<commit_message>
Updates to slides from conversion
</commit_message>
<xml_diff>
--- a/LectureSlides/11_IntroductionToTimeSeries.pptx
+++ b/LectureSlides/11_IntroductionToTimeSeries.pptx
@@ -354,7 +354,7 @@
           <a:p>
             <a:fld id="{241EB5C9-1307-BA42-ABA2-0BC069CD8E7F}" type="datetimeFigureOut">
               <a:rPr lang="en-US" smtClean="0"/>
-              <a:t>10/23/2024</a:t>
+              <a:t>10/24/2024</a:t>
             </a:fld>
             <a:endParaRPr lang="en-US"/>
           </a:p>
@@ -522,7 +522,7 @@
           <a:p>
             <a:fld id="{241EB5C9-1307-BA42-ABA2-0BC069CD8E7F}" type="datetimeFigureOut">
               <a:rPr lang="en-US" smtClean="0"/>
-              <a:t>10/23/2024</a:t>
+              <a:t>10/24/2024</a:t>
             </a:fld>
             <a:endParaRPr lang="en-US"/>
           </a:p>
@@ -700,7 +700,7 @@
           <a:p>
             <a:fld id="{241EB5C9-1307-BA42-ABA2-0BC069CD8E7F}" type="datetimeFigureOut">
               <a:rPr lang="en-US" smtClean="0"/>
-              <a:t>10/23/2024</a:t>
+              <a:t>10/24/2024</a:t>
             </a:fld>
             <a:endParaRPr lang="en-US"/>
           </a:p>
@@ -868,7 +868,7 @@
           <a:p>
             <a:fld id="{241EB5C9-1307-BA42-ABA2-0BC069CD8E7F}" type="datetimeFigureOut">
               <a:rPr lang="en-US" smtClean="0"/>
-              <a:t>10/23/2024</a:t>
+              <a:t>10/24/2024</a:t>
             </a:fld>
             <a:endParaRPr lang="en-US"/>
           </a:p>
@@ -1113,7 +1113,7 @@
           <a:p>
             <a:fld id="{241EB5C9-1307-BA42-ABA2-0BC069CD8E7F}" type="datetimeFigureOut">
               <a:rPr lang="en-US" smtClean="0"/>
-              <a:t>10/23/2024</a:t>
+              <a:t>10/24/2024</a:t>
             </a:fld>
             <a:endParaRPr lang="en-US"/>
           </a:p>
@@ -1398,7 +1398,7 @@
           <a:p>
             <a:fld id="{241EB5C9-1307-BA42-ABA2-0BC069CD8E7F}" type="datetimeFigureOut">
               <a:rPr lang="en-US" smtClean="0"/>
-              <a:t>10/23/2024</a:t>
+              <a:t>10/24/2024</a:t>
             </a:fld>
             <a:endParaRPr lang="en-US"/>
           </a:p>
@@ -1817,7 +1817,7 @@
           <a:p>
             <a:fld id="{241EB5C9-1307-BA42-ABA2-0BC069CD8E7F}" type="datetimeFigureOut">
               <a:rPr lang="en-US" smtClean="0"/>
-              <a:t>10/23/2024</a:t>
+              <a:t>10/24/2024</a:t>
             </a:fld>
             <a:endParaRPr lang="en-US"/>
           </a:p>
@@ -1934,7 +1934,7 @@
           <a:p>
             <a:fld id="{241EB5C9-1307-BA42-ABA2-0BC069CD8E7F}" type="datetimeFigureOut">
               <a:rPr lang="en-US" smtClean="0"/>
-              <a:t>10/23/2024</a:t>
+              <a:t>10/24/2024</a:t>
             </a:fld>
             <a:endParaRPr lang="en-US"/>
           </a:p>
@@ -2029,7 +2029,7 @@
           <a:p>
             <a:fld id="{241EB5C9-1307-BA42-ABA2-0BC069CD8E7F}" type="datetimeFigureOut">
               <a:rPr lang="en-US" smtClean="0"/>
-              <a:t>10/23/2024</a:t>
+              <a:t>10/24/2024</a:t>
             </a:fld>
             <a:endParaRPr lang="en-US"/>
           </a:p>
@@ -2304,7 +2304,7 @@
           <a:p>
             <a:fld id="{241EB5C9-1307-BA42-ABA2-0BC069CD8E7F}" type="datetimeFigureOut">
               <a:rPr lang="en-US" smtClean="0"/>
-              <a:t>10/23/2024</a:t>
+              <a:t>10/24/2024</a:t>
             </a:fld>
             <a:endParaRPr lang="en-US"/>
           </a:p>
@@ -2556,7 +2556,7 @@
           <a:p>
             <a:fld id="{241EB5C9-1307-BA42-ABA2-0BC069CD8E7F}" type="datetimeFigureOut">
               <a:rPr lang="en-US" smtClean="0"/>
-              <a:t>10/23/2024</a:t>
+              <a:t>10/24/2024</a:t>
             </a:fld>
             <a:endParaRPr lang="en-US"/>
           </a:p>
@@ -2767,7 +2767,7 @@
           <a:p>
             <a:fld id="{241EB5C9-1307-BA42-ABA2-0BC069CD8E7F}" type="datetimeFigureOut">
               <a:rPr lang="en-US" smtClean="0"/>
-              <a:t>10/23/2024</a:t>
+              <a:t>10/24/2024</a:t>
             </a:fld>
             <a:endParaRPr lang="en-US"/>
           </a:p>
@@ -3366,7 +3366,20 @@
               <a:buNone/>
             </a:pPr>
             <a:r>
-              <a:t>History of Time Series Analysis</a:t>
+              <a:rPr lang="en-US" dirty="0"/>
+              <a:t>21</a:t>
+            </a:r>
+            <a:r>
+              <a:rPr lang="en-US" baseline="30000" dirty="0"/>
+              <a:t>st</a:t>
+            </a:r>
+            <a:r>
+              <a:rPr lang="en-US" dirty="0"/>
+              <a:t> Century </a:t>
+            </a:r>
+            <a:r>
+              <a:rPr dirty="0"/>
+              <a:t>Time Series Analysis</a:t>
             </a:r>
           </a:p>
         </p:txBody>
@@ -3879,8 +3892,8 @@
           </a:p>
         </p:txBody>
       </p:sp>
-      <mc:AlternateContent xmlns:mc="http://schemas.openxmlformats.org/markup-compatibility/2006">
-        <mc:Choice xmlns:a14="http://schemas.microsoft.com/office/drawing/2010/main" Requires="a14">
+      <mc:AlternateContent xmlns:mc="http://schemas.openxmlformats.org/markup-compatibility/2006" xmlns:a14="http://schemas.microsoft.com/office/drawing/2010/main">
+        <mc:Choice Requires="a14">
           <p:sp>
             <p:nvSpPr>
               <p:cNvPr id="3" name="Content Placeholder 2"/>
@@ -4267,7 +4280,7 @@
             </p:txBody>
           </p:sp>
         </mc:Choice>
-        <mc:Fallback>
+        <mc:Fallback xmlns="">
           <p:sp>
             <p:nvSpPr>
               <p:cNvPr id="3" name="Content Placeholder 2"/>
@@ -4350,8 +4363,8 @@
           </a:p>
         </p:txBody>
       </p:sp>
-      <mc:AlternateContent xmlns:mc="http://schemas.openxmlformats.org/markup-compatibility/2006">
-        <mc:Choice xmlns:a14="http://schemas.microsoft.com/office/drawing/2010/main" Requires="a14">
+      <mc:AlternateContent xmlns:mc="http://schemas.openxmlformats.org/markup-compatibility/2006" xmlns:a14="http://schemas.microsoft.com/office/drawing/2010/main">
+        <mc:Choice Requires="a14">
           <p:sp>
             <p:nvSpPr>
               <p:cNvPr id="3" name="Content Placeholder 2"/>
@@ -4908,7 +4921,7 @@
             </p:txBody>
           </p:sp>
         </mc:Choice>
-        <mc:Fallback>
+        <mc:Fallback xmlns="">
           <p:sp>
             <p:nvSpPr>
               <p:cNvPr id="3" name="Content Placeholder 2"/>
@@ -4980,17 +4993,20 @@
         <p:spPr>
           <a:xfrm>
             <a:off x="457201" y="204787"/>
-            <a:ext cx="3008313" cy="871538"/>
+            <a:ext cx="8250381" cy="539202"/>
           </a:xfrm>
         </p:spPr>
         <p:txBody>
-          <a:bodyPr/>
+          <a:bodyPr>
+            <a:noAutofit/>
+          </a:bodyPr>
           <a:lstStyle/>
           <a:p>
-            <a:pPr marL="0" lvl="0" indent="0">
+            <a:pPr marL="0" lvl="0" indent="0" algn="ctr">
               <a:buNone/>
             </a:pPr>
             <a:r>
+              <a:rPr sz="3200" b="0" dirty="0"/>
               <a:t>White Noise Series</a:t>
             </a:r>
           </a:p>
@@ -5006,25 +5022,79 @@
             <p:ph type="body" sz="half" idx="2"/>
           </p:nvPr>
         </p:nvSpPr>
-        <p:spPr/>
+        <p:spPr>
+          <a:xfrm>
+            <a:off x="457201" y="985058"/>
+            <a:ext cx="8458199" cy="1272420"/>
+          </a:xfrm>
+        </p:spPr>
         <p:txBody>
-          <a:bodyPr/>
+          <a:bodyPr>
+            <a:normAutofit fontScale="92500" lnSpcReduction="20000"/>
+          </a:bodyPr>
           <a:lstStyle/>
           <a:p>
             <a:pPr marL="0" lvl="0" indent="0">
               <a:buNone/>
             </a:pPr>
             <a:r>
+              <a:rPr sz="2000" dirty="0"/>
               <a:t>What does a white noise series look like?</a:t>
             </a:r>
+            <a:endParaRPr lang="en-US" sz="2000" dirty="0"/>
+          </a:p>
+          <a:p>
+            <a:pPr marL="342900" lvl="0" indent="-342900">
+              <a:buFont typeface="Arial" panose="020B0604020202020204" pitchFamily="34" charset="0"/>
+              <a:buChar char="•"/>
+            </a:pPr>
+            <a:r>
+              <a:rPr lang="en-US" sz="2000" dirty="0"/>
+              <a:t>White noise is a series of </a:t>
+            </a:r>
+            <a:r>
+              <a:rPr lang="en-US" sz="2000" dirty="0" err="1"/>
+              <a:t>iid</a:t>
+            </a:r>
+            <a:r>
+              <a:rPr lang="en-US" sz="2000" dirty="0"/>
+              <a:t> impulses </a:t>
+            </a:r>
+          </a:p>
+          <a:p>
+            <a:pPr marL="342900" lvl="0" indent="-342900">
+              <a:buFont typeface="Arial" panose="020B0604020202020204" pitchFamily="34" charset="0"/>
+              <a:buChar char="•"/>
+            </a:pPr>
+            <a:r>
+              <a:rPr lang="en-US" sz="2000" dirty="0"/>
+              <a:t>White noise series has no trend  </a:t>
+            </a:r>
+          </a:p>
+          <a:p>
+            <a:pPr marL="342900" lvl="0" indent="-342900">
+              <a:buFont typeface="Arial" panose="020B0604020202020204" pitchFamily="34" charset="0"/>
+              <a:buChar char="•"/>
+            </a:pPr>
+            <a:r>
+              <a:rPr lang="en-US" sz="2000" dirty="0"/>
+              <a:t>The white noise series has constant statistical properties for all time  </a:t>
+            </a:r>
+            <a:endParaRPr sz="2000" dirty="0"/>
           </a:p>
         </p:txBody>
       </p:sp>
       <p:pic>
         <p:nvPicPr>
-          <p:cNvPr id="3" name="Picture 1" descr="11_IntroductionToTimeSeries_files/figure-pptx/unnamed-chunk-1-1.png"/>
+          <p:cNvPr id="6" name="Picture 5">
+            <a:extLst>
+              <a:ext uri="{FF2B5EF4-FFF2-40B4-BE49-F238E27FC236}">
+                <a16:creationId xmlns:a16="http://schemas.microsoft.com/office/drawing/2014/main" id="{3888A5DF-C717-DDE4-E081-7C7885F3AAEC}"/>
+              </a:ext>
+            </a:extLst>
+          </p:cNvPr>
           <p:cNvPicPr>
-            <a:picLocks noGrp="1" noChangeAspect="1"/>
+            <a:picLocks noChangeAspect="1"/>
           </p:cNvPicPr>
           <p:nvPr/>
         </p:nvPicPr>
@@ -5034,20 +5104,14 @@
             <a:fillRect/>
           </a:stretch>
         </p:blipFill>
-        <p:spPr bwMode="auto">
+        <p:spPr>
           <a:xfrm>
-            <a:off x="3568700" y="1117600"/>
-            <a:ext cx="5105400" cy="2552700"/>
+            <a:off x="1837112" y="2338385"/>
+            <a:ext cx="5291052" cy="2743096"/>
           </a:xfrm>
           <a:prstGeom prst="rect">
             <a:avLst/>
           </a:prstGeom>
-          <a:noFill/>
-          <a:ln w="9525">
-            <a:noFill/>
-            <a:headEnd/>
-            <a:tailEnd/>
-          </a:ln>
         </p:spPr>
       </p:pic>
     </p:spTree>
@@ -5087,18 +5151,21 @@
         </p:nvSpPr>
         <p:spPr>
           <a:xfrm>
-            <a:off x="457201" y="204787"/>
-            <a:ext cx="3008313" cy="871538"/>
+            <a:off x="457201" y="204786"/>
+            <a:ext cx="8163097" cy="481013"/>
           </a:xfrm>
         </p:spPr>
         <p:txBody>
-          <a:bodyPr/>
+          <a:bodyPr>
+            <a:noAutofit/>
+          </a:bodyPr>
           <a:lstStyle/>
           <a:p>
-            <a:pPr marL="0" lvl="0" indent="0">
+            <a:pPr marL="0" lvl="0" indent="0" algn="ctr">
               <a:buNone/>
             </a:pPr>
             <a:r>
+              <a:rPr sz="3200" b="0" dirty="0"/>
               <a:t>White Noise Series</a:t>
             </a:r>
           </a:p>
@@ -5114,39 +5181,62 @@
             <p:ph type="body" sz="half" idx="2"/>
           </p:nvPr>
         </p:nvSpPr>
-        <p:spPr/>
+        <p:spPr>
+          <a:xfrm>
+            <a:off x="457201" y="1076327"/>
+            <a:ext cx="8250381" cy="1301114"/>
+          </a:xfrm>
+        </p:spPr>
         <p:txBody>
-          <a:bodyPr/>
+          <a:bodyPr>
+            <a:normAutofit/>
+          </a:bodyPr>
           <a:lstStyle/>
           <a:p>
             <a:pPr marL="0" lvl="0" indent="0">
               <a:buNone/>
             </a:pPr>
             <a:r>
-              <a:t>What does a white noise series look like?</a:t>
+              <a:rPr lang="en-US" sz="2000" dirty="0"/>
+              <a:t>The distribution of a white noise </a:t>
+            </a:r>
+            <a:r>
+              <a:rPr sz="2000" dirty="0" err="1"/>
+              <a:t>iid</a:t>
+            </a:r>
+            <a:r>
+              <a:rPr sz="2000" dirty="0"/>
+              <a:t> Normal</a:t>
+            </a:r>
+            <a:endParaRPr lang="en-US" sz="2000" dirty="0"/>
+          </a:p>
+          <a:p>
+            <a:pPr marL="342900" lvl="0" indent="-342900">
+              <a:buFont typeface="Arial" panose="020B0604020202020204" pitchFamily="34" charset="0"/>
+              <a:buChar char="•"/>
+            </a:pPr>
+            <a:r>
+              <a:rPr lang="en-US" sz="2000" dirty="0"/>
+              <a:t>Each impulse is an independent draw from the Normal distribution</a:t>
             </a:r>
           </a:p>
           <a:p>
             <a:pPr lvl="0"/>
-            <a:r>
-              <a:t>Each value is a sample is iid Normally distributed</a:t>
-            </a:r>
-            <a:br/>
-            <a:endParaRPr/>
-          </a:p>
-          <a:p>
-            <a:pPr lvl="0"/>
-            <a:r>
-              <a:t>No trend</a:t>
-            </a:r>
+            <a:endParaRPr sz="2000" dirty="0"/>
           </a:p>
         </p:txBody>
       </p:sp>
       <p:pic>
         <p:nvPicPr>
-          <p:cNvPr id="3" name="Picture 1" descr="11_IntroductionToTimeSeries_files/figure-pptx/unnamed-chunk-2-3.png"/>
+          <p:cNvPr id="6" name="Picture 5">
+            <a:extLst>
+              <a:ext uri="{FF2B5EF4-FFF2-40B4-BE49-F238E27FC236}">
+                <a16:creationId xmlns:a16="http://schemas.microsoft.com/office/drawing/2014/main" id="{91012729-4F5F-0EBE-879E-BB121A06CE62}"/>
+              </a:ext>
+            </a:extLst>
+          </p:cNvPr>
           <p:cNvPicPr>
-            <a:picLocks noGrp="1" noChangeAspect="1"/>
+            <a:picLocks noChangeAspect="1"/>
           </p:cNvPicPr>
           <p:nvPr/>
         </p:nvPicPr>
@@ -5156,20 +5246,14 @@
             <a:fillRect/>
           </a:stretch>
         </p:blipFill>
-        <p:spPr bwMode="auto">
+        <p:spPr>
           <a:xfrm>
-            <a:off x="3568700" y="1371600"/>
-            <a:ext cx="5105400" cy="2044700"/>
+            <a:off x="1731125" y="2571750"/>
+            <a:ext cx="5523807" cy="2512254"/>
           </a:xfrm>
           <a:prstGeom prst="rect">
             <a:avLst/>
           </a:prstGeom>
-          <a:noFill/>
-          <a:ln w="9525">
-            <a:noFill/>
-            <a:headEnd/>
-            <a:tailEnd/>
-          </a:ln>
         </p:spPr>
       </p:pic>
     </p:spTree>
@@ -5253,8 +5337,20 @@
           <a:p>
             <a:pPr lvl="0"/>
             <a:r>
+              <a:rPr lang="en-US" dirty="0"/>
+              <a:t>The statistical properties of a</a:t>
+            </a:r>
+            <a:r>
               <a:rPr dirty="0"/>
-              <a:t>A stationary time series has statistical properties constant in time</a:t>
+              <a:t> stationary time </a:t>
+            </a:r>
+            <a:r>
+              <a:rPr lang="en-US" dirty="0"/>
+              <a:t>series are</a:t>
+            </a:r>
+            <a:r>
+              <a:rPr dirty="0"/>
+              <a:t> constant in time</a:t>
             </a:r>
           </a:p>
           <a:p>
@@ -5394,6 +5490,35 @@
               <a:rPr dirty="0"/>
               <a:t>Hypothesis tests</a:t>
             </a:r>
+            <a:endParaRPr lang="en-US" dirty="0"/>
+          </a:p>
+          <a:p>
+            <a:pPr lvl="1"/>
+            <a:r>
+              <a:rPr lang="en-US" dirty="0">
+                <a:hlinkClick r:id="rId2"/>
+              </a:rPr>
+              <a:t>Augmented Dicky-Fuller test</a:t>
+            </a:r>
+            <a:endParaRPr lang="en-US" dirty="0"/>
+          </a:p>
+          <a:p>
+            <a:pPr lvl="1"/>
+            <a:r>
+              <a:rPr lang="en-US" dirty="0">
+                <a:hlinkClick r:id="rId3"/>
+              </a:rPr>
+              <a:t>Kwiatkowski-Phillips-Schmidt-Shin (KPSS) test</a:t>
+            </a:r>
+            <a:endParaRPr lang="en-US" dirty="0"/>
+          </a:p>
+          <a:p>
+            <a:pPr lvl="1"/>
+            <a:r>
+              <a:rPr lang="en-US" dirty="0"/>
+              <a:t>More on these tests latter</a:t>
+            </a:r>
+            <a:endParaRPr dirty="0"/>
           </a:p>
         </p:txBody>
       </p:sp>
@@ -5467,35 +5592,45 @@
               <a:buNone/>
             </a:pPr>
             <a:r>
+              <a:rPr dirty="0"/>
               <a:t>Can measure the correlation of a time series with itself</a:t>
             </a:r>
           </a:p>
           <a:p>
             <a:pPr lvl="0"/>
             <a:r>
-              <a:t>The time series is correlated at different time offsets</a:t>
-            </a:r>
+              <a:rPr dirty="0"/>
+              <a:t>The time series is correlated at different time </a:t>
+            </a:r>
+            <a:r>
+              <a:rPr lang="en-US" dirty="0"/>
+              <a:t>offsets</a:t>
+            </a:r>
+            <a:endParaRPr dirty="0"/>
           </a:p>
           <a:p>
             <a:pPr lvl="0"/>
             <a:r>
+              <a:rPr dirty="0"/>
               <a:t>Each time step of offset is called a </a:t>
             </a:r>
             <a:r>
-              <a:rPr b="1"/>
+              <a:rPr b="1" dirty="0"/>
               <a:t>lag</a:t>
             </a:r>
           </a:p>
           <a:p>
             <a:pPr lvl="0"/>
             <a:r>
+              <a:rPr dirty="0"/>
               <a:t>The </a:t>
             </a:r>
             <a:r>
-              <a:rPr b="1"/>
+              <a:rPr b="1" dirty="0"/>
               <a:t>autocorrelation function (ACF)</a:t>
             </a:r>
             <a:r>
+              <a:rPr dirty="0"/>
               <a:t> is measured between the series and the series lagged in time</a:t>
             </a:r>
           </a:p>
@@ -5650,7 +5785,7 @@
             <p:spPr/>
             <p:txBody>
               <a:bodyPr>
-                <a:normAutofit/>
+                <a:normAutofit fontScale="92500"/>
               </a:bodyPr>
               <a:lstStyle/>
               <a:p>
@@ -6006,6 +6141,207 @@
                 <a:r>
                   <a:rPr dirty="0"/>
                   <a:t>Where:</a:t>
+                </a:r>
+              </a:p>
+              <a:p>
+                <a:pPr lvl="0"/>
+                <a14:m>
+                  <m:oMath xmlns:m="http://schemas.openxmlformats.org/officeDocument/2006/math">
+                    <m:sSub>
+                      <m:sSubPr>
+                        <m:ctrlPr>
+                          <a:rPr lang="ar-AE" i="1" smtClean="0">
+                            <a:latin typeface="Cambria Math" panose="02040503050406030204" pitchFamily="18" charset="0"/>
+                          </a:rPr>
+                        </m:ctrlPr>
+                      </m:sSubPr>
+                      <m:e>
+                        <m:r>
+                          <a:rPr lang="ar-AE">
+                            <a:latin typeface="Cambria Math" panose="02040503050406030204" pitchFamily="18" charset="0"/>
+                          </a:rPr>
+                          <m:t>𝛾</m:t>
+                        </m:r>
+                      </m:e>
+                      <m:sub>
+                        <m:r>
+                          <a:rPr lang="ar-AE">
+                            <a:latin typeface="Cambria Math" panose="02040503050406030204" pitchFamily="18" charset="0"/>
+                          </a:rPr>
+                          <m:t>𝑘</m:t>
+                        </m:r>
+                      </m:sub>
+                    </m:sSub>
+                    <m:r>
+                      <a:rPr lang="ar-AE">
+                        <a:latin typeface="Cambria Math" panose="02040503050406030204" pitchFamily="18" charset="0"/>
+                      </a:rPr>
+                      <m:t>=</m:t>
+                    </m:r>
+                    <m:nary>
+                      <m:naryPr>
+                        <m:chr m:val="∑"/>
+                        <m:limLoc m:val="undOvr"/>
+                        <m:ctrlPr>
+                          <a:rPr lang="ar-AE" i="1">
+                            <a:latin typeface="Cambria Math" panose="02040503050406030204" pitchFamily="18" charset="0"/>
+                          </a:rPr>
+                        </m:ctrlPr>
+                      </m:naryPr>
+                      <m:sub>
+                        <m:r>
+                          <a:rPr lang="ar-AE">
+                            <a:latin typeface="Cambria Math" panose="02040503050406030204" pitchFamily="18" charset="0"/>
+                          </a:rPr>
+                          <m:t>𝑡</m:t>
+                        </m:r>
+                        <m:r>
+                          <a:rPr lang="ar-AE">
+                            <a:latin typeface="Cambria Math" panose="02040503050406030204" pitchFamily="18" charset="0"/>
+                          </a:rPr>
+                          <m:t>=</m:t>
+                        </m:r>
+                        <m:r>
+                          <a:rPr lang="ar-AE">
+                            <a:latin typeface="Cambria Math" panose="02040503050406030204" pitchFamily="18" charset="0"/>
+                          </a:rPr>
+                          <m:t>1</m:t>
+                        </m:r>
+                      </m:sub>
+                      <m:sup>
+                        <m:r>
+                          <a:rPr lang="ar-AE">
+                            <a:latin typeface="Cambria Math" panose="02040503050406030204" pitchFamily="18" charset="0"/>
+                          </a:rPr>
+                          <m:t>𝑁</m:t>
+                        </m:r>
+                      </m:sup>
+                      <m:e>
+                        <m:d>
+                          <m:dPr>
+                            <m:ctrlPr>
+                              <a:rPr lang="ar-AE" i="1">
+                                <a:latin typeface="Cambria Math" panose="02040503050406030204" pitchFamily="18" charset="0"/>
+                              </a:rPr>
+                            </m:ctrlPr>
+                          </m:dPr>
+                          <m:e>
+                            <m:sSub>
+                              <m:sSubPr>
+                                <m:ctrlPr>
+                                  <a:rPr lang="ar-AE" i="1">
+                                    <a:latin typeface="Cambria Math" panose="02040503050406030204" pitchFamily="18" charset="0"/>
+                                  </a:rPr>
+                                </m:ctrlPr>
+                              </m:sSubPr>
+                              <m:e>
+                                <m:r>
+                                  <a:rPr lang="ar-AE">
+                                    <a:latin typeface="Cambria Math" panose="02040503050406030204" pitchFamily="18" charset="0"/>
+                                  </a:rPr>
+                                  <m:t>𝑦</m:t>
+                                </m:r>
+                              </m:e>
+                              <m:sub>
+                                <m:r>
+                                  <a:rPr lang="ar-AE">
+                                    <a:latin typeface="Cambria Math" panose="02040503050406030204" pitchFamily="18" charset="0"/>
+                                  </a:rPr>
+                                  <m:t>𝑡</m:t>
+                                </m:r>
+                              </m:sub>
+                            </m:sSub>
+                            <m:r>
+                              <a:rPr lang="ar-AE">
+                                <a:latin typeface="Cambria Math" panose="02040503050406030204" pitchFamily="18" charset="0"/>
+                              </a:rPr>
+                              <m:t>−</m:t>
+                            </m:r>
+                            <m:r>
+                              <a:rPr lang="ar-AE">
+                                <a:latin typeface="Cambria Math" panose="02040503050406030204" pitchFamily="18" charset="0"/>
+                              </a:rPr>
+                              <m:t>𝜇</m:t>
+                            </m:r>
+                          </m:e>
+                        </m:d>
+                      </m:e>
+                    </m:nary>
+                    <m:r>
+                      <a:rPr lang="ar-AE">
+                        <a:latin typeface="Cambria Math" panose="02040503050406030204" pitchFamily="18" charset="0"/>
+                      </a:rPr>
+                      <m:t>⋅</m:t>
+                    </m:r>
+                    <m:d>
+                      <m:dPr>
+                        <m:ctrlPr>
+                          <a:rPr lang="ar-AE" i="1">
+                            <a:latin typeface="Cambria Math" panose="02040503050406030204" pitchFamily="18" charset="0"/>
+                          </a:rPr>
+                        </m:ctrlPr>
+                      </m:dPr>
+                      <m:e>
+                        <m:sSub>
+                          <m:sSubPr>
+                            <m:ctrlPr>
+                              <a:rPr lang="ar-AE" i="1">
+                                <a:latin typeface="Cambria Math" panose="02040503050406030204" pitchFamily="18" charset="0"/>
+                              </a:rPr>
+                            </m:ctrlPr>
+                          </m:sSubPr>
+                          <m:e>
+                            <m:r>
+                              <a:rPr lang="ar-AE">
+                                <a:latin typeface="Cambria Math" panose="02040503050406030204" pitchFamily="18" charset="0"/>
+                              </a:rPr>
+                              <m:t>𝑦</m:t>
+                            </m:r>
+                          </m:e>
+                          <m:sub>
+                            <m:r>
+                              <a:rPr lang="ar-AE">
+                                <a:latin typeface="Cambria Math" panose="02040503050406030204" pitchFamily="18" charset="0"/>
+                              </a:rPr>
+                              <m:t>𝑡</m:t>
+                            </m:r>
+                            <m:r>
+                              <a:rPr lang="ar-AE">
+                                <a:latin typeface="Cambria Math" panose="02040503050406030204" pitchFamily="18" charset="0"/>
+                              </a:rPr>
+                              <m:t>−</m:t>
+                            </m:r>
+                            <m:r>
+                              <a:rPr lang="ar-AE">
+                                <a:latin typeface="Cambria Math" panose="02040503050406030204" pitchFamily="18" charset="0"/>
+                              </a:rPr>
+                              <m:t>𝑘</m:t>
+                            </m:r>
+                          </m:sub>
+                        </m:sSub>
+                        <m:r>
+                          <a:rPr lang="ar-AE">
+                            <a:latin typeface="Cambria Math" panose="02040503050406030204" pitchFamily="18" charset="0"/>
+                          </a:rPr>
+                          <m:t>−</m:t>
+                        </m:r>
+                        <m:r>
+                          <a:rPr lang="ar-AE">
+                            <a:latin typeface="Cambria Math" panose="02040503050406030204" pitchFamily="18" charset="0"/>
+                          </a:rPr>
+                          <m:t>𝜇</m:t>
+                        </m:r>
+                      </m:e>
+                    </m:d>
+                  </m:oMath>
+                </a14:m>
+                <a:r>
+                  <a:rPr lang="en-US" dirty="0"/>
+                  <a:t> is the autocovariance at lag </a:t>
+                </a:r>
+                <a:r>
+                  <a:rPr lang="en-US" i="1" dirty="0"/>
+                  <a:t>k</a:t>
                 </a:r>
               </a:p>
               <a:p>
@@ -6147,7 +6483,7 @@
               <a:blipFill>
                 <a:blip r:embed="rId2"/>
                 <a:stretch>
-                  <a:fillRect l="-1111" t="-1436"/>
+                  <a:fillRect l="-963" t="-1257"/>
                 </a:stretch>
               </a:blipFill>
             </p:spPr>
@@ -6232,7 +6568,7 @@
             <p:spPr/>
             <p:txBody>
               <a:bodyPr>
-                <a:normAutofit fontScale="92500" lnSpcReduction="10000"/>
+                <a:normAutofit lnSpcReduction="10000"/>
               </a:bodyPr>
               <a:lstStyle/>
               <a:p>
@@ -6310,7 +6646,7 @@
                 <a:pPr lvl="1"/>
                 <a:r>
                   <a:rPr dirty="0"/>
-                  <a:t>Remove the linearly predictable autocorrelation component of the time series</a:t>
+                  <a:t>Remove the linearly predictable component of the time series</a:t>
                 </a:r>
               </a:p>
               <a:p>
@@ -6356,7 +6692,7 @@
               <a:blipFill>
                 <a:blip r:embed="rId2"/>
                 <a:stretch>
-                  <a:fillRect l="-963" t="-2334" b="-1257"/>
+                  <a:fillRect l="-1111" t="-2513" b="-2513"/>
                 </a:stretch>
               </a:blipFill>
             </p:spPr>
@@ -6413,17 +6749,20 @@
         <p:spPr>
           <a:xfrm>
             <a:off x="457201" y="204787"/>
-            <a:ext cx="3008313" cy="871538"/>
+            <a:ext cx="8021781" cy="485169"/>
           </a:xfrm>
         </p:spPr>
         <p:txBody>
-          <a:bodyPr/>
+          <a:bodyPr>
+            <a:noAutofit/>
+          </a:bodyPr>
           <a:lstStyle/>
           <a:p>
             <a:pPr marL="0" lvl="0" indent="0">
               <a:buNone/>
             </a:pPr>
             <a:r>
+              <a:rPr sz="2800" b="0" dirty="0"/>
               <a:t>Autocorrelation Properties of White Noise Series</a:t>
             </a:r>
           </a:p>
@@ -6441,53 +6780,81 @@
                 <p:ph type="body" sz="half" idx="2"/>
               </p:nvPr>
             </p:nvSpPr>
-            <p:spPr/>
+            <p:spPr>
+              <a:xfrm>
+                <a:off x="457201" y="1076326"/>
+                <a:ext cx="4555373" cy="3599583"/>
+              </a:xfrm>
+            </p:spPr>
             <p:txBody>
-              <a:bodyPr/>
+              <a:bodyPr>
+                <a:normAutofit/>
+              </a:bodyPr>
               <a:lstStyle/>
               <a:p>
                 <a:pPr marL="0" lvl="0" indent="0">
                   <a:buNone/>
                 </a:pPr>
                 <a:r>
+                  <a:rPr sz="2000" dirty="0"/>
                   <a:t>What are the autocorrelation and partial autocorrelation properties of a white noise series?</a:t>
                 </a:r>
               </a:p>
               <a:p>
-                <a:pPr lvl="0"/>
-                <a:r>
+                <a:pPr marL="342900" indent="-342900">
+                  <a:buFont typeface="Arial" panose="020B0604020202020204" pitchFamily="34" charset="0"/>
+                  <a:buChar char="•"/>
+                </a:pPr>
+                <a:r>
+                  <a:rPr lang="en-US" sz="2000" dirty="0"/>
+                  <a:t>Autocorrelation plot shows value at each lag selected</a:t>
+                </a:r>
+              </a:p>
+              <a:p>
+                <a:pPr marL="342900" indent="-342900">
+                  <a:buFont typeface="Arial" panose="020B0604020202020204" pitchFamily="34" charset="0"/>
+                  <a:buChar char="•"/>
+                </a:pPr>
+                <a:r>
+                  <a:rPr lang="en-US" sz="2000" dirty="0"/>
+                  <a:t>White noise series have no serial correlation</a:t>
+                </a:r>
+              </a:p>
+              <a:p>
+                <a:pPr marL="342900" lvl="0" indent="-342900">
+                  <a:buFont typeface="Arial" panose="020B0604020202020204" pitchFamily="34" charset="0"/>
+                  <a:buChar char="•"/>
+                </a:pPr>
+                <a:r>
+                  <a:rPr sz="2000" dirty="0"/>
                   <a:t>The autocorrelation and partial autocorrelation are 0 for all </a:t>
                 </a:r>
                 <a14:m>
                   <m:oMath xmlns:m="http://schemas.openxmlformats.org/officeDocument/2006/math">
                     <m:r>
-                      <a:rPr>
+                      <a:rPr sz="2000">
                         <a:latin typeface="Cambria Math" panose="02040503050406030204" pitchFamily="18" charset="0"/>
                       </a:rPr>
                       <m:t>𝑘</m:t>
                     </m:r>
                     <m:r>
-                      <a:rPr>
+                      <a:rPr sz="2000">
                         <a:latin typeface="Cambria Math" panose="02040503050406030204" pitchFamily="18" charset="0"/>
                       </a:rPr>
                       <m:t>&gt;</m:t>
                     </m:r>
                     <m:r>
-                      <a:rPr>
+                      <a:rPr sz="2000">
                         <a:latin typeface="Cambria Math" panose="02040503050406030204" pitchFamily="18" charset="0"/>
                       </a:rPr>
                       <m:t>0</m:t>
                     </m:r>
                   </m:oMath>
                 </a14:m>
-                <a:br/>
-                <a:endParaRPr/>
-              </a:p>
-              <a:p>
-                <a:pPr lvl="0"/>
-                <a:r>
-                  <a:t>Autocorrelation plot shows value at each lag selected</a:t>
-                </a:r>
+                <a:br>
+                  <a:rPr sz="2000" dirty="0"/>
+                </a:br>
+                <a:endParaRPr sz="2000" dirty="0"/>
               </a:p>
             </p:txBody>
           </p:sp>
@@ -6504,10 +6871,14 @@
               </p:nvPr>
             </p:nvSpPr>
             <p:spPr>
+              <a:xfrm>
+                <a:off x="457201" y="1076326"/>
+                <a:ext cx="4555373" cy="3599583"/>
+              </a:xfrm>
               <a:blipFill>
                 <a:blip r:embed="rId2"/>
                 <a:stretch>
-                  <a:fillRect/>
+                  <a:fillRect l="-1339" t="-1017"/>
                 </a:stretch>
               </a:blipFill>
             </p:spPr>
@@ -6528,9 +6899,15 @@
       </mc:AlternateContent>
       <p:pic>
         <p:nvPicPr>
-          <p:cNvPr id="3" name="Picture 1" descr="11_IntroductionToTimeSeries_files/figure-pptx/unnamed-chunk-3-5.png"/>
+          <p:cNvPr id="6" name="Picture 5">
+            <a:extLst>
+              <a:ext uri="{FF2B5EF4-FFF2-40B4-BE49-F238E27FC236}">
+                <a16:creationId xmlns:a16="http://schemas.microsoft.com/office/drawing/2014/main" id="{C87204BA-60F2-00EE-1365-DDF67499FDCA}"/>
+              </a:ext>
+            </a:extLst>
+          </p:cNvPr>
           <p:cNvPicPr>
-            <a:picLocks noGrp="1" noChangeAspect="1"/>
+            <a:picLocks noChangeAspect="1"/>
           </p:cNvPicPr>
           <p:nvPr/>
         </p:nvPicPr>
@@ -6540,20 +6917,14 @@
             <a:fillRect/>
           </a:stretch>
         </p:blipFill>
-        <p:spPr bwMode="auto">
+        <p:spPr>
           <a:xfrm>
-            <a:off x="3568700" y="1752600"/>
-            <a:ext cx="5105400" cy="1270000"/>
+            <a:off x="5153038" y="993371"/>
+            <a:ext cx="3907108" cy="3838402"/>
           </a:xfrm>
           <a:prstGeom prst="rect">
             <a:avLst/>
           </a:prstGeom>
-          <a:noFill/>
-          <a:ln w="9525">
-            <a:noFill/>
-            <a:headEnd/>
-            <a:tailEnd/>
-          </a:ln>
         </p:spPr>
       </p:pic>
     </p:spTree>
@@ -6605,8 +6976,8 @@
           </a:p>
         </p:txBody>
       </p:sp>
-      <mc:AlternateContent xmlns:mc="http://schemas.openxmlformats.org/markup-compatibility/2006" xmlns:a14="http://schemas.microsoft.com/office/drawing/2010/main">
-        <mc:Choice Requires="a14">
+      <mc:AlternateContent xmlns:mc="http://schemas.openxmlformats.org/markup-compatibility/2006">
+        <mc:Choice xmlns:a14="http://schemas.microsoft.com/office/drawing/2010/main" Requires="a14">
           <p:sp>
             <p:nvSpPr>
               <p:cNvPr id="3" name="Content Placeholder 2"/>
@@ -6620,7 +6991,7 @@
             <p:spPr/>
             <p:txBody>
               <a:bodyPr>
-                <a:normAutofit fontScale="92500" lnSpcReduction="20000"/>
+                <a:normAutofit fontScale="85000" lnSpcReduction="10000"/>
               </a:bodyPr>
               <a:lstStyle/>
               <a:p>
@@ -6628,59 +6999,30 @@
                   <a:buNone/>
                 </a:pPr>
                 <a:r>
+                  <a:rPr lang="en-US" dirty="0"/>
                   <a:t>The </a:t>
                 </a:r>
                 <a:r>
-                  <a:rPr>
+                  <a:rPr lang="en-US" dirty="0" err="1">
                     <a:hlinkClick r:id="rId2"/>
                   </a:rPr>
-                  <a:t>Ljung-Box Q statistic</a:t>
-                </a:r>
-                <a:r>
+                  <a:t>Ljung</a:t>
+                </a:r>
+                <a:r>
+                  <a:rPr lang="en-US" dirty="0">
+                    <a:hlinkClick r:id="rId2"/>
+                  </a:rPr>
+                  <a:t>-Box Q statistic</a:t>
+                </a:r>
+                <a:r>
+                  <a:rPr lang="en-US" dirty="0"/>
                   <a:t> used to test for autocorrelation</a:t>
                 </a:r>
               </a:p>
               <a:p>
                 <a:pPr lvl="0"/>
                 <a:r>
-                  <a:t>Q is close to </a:t>
-                </a:r>
-                <a14:m>
-                  <m:oMath xmlns:m="http://schemas.openxmlformats.org/officeDocument/2006/math">
-                    <m:sSup>
-                      <m:sSupPr>
-                        <m:ctrlPr>
-                          <a:rPr i="1">
-                            <a:latin typeface="Cambria Math" panose="02040503050406030204" pitchFamily="18" charset="0"/>
-                          </a:rPr>
-                        </m:ctrlPr>
-                      </m:sSupPr>
-                      <m:e>
-                        <m:r>
-                          <a:rPr>
-                            <a:latin typeface="Cambria Math" panose="02040503050406030204" pitchFamily="18" charset="0"/>
-                          </a:rPr>
-                          <m:t>𝜒</m:t>
-                        </m:r>
-                      </m:e>
-                      <m:sup>
-                        <m:r>
-                          <a:rPr>
-                            <a:latin typeface="Cambria Math" panose="02040503050406030204" pitchFamily="18" charset="0"/>
-                          </a:rPr>
-                          <m:t>2</m:t>
-                        </m:r>
-                      </m:sup>
-                    </m:sSup>
-                  </m:oMath>
-                </a14:m>
-                <a:r>
-                  <a:t> distributed</a:t>
-                </a:r>
-              </a:p>
-              <a:p>
-                <a:pPr lvl="0"/>
-                <a:r>
+                  <a:rPr lang="en-US" dirty="0"/>
                   <a:t>Q computed from autocorrelation of at multiple lag values, </a:t>
                 </a:r>
                 <a14:m>
@@ -6688,14 +7030,14 @@
                     <m:sSub>
                       <m:sSubPr>
                         <m:ctrlPr>
-                          <a:rPr i="1">
+                          <a:rPr lang="ar-AE" i="1">
                             <a:latin typeface="Cambria Math" panose="02040503050406030204" pitchFamily="18" charset="0"/>
                           </a:rPr>
                         </m:ctrlPr>
                       </m:sSubPr>
                       <m:e>
                         <m:r>
-                          <a:rPr>
+                          <a:rPr lang="ar-AE">
                             <a:latin typeface="Cambria Math" panose="02040503050406030204" pitchFamily="18" charset="0"/>
                           </a:rPr>
                           <m:t>𝜌</m:t>
@@ -6703,16 +7045,19 @@
                       </m:e>
                       <m:sub>
                         <m:r>
-                          <a:rPr>
+                          <m:rPr>
+                            <m:sty m:val="p"/>
+                          </m:rPr>
+                          <a:rPr lang="en-US" b="0" i="0" smtClean="0">
                             <a:latin typeface="Cambria Math" panose="02040503050406030204" pitchFamily="18" charset="0"/>
                           </a:rPr>
-                          <m:t>𝑖</m:t>
+                          <m:t>k</m:t>
                         </m:r>
                       </m:sub>
                     </m:sSub>
                   </m:oMath>
                 </a14:m>
-                <a:endParaRPr/>
+                <a:endParaRPr lang="ar-AE" dirty="0"/>
               </a:p>
               <a:p>
                 <a:pPr marL="0" lvl="0" indent="0">
@@ -6725,19 +7070,19 @@
                     </m:oMathParaPr>
                     <m:oMath xmlns:m="http://schemas.openxmlformats.org/officeDocument/2006/math">
                       <m:r>
-                        <a:rPr>
+                        <a:rPr lang="ar-AE">
                           <a:latin typeface="Cambria Math" panose="02040503050406030204" pitchFamily="18" charset="0"/>
                         </a:rPr>
                         <m:t>𝑄</m:t>
                       </m:r>
                       <m:r>
-                        <a:rPr>
+                        <a:rPr lang="ar-AE">
                           <a:latin typeface="Cambria Math" panose="02040503050406030204" pitchFamily="18" charset="0"/>
                         </a:rPr>
                         <m:t>=</m:t>
                       </m:r>
                       <m:r>
-                        <a:rPr>
+                        <a:rPr lang="ar-AE">
                           <a:latin typeface="Cambria Math" panose="02040503050406030204" pitchFamily="18" charset="0"/>
                         </a:rPr>
                         <m:t>𝑛</m:t>
@@ -6745,26 +7090,26 @@
                       <m:d>
                         <m:dPr>
                           <m:ctrlPr>
-                            <a:rPr i="1">
+                            <a:rPr lang="ar-AE" i="1">
                               <a:latin typeface="Cambria Math" panose="02040503050406030204" pitchFamily="18" charset="0"/>
                             </a:rPr>
                           </m:ctrlPr>
                         </m:dPr>
                         <m:e>
                           <m:r>
-                            <a:rPr>
+                            <a:rPr lang="ar-AE">
                               <a:latin typeface="Cambria Math" panose="02040503050406030204" pitchFamily="18" charset="0"/>
                             </a:rPr>
                             <m:t>𝑛</m:t>
                           </m:r>
                           <m:r>
-                            <a:rPr>
+                            <a:rPr lang="ar-AE">
                               <a:latin typeface="Cambria Math" panose="02040503050406030204" pitchFamily="18" charset="0"/>
                             </a:rPr>
                             <m:t>+</m:t>
                           </m:r>
                           <m:r>
-                            <a:rPr>
+                            <a:rPr lang="ar-AE">
                               <a:latin typeface="Cambria Math" panose="02040503050406030204" pitchFamily="18" charset="0"/>
                             </a:rPr>
                             <m:t>2</m:t>
@@ -6776,26 +7121,26 @@
                           <m:chr m:val="∑"/>
                           <m:limLoc m:val="undOvr"/>
                           <m:ctrlPr>
-                            <a:rPr i="1">
+                            <a:rPr lang="ar-AE" i="1">
                               <a:latin typeface="Cambria Math" panose="02040503050406030204" pitchFamily="18" charset="0"/>
                             </a:rPr>
                           </m:ctrlPr>
                         </m:naryPr>
                         <m:sub>
                           <m:r>
-                            <a:rPr>
+                            <a:rPr lang="ar-AE">
                               <a:latin typeface="Cambria Math" panose="02040503050406030204" pitchFamily="18" charset="0"/>
                             </a:rPr>
                             <m:t>𝑘</m:t>
                           </m:r>
                           <m:r>
-                            <a:rPr>
+                            <a:rPr lang="ar-AE">
                               <a:latin typeface="Cambria Math" panose="02040503050406030204" pitchFamily="18" charset="0"/>
                             </a:rPr>
                             <m:t>=</m:t>
                           </m:r>
                           <m:r>
-                            <a:rPr>
+                            <a:rPr lang="ar-AE">
                               <a:latin typeface="Cambria Math" panose="02040503050406030204" pitchFamily="18" charset="0"/>
                             </a:rPr>
                             <m:t>1</m:t>
@@ -6803,7 +7148,7 @@
                         </m:sub>
                         <m:sup>
                           <m:r>
-                            <a:rPr>
+                            <a:rPr lang="ar-AE">
                               <a:latin typeface="Cambria Math" panose="02040503050406030204" pitchFamily="18" charset="0"/>
                             </a:rPr>
                             <m:t>h</m:t>
@@ -6813,7 +7158,7 @@
                           <m:f>
                             <m:fPr>
                               <m:ctrlPr>
-                                <a:rPr i="1">
+                                <a:rPr lang="ar-AE" i="1">
                                   <a:latin typeface="Cambria Math" panose="02040503050406030204" pitchFamily="18" charset="0"/>
                                 </a:rPr>
                               </m:ctrlPr>
@@ -6822,7 +7167,7 @@
                               <m:sSubSup>
                                 <m:sSubSupPr>
                                   <m:ctrlPr>
-                                    <a:rPr i="1">
+                                    <a:rPr lang="ar-AE" i="1">
                                       <a:latin typeface="Cambria Math" panose="02040503050406030204" pitchFamily="18" charset="0"/>
                                     </a:rPr>
                                   </m:ctrlPr>
@@ -6832,14 +7177,14 @@
                                     <m:accPr>
                                       <m:chr m:val="̂"/>
                                       <m:ctrlPr>
-                                        <a:rPr i="1">
+                                        <a:rPr lang="ar-AE" i="1">
                                           <a:latin typeface="Cambria Math" panose="02040503050406030204" pitchFamily="18" charset="0"/>
                                         </a:rPr>
                                       </m:ctrlPr>
                                     </m:accPr>
                                     <m:e>
                                       <m:r>
-                                        <a:rPr>
+                                        <a:rPr lang="ar-AE">
                                           <a:latin typeface="Cambria Math" panose="02040503050406030204" pitchFamily="18" charset="0"/>
                                         </a:rPr>
                                         <m:t>𝜌</m:t>
@@ -6849,7 +7194,7 @@
                                 </m:e>
                                 <m:sub>
                                   <m:r>
-                                    <a:rPr>
+                                    <a:rPr lang="ar-AE">
                                       <a:latin typeface="Cambria Math" panose="02040503050406030204" pitchFamily="18" charset="0"/>
                                     </a:rPr>
                                     <m:t>𝑘</m:t>
@@ -6857,7 +7202,7 @@
                                 </m:sub>
                                 <m:sup>
                                   <m:r>
-                                    <a:rPr>
+                                    <a:rPr lang="ar-AE">
                                       <a:latin typeface="Cambria Math" panose="02040503050406030204" pitchFamily="18" charset="0"/>
                                     </a:rPr>
                                     <m:t>2</m:t>
@@ -6867,19 +7212,19 @@
                             </m:num>
                             <m:den>
                               <m:r>
-                                <a:rPr>
+                                <a:rPr lang="ar-AE">
                                   <a:latin typeface="Cambria Math" panose="02040503050406030204" pitchFamily="18" charset="0"/>
                                 </a:rPr>
                                 <m:t>𝑛</m:t>
                               </m:r>
                               <m:r>
-                                <a:rPr>
+                                <a:rPr lang="ar-AE">
                                   <a:latin typeface="Cambria Math" panose="02040503050406030204" pitchFamily="18" charset="0"/>
                                 </a:rPr>
                                 <m:t>−</m:t>
                               </m:r>
                               <m:r>
-                                <a:rPr>
+                                <a:rPr lang="ar-AE">
                                   <a:latin typeface="Cambria Math" panose="02040503050406030204" pitchFamily="18" charset="0"/>
                                 </a:rPr>
                                 <m:t>𝑘</m:t>
@@ -6891,17 +7236,72 @@
                     </m:oMath>
                   </m:oMathPara>
                 </a14:m>
-                <a:endParaRPr/>
+                <a:endParaRPr lang="ar-AE" dirty="0"/>
+              </a:p>
+              <a:p>
+                <a:r>
+                  <a:rPr lang="en-US" dirty="0"/>
+                  <a:t>Q is close to </a:t>
+                </a:r>
+                <a14:m>
+                  <m:oMath xmlns:m="http://schemas.openxmlformats.org/officeDocument/2006/math">
+                    <m:sSup>
+                      <m:sSupPr>
+                        <m:ctrlPr>
+                          <a:rPr lang="ar-AE" i="1">
+                            <a:latin typeface="Cambria Math" panose="02040503050406030204" pitchFamily="18" charset="0"/>
+                          </a:rPr>
+                        </m:ctrlPr>
+                      </m:sSupPr>
+                      <m:e>
+                        <m:r>
+                          <a:rPr lang="ar-AE">
+                            <a:latin typeface="Cambria Math" panose="02040503050406030204" pitchFamily="18" charset="0"/>
+                          </a:rPr>
+                          <m:t>𝜒</m:t>
+                        </m:r>
+                      </m:e>
+                      <m:sup>
+                        <m:r>
+                          <a:rPr lang="ar-AE">
+                            <a:latin typeface="Cambria Math" panose="02040503050406030204" pitchFamily="18" charset="0"/>
+                          </a:rPr>
+                          <m:t>2</m:t>
+                        </m:r>
+                      </m:sup>
+                    </m:sSup>
+                  </m:oMath>
+                </a14:m>
+                <a:r>
+                  <a:rPr lang="ar-AE" dirty="0"/>
+                  <a:t> </a:t>
+                </a:r>
+                <a:r>
+                  <a:rPr lang="en-US" dirty="0"/>
+                  <a:t>distributed</a:t>
+                </a:r>
               </a:p>
               <a:p>
                 <a:pPr lvl="0"/>
                 <a:r>
-                  <a:t>Null hypothesis is that there is no serial correlation between iid values </a:t>
+                  <a:rPr lang="en-US" dirty="0"/>
+                  <a:t>Null hypothesis is no serial correlation between</a:t>
+                </a:r>
+              </a:p>
+              <a:p>
+                <a:pPr lvl="1"/>
+                <a:r>
+                  <a:rPr lang="en-US" dirty="0" err="1"/>
+                  <a:t>iid</a:t>
+                </a:r>
+                <a:r>
+                  <a:rPr lang="en-US" dirty="0"/>
+                  <a:t> values </a:t>
                 </a:r>
                 <a14:m>
                   <m:oMath xmlns:m="http://schemas.openxmlformats.org/officeDocument/2006/math">
                     <m:r>
-                      <a:rPr>
+                      <a:rPr lang="en-US">
                         <a:latin typeface="Cambria Math" panose="02040503050406030204" pitchFamily="18" charset="0"/>
                       </a:rPr>
                       <m:t>→</m:t>
@@ -6909,18 +7309,30 @@
                   </m:oMath>
                 </a14:m>
                 <a:r>
+                  <a:rPr lang="en-US" dirty="0"/>
                   <a:t> large p-value</a:t>
                 </a:r>
               </a:p>
               <a:p>
                 <a:pPr lvl="0"/>
                 <a:r>
+                  <a:rPr lang="en-US" dirty="0"/>
                   <a:t>Alternative hypothesis is serial correlation gives high values of Q statistic </a:t>
+                </a:r>
+                <a:endParaRPr lang="en-US" dirty="0">
+                  <a:latin typeface="Cambria Math" panose="02040503050406030204" pitchFamily="18" charset="0"/>
+                </a:endParaRPr>
+              </a:p>
+              <a:p>
+                <a:pPr lvl="1"/>
+                <a:r>
+                  <a:rPr lang="en-US" dirty="0"/>
+                  <a:t>Significant serial correlation </a:t>
                 </a:r>
                 <a14:m>
                   <m:oMath xmlns:m="http://schemas.openxmlformats.org/officeDocument/2006/math">
                     <m:r>
-                      <a:rPr>
+                      <a:rPr lang="en-US">
                         <a:latin typeface="Cambria Math" panose="02040503050406030204" pitchFamily="18" charset="0"/>
                       </a:rPr>
                       <m:t>→</m:t>
@@ -6928,13 +7340,15 @@
                   </m:oMath>
                 </a14:m>
                 <a:r>
+                  <a:rPr lang="en-US" dirty="0"/>
                   <a:t> small p-value</a:t>
                 </a:r>
+                <a:endParaRPr dirty="0"/>
               </a:p>
             </p:txBody>
           </p:sp>
         </mc:Choice>
-        <mc:Fallback xmlns="">
+        <mc:Fallback>
           <p:sp>
             <p:nvSpPr>
               <p:cNvPr id="3" name="Content Placeholder 2"/>
@@ -6949,7 +7363,7 @@
               <a:blipFill>
                 <a:blip r:embed="rId3"/>
                 <a:stretch>
-                  <a:fillRect l="-963" t="-3052"/>
+                  <a:fillRect l="-741" t="-1975"/>
                 </a:stretch>
               </a:blipFill>
             </p:spPr>
@@ -7040,115 +7454,152 @@
                   <a:buNone/>
                 </a:pPr>
                 <a:r>
+                  <a:rPr b="1" dirty="0"/>
+                  <a:t>Random walks </a:t>
+                </a:r>
+                <a:r>
                   <a:rPr dirty="0"/>
-                  <a:t>Random walks are a commonly encountered properties of time series</a:t>
+                  <a:t>are a commonly encountered properties of time series</a:t>
                 </a:r>
               </a:p>
               <a:p>
                 <a:pPr lvl="0"/>
                 <a:r>
                   <a:rPr dirty="0"/>
-                  <a:t>Change in value of random walk series at one time step:</a:t>
+                  <a:t>Change in value</a:t>
+                </a:r>
+                <a:r>
+                  <a:rPr lang="en-US" dirty="0"/>
+                  <a:t> or </a:t>
+                </a:r>
+                <a:r>
+                  <a:rPr lang="en-US" dirty="0" err="1"/>
+                  <a:t>impluse</a:t>
+                </a:r>
+                <a:r>
+                  <a:rPr dirty="0"/>
+                  <a:t> of random walk series at </a:t>
+                </a:r>
+                <a:r>
+                  <a:rPr lang="en-US" dirty="0"/>
+                  <a:t>each</a:t>
+                </a:r>
+                <a:r>
+                  <a:rPr dirty="0"/>
+                  <a:t> time step:</a:t>
                 </a:r>
               </a:p>
               <a:p>
-                <a:pPr lvl="0"/>
+                <a:pPr marL="0" lvl="0" indent="0">
+                  <a:buNone/>
+                </a:pPr>
                 <a14:m>
-                  <m:oMath xmlns:m="http://schemas.openxmlformats.org/officeDocument/2006/math">
-                    <m:sSub>
-                      <m:sSubPr>
-                        <m:ctrlPr>
-                          <a:rPr i="1">
-                            <a:latin typeface="Cambria Math" panose="02040503050406030204" pitchFamily="18" charset="0"/>
-                          </a:rPr>
-                        </m:ctrlPr>
-                      </m:sSubPr>
-                      <m:e>
-                        <m:r>
-                          <a:rPr>
-                            <a:latin typeface="Cambria Math" panose="02040503050406030204" pitchFamily="18" charset="0"/>
-                          </a:rPr>
-                          <m:t>𝑤</m:t>
-                        </m:r>
-                      </m:e>
-                      <m:sub>
-                        <m:r>
-                          <a:rPr>
-                            <a:latin typeface="Cambria Math" panose="02040503050406030204" pitchFamily="18" charset="0"/>
-                          </a:rPr>
-                          <m:t>𝑡</m:t>
-                        </m:r>
-                      </m:sub>
-                    </m:sSub>
-                    <m:r>
-                      <a:rPr>
-                        <a:latin typeface="Cambria Math" panose="02040503050406030204" pitchFamily="18" charset="0"/>
-                      </a:rPr>
-                      <m:t>=</m:t>
-                    </m:r>
-                    <m:sSub>
-                      <m:sSubPr>
-                        <m:ctrlPr>
-                          <a:rPr i="1">
-                            <a:latin typeface="Cambria Math" panose="02040503050406030204" pitchFamily="18" charset="0"/>
-                          </a:rPr>
-                        </m:ctrlPr>
-                      </m:sSubPr>
-                      <m:e>
-                        <m:r>
-                          <a:rPr>
-                            <a:latin typeface="Cambria Math" panose="02040503050406030204" pitchFamily="18" charset="0"/>
-                          </a:rPr>
-                          <m:t>𝑦</m:t>
-                        </m:r>
-                      </m:e>
-                      <m:sub>
-                        <m:r>
-                          <a:rPr>
-                            <a:latin typeface="Cambria Math" panose="02040503050406030204" pitchFamily="18" charset="0"/>
-                          </a:rPr>
-                          <m:t>𝑡</m:t>
-                        </m:r>
-                      </m:sub>
-                    </m:sSub>
-                    <m:r>
-                      <a:rPr>
-                        <a:latin typeface="Cambria Math" panose="02040503050406030204" pitchFamily="18" charset="0"/>
-                      </a:rPr>
-                      <m:t>−</m:t>
-                    </m:r>
-                    <m:sSub>
-                      <m:sSubPr>
-                        <m:ctrlPr>
-                          <a:rPr i="1">
-                            <a:latin typeface="Cambria Math" panose="02040503050406030204" pitchFamily="18" charset="0"/>
-                          </a:rPr>
-                        </m:ctrlPr>
-                      </m:sSubPr>
-                      <m:e>
-                        <m:r>
-                          <a:rPr>
-                            <a:latin typeface="Cambria Math" panose="02040503050406030204" pitchFamily="18" charset="0"/>
-                          </a:rPr>
-                          <m:t>𝑦</m:t>
-                        </m:r>
-                      </m:e>
-                      <m:sub>
-                        <m:r>
-                          <a:rPr>
-                            <a:latin typeface="Cambria Math" panose="02040503050406030204" pitchFamily="18" charset="0"/>
-                          </a:rPr>
-                          <m:t>𝑡</m:t>
-                        </m:r>
-                        <m:r>
-                          <a:rPr>
-                            <a:latin typeface="Cambria Math" panose="02040503050406030204" pitchFamily="18" charset="0"/>
-                          </a:rPr>
-                          <m:t>−1</m:t>
-                        </m:r>
-                      </m:sub>
-                    </m:sSub>
-                  </m:oMath>
+                  <m:oMathPara xmlns:m="http://schemas.openxmlformats.org/officeDocument/2006/math">
+                    <m:oMathParaPr>
+                      <m:jc m:val="centerGroup"/>
+                    </m:oMathParaPr>
+                    <m:oMath xmlns:m="http://schemas.openxmlformats.org/officeDocument/2006/math">
+                      <m:sSub>
+                        <m:sSubPr>
+                          <m:ctrlPr>
+                            <a:rPr i="1">
+                              <a:latin typeface="Cambria Math" panose="02040503050406030204" pitchFamily="18" charset="0"/>
+                            </a:rPr>
+                          </m:ctrlPr>
+                        </m:sSubPr>
+                        <m:e>
+                          <m:r>
+                            <a:rPr>
+                              <a:latin typeface="Cambria Math" panose="02040503050406030204" pitchFamily="18" charset="0"/>
+                            </a:rPr>
+                            <m:t>𝑤</m:t>
+                          </m:r>
+                        </m:e>
+                        <m:sub>
+                          <m:r>
+                            <a:rPr>
+                              <a:latin typeface="Cambria Math" panose="02040503050406030204" pitchFamily="18" charset="0"/>
+                            </a:rPr>
+                            <m:t>𝑡</m:t>
+                          </m:r>
+                        </m:sub>
+                      </m:sSub>
+                      <m:r>
+                        <a:rPr>
+                          <a:latin typeface="Cambria Math" panose="02040503050406030204" pitchFamily="18" charset="0"/>
+                        </a:rPr>
+                        <m:t>=</m:t>
+                      </m:r>
+                      <m:sSub>
+                        <m:sSubPr>
+                          <m:ctrlPr>
+                            <a:rPr i="1">
+                              <a:latin typeface="Cambria Math" panose="02040503050406030204" pitchFamily="18" charset="0"/>
+                            </a:rPr>
+                          </m:ctrlPr>
+                        </m:sSubPr>
+                        <m:e>
+                          <m:r>
+                            <a:rPr>
+                              <a:latin typeface="Cambria Math" panose="02040503050406030204" pitchFamily="18" charset="0"/>
+                            </a:rPr>
+                            <m:t>𝑦</m:t>
+                          </m:r>
+                        </m:e>
+                        <m:sub>
+                          <m:r>
+                            <a:rPr>
+                              <a:latin typeface="Cambria Math" panose="02040503050406030204" pitchFamily="18" charset="0"/>
+                            </a:rPr>
+                            <m:t>𝑡</m:t>
+                          </m:r>
+                        </m:sub>
+                      </m:sSub>
+                      <m:r>
+                        <a:rPr>
+                          <a:latin typeface="Cambria Math" panose="02040503050406030204" pitchFamily="18" charset="0"/>
+                        </a:rPr>
+                        <m:t>−</m:t>
+                      </m:r>
+                      <m:sSub>
+                        <m:sSubPr>
+                          <m:ctrlPr>
+                            <a:rPr i="1">
+                              <a:latin typeface="Cambria Math" panose="02040503050406030204" pitchFamily="18" charset="0"/>
+                            </a:rPr>
+                          </m:ctrlPr>
+                        </m:sSubPr>
+                        <m:e>
+                          <m:r>
+                            <a:rPr>
+                              <a:latin typeface="Cambria Math" panose="02040503050406030204" pitchFamily="18" charset="0"/>
+                            </a:rPr>
+                            <m:t>𝑦</m:t>
+                          </m:r>
+                        </m:e>
+                        <m:sub>
+                          <m:r>
+                            <a:rPr>
+                              <a:latin typeface="Cambria Math" panose="02040503050406030204" pitchFamily="18" charset="0"/>
+                            </a:rPr>
+                            <m:t>𝑡</m:t>
+                          </m:r>
+                          <m:r>
+                            <a:rPr>
+                              <a:latin typeface="Cambria Math" panose="02040503050406030204" pitchFamily="18" charset="0"/>
+                            </a:rPr>
+                            <m:t>−</m:t>
+                          </m:r>
+                          <m:r>
+                            <a:rPr>
+                              <a:latin typeface="Cambria Math" panose="02040503050406030204" pitchFamily="18" charset="0"/>
+                            </a:rPr>
+                            <m:t>1</m:t>
+                          </m:r>
+                        </m:sub>
+                      </m:sSub>
+                    </m:oMath>
+                  </m:oMathPara>
                 </a14:m>
                 <a:endParaRPr dirty="0"/>
               </a:p>
@@ -7160,110 +7611,120 @@
                 </a:r>
               </a:p>
               <a:p>
-                <a:pPr lvl="0"/>
+                <a:pPr marL="0" lvl="0" indent="0">
+                  <a:buNone/>
+                </a:pPr>
                 <a14:m>
-                  <m:oMath xmlns:m="http://schemas.openxmlformats.org/officeDocument/2006/math">
-                    <m:sSub>
-                      <m:sSubPr>
-                        <m:ctrlPr>
-                          <a:rPr i="1">
-                            <a:latin typeface="Cambria Math" panose="02040503050406030204" pitchFamily="18" charset="0"/>
-                          </a:rPr>
-                        </m:ctrlPr>
-                      </m:sSubPr>
-                      <m:e>
-                        <m:r>
-                          <a:rPr>
-                            <a:latin typeface="Cambria Math" panose="02040503050406030204" pitchFamily="18" charset="0"/>
-                          </a:rPr>
-                          <m:t>𝑦</m:t>
-                        </m:r>
-                      </m:e>
-                      <m:sub>
-                        <m:r>
-                          <a:rPr>
-                            <a:latin typeface="Cambria Math" panose="02040503050406030204" pitchFamily="18" charset="0"/>
-                          </a:rPr>
-                          <m:t>𝑡</m:t>
-                        </m:r>
-                      </m:sub>
-                    </m:sSub>
-                    <m:r>
-                      <a:rPr>
-                        <a:latin typeface="Cambria Math" panose="02040503050406030204" pitchFamily="18" charset="0"/>
-                      </a:rPr>
-                      <m:t>=</m:t>
-                    </m:r>
-                    <m:sSub>
-                      <m:sSubPr>
-                        <m:ctrlPr>
-                          <a:rPr i="1">
-                            <a:latin typeface="Cambria Math" panose="02040503050406030204" pitchFamily="18" charset="0"/>
-                          </a:rPr>
-                        </m:ctrlPr>
-                      </m:sSubPr>
-                      <m:e>
-                        <m:r>
-                          <a:rPr>
-                            <a:latin typeface="Cambria Math" panose="02040503050406030204" pitchFamily="18" charset="0"/>
-                          </a:rPr>
-                          <m:t>𝑦</m:t>
-                        </m:r>
-                      </m:e>
-                      <m:sub>
-                        <m:r>
-                          <a:rPr>
-                            <a:latin typeface="Cambria Math" panose="02040503050406030204" pitchFamily="18" charset="0"/>
-                          </a:rPr>
-                          <m:t>𝑡</m:t>
-                        </m:r>
-                        <m:r>
-                          <a:rPr>
-                            <a:latin typeface="Cambria Math" panose="02040503050406030204" pitchFamily="18" charset="0"/>
-                          </a:rPr>
-                          <m:t>−1</m:t>
-                        </m:r>
-                      </m:sub>
-                    </m:sSub>
-                    <m:r>
-                      <a:rPr>
-                        <a:latin typeface="Cambria Math" panose="02040503050406030204" pitchFamily="18" charset="0"/>
-                      </a:rPr>
-                      <m:t>+</m:t>
-                    </m:r>
-                    <m:sSub>
-                      <m:sSubPr>
-                        <m:ctrlPr>
-                          <a:rPr i="1">
-                            <a:latin typeface="Cambria Math" panose="02040503050406030204" pitchFamily="18" charset="0"/>
-                          </a:rPr>
-                        </m:ctrlPr>
-                      </m:sSubPr>
-                      <m:e>
-                        <m:r>
-                          <a:rPr>
-                            <a:latin typeface="Cambria Math" panose="02040503050406030204" pitchFamily="18" charset="0"/>
-                          </a:rPr>
-                          <m:t>𝑤</m:t>
-                        </m:r>
-                      </m:e>
-                      <m:sub>
-                        <m:r>
-                          <a:rPr>
-                            <a:latin typeface="Cambria Math" panose="02040503050406030204" pitchFamily="18" charset="0"/>
-                          </a:rPr>
-                          <m:t>𝑡</m:t>
-                        </m:r>
-                      </m:sub>
-                    </m:sSub>
-                  </m:oMath>
+                  <m:oMathPara xmlns:m="http://schemas.openxmlformats.org/officeDocument/2006/math">
+                    <m:oMathParaPr>
+                      <m:jc m:val="centerGroup"/>
+                    </m:oMathParaPr>
+                    <m:oMath xmlns:m="http://schemas.openxmlformats.org/officeDocument/2006/math">
+                      <m:sSub>
+                        <m:sSubPr>
+                          <m:ctrlPr>
+                            <a:rPr i="1">
+                              <a:latin typeface="Cambria Math" panose="02040503050406030204" pitchFamily="18" charset="0"/>
+                            </a:rPr>
+                          </m:ctrlPr>
+                        </m:sSubPr>
+                        <m:e>
+                          <m:r>
+                            <a:rPr>
+                              <a:latin typeface="Cambria Math" panose="02040503050406030204" pitchFamily="18" charset="0"/>
+                            </a:rPr>
+                            <m:t>𝑦</m:t>
+                          </m:r>
+                        </m:e>
+                        <m:sub>
+                          <m:r>
+                            <a:rPr>
+                              <a:latin typeface="Cambria Math" panose="02040503050406030204" pitchFamily="18" charset="0"/>
+                            </a:rPr>
+                            <m:t>𝑡</m:t>
+                          </m:r>
+                        </m:sub>
+                      </m:sSub>
+                      <m:r>
+                        <a:rPr>
+                          <a:latin typeface="Cambria Math" panose="02040503050406030204" pitchFamily="18" charset="0"/>
+                        </a:rPr>
+                        <m:t>=</m:t>
+                      </m:r>
+                      <m:sSub>
+                        <m:sSubPr>
+                          <m:ctrlPr>
+                            <a:rPr i="1">
+                              <a:latin typeface="Cambria Math" panose="02040503050406030204" pitchFamily="18" charset="0"/>
+                            </a:rPr>
+                          </m:ctrlPr>
+                        </m:sSubPr>
+                        <m:e>
+                          <m:r>
+                            <a:rPr>
+                              <a:latin typeface="Cambria Math" panose="02040503050406030204" pitchFamily="18" charset="0"/>
+                            </a:rPr>
+                            <m:t>𝑦</m:t>
+                          </m:r>
+                        </m:e>
+                        <m:sub>
+                          <m:r>
+                            <a:rPr>
+                              <a:latin typeface="Cambria Math" panose="02040503050406030204" pitchFamily="18" charset="0"/>
+                            </a:rPr>
+                            <m:t>𝑡</m:t>
+                          </m:r>
+                          <m:r>
+                            <a:rPr>
+                              <a:latin typeface="Cambria Math" panose="02040503050406030204" pitchFamily="18" charset="0"/>
+                            </a:rPr>
+                            <m:t>−</m:t>
+                          </m:r>
+                          <m:r>
+                            <a:rPr>
+                              <a:latin typeface="Cambria Math" panose="02040503050406030204" pitchFamily="18" charset="0"/>
+                            </a:rPr>
+                            <m:t>1</m:t>
+                          </m:r>
+                        </m:sub>
+                      </m:sSub>
+                      <m:r>
+                        <a:rPr>
+                          <a:latin typeface="Cambria Math" panose="02040503050406030204" pitchFamily="18" charset="0"/>
+                        </a:rPr>
+                        <m:t>+</m:t>
+                      </m:r>
+                      <m:sSub>
+                        <m:sSubPr>
+                          <m:ctrlPr>
+                            <a:rPr i="1">
+                              <a:latin typeface="Cambria Math" panose="02040503050406030204" pitchFamily="18" charset="0"/>
+                            </a:rPr>
+                          </m:ctrlPr>
+                        </m:sSubPr>
+                        <m:e>
+                          <m:r>
+                            <a:rPr>
+                              <a:latin typeface="Cambria Math" panose="02040503050406030204" pitchFamily="18" charset="0"/>
+                            </a:rPr>
+                            <m:t>𝑤</m:t>
+                          </m:r>
+                        </m:e>
+                        <m:sub>
+                          <m:r>
+                            <a:rPr>
+                              <a:latin typeface="Cambria Math" panose="02040503050406030204" pitchFamily="18" charset="0"/>
+                            </a:rPr>
+                            <m:t>𝑡</m:t>
+                          </m:r>
+                        </m:sub>
+                      </m:sSub>
+                    </m:oMath>
+                  </m:oMathPara>
                 </a14:m>
                 <a:endParaRPr dirty="0"/>
               </a:p>
               <a:p>
-                <a:pPr marL="0" lvl="0" indent="0">
-                  <a:buNone/>
-                </a:pPr>
                 <a:r>
                   <a:rPr dirty="0"/>
                   <a:t>Or, with a little bit of algebra:</a:t>
@@ -7362,7 +7823,13 @@
                             <a:rPr>
                               <a:latin typeface="Cambria Math" panose="02040503050406030204" pitchFamily="18" charset="0"/>
                             </a:rPr>
-                            <m:t>=0</m:t>
+                            <m:t>=</m:t>
+                          </m:r>
+                          <m:r>
+                            <a:rPr>
+                              <a:latin typeface="Cambria Math" panose="02040503050406030204" pitchFamily="18" charset="0"/>
+                            </a:rPr>
+                            <m:t>0</m:t>
                           </m:r>
                         </m:sub>
                         <m:sup>
@@ -7376,7 +7843,13 @@
                             <a:rPr>
                               <a:latin typeface="Cambria Math" panose="02040503050406030204" pitchFamily="18" charset="0"/>
                             </a:rPr>
-                            <m:t>−1</m:t>
+                            <m:t>−</m:t>
+                          </m:r>
+                          <m:r>
+                            <a:rPr>
+                              <a:latin typeface="Cambria Math" panose="02040503050406030204" pitchFamily="18" charset="0"/>
+                            </a:rPr>
+                            <m:t>1</m:t>
                           </m:r>
                         </m:sup>
                         <m:e>
@@ -7430,7 +7903,7 @@
               <a:blipFill>
                 <a:blip r:embed="rId2"/>
                 <a:stretch>
-                  <a:fillRect l="-963" t="-1257"/>
+                  <a:fillRect l="-963" t="-1257" r="-815"/>
                 </a:stretch>
               </a:blipFill>
             </p:spPr>
@@ -7513,7 +7986,7 @@
             <p:spPr/>
             <p:txBody>
               <a:bodyPr>
-                <a:normAutofit fontScale="85000" lnSpcReduction="10000"/>
+                <a:normAutofit fontScale="92500" lnSpcReduction="20000"/>
               </a:bodyPr>
               <a:lstStyle/>
               <a:p>
@@ -7835,7 +8308,7 @@
                 </a:r>
               </a:p>
               <a:p>
-                <a:pPr marL="0" lvl="0" indent="0">
+                <a:pPr marL="685800" lvl="2" indent="0">
                   <a:buNone/>
                 </a:pPr>
                 <a:r>
@@ -7845,37 +8318,37 @@
                 <a:r>
                   <a:rPr dirty="0"/>
                   <a:t> innovations are referred to by other names:</a:t>
+                </a:r>
+                <a:endParaRPr lang="en-US" dirty="0"/>
+              </a:p>
+              <a:p>
+                <a:pPr marL="685800" lvl="2" indent="0">
+                  <a:buNone/>
+                </a:pPr>
+                <a:r>
+                  <a:rPr b="1" dirty="0"/>
+                  <a:t>Shocks</a:t>
+                </a:r>
+                <a:r>
+                  <a:rPr dirty="0"/>
+                  <a:t> in the stochastic process literature</a:t>
                 </a:r>
                 <a:br>
                   <a:rPr dirty="0"/>
                 </a:br>
                 <a:r>
+                  <a:rPr lang="en-US" b="1" dirty="0"/>
+                  <a:t>Impulses</a:t>
+                </a:r>
+                <a:r>
                   <a:rPr dirty="0"/>
-                  <a:t>- </a:t>
-                </a:r>
-                <a:r>
-                  <a:rPr b="1" dirty="0"/>
-                  <a:t>Shocks</a:t>
-                </a:r>
-                <a:r>
-                  <a:rPr dirty="0"/>
-                  <a:t> in the stochastic process literature</a:t>
-                </a:r>
-                <a:br>
-                  <a:rPr dirty="0"/>
-                </a:br>
-                <a:r>
-                  <a:rPr dirty="0"/>
-                  <a:t>- </a:t>
-                </a:r>
-                <a:r>
-                  <a:rPr b="1" dirty="0"/>
-                  <a:t>Returns</a:t>
-                </a:r>
-                <a:r>
-                  <a:rPr dirty="0"/>
-                  <a:t> in financial analytics</a:t>
-                </a:r>
+                  <a:t> in </a:t>
+                </a:r>
+                <a:r>
+                  <a:rPr lang="en-US" dirty="0"/>
+                  <a:t>some time series literature </a:t>
+                </a:r>
+                <a:endParaRPr dirty="0"/>
               </a:p>
             </p:txBody>
           </p:sp>
@@ -7895,7 +8368,7 @@
               <a:blipFill>
                 <a:blip r:embed="rId2"/>
                 <a:stretch>
-                  <a:fillRect l="-741" t="-1975"/>
+                  <a:fillRect l="-963" t="-3052"/>
                 </a:stretch>
               </a:blipFill>
             </p:spPr>
@@ -8110,8 +8583,8 @@
           </a:p>
         </p:txBody>
       </p:sp>
-      <mc:AlternateContent xmlns:mc="http://schemas.openxmlformats.org/markup-compatibility/2006">
-        <mc:Choice xmlns:a14="http://schemas.microsoft.com/office/drawing/2010/main" Requires="a14">
+      <mc:AlternateContent xmlns:mc="http://schemas.openxmlformats.org/markup-compatibility/2006" xmlns:a14="http://schemas.microsoft.com/office/drawing/2010/main">
+        <mc:Choice Requires="a14">
           <p:sp>
             <p:nvSpPr>
               <p:cNvPr id="4" name="Text Placeholder 3"/>
@@ -8162,7 +8635,7 @@
             </p:txBody>
           </p:sp>
         </mc:Choice>
-        <mc:Fallback>
+        <mc:Fallback xmlns="">
           <p:sp>
             <p:nvSpPr>
               <p:cNvPr id="4" name="Text Placeholder 3"/>
@@ -10206,8 +10679,8 @@
           </a:p>
         </p:txBody>
       </p:sp>
-      <mc:AlternateContent xmlns:mc="http://schemas.openxmlformats.org/markup-compatibility/2006">
-        <mc:Choice xmlns:a14="http://schemas.microsoft.com/office/drawing/2010/main" Requires="a14">
+      <mc:AlternateContent xmlns:mc="http://schemas.openxmlformats.org/markup-compatibility/2006" xmlns:a14="http://schemas.microsoft.com/office/drawing/2010/main">
+        <mc:Choice Requires="a14">
           <p:sp>
             <p:nvSpPr>
               <p:cNvPr id="3" name="Content Placeholder 2"/>
@@ -10379,7 +10852,7 @@
             </p:txBody>
           </p:sp>
         </mc:Choice>
-        <mc:Fallback>
+        <mc:Fallback xmlns="">
           <p:sp>
             <p:nvSpPr>
               <p:cNvPr id="3" name="Content Placeholder 2"/>
@@ -11533,7 +12006,13 @@
                       <a:rPr>
                         <a:latin typeface="Cambria Math" panose="02040503050406030204" pitchFamily="18" charset="0"/>
                       </a:rPr>
-                      <m:t>=1</m:t>
+                      <m:t>=</m:t>
+                    </m:r>
+                    <m:r>
+                      <a:rPr>
+                        <a:latin typeface="Cambria Math" panose="02040503050406030204" pitchFamily="18" charset="0"/>
+                      </a:rPr>
+                      <m:t>1</m:t>
                     </m:r>
                   </m:oMath>
                 </a14:m>
@@ -12070,8 +12549,8 @@
           </a:p>
         </p:txBody>
       </p:sp>
-      <mc:AlternateContent xmlns:mc="http://schemas.openxmlformats.org/markup-compatibility/2006">
-        <mc:Choice xmlns:a14="http://schemas.microsoft.com/office/drawing/2010/main" Requires="a14">
+      <mc:AlternateContent xmlns:mc="http://schemas.openxmlformats.org/markup-compatibility/2006" xmlns:a14="http://schemas.microsoft.com/office/drawing/2010/main">
+        <mc:Choice Requires="a14">
           <p:sp>
             <p:nvSpPr>
               <p:cNvPr id="3" name="Content Placeholder 2"/>
@@ -12309,7 +12788,7 @@
             </p:txBody>
           </p:sp>
         </mc:Choice>
-        <mc:Fallback>
+        <mc:Fallback xmlns="">
           <p:sp>
             <p:nvSpPr>
               <p:cNvPr id="3" name="Content Placeholder 2"/>
@@ -12963,8 +13442,8 @@
           </a:p>
         </p:txBody>
       </p:sp>
-      <mc:AlternateContent xmlns:mc="http://schemas.openxmlformats.org/markup-compatibility/2006">
-        <mc:Choice xmlns:a14="http://schemas.microsoft.com/office/drawing/2010/main" Requires="a14">
+      <mc:AlternateContent xmlns:mc="http://schemas.openxmlformats.org/markup-compatibility/2006" xmlns:a14="http://schemas.microsoft.com/office/drawing/2010/main">
+        <mc:Choice Requires="a14">
           <p:sp>
             <p:nvSpPr>
               <p:cNvPr id="3" name="Content Placeholder 2"/>
@@ -13121,7 +13600,7 @@
             </p:txBody>
           </p:sp>
         </mc:Choice>
-        <mc:Fallback>
+        <mc:Fallback xmlns="">
           <p:sp>
             <p:nvSpPr>
               <p:cNvPr id="3" name="Content Placeholder 2"/>

</xml_diff>

<commit_message>
Updates and improvements to converted slides
</commit_message>
<xml_diff>
--- a/LectureSlides/11_IntroductionToTimeSeries.pptx
+++ b/LectureSlides/11_IntroductionToTimeSeries.pptx
@@ -61,7 +61,12 @@
     <p:sldId id="305" r:id="rId55"/>
     <p:sldId id="306" r:id="rId56"/>
     <p:sldId id="307" r:id="rId57"/>
-    <p:sldId id="308" r:id="rId58"/>
+    <p:sldId id="315" r:id="rId58"/>
+    <p:sldId id="316" r:id="rId59"/>
+    <p:sldId id="317" r:id="rId60"/>
+    <p:sldId id="318" r:id="rId61"/>
+    <p:sldId id="319" r:id="rId62"/>
+    <p:sldId id="308" r:id="rId63"/>
   </p:sldIdLst>
   <p:sldSz cx="9144000" cy="5143500" type="screen16x9"/>
   <p:notesSz cx="6858000" cy="9144000"/>
@@ -17630,8 +17635,8 @@
           </a:p>
         </p:txBody>
       </p:sp>
-      <mc:AlternateContent xmlns:mc="http://schemas.openxmlformats.org/markup-compatibility/2006" xmlns:a14="http://schemas.microsoft.com/office/drawing/2010/main">
-        <mc:Choice Requires="a14">
+      <mc:AlternateContent xmlns:mc="http://schemas.openxmlformats.org/markup-compatibility/2006">
+        <mc:Choice xmlns:a14="http://schemas.microsoft.com/office/drawing/2010/main" Requires="a14">
           <p:sp>
             <p:nvSpPr>
               <p:cNvPr id="3" name="Content Placeholder 2"/>
@@ -17651,13 +17656,15 @@
                   <a:buNone/>
                 </a:pPr>
                 <a:r>
+                  <a:rPr dirty="0"/>
                   <a:t>A random walk is stochastic and </a:t>
                 </a:r>
                 <a:r>
-                  <a:rPr b="1"/>
+                  <a:rPr b="1" dirty="0"/>
                   <a:t>not stationary</a:t>
                 </a:r>
                 <a:r>
+                  <a:rPr dirty="0"/>
                   <a:t>:</a:t>
                 </a:r>
               </a:p>
@@ -17771,24 +17778,23 @@
                     </m:oMath>
                   </m:oMathPara>
                 </a14:m>
-                <a:endParaRPr/>
+                <a:endParaRPr dirty="0"/>
               </a:p>
               <a:p>
                 <a:pPr lvl="0"/>
                 <a:r>
-                  <a:t>Provides a basis for hypothesis tests of stationarity</a:t>
-                </a:r>
-              </a:p>
-              <a:p>
-                <a:pPr lvl="0"/>
-                <a:r>
-                  <a:t>Test the hypothesis that there is a unit root to determine is a time series is stationary</a:t>
+                  <a:rPr lang="en-US" dirty="0"/>
+                  <a:t>Testing for unit route p</a:t>
+                </a:r>
+                <a:r>
+                  <a:rPr dirty="0"/>
+                  <a:t>rovides a basis for hypothesis tests of stationarity</a:t>
                 </a:r>
               </a:p>
             </p:txBody>
           </p:sp>
         </mc:Choice>
-        <mc:Fallback xmlns="">
+        <mc:Fallback>
           <p:sp>
             <p:nvSpPr>
               <p:cNvPr id="3" name="Content Placeholder 2"/>
@@ -17871,8 +17877,8 @@
           </a:p>
         </p:txBody>
       </p:sp>
-      <mc:AlternateContent xmlns:mc="http://schemas.openxmlformats.org/markup-compatibility/2006" xmlns:a14="http://schemas.microsoft.com/office/drawing/2010/main">
-        <mc:Choice Requires="a14">
+      <mc:AlternateContent xmlns:mc="http://schemas.openxmlformats.org/markup-compatibility/2006">
+        <mc:Choice xmlns:a14="http://schemas.microsoft.com/office/drawing/2010/main" Requires="a14">
           <p:sp>
             <p:nvSpPr>
               <p:cNvPr id="3" name="Content Placeholder 2"/>
@@ -17886,7 +17892,7 @@
             <p:spPr/>
             <p:txBody>
               <a:bodyPr>
-                <a:normAutofit fontScale="92500" lnSpcReduction="20000"/>
+                <a:normAutofit fontScale="85000" lnSpcReduction="20000"/>
               </a:bodyPr>
               <a:lstStyle/>
               <a:p>
@@ -17894,7 +17900,7 @@
                   <a:buNone/>
                 </a:pPr>
                 <a:r>
-                  <a:rPr dirty="0"/>
+                  <a:rPr lang="en-US" dirty="0"/>
                   <a:t>There are several ways to define a model for a stationary process</a:t>
                 </a:r>
               </a:p>
@@ -17903,17 +17909,259 @@
                   <a:buAutoNum type="arabicPeriod"/>
                 </a:pPr>
                 <a:r>
-                  <a:rPr dirty="0"/>
+                  <a:rPr lang="en-US" dirty="0"/>
                   <a:t>A </a:t>
                 </a:r>
                 <a:r>
-                  <a:rPr b="1" dirty="0"/>
-                  <a:t>unit root test</a:t>
-                </a:r>
-                <a:r>
-                  <a:rPr dirty="0"/>
-                  <a:t> as discussed</a:t>
-                </a:r>
+                  <a:rPr lang="en-US" b="1" dirty="0"/>
+                  <a:t>unit root test </a:t>
+                </a:r>
+                <a:r>
+                  <a:rPr lang="en-US" dirty="0"/>
+                  <a:t>on an AR process</a:t>
+                </a:r>
+              </a:p>
+              <a:p>
+                <a:pPr marL="0" indent="0">
+                  <a:buNone/>
+                </a:pPr>
+                <a14:m>
+                  <m:oMathPara xmlns:m="http://schemas.openxmlformats.org/officeDocument/2006/math">
+                    <m:oMathParaPr>
+                      <m:jc m:val="center"/>
+                    </m:oMathParaPr>
+                    <m:oMath xmlns:m="http://schemas.openxmlformats.org/officeDocument/2006/math">
+                      <m:r>
+                        <a:rPr lang="en-US">
+                          <a:latin typeface="Cambria Math" panose="02040503050406030204" pitchFamily="18" charset="0"/>
+                        </a:rPr>
+                        <m:t>𝛥</m:t>
+                      </m:r>
+                      <m:sSub>
+                        <m:sSubPr>
+                          <m:ctrlPr>
+                            <a:rPr lang="ar-AE" i="1">
+                              <a:latin typeface="Cambria Math" panose="02040503050406030204" pitchFamily="18" charset="0"/>
+                            </a:rPr>
+                          </m:ctrlPr>
+                        </m:sSubPr>
+                        <m:e>
+                          <m:r>
+                            <a:rPr lang="ar-AE">
+                              <a:latin typeface="Cambria Math" panose="02040503050406030204" pitchFamily="18" charset="0"/>
+                            </a:rPr>
+                            <m:t>𝑦</m:t>
+                          </m:r>
+                        </m:e>
+                        <m:sub>
+                          <m:r>
+                            <a:rPr lang="ar-AE">
+                              <a:latin typeface="Cambria Math" panose="02040503050406030204" pitchFamily="18" charset="0"/>
+                            </a:rPr>
+                            <m:t>𝑡</m:t>
+                          </m:r>
+                        </m:sub>
+                      </m:sSub>
+                      <m:r>
+                        <a:rPr lang="ar-AE">
+                          <a:latin typeface="Cambria Math" panose="02040503050406030204" pitchFamily="18" charset="0"/>
+                        </a:rPr>
+                        <m:t>=</m:t>
+                      </m:r>
+                      <m:d>
+                        <m:dPr>
+                          <m:ctrlPr>
+                            <a:rPr lang="ar-AE" i="1">
+                              <a:latin typeface="Cambria Math" panose="02040503050406030204" pitchFamily="18" charset="0"/>
+                            </a:rPr>
+                          </m:ctrlPr>
+                        </m:dPr>
+                        <m:e>
+                          <m:r>
+                            <a:rPr lang="ar-AE">
+                              <a:latin typeface="Cambria Math" panose="02040503050406030204" pitchFamily="18" charset="0"/>
+                            </a:rPr>
+                            <m:t>1</m:t>
+                          </m:r>
+                          <m:r>
+                            <a:rPr lang="ar-AE">
+                              <a:latin typeface="Cambria Math" panose="02040503050406030204" pitchFamily="18" charset="0"/>
+                            </a:rPr>
+                            <m:t>−</m:t>
+                          </m:r>
+                          <m:r>
+                            <a:rPr lang="ar-AE">
+                              <a:latin typeface="Cambria Math" panose="02040503050406030204" pitchFamily="18" charset="0"/>
+                            </a:rPr>
+                            <m:t>𝜙</m:t>
+                          </m:r>
+                        </m:e>
+                      </m:d>
+                      <m:sSub>
+                        <m:sSubPr>
+                          <m:ctrlPr>
+                            <a:rPr lang="ar-AE" i="1">
+                              <a:latin typeface="Cambria Math" panose="02040503050406030204" pitchFamily="18" charset="0"/>
+                            </a:rPr>
+                          </m:ctrlPr>
+                        </m:sSubPr>
+                        <m:e>
+                          <m:r>
+                            <a:rPr lang="ar-AE">
+                              <a:latin typeface="Cambria Math" panose="02040503050406030204" pitchFamily="18" charset="0"/>
+                            </a:rPr>
+                            <m:t>𝑦</m:t>
+                          </m:r>
+                        </m:e>
+                        <m:sub>
+                          <m:r>
+                            <a:rPr lang="ar-AE">
+                              <a:latin typeface="Cambria Math" panose="02040503050406030204" pitchFamily="18" charset="0"/>
+                            </a:rPr>
+                            <m:t>𝑡</m:t>
+                          </m:r>
+                          <m:r>
+                            <a:rPr lang="ar-AE">
+                              <a:latin typeface="Cambria Math" panose="02040503050406030204" pitchFamily="18" charset="0"/>
+                            </a:rPr>
+                            <m:t>−</m:t>
+                          </m:r>
+                          <m:r>
+                            <a:rPr lang="ar-AE">
+                              <a:latin typeface="Cambria Math" panose="02040503050406030204" pitchFamily="18" charset="0"/>
+                            </a:rPr>
+                            <m:t>1</m:t>
+                          </m:r>
+                        </m:sub>
+                      </m:sSub>
+                      <m:r>
+                        <a:rPr lang="ar-AE">
+                          <a:latin typeface="Cambria Math" panose="02040503050406030204" pitchFamily="18" charset="0"/>
+                        </a:rPr>
+                        <m:t>+</m:t>
+                      </m:r>
+                      <m:sSub>
+                        <m:sSubPr>
+                          <m:ctrlPr>
+                            <a:rPr lang="ar-AE" i="1">
+                              <a:latin typeface="Cambria Math" panose="02040503050406030204" pitchFamily="18" charset="0"/>
+                            </a:rPr>
+                          </m:ctrlPr>
+                        </m:sSubPr>
+                        <m:e>
+                          <m:r>
+                            <a:rPr lang="ar-AE">
+                              <a:latin typeface="Cambria Math" panose="02040503050406030204" pitchFamily="18" charset="0"/>
+                            </a:rPr>
+                            <m:t>𝑤</m:t>
+                          </m:r>
+                        </m:e>
+                        <m:sub>
+                          <m:r>
+                            <a:rPr lang="ar-AE">
+                              <a:latin typeface="Cambria Math" panose="02040503050406030204" pitchFamily="18" charset="0"/>
+                            </a:rPr>
+                            <m:t>𝑡</m:t>
+                          </m:r>
+                        </m:sub>
+                      </m:sSub>
+                    </m:oMath>
+                  </m:oMathPara>
+                </a14:m>
+                <a:endParaRPr lang="ar-AE" dirty="0"/>
+              </a:p>
+              <a:p>
+                <a:pPr marL="342900" lvl="0" indent="-342900">
+                  <a:buAutoNum type="arabicPeriod" startAt="2"/>
+                </a:pPr>
+                <a:r>
+                  <a:rPr lang="en-US" dirty="0"/>
+                  <a:t>A </a:t>
+                </a:r>
+                <a:r>
+                  <a:rPr lang="en-US" b="1" dirty="0"/>
+                  <a:t>unit root test with a constant</a:t>
+                </a:r>
+              </a:p>
+              <a:p>
+                <a:pPr lvl="1"/>
+                <a:r>
+                  <a:rPr lang="en-US" dirty="0"/>
+                  <a:t>Often constant is initial value, </a:t>
+                </a:r>
+                <a14:m>
+                  <m:oMath xmlns:m="http://schemas.openxmlformats.org/officeDocument/2006/math">
+                    <m:r>
+                      <a:rPr lang="en-US">
+                        <a:latin typeface="Cambria Math" panose="02040503050406030204" pitchFamily="18" charset="0"/>
+                      </a:rPr>
+                      <m:t>𝑐</m:t>
+                    </m:r>
+                    <m:r>
+                      <a:rPr lang="en-US">
+                        <a:latin typeface="Cambria Math" panose="02040503050406030204" pitchFamily="18" charset="0"/>
+                      </a:rPr>
+                      <m:t>=</m:t>
+                    </m:r>
+                    <m:sSub>
+                      <m:sSubPr>
+                        <m:ctrlPr>
+                          <a:rPr lang="ar-AE" i="1">
+                            <a:latin typeface="Cambria Math" panose="02040503050406030204" pitchFamily="18" charset="0"/>
+                          </a:rPr>
+                        </m:ctrlPr>
+                      </m:sSubPr>
+                      <m:e>
+                        <m:r>
+                          <a:rPr lang="ar-AE">
+                            <a:latin typeface="Cambria Math" panose="02040503050406030204" pitchFamily="18" charset="0"/>
+                          </a:rPr>
+                          <m:t>𝑦</m:t>
+                        </m:r>
+                      </m:e>
+                      <m:sub>
+                        <m:r>
+                          <a:rPr lang="ar-AE">
+                            <a:latin typeface="Cambria Math" panose="02040503050406030204" pitchFamily="18" charset="0"/>
+                          </a:rPr>
+                          <m:t>0</m:t>
+                        </m:r>
+                      </m:sub>
+                    </m:sSub>
+                  </m:oMath>
+                </a14:m>
+                <a:endParaRPr lang="ar-AE" dirty="0"/>
+              </a:p>
+              <a:p>
+                <a:pPr lvl="1"/>
+                <a:r>
+                  <a:rPr lang="en-US" dirty="0"/>
+                  <a:t>Or a mean value </a:t>
+                </a:r>
+                <a14:m>
+                  <m:oMath xmlns:m="http://schemas.openxmlformats.org/officeDocument/2006/math">
+                    <m:r>
+                      <a:rPr lang="en-US" b="0" i="1" smtClean="0">
+                        <a:latin typeface="Cambria Math" panose="02040503050406030204" pitchFamily="18" charset="0"/>
+                      </a:rPr>
+                      <m:t>𝑐</m:t>
+                    </m:r>
+                    <m:r>
+                      <a:rPr lang="en-US" b="0" i="1" smtClean="0">
+                        <a:latin typeface="Cambria Math" panose="02040503050406030204" pitchFamily="18" charset="0"/>
+                      </a:rPr>
+                      <m:t>=</m:t>
+                    </m:r>
+                    <m:r>
+                      <a:rPr lang="en-US" b="0" i="1" smtClean="0">
+                        <a:latin typeface="Cambria Math" panose="02040503050406030204" pitchFamily="18" charset="0"/>
+                        <a:ea typeface="Cambria Math" panose="02040503050406030204" pitchFamily="18" charset="0"/>
+                      </a:rPr>
+                      <m:t>𝜇</m:t>
+                    </m:r>
+                  </m:oMath>
+                </a14:m>
+                <a:endParaRPr lang="en-US" dirty="0"/>
               </a:p>
               <a:p>
                 <a:pPr marL="0" lvl="0" indent="0">
@@ -17928,14 +18176,14 @@
                       <m:sSub>
                         <m:sSubPr>
                           <m:ctrlPr>
-                            <a:rPr i="1">
+                            <a:rPr lang="ar-AE" i="1">
                               <a:latin typeface="Cambria Math" panose="02040503050406030204" pitchFamily="18" charset="0"/>
                             </a:rPr>
                           </m:ctrlPr>
                         </m:sSubPr>
                         <m:e>
                           <m:r>
-                            <a:rPr>
+                            <a:rPr lang="ar-AE">
                               <a:latin typeface="Cambria Math" panose="02040503050406030204" pitchFamily="18" charset="0"/>
                             </a:rPr>
                             <m:t>𝑦</m:t>
@@ -17943,7 +18191,7 @@
                         </m:e>
                         <m:sub>
                           <m:r>
-                            <a:rPr>
+                            <a:rPr lang="ar-AE">
                               <a:latin typeface="Cambria Math" panose="02040503050406030204" pitchFamily="18" charset="0"/>
                             </a:rPr>
                             <m:t>𝑡</m:t>
@@ -17951,13 +18199,25 @@
                         </m:sub>
                       </m:sSub>
                       <m:r>
-                        <a:rPr>
+                        <a:rPr lang="ar-AE">
                           <a:latin typeface="Cambria Math" panose="02040503050406030204" pitchFamily="18" charset="0"/>
                         </a:rPr>
                         <m:t>=</m:t>
                       </m:r>
                       <m:r>
-                        <a:rPr>
+                        <a:rPr lang="ar-AE">
+                          <a:latin typeface="Cambria Math" panose="02040503050406030204" pitchFamily="18" charset="0"/>
+                        </a:rPr>
+                        <m:t>𝑐</m:t>
+                      </m:r>
+                      <m:r>
+                        <a:rPr lang="ar-AE">
+                          <a:latin typeface="Cambria Math" panose="02040503050406030204" pitchFamily="18" charset="0"/>
+                        </a:rPr>
+                        <m:t>+</m:t>
+                      </m:r>
+                      <m:r>
+                        <a:rPr lang="ar-AE">
                           <a:latin typeface="Cambria Math" panose="02040503050406030204" pitchFamily="18" charset="0"/>
                         </a:rPr>
                         <m:t>𝜙</m:t>
@@ -17965,14 +18225,14 @@
                       <m:sSub>
                         <m:sSubPr>
                           <m:ctrlPr>
-                            <a:rPr i="1">
+                            <a:rPr lang="ar-AE" i="1">
                               <a:latin typeface="Cambria Math" panose="02040503050406030204" pitchFamily="18" charset="0"/>
                             </a:rPr>
                           </m:ctrlPr>
                         </m:sSubPr>
                         <m:e>
                           <m:r>
-                            <a:rPr>
+                            <a:rPr lang="ar-AE">
                               <a:latin typeface="Cambria Math" panose="02040503050406030204" pitchFamily="18" charset="0"/>
                             </a:rPr>
                             <m:t>𝑦</m:t>
@@ -17980,19 +18240,19 @@
                         </m:e>
                         <m:sub>
                           <m:r>
-                            <a:rPr>
+                            <a:rPr lang="ar-AE">
                               <a:latin typeface="Cambria Math" panose="02040503050406030204" pitchFamily="18" charset="0"/>
                             </a:rPr>
                             <m:t>𝑡</m:t>
                           </m:r>
                           <m:r>
-                            <a:rPr>
+                            <a:rPr lang="ar-AE">
                               <a:latin typeface="Cambria Math" panose="02040503050406030204" pitchFamily="18" charset="0"/>
                             </a:rPr>
                             <m:t>−</m:t>
                           </m:r>
                           <m:r>
-                            <a:rPr>
+                            <a:rPr lang="ar-AE">
                               <a:latin typeface="Cambria Math" panose="02040503050406030204" pitchFamily="18" charset="0"/>
                             </a:rPr>
                             <m:t>1</m:t>
@@ -18000,7 +18260,7 @@
                         </m:sub>
                       </m:sSub>
                       <m:r>
-                        <a:rPr>
+                        <a:rPr lang="ar-AE">
                           <a:latin typeface="Cambria Math" panose="02040503050406030204" pitchFamily="18" charset="0"/>
                         </a:rPr>
                         <m:t>+</m:t>
@@ -18008,14 +18268,14 @@
                       <m:sSub>
                         <m:sSubPr>
                           <m:ctrlPr>
-                            <a:rPr i="1">
+                            <a:rPr lang="ar-AE" i="1">
                               <a:latin typeface="Cambria Math" panose="02040503050406030204" pitchFamily="18" charset="0"/>
                             </a:rPr>
                           </m:ctrlPr>
                         </m:sSubPr>
                         <m:e>
                           <m:r>
-                            <a:rPr>
+                            <a:rPr lang="ar-AE">
                               <a:latin typeface="Cambria Math" panose="02040503050406030204" pitchFamily="18" charset="0"/>
                             </a:rPr>
                             <m:t>𝑤</m:t>
@@ -18023,7 +18283,7 @@
                         </m:e>
                         <m:sub>
                           <m:r>
-                            <a:rPr>
+                            <a:rPr lang="ar-AE">
                               <a:latin typeface="Cambria Math" panose="02040503050406030204" pitchFamily="18" charset="0"/>
                             </a:rPr>
                             <m:t>𝑡</m:t>
@@ -18033,76 +18293,92 @@
                     </m:oMath>
                   </m:oMathPara>
                 </a14:m>
-                <a:endParaRPr dirty="0"/>
+                <a:endParaRPr lang="ar-AE" dirty="0"/>
               </a:p>
               <a:p>
                 <a:pPr marL="342900" lvl="0" indent="-342900">
-                  <a:buAutoNum type="arabicPeriod" startAt="2"/>
+                  <a:buAutoNum type="arabicPeriod" startAt="3"/>
                 </a:pPr>
                 <a:r>
-                  <a:rPr dirty="0"/>
-                  <a:t>A </a:t>
-                </a:r>
-                <a:r>
-                  <a:rPr b="1" dirty="0"/>
-                  <a:t>unit root test with a constant</a:t>
+                  <a:rPr lang="en-US" b="1" dirty="0"/>
+                  <a:t>Trend stationary process</a:t>
+                </a:r>
+                <a:r>
+                  <a:rPr lang="en-US" dirty="0"/>
+                  <a:t>, with or without a constant</a:t>
                 </a:r>
               </a:p>
               <a:p>
                 <a:pPr lvl="1"/>
                 <a:r>
-                  <a:rPr dirty="0"/>
-                  <a:t>Often constant is initial value, </a:t>
+                  <a:rPr lang="en-US" dirty="0"/>
+                  <a:t>Used to test if a process is </a:t>
+                </a:r>
+                <a:r>
+                  <a:rPr lang="en-US" b="1" dirty="0"/>
+                  <a:t>stationary about a deterministic trend</a:t>
+                </a:r>
+                <a:r>
+                  <a:rPr lang="en-US" dirty="0"/>
+                  <a:t>, </a:t>
                 </a:r>
                 <a14:m>
                   <m:oMath xmlns:m="http://schemas.openxmlformats.org/officeDocument/2006/math">
                     <m:r>
-                      <a:rPr>
+                      <a:rPr lang="en-US" smtClean="0">
                         <a:latin typeface="Cambria Math" panose="02040503050406030204" pitchFamily="18" charset="0"/>
                       </a:rPr>
-                      <m:t>𝑐</m:t>
+                      <m:t>𝛽</m:t>
                     </m:r>
-                    <m:r>
-                      <a:rPr>
-                        <a:latin typeface="Cambria Math" panose="02040503050406030204" pitchFamily="18" charset="0"/>
-                      </a:rPr>
-                      <m:t>=</m:t>
-                    </m:r>
+                  </m:oMath>
+                </a14:m>
+                <a:r>
+                  <a:rPr lang="en-US" dirty="0"/>
+                  <a:t>, and intercept </a:t>
+                </a:r>
+                <a14:m>
+                  <m:oMath xmlns:m="http://schemas.openxmlformats.org/officeDocument/2006/math">
                     <m:sSub>
                       <m:sSubPr>
                         <m:ctrlPr>
-                          <a:rPr i="1">
+                          <a:rPr lang="en-US" i="1" smtClean="0">
                             <a:latin typeface="Cambria Math" panose="02040503050406030204" pitchFamily="18" charset="0"/>
                           </a:rPr>
                         </m:ctrlPr>
                       </m:sSubPr>
                       <m:e>
                         <m:r>
-                          <a:rPr>
+                          <a:rPr lang="en-US" i="1" smtClean="0">
                             <a:latin typeface="Cambria Math" panose="02040503050406030204" pitchFamily="18" charset="0"/>
+                            <a:ea typeface="Cambria Math" panose="02040503050406030204" pitchFamily="18" charset="0"/>
                           </a:rPr>
-                          <m:t>𝑦</m:t>
+                          <m:t>𝛽</m:t>
                         </m:r>
                       </m:e>
                       <m:sub>
                         <m:r>
-                          <a:rPr>
+                          <a:rPr lang="en-US" b="0" i="1" smtClean="0">
                             <a:latin typeface="Cambria Math" panose="02040503050406030204" pitchFamily="18" charset="0"/>
                           </a:rPr>
-                          <m:t>0</m:t>
+                          <m:t>𝑜</m:t>
                         </m:r>
                       </m:sub>
                     </m:sSub>
+                    <m:r>
+                      <a:rPr lang="en-US" b="0" i="1" smtClean="0">
+                        <a:latin typeface="Cambria Math" panose="02040503050406030204" pitchFamily="18" charset="0"/>
+                      </a:rPr>
+                      <m:t>=</m:t>
+                    </m:r>
+                    <m:r>
+                      <a:rPr lang="en-US" b="0" i="1" smtClean="0">
+                        <a:latin typeface="Cambria Math" panose="02040503050406030204" pitchFamily="18" charset="0"/>
+                      </a:rPr>
+                      <m:t>𝑐</m:t>
+                    </m:r>
                   </m:oMath>
                 </a14:m>
-                <a:endParaRPr dirty="0"/>
-              </a:p>
-              <a:p>
-                <a:pPr lvl="1"/>
-                <a:r>
-                  <a:rPr dirty="0"/>
-                  <a:t>Or a mean value</a:t>
-                </a:r>
+                <a:endParaRPr lang="en-US" dirty="0"/>
               </a:p>
               <a:p>
                 <a:pPr marL="0" lvl="0" indent="0">
@@ -18117,14 +18393,14 @@
                       <m:sSub>
                         <m:sSubPr>
                           <m:ctrlPr>
-                            <a:rPr i="1">
+                            <a:rPr lang="ar-AE" i="1">
                               <a:latin typeface="Cambria Math" panose="02040503050406030204" pitchFamily="18" charset="0"/>
                             </a:rPr>
                           </m:ctrlPr>
                         </m:sSubPr>
                         <m:e>
                           <m:r>
-                            <a:rPr>
+                            <a:rPr lang="ar-AE">
                               <a:latin typeface="Cambria Math" panose="02040503050406030204" pitchFamily="18" charset="0"/>
                             </a:rPr>
                             <m:t>𝑦</m:t>
@@ -18132,7 +18408,7 @@
                         </m:e>
                         <m:sub>
                           <m:r>
-                            <a:rPr>
+                            <a:rPr lang="ar-AE">
                               <a:latin typeface="Cambria Math" panose="02040503050406030204" pitchFamily="18" charset="0"/>
                             </a:rPr>
                             <m:t>𝑡</m:t>
@@ -18140,25 +18416,43 @@
                         </m:sub>
                       </m:sSub>
                       <m:r>
-                        <a:rPr>
+                        <a:rPr lang="ar-AE">
                           <a:latin typeface="Cambria Math" panose="02040503050406030204" pitchFamily="18" charset="0"/>
                         </a:rPr>
                         <m:t>=</m:t>
                       </m:r>
                       <m:r>
-                        <a:rPr>
+                        <a:rPr lang="ar-AE">
                           <a:latin typeface="Cambria Math" panose="02040503050406030204" pitchFamily="18" charset="0"/>
                         </a:rPr>
                         <m:t>𝑐</m:t>
                       </m:r>
                       <m:r>
-                        <a:rPr>
+                        <a:rPr lang="ar-AE">
                           <a:latin typeface="Cambria Math" panose="02040503050406030204" pitchFamily="18" charset="0"/>
                         </a:rPr>
                         <m:t>+</m:t>
                       </m:r>
                       <m:r>
-                        <a:rPr>
+                        <a:rPr lang="ar-AE">
+                          <a:latin typeface="Cambria Math" panose="02040503050406030204" pitchFamily="18" charset="0"/>
+                        </a:rPr>
+                        <m:t>𝛽</m:t>
+                      </m:r>
+                      <m:r>
+                        <a:rPr lang="ar-AE">
+                          <a:latin typeface="Cambria Math" panose="02040503050406030204" pitchFamily="18" charset="0"/>
+                        </a:rPr>
+                        <m:t>𝑡</m:t>
+                      </m:r>
+                      <m:r>
+                        <a:rPr lang="ar-AE">
+                          <a:latin typeface="Cambria Math" panose="02040503050406030204" pitchFamily="18" charset="0"/>
+                        </a:rPr>
+                        <m:t>+</m:t>
+                      </m:r>
+                      <m:r>
+                        <a:rPr lang="ar-AE">
                           <a:latin typeface="Cambria Math" panose="02040503050406030204" pitchFamily="18" charset="0"/>
                         </a:rPr>
                         <m:t>𝜙</m:t>
@@ -18166,14 +18460,14 @@
                       <m:sSub>
                         <m:sSubPr>
                           <m:ctrlPr>
-                            <a:rPr i="1">
+                            <a:rPr lang="ar-AE" i="1">
                               <a:latin typeface="Cambria Math" panose="02040503050406030204" pitchFamily="18" charset="0"/>
                             </a:rPr>
                           </m:ctrlPr>
                         </m:sSubPr>
                         <m:e>
                           <m:r>
-                            <a:rPr>
+                            <a:rPr lang="ar-AE">
                               <a:latin typeface="Cambria Math" panose="02040503050406030204" pitchFamily="18" charset="0"/>
                             </a:rPr>
                             <m:t>𝑦</m:t>
@@ -18181,19 +18475,19 @@
                         </m:e>
                         <m:sub>
                           <m:r>
-                            <a:rPr>
+                            <a:rPr lang="ar-AE">
                               <a:latin typeface="Cambria Math" panose="02040503050406030204" pitchFamily="18" charset="0"/>
                             </a:rPr>
                             <m:t>𝑡</m:t>
                           </m:r>
                           <m:r>
-                            <a:rPr>
+                            <a:rPr lang="ar-AE">
                               <a:latin typeface="Cambria Math" panose="02040503050406030204" pitchFamily="18" charset="0"/>
                             </a:rPr>
                             <m:t>−</m:t>
                           </m:r>
                           <m:r>
-                            <a:rPr>
+                            <a:rPr lang="ar-AE">
                               <a:latin typeface="Cambria Math" panose="02040503050406030204" pitchFamily="18" charset="0"/>
                             </a:rPr>
                             <m:t>1</m:t>
@@ -18201,7 +18495,7 @@
                         </m:sub>
                       </m:sSub>
                       <m:r>
-                        <a:rPr>
+                        <a:rPr lang="ar-AE">
                           <a:latin typeface="Cambria Math" panose="02040503050406030204" pitchFamily="18" charset="0"/>
                         </a:rPr>
                         <m:t>+</m:t>
@@ -18209,14 +18503,14 @@
                       <m:sSub>
                         <m:sSubPr>
                           <m:ctrlPr>
-                            <a:rPr i="1">
+                            <a:rPr lang="ar-AE" i="1">
                               <a:latin typeface="Cambria Math" panose="02040503050406030204" pitchFamily="18" charset="0"/>
                             </a:rPr>
                           </m:ctrlPr>
                         </m:sSubPr>
                         <m:e>
                           <m:r>
-                            <a:rPr>
+                            <a:rPr lang="ar-AE">
                               <a:latin typeface="Cambria Math" panose="02040503050406030204" pitchFamily="18" charset="0"/>
                             </a:rPr>
                             <m:t>𝑤</m:t>
@@ -18224,199 +18518,7 @@
                         </m:e>
                         <m:sub>
                           <m:r>
-                            <a:rPr>
-                              <a:latin typeface="Cambria Math" panose="02040503050406030204" pitchFamily="18" charset="0"/>
-                            </a:rPr>
-                            <m:t>𝑡</m:t>
-                          </m:r>
-                        </m:sub>
-                      </m:sSub>
-                    </m:oMath>
-                  </m:oMathPara>
-                </a14:m>
-                <a:endParaRPr dirty="0"/>
-              </a:p>
-              <a:p>
-                <a:pPr marL="342900" lvl="0" indent="-342900">
-                  <a:buAutoNum type="arabicPeriod" startAt="3"/>
-                </a:pPr>
-                <a:r>
-                  <a:rPr b="1" dirty="0"/>
-                  <a:t>Trend stationary process</a:t>
-                </a:r>
-                <a:r>
-                  <a:rPr dirty="0"/>
-                  <a:t>, with or without a constant</a:t>
-                </a:r>
-              </a:p>
-              <a:p>
-                <a:pPr lvl="1"/>
-                <a:r>
-                  <a:rPr dirty="0"/>
-                  <a:t>Used to test if a process is </a:t>
-                </a:r>
-                <a:r>
-                  <a:rPr b="1" dirty="0"/>
-                  <a:t>stationary about a deterministic trend</a:t>
-                </a:r>
-                <a:r>
-                  <a:rPr dirty="0"/>
-                  <a:t>, </a:t>
-                </a:r>
-                <a14:m>
-                  <m:oMath xmlns:m="http://schemas.openxmlformats.org/officeDocument/2006/math">
-                    <m:r>
-                      <a:rPr>
-                        <a:latin typeface="Cambria Math" panose="02040503050406030204" pitchFamily="18" charset="0"/>
-                      </a:rPr>
-                      <m:t>𝛽</m:t>
-                    </m:r>
-                  </m:oMath>
-                </a14:m>
-                <a:r>
-                  <a:rPr dirty="0"/>
-                  <a:t>.</a:t>
-                </a:r>
-              </a:p>
-              <a:p>
-                <a:pPr marL="0" lvl="0" indent="0">
-                  <a:buNone/>
-                </a:pPr>
-                <a14:m>
-                  <m:oMathPara xmlns:m="http://schemas.openxmlformats.org/officeDocument/2006/math">
-                    <m:oMathParaPr>
-                      <m:jc m:val="center"/>
-                    </m:oMathParaPr>
-                    <m:oMath xmlns:m="http://schemas.openxmlformats.org/officeDocument/2006/math">
-                      <m:sSub>
-                        <m:sSubPr>
-                          <m:ctrlPr>
-                            <a:rPr i="1">
-                              <a:latin typeface="Cambria Math" panose="02040503050406030204" pitchFamily="18" charset="0"/>
-                            </a:rPr>
-                          </m:ctrlPr>
-                        </m:sSubPr>
-                        <m:e>
-                          <m:r>
-                            <a:rPr>
-                              <a:latin typeface="Cambria Math" panose="02040503050406030204" pitchFamily="18" charset="0"/>
-                            </a:rPr>
-                            <m:t>𝑦</m:t>
-                          </m:r>
-                        </m:e>
-                        <m:sub>
-                          <m:r>
-                            <a:rPr>
-                              <a:latin typeface="Cambria Math" panose="02040503050406030204" pitchFamily="18" charset="0"/>
-                            </a:rPr>
-                            <m:t>𝑡</m:t>
-                          </m:r>
-                        </m:sub>
-                      </m:sSub>
-                      <m:r>
-                        <a:rPr>
-                          <a:latin typeface="Cambria Math" panose="02040503050406030204" pitchFamily="18" charset="0"/>
-                        </a:rPr>
-                        <m:t>=</m:t>
-                      </m:r>
-                      <m:r>
-                        <a:rPr>
-                          <a:latin typeface="Cambria Math" panose="02040503050406030204" pitchFamily="18" charset="0"/>
-                        </a:rPr>
-                        <m:t>𝑐</m:t>
-                      </m:r>
-                      <m:r>
-                        <a:rPr>
-                          <a:latin typeface="Cambria Math" panose="02040503050406030204" pitchFamily="18" charset="0"/>
-                        </a:rPr>
-                        <m:t>+</m:t>
-                      </m:r>
-                      <m:r>
-                        <a:rPr>
-                          <a:latin typeface="Cambria Math" panose="02040503050406030204" pitchFamily="18" charset="0"/>
-                        </a:rPr>
-                        <m:t>𝛽</m:t>
-                      </m:r>
-                      <m:r>
-                        <a:rPr>
-                          <a:latin typeface="Cambria Math" panose="02040503050406030204" pitchFamily="18" charset="0"/>
-                        </a:rPr>
-                        <m:t>𝑡</m:t>
-                      </m:r>
-                      <m:r>
-                        <a:rPr>
-                          <a:latin typeface="Cambria Math" panose="02040503050406030204" pitchFamily="18" charset="0"/>
-                        </a:rPr>
-                        <m:t>+</m:t>
-                      </m:r>
-                      <m:r>
-                        <a:rPr>
-                          <a:latin typeface="Cambria Math" panose="02040503050406030204" pitchFamily="18" charset="0"/>
-                        </a:rPr>
-                        <m:t>𝜙</m:t>
-                      </m:r>
-                      <m:sSub>
-                        <m:sSubPr>
-                          <m:ctrlPr>
-                            <a:rPr i="1">
-                              <a:latin typeface="Cambria Math" panose="02040503050406030204" pitchFamily="18" charset="0"/>
-                            </a:rPr>
-                          </m:ctrlPr>
-                        </m:sSubPr>
-                        <m:e>
-                          <m:r>
-                            <a:rPr>
-                              <a:latin typeface="Cambria Math" panose="02040503050406030204" pitchFamily="18" charset="0"/>
-                            </a:rPr>
-                            <m:t>𝑦</m:t>
-                          </m:r>
-                        </m:e>
-                        <m:sub>
-                          <m:r>
-                            <a:rPr>
-                              <a:latin typeface="Cambria Math" panose="02040503050406030204" pitchFamily="18" charset="0"/>
-                            </a:rPr>
-                            <m:t>𝑡</m:t>
-                          </m:r>
-                          <m:r>
-                            <a:rPr>
-                              <a:latin typeface="Cambria Math" panose="02040503050406030204" pitchFamily="18" charset="0"/>
-                            </a:rPr>
-                            <m:t>−</m:t>
-                          </m:r>
-                          <m:r>
-                            <a:rPr>
-                              <a:latin typeface="Cambria Math" panose="02040503050406030204" pitchFamily="18" charset="0"/>
-                            </a:rPr>
-                            <m:t>1</m:t>
-                          </m:r>
-                        </m:sub>
-                      </m:sSub>
-                      <m:r>
-                        <a:rPr>
-                          <a:latin typeface="Cambria Math" panose="02040503050406030204" pitchFamily="18" charset="0"/>
-                        </a:rPr>
-                        <m:t>+</m:t>
-                      </m:r>
-                      <m:sSub>
-                        <m:sSubPr>
-                          <m:ctrlPr>
-                            <a:rPr i="1">
-                              <a:latin typeface="Cambria Math" panose="02040503050406030204" pitchFamily="18" charset="0"/>
-                            </a:rPr>
-                          </m:ctrlPr>
-                        </m:sSubPr>
-                        <m:e>
-                          <m:r>
-                            <a:rPr>
-                              <a:latin typeface="Cambria Math" panose="02040503050406030204" pitchFamily="18" charset="0"/>
-                            </a:rPr>
-                            <m:t>𝑤</m:t>
-                          </m:r>
-                        </m:e>
-                        <m:sub>
-                          <m:r>
-                            <a:rPr>
+                            <a:rPr lang="ar-AE">
                               <a:latin typeface="Cambria Math" panose="02040503050406030204" pitchFamily="18" charset="0"/>
                             </a:rPr>
                             <m:t>𝑡</m:t>
@@ -18431,7 +18533,7 @@
             </p:txBody>
           </p:sp>
         </mc:Choice>
-        <mc:Fallback xmlns="">
+        <mc:Fallback>
           <p:sp>
             <p:nvSpPr>
               <p:cNvPr id="3" name="Content Placeholder 2"/>
@@ -18446,7 +18548,7 @@
               <a:blipFill>
                 <a:blip r:embed="rId2"/>
                 <a:stretch>
-                  <a:fillRect l="-963" t="-3052"/>
+                  <a:fillRect l="-815" t="-2693"/>
                 </a:stretch>
               </a:blipFill>
             </p:spPr>
@@ -18527,7 +18629,7 @@
         <p:spPr/>
         <p:txBody>
           <a:bodyPr>
-            <a:normAutofit fontScale="92500" lnSpcReduction="10000"/>
+            <a:normAutofit fontScale="92500" lnSpcReduction="20000"/>
           </a:bodyPr>
           <a:lstStyle/>
           <a:p>
@@ -18536,7 +18638,7 @@
             </a:pPr>
             <a:r>
               <a:rPr dirty="0"/>
-              <a:t>There are a number of ways to determine if a time series is stationary.</a:t>
+              <a:t>There are a number of ways to determine if a time series is stationary</a:t>
             </a:r>
           </a:p>
           <a:p>
@@ -18582,14 +18684,30 @@
             <a:pPr lvl="1"/>
             <a:r>
               <a:rPr dirty="0"/>
-              <a:t>Coefficients represent components of the time series, e.g. trend and lagged differences</a:t>
+              <a:t>Coefficients represent components of the time series, e.g. </a:t>
+            </a:r>
+            <a:r>
+              <a:rPr lang="en-US" dirty="0" err="1"/>
+              <a:t>constsant</a:t>
+            </a:r>
+            <a:r>
+              <a:rPr lang="en-US" dirty="0"/>
+              <a:t>, </a:t>
+            </a:r>
+            <a:r>
+              <a:rPr dirty="0"/>
+              <a:t>trend and lagged differences</a:t>
             </a:r>
           </a:p>
           <a:p>
             <a:pPr lvl="1"/>
             <a:r>
               <a:rPr dirty="0"/>
-              <a:t>Null distribution is that the series is non-stationary</a:t>
+              <a:t>Null distribution is that the </a:t>
+            </a:r>
+            <a:r>
+              <a:rPr b="1" dirty="0"/>
+              <a:t>series is non-stationary</a:t>
             </a:r>
           </a:p>
           <a:p>
@@ -18611,8 +18729,31 @@
             <a:pPr lvl="1"/>
             <a:r>
               <a:rPr dirty="0"/>
-              <a:t>Null hypothesis is that the time series is trend stationary</a:t>
-            </a:r>
+              <a:t>Null hypothesis is that the </a:t>
+            </a:r>
+            <a:r>
+              <a:rPr b="1" dirty="0"/>
+              <a:t>time series is trend stationary</a:t>
+            </a:r>
+            <a:endParaRPr lang="en-US" b="1" dirty="0"/>
+          </a:p>
+          <a:p>
+            <a:pPr marL="0" indent="0">
+              <a:buNone/>
+            </a:pPr>
+            <a:r>
+              <a:rPr lang="en-US" dirty="0">
+                <a:solidFill>
+                  <a:srgbClr val="C00000"/>
+                </a:solidFill>
+              </a:rPr>
+              <a:t>Don’t me confused by the different null hypotheses for these tests!</a:t>
+            </a:r>
+            <a:endParaRPr dirty="0">
+              <a:solidFill>
+                <a:srgbClr val="C00000"/>
+              </a:solidFill>
+            </a:endParaRPr>
           </a:p>
         </p:txBody>
       </p:sp>
@@ -18687,7 +18828,23 @@
             </a:pPr>
             <a:r>
               <a:rPr dirty="0"/>
-              <a:t>There is often a small difference between a time series with a unit root, which is non-stationary, and a time series with a root close to unit</a:t>
+              <a:t>There is often a small difference between a time series </a:t>
+            </a:r>
+            <a:r>
+              <a:rPr lang="en-US" dirty="0"/>
+              <a:t>nonstationary time series with a </a:t>
+            </a:r>
+            <a:r>
+              <a:rPr dirty="0"/>
+              <a:t>unit root</a:t>
+            </a:r>
+            <a:r>
+              <a:rPr lang="en-US" dirty="0"/>
+              <a:t> </a:t>
+            </a:r>
+            <a:r>
+              <a:rPr dirty="0"/>
+              <a:t>and a time series with a root close to unit</a:t>
             </a:r>
           </a:p>
           <a:p>
@@ -18706,8 +18863,17 @@
             <a:pPr lvl="0"/>
             <a:r>
               <a:rPr dirty="0"/>
-              <a:t>Lack of power means a hypothesis test may not be able to reject a hypothesis of non-stationary</a:t>
-            </a:r>
+              <a:t>Lack of power means a hypothesis test may not be able to reject a hypothesis of </a:t>
+            </a:r>
+            <a:r>
+              <a:rPr dirty="0" err="1"/>
+              <a:t>nonstationar</a:t>
+            </a:r>
+            <a:r>
+              <a:rPr lang="en-US" dirty="0" err="1"/>
+              <a:t>ity</a:t>
+            </a:r>
+            <a:endParaRPr dirty="0"/>
           </a:p>
           <a:p>
             <a:pPr lvl="0"/>
@@ -18720,7 +18886,23 @@
             <a:pPr lvl="0"/>
             <a:r>
               <a:rPr dirty="0"/>
-              <a:t>It is best to perform a visual inspection of the properties of the time series as well</a:t>
+              <a:t>It is best </a:t>
+            </a:r>
+            <a:r>
+              <a:rPr lang="en-US" dirty="0"/>
+              <a:t>to </a:t>
+            </a:r>
+            <a:r>
+              <a:rPr lang="en-US" dirty="0" err="1"/>
+              <a:t>linclude</a:t>
+            </a:r>
+            <a:r>
+              <a:rPr lang="en-US" dirty="0"/>
+              <a:t> </a:t>
+            </a:r>
+            <a:r>
+              <a:rPr dirty="0"/>
+              <a:t>a visual inspection of the properties of the time series as well</a:t>
             </a:r>
           </a:p>
         </p:txBody>
@@ -18760,7 +18942,12 @@
             <p:ph type="title"/>
           </p:nvPr>
         </p:nvSpPr>
-        <p:spPr/>
+        <p:spPr>
+          <a:xfrm>
+            <a:off x="457200" y="205979"/>
+            <a:ext cx="4912822" cy="857250"/>
+          </a:xfrm>
+        </p:spPr>
         <p:txBody>
           <a:bodyPr/>
           <a:lstStyle/>
@@ -18769,6 +18956,7 @@
               <a:buNone/>
             </a:pPr>
             <a:r>
+              <a:rPr dirty="0"/>
               <a:t>Stationarity</a:t>
             </a:r>
           </a:p>
@@ -18777,6 +18965,565 @@
       <p:sp>
         <p:nvSpPr>
           <p:cNvPr id="3" name="Content Placeholder 2"/>
+          <p:cNvSpPr>
+            <a:spLocks noGrp="1"/>
+          </p:cNvSpPr>
+          <p:nvPr>
+            <p:ph idx="1"/>
+          </p:nvPr>
+        </p:nvSpPr>
+        <p:spPr>
+          <a:xfrm>
+            <a:off x="457200" y="1006191"/>
+            <a:ext cx="6245388" cy="3640623"/>
+          </a:xfrm>
+        </p:spPr>
+        <p:txBody>
+          <a:bodyPr>
+            <a:normAutofit lnSpcReduction="10000"/>
+          </a:bodyPr>
+          <a:lstStyle/>
+          <a:p>
+            <a:pPr marL="0" lvl="0" indent="0">
+              <a:buNone/>
+            </a:pPr>
+            <a:r>
+              <a:rPr dirty="0"/>
+              <a:t>Example of hypothesis tests on </a:t>
+            </a:r>
+            <a:r>
+              <a:rPr lang="en-US" dirty="0"/>
+              <a:t>5 </a:t>
+            </a:r>
+            <a:r>
+              <a:rPr dirty="0"/>
+              <a:t>example time series</a:t>
+            </a:r>
+            <a:endParaRPr lang="en-US" dirty="0"/>
+          </a:p>
+          <a:p>
+            <a:pPr marL="457200" lvl="0" indent="-457200">
+              <a:buFont typeface="+mj-lt"/>
+              <a:buAutoNum type="arabicPeriod"/>
+            </a:pPr>
+            <a:r>
+              <a:rPr lang="en-US" dirty="0"/>
+              <a:t>White noise series, is </a:t>
+            </a:r>
+            <a:r>
+              <a:rPr lang="en-US" b="1" dirty="0"/>
+              <a:t>stationary </a:t>
+            </a:r>
+          </a:p>
+          <a:p>
+            <a:pPr marL="457200" lvl="0" indent="-457200">
+              <a:buFont typeface="+mj-lt"/>
+              <a:buAutoNum type="arabicPeriod"/>
+            </a:pPr>
+            <a:r>
+              <a:rPr lang="en-US" dirty="0"/>
+              <a:t>Time series with periodic behavior, is </a:t>
+            </a:r>
+            <a:r>
+              <a:rPr lang="en-US" b="1" dirty="0"/>
+              <a:t>nonstationary </a:t>
+            </a:r>
+            <a:r>
+              <a:rPr lang="en-US" dirty="0"/>
+              <a:t> </a:t>
+            </a:r>
+          </a:p>
+          <a:p>
+            <a:pPr marL="457200" lvl="0" indent="-457200">
+              <a:buFont typeface="+mj-lt"/>
+              <a:buAutoNum type="arabicPeriod"/>
+            </a:pPr>
+            <a:r>
+              <a:rPr lang="en-US" dirty="0"/>
+              <a:t>Random walk, </a:t>
+            </a:r>
+            <a:r>
+              <a:rPr lang="en-US" b="1" dirty="0"/>
+              <a:t>nonstationary</a:t>
+            </a:r>
+          </a:p>
+          <a:p>
+            <a:pPr marL="457200" lvl="0" indent="-457200">
+              <a:buFont typeface="+mj-lt"/>
+              <a:buAutoNum type="arabicPeriod"/>
+            </a:pPr>
+            <a:r>
+              <a:rPr lang="en-US" dirty="0"/>
+              <a:t>Time series with trend, </a:t>
+            </a:r>
+            <a:r>
+              <a:rPr lang="en-US" b="1" dirty="0"/>
+              <a:t>nonstationary</a:t>
+            </a:r>
+          </a:p>
+          <a:p>
+            <a:pPr marL="457200" lvl="0" indent="-457200">
+              <a:buFont typeface="+mj-lt"/>
+              <a:buAutoNum type="arabicPeriod"/>
+            </a:pPr>
+            <a:r>
+              <a:rPr lang="en-US" dirty="0"/>
+              <a:t>Time series with trend and seasonal component, </a:t>
+            </a:r>
+            <a:r>
+              <a:rPr lang="en-US" b="1" dirty="0"/>
+              <a:t>nonstationary</a:t>
+            </a:r>
+            <a:r>
+              <a:rPr lang="en-US" dirty="0"/>
+              <a:t> </a:t>
+            </a:r>
+            <a:endParaRPr dirty="0"/>
+          </a:p>
+        </p:txBody>
+      </p:sp>
+      <p:pic>
+        <p:nvPicPr>
+          <p:cNvPr id="6" name="Picture 5">
+            <a:extLst>
+              <a:ext uri="{FF2B5EF4-FFF2-40B4-BE49-F238E27FC236}">
+                <a16:creationId xmlns:a16="http://schemas.microsoft.com/office/drawing/2014/main" id="{F48FCD0B-7F08-60AB-F118-19A8458CDF0A}"/>
+              </a:ext>
+            </a:extLst>
+          </p:cNvPr>
+          <p:cNvPicPr>
+            <a:picLocks noChangeAspect="1"/>
+          </p:cNvPicPr>
+          <p:nvPr/>
+        </p:nvPicPr>
+        <p:blipFill>
+          <a:blip r:embed="rId2"/>
+          <a:stretch>
+            <a:fillRect/>
+          </a:stretch>
+        </p:blipFill>
+        <p:spPr>
+          <a:xfrm>
+            <a:off x="6782001" y="29953"/>
+            <a:ext cx="1977575" cy="1025255"/>
+          </a:xfrm>
+          <a:prstGeom prst="rect">
+            <a:avLst/>
+          </a:prstGeom>
+        </p:spPr>
+      </p:pic>
+      <p:pic>
+        <p:nvPicPr>
+          <p:cNvPr id="7" name="Picture 6">
+            <a:extLst>
+              <a:ext uri="{FF2B5EF4-FFF2-40B4-BE49-F238E27FC236}">
+                <a16:creationId xmlns:a16="http://schemas.microsoft.com/office/drawing/2014/main" id="{7AB5D300-846C-AEB8-FC18-6C355EDCF940}"/>
+              </a:ext>
+            </a:extLst>
+          </p:cNvPr>
+          <p:cNvPicPr>
+            <a:picLocks noChangeAspect="1"/>
+          </p:cNvPicPr>
+          <p:nvPr/>
+        </p:nvPicPr>
+        <p:blipFill>
+          <a:blip r:embed="rId3"/>
+          <a:stretch>
+            <a:fillRect/>
+          </a:stretch>
+        </p:blipFill>
+        <p:spPr>
+          <a:xfrm>
+            <a:off x="6785851" y="1047136"/>
+            <a:ext cx="1996299" cy="1010784"/>
+          </a:xfrm>
+          <a:prstGeom prst="rect">
+            <a:avLst/>
+          </a:prstGeom>
+        </p:spPr>
+      </p:pic>
+      <p:pic>
+        <p:nvPicPr>
+          <p:cNvPr id="8" name="Picture 7">
+            <a:extLst>
+              <a:ext uri="{FF2B5EF4-FFF2-40B4-BE49-F238E27FC236}">
+                <a16:creationId xmlns:a16="http://schemas.microsoft.com/office/drawing/2014/main" id="{6515E1F1-9EF5-F4C9-37D8-9B365D643CA1}"/>
+              </a:ext>
+            </a:extLst>
+          </p:cNvPr>
+          <p:cNvPicPr>
+            <a:picLocks noChangeAspect="1"/>
+          </p:cNvPicPr>
+          <p:nvPr/>
+        </p:nvPicPr>
+        <p:blipFill>
+          <a:blip r:embed="rId4"/>
+          <a:stretch>
+            <a:fillRect/>
+          </a:stretch>
+        </p:blipFill>
+        <p:spPr>
+          <a:xfrm>
+            <a:off x="6725162" y="2072340"/>
+            <a:ext cx="2062170" cy="1010784"/>
+          </a:xfrm>
+          <a:prstGeom prst="rect">
+            <a:avLst/>
+          </a:prstGeom>
+        </p:spPr>
+      </p:pic>
+      <p:pic>
+        <p:nvPicPr>
+          <p:cNvPr id="9" name="Picture 8">
+            <a:extLst>
+              <a:ext uri="{FF2B5EF4-FFF2-40B4-BE49-F238E27FC236}">
+                <a16:creationId xmlns:a16="http://schemas.microsoft.com/office/drawing/2014/main" id="{21B40CFB-26FC-78AF-DA5F-1C529F3D9170}"/>
+              </a:ext>
+            </a:extLst>
+          </p:cNvPr>
+          <p:cNvPicPr>
+            <a:picLocks noChangeAspect="1"/>
+          </p:cNvPicPr>
+          <p:nvPr/>
+        </p:nvPicPr>
+        <p:blipFill>
+          <a:blip r:embed="rId5"/>
+          <a:stretch>
+            <a:fillRect/>
+          </a:stretch>
+        </p:blipFill>
+        <p:spPr>
+          <a:xfrm>
+            <a:off x="6754247" y="3111964"/>
+            <a:ext cx="2033085" cy="1025121"/>
+          </a:xfrm>
+          <a:prstGeom prst="rect">
+            <a:avLst/>
+          </a:prstGeom>
+        </p:spPr>
+      </p:pic>
+      <p:pic>
+        <p:nvPicPr>
+          <p:cNvPr id="11" name="Picture 10">
+            <a:extLst>
+              <a:ext uri="{FF2B5EF4-FFF2-40B4-BE49-F238E27FC236}">
+                <a16:creationId xmlns:a16="http://schemas.microsoft.com/office/drawing/2014/main" id="{B8EEF2E2-7C56-53F4-D62A-71FF5E074196}"/>
+              </a:ext>
+            </a:extLst>
+          </p:cNvPr>
+          <p:cNvPicPr>
+            <a:picLocks noChangeAspect="1"/>
+          </p:cNvPicPr>
+          <p:nvPr/>
+        </p:nvPicPr>
+        <p:blipFill>
+          <a:blip r:embed="rId6"/>
+          <a:stretch>
+            <a:fillRect/>
+          </a:stretch>
+        </p:blipFill>
+        <p:spPr>
+          <a:xfrm>
+            <a:off x="6767459" y="4092236"/>
+            <a:ext cx="2033085" cy="997118"/>
+          </a:xfrm>
+          <a:prstGeom prst="rect">
+            <a:avLst/>
+          </a:prstGeom>
+        </p:spPr>
+      </p:pic>
+      <p:cxnSp>
+        <p:nvCxnSpPr>
+          <p:cNvPr id="12" name="Straight Arrow Connector 11">
+            <a:extLst>
+              <a:ext uri="{FF2B5EF4-FFF2-40B4-BE49-F238E27FC236}">
+                <a16:creationId xmlns:a16="http://schemas.microsoft.com/office/drawing/2014/main" id="{A07FE1ED-E987-05BB-6055-0401F3F0B0C3}"/>
+              </a:ext>
+            </a:extLst>
+          </p:cNvPr>
+          <p:cNvCxnSpPr>
+            <a:cxnSpLocks/>
+          </p:cNvCxnSpPr>
+          <p:nvPr/>
+        </p:nvCxnSpPr>
+        <p:spPr>
+          <a:xfrm flipV="1">
+            <a:off x="5041669" y="1006191"/>
+            <a:ext cx="1803862" cy="997176"/>
+          </a:xfrm>
+          <a:prstGeom prst="straightConnector1">
+            <a:avLst/>
+          </a:prstGeom>
+          <a:ln>
+            <a:solidFill>
+              <a:schemeClr val="tx1"/>
+            </a:solidFill>
+            <a:tailEnd type="triangle"/>
+          </a:ln>
+        </p:spPr>
+        <p:style>
+          <a:lnRef idx="2">
+            <a:schemeClr val="accent1"/>
+          </a:lnRef>
+          <a:fillRef idx="0">
+            <a:schemeClr val="accent1"/>
+          </a:fillRef>
+          <a:effectRef idx="1">
+            <a:schemeClr val="accent1"/>
+          </a:effectRef>
+          <a:fontRef idx="minor">
+            <a:schemeClr val="tx1"/>
+          </a:fontRef>
+        </p:style>
+      </p:cxnSp>
+      <p:cxnSp>
+        <p:nvCxnSpPr>
+          <p:cNvPr id="15" name="Straight Arrow Connector 14">
+            <a:extLst>
+              <a:ext uri="{FF2B5EF4-FFF2-40B4-BE49-F238E27FC236}">
+                <a16:creationId xmlns:a16="http://schemas.microsoft.com/office/drawing/2014/main" id="{6F973548-B735-A8AE-990A-7BEDB5D18825}"/>
+              </a:ext>
+            </a:extLst>
+          </p:cNvPr>
+          <p:cNvCxnSpPr>
+            <a:cxnSpLocks/>
+          </p:cNvCxnSpPr>
+          <p:nvPr/>
+        </p:nvCxnSpPr>
+        <p:spPr>
+          <a:xfrm flipV="1">
+            <a:off x="5598622" y="1687484"/>
+            <a:ext cx="1103966" cy="644236"/>
+          </a:xfrm>
+          <a:prstGeom prst="straightConnector1">
+            <a:avLst/>
+          </a:prstGeom>
+          <a:ln>
+            <a:solidFill>
+              <a:schemeClr val="tx1"/>
+            </a:solidFill>
+            <a:tailEnd type="triangle"/>
+          </a:ln>
+        </p:spPr>
+        <p:style>
+          <a:lnRef idx="2">
+            <a:schemeClr val="accent1"/>
+          </a:lnRef>
+          <a:fillRef idx="0">
+            <a:schemeClr val="accent1"/>
+          </a:fillRef>
+          <a:effectRef idx="1">
+            <a:schemeClr val="accent1"/>
+          </a:effectRef>
+          <a:fontRef idx="minor">
+            <a:schemeClr val="tx1"/>
+          </a:fontRef>
+        </p:style>
+      </p:cxnSp>
+      <p:cxnSp>
+        <p:nvCxnSpPr>
+          <p:cNvPr id="18" name="Straight Arrow Connector 17">
+            <a:extLst>
+              <a:ext uri="{FF2B5EF4-FFF2-40B4-BE49-F238E27FC236}">
+                <a16:creationId xmlns:a16="http://schemas.microsoft.com/office/drawing/2014/main" id="{9DF54669-ABDF-30F4-C9D8-B08B9E82B42C}"/>
+              </a:ext>
+            </a:extLst>
+          </p:cNvPr>
+          <p:cNvCxnSpPr>
+            <a:cxnSpLocks/>
+          </p:cNvCxnSpPr>
+          <p:nvPr/>
+        </p:nvCxnSpPr>
+        <p:spPr>
+          <a:xfrm flipV="1">
+            <a:off x="4655127" y="2571750"/>
+            <a:ext cx="1953491" cy="540214"/>
+          </a:xfrm>
+          <a:prstGeom prst="straightConnector1">
+            <a:avLst/>
+          </a:prstGeom>
+          <a:ln>
+            <a:solidFill>
+              <a:schemeClr val="tx1"/>
+            </a:solidFill>
+            <a:tailEnd type="triangle"/>
+          </a:ln>
+        </p:spPr>
+        <p:style>
+          <a:lnRef idx="2">
+            <a:schemeClr val="accent1"/>
+          </a:lnRef>
+          <a:fillRef idx="0">
+            <a:schemeClr val="accent1"/>
+          </a:fillRef>
+          <a:effectRef idx="1">
+            <a:schemeClr val="accent1"/>
+          </a:effectRef>
+          <a:fontRef idx="minor">
+            <a:schemeClr val="tx1"/>
+          </a:fontRef>
+        </p:style>
+      </p:cxnSp>
+      <p:cxnSp>
+        <p:nvCxnSpPr>
+          <p:cNvPr id="21" name="Straight Arrow Connector 20">
+            <a:extLst>
+              <a:ext uri="{FF2B5EF4-FFF2-40B4-BE49-F238E27FC236}">
+                <a16:creationId xmlns:a16="http://schemas.microsoft.com/office/drawing/2014/main" id="{057940BE-18C5-856C-18B2-40C88319B8B1}"/>
+              </a:ext>
+            </a:extLst>
+          </p:cNvPr>
+          <p:cNvCxnSpPr>
+            <a:cxnSpLocks/>
+            <a:endCxn id="9" idx="1"/>
+          </p:cNvCxnSpPr>
+          <p:nvPr/>
+        </p:nvCxnSpPr>
+        <p:spPr>
+          <a:xfrm>
+            <a:off x="5760720" y="3528753"/>
+            <a:ext cx="993527" cy="95772"/>
+          </a:xfrm>
+          <a:prstGeom prst="straightConnector1">
+            <a:avLst/>
+          </a:prstGeom>
+          <a:ln>
+            <a:solidFill>
+              <a:schemeClr val="tx1"/>
+            </a:solidFill>
+            <a:tailEnd type="triangle"/>
+          </a:ln>
+        </p:spPr>
+        <p:style>
+          <a:lnRef idx="2">
+            <a:schemeClr val="accent1"/>
+          </a:lnRef>
+          <a:fillRef idx="0">
+            <a:schemeClr val="accent1"/>
+          </a:fillRef>
+          <a:effectRef idx="1">
+            <a:schemeClr val="accent1"/>
+          </a:effectRef>
+          <a:fontRef idx="minor">
+            <a:schemeClr val="tx1"/>
+          </a:fontRef>
+        </p:style>
+      </p:cxnSp>
+      <p:cxnSp>
+        <p:nvCxnSpPr>
+          <p:cNvPr id="24" name="Straight Arrow Connector 23">
+            <a:extLst>
+              <a:ext uri="{FF2B5EF4-FFF2-40B4-BE49-F238E27FC236}">
+                <a16:creationId xmlns:a16="http://schemas.microsoft.com/office/drawing/2014/main" id="{08AF709C-9F6C-7ACD-D3A8-8087E618846C}"/>
+              </a:ext>
+            </a:extLst>
+          </p:cNvPr>
+          <p:cNvCxnSpPr>
+            <a:cxnSpLocks/>
+            <a:endCxn id="11" idx="1"/>
+          </p:cNvCxnSpPr>
+          <p:nvPr/>
+        </p:nvCxnSpPr>
+        <p:spPr>
+          <a:xfrm>
+            <a:off x="5511338" y="3944389"/>
+            <a:ext cx="1256121" cy="646406"/>
+          </a:xfrm>
+          <a:prstGeom prst="straightConnector1">
+            <a:avLst/>
+          </a:prstGeom>
+          <a:ln>
+            <a:solidFill>
+              <a:schemeClr val="tx1"/>
+            </a:solidFill>
+            <a:tailEnd type="triangle"/>
+          </a:ln>
+        </p:spPr>
+        <p:style>
+          <a:lnRef idx="2">
+            <a:schemeClr val="accent1"/>
+          </a:lnRef>
+          <a:fillRef idx="0">
+            <a:schemeClr val="accent1"/>
+          </a:fillRef>
+          <a:effectRef idx="1">
+            <a:schemeClr val="accent1"/>
+          </a:effectRef>
+          <a:fontRef idx="minor">
+            <a:schemeClr val="tx1"/>
+          </a:fontRef>
+        </p:style>
+      </p:cxnSp>
+    </p:spTree>
+  </p:cSld>
+  <p:clrMapOvr>
+    <a:masterClrMapping/>
+  </p:clrMapOvr>
+</p:sld>
+</file>
+
+<file path=ppt/slides/slide57.xml><?xml version="1.0" encoding="utf-8"?>
+<p:sld xmlns:a="http://schemas.openxmlformats.org/drawingml/2006/main" xmlns:r="http://schemas.openxmlformats.org/officeDocument/2006/relationships" xmlns:p="http://schemas.openxmlformats.org/presentationml/2006/main">
+  <p:cSld>
+    <p:spTree>
+      <p:nvGrpSpPr>
+        <p:cNvPr id="1" name="">
+          <a:extLst>
+            <a:ext uri="{FF2B5EF4-FFF2-40B4-BE49-F238E27FC236}">
+              <a16:creationId xmlns:a16="http://schemas.microsoft.com/office/drawing/2014/main" id="{9438CF22-C1C2-AA09-9A47-A01CAD0E2037}"/>
+            </a:ext>
+          </a:extLst>
+        </p:cNvPr>
+        <p:cNvGrpSpPr/>
+        <p:nvPr/>
+      </p:nvGrpSpPr>
+      <p:grpSpPr>
+        <a:xfrm>
+          <a:off x="0" y="0"/>
+          <a:ext cx="0" cy="0"/>
+          <a:chOff x="0" y="0"/>
+          <a:chExt cx="0" cy="0"/>
+        </a:xfrm>
+      </p:grpSpPr>
+      <p:sp>
+        <p:nvSpPr>
+          <p:cNvPr id="2" name="Title 1">
+            <a:extLst>
+              <a:ext uri="{FF2B5EF4-FFF2-40B4-BE49-F238E27FC236}">
+                <a16:creationId xmlns:a16="http://schemas.microsoft.com/office/drawing/2014/main" id="{66FB3C44-5384-99A0-34E3-AEEF456D76AA}"/>
+              </a:ext>
+            </a:extLst>
+          </p:cNvPr>
+          <p:cNvSpPr>
+            <a:spLocks noGrp="1"/>
+          </p:cNvSpPr>
+          <p:nvPr>
+            <p:ph type="title"/>
+          </p:nvPr>
+        </p:nvSpPr>
+        <p:spPr/>
+        <p:txBody>
+          <a:bodyPr/>
+          <a:lstStyle/>
+          <a:p>
+            <a:pPr marL="0" lvl="0" indent="0">
+              <a:buNone/>
+            </a:pPr>
+            <a:r>
+              <a:t>Stationarity</a:t>
+            </a:r>
+          </a:p>
+        </p:txBody>
+      </p:sp>
+      <p:sp>
+        <p:nvSpPr>
+          <p:cNvPr id="3" name="Content Placeholder 2">
+            <a:extLst>
+              <a:ext uri="{FF2B5EF4-FFF2-40B4-BE49-F238E27FC236}">
+                <a16:creationId xmlns:a16="http://schemas.microsoft.com/office/drawing/2014/main" id="{7BAF0609-7FC0-8C77-7925-A4C9380C0700}"/>
+              </a:ext>
+            </a:extLst>
+          </p:cNvPr>
           <p:cNvSpPr>
             <a:spLocks noGrp="1"/>
           </p:cNvSpPr>
@@ -18799,14 +19546,28 @@
             </a:pPr>
             <a:r>
               <a:rPr dirty="0"/>
-              <a:t>Example of hypothesis tests on example time series</a:t>
+              <a:t>Example of hypothesis tests on </a:t>
+            </a:r>
+            <a:r>
+              <a:rPr lang="en-US" dirty="0"/>
+              <a:t>5 </a:t>
+            </a:r>
+            <a:r>
+              <a:rPr dirty="0"/>
+              <a:t>example time series</a:t>
             </a:r>
           </a:p>
         </p:txBody>
       </p:sp>
       <p:pic>
         <p:nvPicPr>
-          <p:cNvPr id="4" name="Picture 1" descr="../images/ADF_KPSS_tests.PNG"/>
+          <p:cNvPr id="4" name="Picture 1" descr="../images/ADF_KPSS_tests.PNG">
+            <a:extLst>
+              <a:ext uri="{FF2B5EF4-FFF2-40B4-BE49-F238E27FC236}">
+                <a16:creationId xmlns:a16="http://schemas.microsoft.com/office/drawing/2014/main" id="{6A863BCD-E4C4-D753-6A8A-2E507D0F0AD5}"/>
+              </a:ext>
+            </a:extLst>
+          </p:cNvPr>
           <p:cNvPicPr>
             <a:picLocks noGrp="1" noChangeAspect="1"/>
           </p:cNvPicPr>
@@ -18820,8 +19581,8 @@
         </p:blipFill>
         <p:spPr bwMode="auto">
           <a:xfrm>
-            <a:off x="1085272" y="1514192"/>
-            <a:ext cx="6807200" cy="2882900"/>
+            <a:off x="544944" y="1514192"/>
+            <a:ext cx="5461001" cy="2312775"/>
           </a:xfrm>
           <a:prstGeom prst="rect">
             <a:avLst/>
@@ -18836,14 +19597,20 @@
       </p:pic>
       <p:sp>
         <p:nvSpPr>
-          <p:cNvPr id="5" name="TextBox 3"/>
+          <p:cNvPr id="5" name="TextBox 3">
+            <a:extLst>
+              <a:ext uri="{FF2B5EF4-FFF2-40B4-BE49-F238E27FC236}">
+                <a16:creationId xmlns:a16="http://schemas.microsoft.com/office/drawing/2014/main" id="{C2FB3B55-BEC0-4974-CF5A-B0C9B92E19A6}"/>
+              </a:ext>
+            </a:extLst>
+          </p:cNvPr>
           <p:cNvSpPr txBox="1"/>
           <p:nvPr/>
         </p:nvSpPr>
         <p:spPr>
           <a:xfrm>
-            <a:off x="1085272" y="4508954"/>
-            <a:ext cx="6745317" cy="508000"/>
+            <a:off x="544945" y="3883308"/>
+            <a:ext cx="5419438" cy="508000"/>
           </a:xfrm>
           <a:prstGeom prst="rect">
             <a:avLst/>
@@ -18864,7 +19631,287 @@
           </a:p>
         </p:txBody>
       </p:sp>
+      <p:sp>
+        <p:nvSpPr>
+          <p:cNvPr id="6" name="Content Placeholder 2">
+            <a:extLst>
+              <a:ext uri="{FF2B5EF4-FFF2-40B4-BE49-F238E27FC236}">
+                <a16:creationId xmlns:a16="http://schemas.microsoft.com/office/drawing/2014/main" id="{12DB1EF7-2238-2829-8DA5-98C6D9320DEC}"/>
+              </a:ext>
+            </a:extLst>
+          </p:cNvPr>
+          <p:cNvSpPr txBox="1">
+            <a:spLocks/>
+          </p:cNvSpPr>
+          <p:nvPr/>
+        </p:nvSpPr>
+        <p:spPr>
+          <a:xfrm>
+            <a:off x="6226233" y="1502877"/>
+            <a:ext cx="2857953" cy="3640623"/>
+          </a:xfrm>
+          <a:prstGeom prst="rect">
+            <a:avLst/>
+          </a:prstGeom>
+        </p:spPr>
+        <p:txBody>
+          <a:bodyPr vert="horz" lIns="91440" tIns="45720" rIns="91440" bIns="45720" rtlCol="0">
+            <a:normAutofit/>
+          </a:bodyPr>
+          <a:lstStyle>
+            <a:lvl1pPr marL="342900" indent="-342900" algn="l" defTabSz="342900" rtl="0" eaLnBrk="1" latinLnBrk="0" hangingPunct="1">
+              <a:spcBef>
+                <a:spcPct val="20000"/>
+              </a:spcBef>
+              <a:buFont typeface="Arial"/>
+              <a:buChar char="•"/>
+              <a:defRPr sz="2400" kern="1200">
+                <a:solidFill>
+                  <a:schemeClr val="tx1"/>
+                </a:solidFill>
+                <a:latin typeface="+mn-lt"/>
+                <a:ea typeface="+mn-ea"/>
+                <a:cs typeface="+mn-cs"/>
+              </a:defRPr>
+            </a:lvl1pPr>
+            <a:lvl2pPr marL="685800" indent="-342900" algn="l" defTabSz="342900" rtl="0" eaLnBrk="1" latinLnBrk="0" hangingPunct="1">
+              <a:spcBef>
+                <a:spcPct val="20000"/>
+              </a:spcBef>
+              <a:buFont typeface="Arial"/>
+              <a:buChar char="–"/>
+              <a:defRPr sz="2100" kern="1200">
+                <a:solidFill>
+                  <a:schemeClr val="tx1"/>
+                </a:solidFill>
+                <a:latin typeface="+mn-lt"/>
+                <a:ea typeface="+mn-ea"/>
+                <a:cs typeface="+mn-cs"/>
+              </a:defRPr>
+            </a:lvl2pPr>
+            <a:lvl3pPr marL="1028700" indent="-342900" algn="l" defTabSz="342900" rtl="0" eaLnBrk="1" latinLnBrk="0" hangingPunct="1">
+              <a:spcBef>
+                <a:spcPct val="20000"/>
+              </a:spcBef>
+              <a:buFont typeface="Arial"/>
+              <a:buChar char="•"/>
+              <a:defRPr sz="1800" kern="1200">
+                <a:solidFill>
+                  <a:schemeClr val="tx1"/>
+                </a:solidFill>
+                <a:latin typeface="+mn-lt"/>
+                <a:ea typeface="+mn-ea"/>
+                <a:cs typeface="+mn-cs"/>
+              </a:defRPr>
+            </a:lvl3pPr>
+            <a:lvl4pPr marL="1371600" indent="-342900" algn="l" defTabSz="342900" rtl="0" eaLnBrk="1" latinLnBrk="0" hangingPunct="1">
+              <a:spcBef>
+                <a:spcPct val="20000"/>
+              </a:spcBef>
+              <a:buFont typeface="Arial"/>
+              <a:buChar char="–"/>
+              <a:defRPr sz="1500" kern="1200">
+                <a:solidFill>
+                  <a:schemeClr val="tx1"/>
+                </a:solidFill>
+                <a:latin typeface="+mn-lt"/>
+                <a:ea typeface="+mn-ea"/>
+                <a:cs typeface="+mn-cs"/>
+              </a:defRPr>
+            </a:lvl4pPr>
+            <a:lvl5pPr marL="1714500" indent="-342900" algn="l" defTabSz="342900" rtl="0" eaLnBrk="1" latinLnBrk="0" hangingPunct="1">
+              <a:spcBef>
+                <a:spcPct val="20000"/>
+              </a:spcBef>
+              <a:buFont typeface="Arial"/>
+              <a:buChar char="»"/>
+              <a:defRPr sz="1500" kern="1200">
+                <a:solidFill>
+                  <a:schemeClr val="tx1"/>
+                </a:solidFill>
+                <a:latin typeface="+mn-lt"/>
+                <a:ea typeface="+mn-ea"/>
+                <a:cs typeface="+mn-cs"/>
+              </a:defRPr>
+            </a:lvl5pPr>
+            <a:lvl6pPr marL="2057400" indent="-342900" algn="l" defTabSz="342900" rtl="0" eaLnBrk="1" latinLnBrk="0" hangingPunct="1">
+              <a:spcBef>
+                <a:spcPct val="20000"/>
+              </a:spcBef>
+              <a:buFont typeface="Arial"/>
+              <a:buChar char="•"/>
+              <a:defRPr sz="1500" kern="1200">
+                <a:solidFill>
+                  <a:schemeClr val="tx1"/>
+                </a:solidFill>
+                <a:latin typeface="+mn-lt"/>
+                <a:ea typeface="+mn-ea"/>
+                <a:cs typeface="+mn-cs"/>
+              </a:defRPr>
+            </a:lvl6pPr>
+            <a:lvl7pPr marL="2400300" indent="-342900" algn="l" defTabSz="342900" rtl="0" eaLnBrk="1" latinLnBrk="0" hangingPunct="1">
+              <a:spcBef>
+                <a:spcPct val="20000"/>
+              </a:spcBef>
+              <a:buFont typeface="Arial"/>
+              <a:buChar char="•"/>
+              <a:defRPr sz="1500" kern="1200">
+                <a:solidFill>
+                  <a:schemeClr val="tx1"/>
+                </a:solidFill>
+                <a:latin typeface="+mn-lt"/>
+                <a:ea typeface="+mn-ea"/>
+                <a:cs typeface="+mn-cs"/>
+              </a:defRPr>
+            </a:lvl7pPr>
+            <a:lvl8pPr marL="2743200" indent="-342900" algn="l" defTabSz="342900" rtl="0" eaLnBrk="1" latinLnBrk="0" hangingPunct="1">
+              <a:spcBef>
+                <a:spcPct val="20000"/>
+              </a:spcBef>
+              <a:buFont typeface="Arial"/>
+              <a:buChar char="•"/>
+              <a:defRPr sz="1500" kern="1200">
+                <a:solidFill>
+                  <a:schemeClr val="tx1"/>
+                </a:solidFill>
+                <a:latin typeface="+mn-lt"/>
+                <a:ea typeface="+mn-ea"/>
+                <a:cs typeface="+mn-cs"/>
+              </a:defRPr>
+            </a:lvl8pPr>
+            <a:lvl9pPr marL="3086100" indent="-342900" algn="l" defTabSz="342900" rtl="0" eaLnBrk="1" latinLnBrk="0" hangingPunct="1">
+              <a:spcBef>
+                <a:spcPct val="20000"/>
+              </a:spcBef>
+              <a:buFont typeface="Arial"/>
+              <a:buChar char="•"/>
+              <a:defRPr sz="1500" kern="1200">
+                <a:solidFill>
+                  <a:schemeClr val="tx1"/>
+                </a:solidFill>
+                <a:latin typeface="+mn-lt"/>
+                <a:ea typeface="+mn-ea"/>
+                <a:cs typeface="+mn-cs"/>
+              </a:defRPr>
+            </a:lvl9pPr>
+          </a:lstStyle>
+          <a:p>
+            <a:pPr marL="0" indent="0">
+              <a:buNone/>
+            </a:pPr>
+            <a:r>
+              <a:rPr lang="en-US" sz="2000" dirty="0"/>
+              <a:t>White noise series</a:t>
+            </a:r>
+          </a:p>
+          <a:p>
+            <a:r>
+              <a:rPr lang="en-US" sz="2000" dirty="0"/>
+              <a:t>ADF; reject hypothesis of nonstationary </a:t>
+            </a:r>
+          </a:p>
+          <a:p>
+            <a:r>
+              <a:rPr lang="en-US" sz="2000" dirty="0"/>
+              <a:t>KPSS test cannot reject null hypothesis of stationary </a:t>
+            </a:r>
+          </a:p>
+        </p:txBody>
+      </p:sp>
+      <p:cxnSp>
+        <p:nvCxnSpPr>
+          <p:cNvPr id="7" name="Straight Arrow Connector 6">
+            <a:extLst>
+              <a:ext uri="{FF2B5EF4-FFF2-40B4-BE49-F238E27FC236}">
+                <a16:creationId xmlns:a16="http://schemas.microsoft.com/office/drawing/2014/main" id="{6898C3C2-E913-A89B-6C4B-F58B4F79C209}"/>
+              </a:ext>
+            </a:extLst>
+          </p:cNvPr>
+          <p:cNvCxnSpPr>
+            <a:cxnSpLocks/>
+          </p:cNvCxnSpPr>
+          <p:nvPr/>
+        </p:nvCxnSpPr>
+        <p:spPr>
+          <a:xfrm flipH="1" flipV="1">
+            <a:off x="4110644" y="1949335"/>
+            <a:ext cx="2340032" cy="511232"/>
+          </a:xfrm>
+          <a:prstGeom prst="straightConnector1">
+            <a:avLst/>
+          </a:prstGeom>
+          <a:ln>
+            <a:solidFill>
+              <a:schemeClr val="tx1"/>
+            </a:solidFill>
+            <a:tailEnd type="triangle"/>
+          </a:ln>
+        </p:spPr>
+        <p:style>
+          <a:lnRef idx="2">
+            <a:schemeClr val="accent1"/>
+          </a:lnRef>
+          <a:fillRef idx="0">
+            <a:schemeClr val="accent1"/>
+          </a:fillRef>
+          <a:effectRef idx="1">
+            <a:schemeClr val="accent1"/>
+          </a:effectRef>
+          <a:fontRef idx="minor">
+            <a:schemeClr val="tx1"/>
+          </a:fontRef>
+        </p:style>
+      </p:cxnSp>
+      <p:cxnSp>
+        <p:nvCxnSpPr>
+          <p:cNvPr id="11" name="Straight Arrow Connector 10">
+            <a:extLst>
+              <a:ext uri="{FF2B5EF4-FFF2-40B4-BE49-F238E27FC236}">
+                <a16:creationId xmlns:a16="http://schemas.microsoft.com/office/drawing/2014/main" id="{FB408133-32BF-202A-CB60-3AC68D10A050}"/>
+              </a:ext>
+            </a:extLst>
+          </p:cNvPr>
+          <p:cNvCxnSpPr>
+            <a:cxnSpLocks/>
+          </p:cNvCxnSpPr>
+          <p:nvPr/>
+        </p:nvCxnSpPr>
+        <p:spPr>
+          <a:xfrm flipH="1" flipV="1">
+            <a:off x="5964383" y="1949335"/>
+            <a:ext cx="565264" cy="1201189"/>
+          </a:xfrm>
+          <a:prstGeom prst="straightConnector1">
+            <a:avLst/>
+          </a:prstGeom>
+          <a:ln>
+            <a:solidFill>
+              <a:schemeClr val="tx1"/>
+            </a:solidFill>
+            <a:tailEnd type="triangle"/>
+          </a:ln>
+        </p:spPr>
+        <p:style>
+          <a:lnRef idx="2">
+            <a:schemeClr val="accent1"/>
+          </a:lnRef>
+          <a:fillRef idx="0">
+            <a:schemeClr val="accent1"/>
+          </a:fillRef>
+          <a:effectRef idx="1">
+            <a:schemeClr val="accent1"/>
+          </a:effectRef>
+          <a:fontRef idx="minor">
+            <a:schemeClr val="tx1"/>
+          </a:fontRef>
+        </p:style>
+      </p:cxnSp>
     </p:spTree>
+    <p:extLst>
+      <p:ext uri="{BB962C8B-B14F-4D97-AF65-F5344CB8AC3E}">
+        <p14:creationId xmlns:p14="http://schemas.microsoft.com/office/powerpoint/2010/main" val="2028699037"/>
+      </p:ext>
+    </p:extLst>
   </p:cSld>
   <p:clrMapOvr>
     <a:masterClrMapping/>
@@ -18872,12 +19919,18 @@
 </p:sld>
 </file>
 
-<file path=ppt/slides/slide57.xml><?xml version="1.0" encoding="utf-8"?>
+<file path=ppt/slides/slide58.xml><?xml version="1.0" encoding="utf-8"?>
 <p:sld xmlns:a="http://schemas.openxmlformats.org/drawingml/2006/main" xmlns:r="http://schemas.openxmlformats.org/officeDocument/2006/relationships" xmlns:p="http://schemas.openxmlformats.org/presentationml/2006/main">
   <p:cSld>
     <p:spTree>
       <p:nvGrpSpPr>
-        <p:cNvPr id="1" name=""/>
+        <p:cNvPr id="1" name="">
+          <a:extLst>
+            <a:ext uri="{FF2B5EF4-FFF2-40B4-BE49-F238E27FC236}">
+              <a16:creationId xmlns:a16="http://schemas.microsoft.com/office/drawing/2014/main" id="{040BDF7D-2F4F-6A22-982C-D9EBA9CB8640}"/>
+            </a:ext>
+          </a:extLst>
+        </p:cNvPr>
         <p:cNvGrpSpPr/>
         <p:nvPr/>
       </p:nvGrpSpPr>
@@ -18891,7 +19944,13 @@
       </p:grpSpPr>
       <p:sp>
         <p:nvSpPr>
-          <p:cNvPr id="2" name="Title 1"/>
+          <p:cNvPr id="2" name="Title 1">
+            <a:extLst>
+              <a:ext uri="{FF2B5EF4-FFF2-40B4-BE49-F238E27FC236}">
+                <a16:creationId xmlns:a16="http://schemas.microsoft.com/office/drawing/2014/main" id="{67D72D84-3328-2F34-639A-EEF76F85BF1F}"/>
+              </a:ext>
+            </a:extLst>
+          </p:cNvPr>
           <p:cNvSpPr>
             <a:spLocks noGrp="1"/>
           </p:cNvSpPr>
@@ -18908,14 +19967,20 @@
               <a:buNone/>
             </a:pPr>
             <a:r>
-              <a:t>Summary</a:t>
+              <a:t>Stationarity</a:t>
             </a:r>
           </a:p>
         </p:txBody>
       </p:sp>
       <p:sp>
         <p:nvSpPr>
-          <p:cNvPr id="3" name="Content Placeholder 2"/>
+          <p:cNvPr id="3" name="Content Placeholder 2">
+            <a:extLst>
+              <a:ext uri="{FF2B5EF4-FFF2-40B4-BE49-F238E27FC236}">
+                <a16:creationId xmlns:a16="http://schemas.microsoft.com/office/drawing/2014/main" id="{AE8C814A-2F56-2F8D-A779-058811A8892E}"/>
+              </a:ext>
+            </a:extLst>
+          </p:cNvPr>
           <p:cNvSpPr>
             <a:spLocks noGrp="1"/>
           </p:cNvSpPr>
@@ -18925,14 +19990,12 @@
         </p:nvSpPr>
         <p:spPr>
           <a:xfrm>
-            <a:off x="457200" y="1200150"/>
-            <a:ext cx="8229600" cy="3558885"/>
+            <a:off x="457200" y="1006192"/>
+            <a:ext cx="8229600" cy="508000"/>
           </a:xfrm>
         </p:spPr>
         <p:txBody>
-          <a:bodyPr>
-            <a:normAutofit fontScale="77500" lnSpcReduction="20000"/>
-          </a:bodyPr>
+          <a:bodyPr/>
           <a:lstStyle/>
           <a:p>
             <a:pPr marL="0" lvl="0" indent="0">
@@ -18940,96 +20003,835 @@
             </a:pPr>
             <a:r>
               <a:rPr dirty="0"/>
-              <a:t>Fundamental elements of time series</a:t>
-            </a:r>
-          </a:p>
-          <a:p>
-            <a:pPr lvl="0"/>
+              <a:t>Example of hypothesis tests on </a:t>
+            </a:r>
+            <a:r>
+              <a:rPr lang="en-US" dirty="0"/>
+              <a:t>5 </a:t>
+            </a:r>
             <a:r>
               <a:rPr dirty="0"/>
-              <a:t>Fundamental components which cannot be predicted</a:t>
-            </a:r>
-          </a:p>
-          <a:p>
-            <a:pPr lvl="1"/>
-            <a:r>
-              <a:rPr dirty="0"/>
-              <a:t>White noise</a:t>
-            </a:r>
-          </a:p>
-          <a:p>
-            <a:pPr lvl="1"/>
-            <a:r>
-              <a:rPr dirty="0"/>
-              <a:t>Random walks</a:t>
-            </a:r>
-          </a:p>
-          <a:p>
-            <a:pPr lvl="0"/>
-            <a:r>
-              <a:rPr dirty="0"/>
-              <a:t>Autocorrelation and partial autocorrelation</a:t>
-            </a:r>
-          </a:p>
-          <a:p>
-            <a:pPr lvl="0"/>
-            <a:r>
-              <a:rPr dirty="0"/>
-              <a:t>Trend</a:t>
-            </a:r>
-          </a:p>
-          <a:p>
-            <a:pPr lvl="0"/>
-            <a:r>
-              <a:rPr dirty="0"/>
-              <a:t>Seasonal components</a:t>
-            </a:r>
-          </a:p>
-          <a:p>
-            <a:pPr lvl="0"/>
-            <a:r>
-              <a:rPr dirty="0"/>
-              <a:t>Differencing to transform to stationarity</a:t>
-            </a:r>
-          </a:p>
-          <a:p>
-            <a:pPr lvl="1"/>
-            <a:r>
-              <a:rPr dirty="0"/>
-              <a:t>Seasonal differencing</a:t>
-            </a:r>
-          </a:p>
-          <a:p>
-            <a:pPr lvl="1"/>
-            <a:r>
-              <a:rPr dirty="0"/>
-              <a:t>Non-seasonal differencing</a:t>
-            </a:r>
-          </a:p>
-          <a:p>
-            <a:pPr lvl="0"/>
-            <a:r>
-              <a:rPr dirty="0"/>
-              <a:t>Stationarity properties</a:t>
-            </a:r>
-          </a:p>
-          <a:p>
-            <a:pPr lvl="1"/>
-            <a:r>
-              <a:rPr dirty="0"/>
-              <a:t>augmented Dicky-Fuller test</a:t>
-            </a:r>
-          </a:p>
-          <a:p>
-            <a:pPr lvl="1"/>
-            <a:r>
-              <a:rPr dirty="0"/>
-              <a:t>KPSS test</a:t>
+              <a:t>example time series</a:t>
             </a:r>
           </a:p>
         </p:txBody>
       </p:sp>
+      <p:pic>
+        <p:nvPicPr>
+          <p:cNvPr id="4" name="Picture 1" descr="../images/ADF_KPSS_tests.PNG">
+            <a:extLst>
+              <a:ext uri="{FF2B5EF4-FFF2-40B4-BE49-F238E27FC236}">
+                <a16:creationId xmlns:a16="http://schemas.microsoft.com/office/drawing/2014/main" id="{AEBAA891-DA6A-C284-C758-DF4E47F99885}"/>
+              </a:ext>
+            </a:extLst>
+          </p:cNvPr>
+          <p:cNvPicPr>
+            <a:picLocks noGrp="1" noChangeAspect="1"/>
+          </p:cNvPicPr>
+          <p:nvPr/>
+        </p:nvPicPr>
+        <p:blipFill>
+          <a:blip r:embed="rId2"/>
+          <a:stretch>
+            <a:fillRect/>
+          </a:stretch>
+        </p:blipFill>
+        <p:spPr bwMode="auto">
+          <a:xfrm>
+            <a:off x="544944" y="1514192"/>
+            <a:ext cx="5461001" cy="2312775"/>
+          </a:xfrm>
+          <a:prstGeom prst="rect">
+            <a:avLst/>
+          </a:prstGeom>
+          <a:noFill/>
+          <a:ln w="9525">
+            <a:noFill/>
+            <a:headEnd/>
+            <a:tailEnd/>
+          </a:ln>
+        </p:spPr>
+      </p:pic>
+      <p:sp>
+        <p:nvSpPr>
+          <p:cNvPr id="5" name="TextBox 3">
+            <a:extLst>
+              <a:ext uri="{FF2B5EF4-FFF2-40B4-BE49-F238E27FC236}">
+                <a16:creationId xmlns:a16="http://schemas.microsoft.com/office/drawing/2014/main" id="{64402DBF-ACB5-87DA-95AA-A8530B0F8411}"/>
+              </a:ext>
+            </a:extLst>
+          </p:cNvPr>
+          <p:cNvSpPr txBox="1"/>
+          <p:nvPr/>
+        </p:nvSpPr>
+        <p:spPr>
+          <a:xfrm>
+            <a:off x="544945" y="3883308"/>
+            <a:ext cx="5419438" cy="508000"/>
+          </a:xfrm>
+          <a:prstGeom prst="rect">
+            <a:avLst/>
+          </a:prstGeom>
+          <a:noFill/>
+        </p:spPr>
+        <p:txBody>
+          <a:bodyPr/>
+          <a:lstStyle/>
+          <a:p>
+            <a:pPr marL="0" lvl="0" indent="0" algn="ctr">
+              <a:buNone/>
+            </a:pPr>
+            <a:r>
+              <a:rPr dirty="0"/>
+              <a:t>Example of tests for stationarity</a:t>
+            </a:r>
+          </a:p>
+        </p:txBody>
+      </p:sp>
+      <p:sp>
+        <p:nvSpPr>
+          <p:cNvPr id="6" name="Content Placeholder 2">
+            <a:extLst>
+              <a:ext uri="{FF2B5EF4-FFF2-40B4-BE49-F238E27FC236}">
+                <a16:creationId xmlns:a16="http://schemas.microsoft.com/office/drawing/2014/main" id="{0F40E8F6-8CD2-DE7C-E27F-FC9F86FE97C0}"/>
+              </a:ext>
+            </a:extLst>
+          </p:cNvPr>
+          <p:cNvSpPr txBox="1">
+            <a:spLocks/>
+          </p:cNvSpPr>
+          <p:nvPr/>
+        </p:nvSpPr>
+        <p:spPr>
+          <a:xfrm>
+            <a:off x="6226233" y="1502877"/>
+            <a:ext cx="2857953" cy="3640623"/>
+          </a:xfrm>
+          <a:prstGeom prst="rect">
+            <a:avLst/>
+          </a:prstGeom>
+        </p:spPr>
+        <p:txBody>
+          <a:bodyPr vert="horz" lIns="91440" tIns="45720" rIns="91440" bIns="45720" rtlCol="0">
+            <a:normAutofit/>
+          </a:bodyPr>
+          <a:lstStyle>
+            <a:lvl1pPr marL="342900" indent="-342900" algn="l" defTabSz="342900" rtl="0" eaLnBrk="1" latinLnBrk="0" hangingPunct="1">
+              <a:spcBef>
+                <a:spcPct val="20000"/>
+              </a:spcBef>
+              <a:buFont typeface="Arial"/>
+              <a:buChar char="•"/>
+              <a:defRPr sz="2400" kern="1200">
+                <a:solidFill>
+                  <a:schemeClr val="tx1"/>
+                </a:solidFill>
+                <a:latin typeface="+mn-lt"/>
+                <a:ea typeface="+mn-ea"/>
+                <a:cs typeface="+mn-cs"/>
+              </a:defRPr>
+            </a:lvl1pPr>
+            <a:lvl2pPr marL="685800" indent="-342900" algn="l" defTabSz="342900" rtl="0" eaLnBrk="1" latinLnBrk="0" hangingPunct="1">
+              <a:spcBef>
+                <a:spcPct val="20000"/>
+              </a:spcBef>
+              <a:buFont typeface="Arial"/>
+              <a:buChar char="–"/>
+              <a:defRPr sz="2100" kern="1200">
+                <a:solidFill>
+                  <a:schemeClr val="tx1"/>
+                </a:solidFill>
+                <a:latin typeface="+mn-lt"/>
+                <a:ea typeface="+mn-ea"/>
+                <a:cs typeface="+mn-cs"/>
+              </a:defRPr>
+            </a:lvl2pPr>
+            <a:lvl3pPr marL="1028700" indent="-342900" algn="l" defTabSz="342900" rtl="0" eaLnBrk="1" latinLnBrk="0" hangingPunct="1">
+              <a:spcBef>
+                <a:spcPct val="20000"/>
+              </a:spcBef>
+              <a:buFont typeface="Arial"/>
+              <a:buChar char="•"/>
+              <a:defRPr sz="1800" kern="1200">
+                <a:solidFill>
+                  <a:schemeClr val="tx1"/>
+                </a:solidFill>
+                <a:latin typeface="+mn-lt"/>
+                <a:ea typeface="+mn-ea"/>
+                <a:cs typeface="+mn-cs"/>
+              </a:defRPr>
+            </a:lvl3pPr>
+            <a:lvl4pPr marL="1371600" indent="-342900" algn="l" defTabSz="342900" rtl="0" eaLnBrk="1" latinLnBrk="0" hangingPunct="1">
+              <a:spcBef>
+                <a:spcPct val="20000"/>
+              </a:spcBef>
+              <a:buFont typeface="Arial"/>
+              <a:buChar char="–"/>
+              <a:defRPr sz="1500" kern="1200">
+                <a:solidFill>
+                  <a:schemeClr val="tx1"/>
+                </a:solidFill>
+                <a:latin typeface="+mn-lt"/>
+                <a:ea typeface="+mn-ea"/>
+                <a:cs typeface="+mn-cs"/>
+              </a:defRPr>
+            </a:lvl4pPr>
+            <a:lvl5pPr marL="1714500" indent="-342900" algn="l" defTabSz="342900" rtl="0" eaLnBrk="1" latinLnBrk="0" hangingPunct="1">
+              <a:spcBef>
+                <a:spcPct val="20000"/>
+              </a:spcBef>
+              <a:buFont typeface="Arial"/>
+              <a:buChar char="»"/>
+              <a:defRPr sz="1500" kern="1200">
+                <a:solidFill>
+                  <a:schemeClr val="tx1"/>
+                </a:solidFill>
+                <a:latin typeface="+mn-lt"/>
+                <a:ea typeface="+mn-ea"/>
+                <a:cs typeface="+mn-cs"/>
+              </a:defRPr>
+            </a:lvl5pPr>
+            <a:lvl6pPr marL="2057400" indent="-342900" algn="l" defTabSz="342900" rtl="0" eaLnBrk="1" latinLnBrk="0" hangingPunct="1">
+              <a:spcBef>
+                <a:spcPct val="20000"/>
+              </a:spcBef>
+              <a:buFont typeface="Arial"/>
+              <a:buChar char="•"/>
+              <a:defRPr sz="1500" kern="1200">
+                <a:solidFill>
+                  <a:schemeClr val="tx1"/>
+                </a:solidFill>
+                <a:latin typeface="+mn-lt"/>
+                <a:ea typeface="+mn-ea"/>
+                <a:cs typeface="+mn-cs"/>
+              </a:defRPr>
+            </a:lvl6pPr>
+            <a:lvl7pPr marL="2400300" indent="-342900" algn="l" defTabSz="342900" rtl="0" eaLnBrk="1" latinLnBrk="0" hangingPunct="1">
+              <a:spcBef>
+                <a:spcPct val="20000"/>
+              </a:spcBef>
+              <a:buFont typeface="Arial"/>
+              <a:buChar char="•"/>
+              <a:defRPr sz="1500" kern="1200">
+                <a:solidFill>
+                  <a:schemeClr val="tx1"/>
+                </a:solidFill>
+                <a:latin typeface="+mn-lt"/>
+                <a:ea typeface="+mn-ea"/>
+                <a:cs typeface="+mn-cs"/>
+              </a:defRPr>
+            </a:lvl7pPr>
+            <a:lvl8pPr marL="2743200" indent="-342900" algn="l" defTabSz="342900" rtl="0" eaLnBrk="1" latinLnBrk="0" hangingPunct="1">
+              <a:spcBef>
+                <a:spcPct val="20000"/>
+              </a:spcBef>
+              <a:buFont typeface="Arial"/>
+              <a:buChar char="•"/>
+              <a:defRPr sz="1500" kern="1200">
+                <a:solidFill>
+                  <a:schemeClr val="tx1"/>
+                </a:solidFill>
+                <a:latin typeface="+mn-lt"/>
+                <a:ea typeface="+mn-ea"/>
+                <a:cs typeface="+mn-cs"/>
+              </a:defRPr>
+            </a:lvl8pPr>
+            <a:lvl9pPr marL="3086100" indent="-342900" algn="l" defTabSz="342900" rtl="0" eaLnBrk="1" latinLnBrk="0" hangingPunct="1">
+              <a:spcBef>
+                <a:spcPct val="20000"/>
+              </a:spcBef>
+              <a:buFont typeface="Arial"/>
+              <a:buChar char="•"/>
+              <a:defRPr sz="1500" kern="1200">
+                <a:solidFill>
+                  <a:schemeClr val="tx1"/>
+                </a:solidFill>
+                <a:latin typeface="+mn-lt"/>
+                <a:ea typeface="+mn-ea"/>
+                <a:cs typeface="+mn-cs"/>
+              </a:defRPr>
+            </a:lvl9pPr>
+          </a:lstStyle>
+          <a:p>
+            <a:pPr marL="0" indent="0">
+              <a:buNone/>
+            </a:pPr>
+            <a:r>
+              <a:rPr lang="en-US" sz="2000" dirty="0"/>
+              <a:t>Periodic series</a:t>
+            </a:r>
+          </a:p>
+          <a:p>
+            <a:r>
+              <a:rPr lang="en-US" sz="2000" dirty="0"/>
+              <a:t>ADF; cannot reject hypothesis of nonstationary </a:t>
+            </a:r>
+          </a:p>
+          <a:p>
+            <a:r>
+              <a:rPr lang="en-US" sz="2000" dirty="0"/>
+              <a:t>KPSS test cannot reject null hypothesis of stationary </a:t>
+            </a:r>
+          </a:p>
+          <a:p>
+            <a:r>
+              <a:rPr lang="en-US" sz="2000" dirty="0"/>
+              <a:t>Ambiguous result, so assume nonstationary</a:t>
+            </a:r>
+          </a:p>
+        </p:txBody>
+      </p:sp>
+      <p:cxnSp>
+        <p:nvCxnSpPr>
+          <p:cNvPr id="7" name="Straight Arrow Connector 6">
+            <a:extLst>
+              <a:ext uri="{FF2B5EF4-FFF2-40B4-BE49-F238E27FC236}">
+                <a16:creationId xmlns:a16="http://schemas.microsoft.com/office/drawing/2014/main" id="{3550984B-DE5D-37C0-BD2B-76F399C3723E}"/>
+              </a:ext>
+            </a:extLst>
+          </p:cNvPr>
+          <p:cNvCxnSpPr>
+            <a:cxnSpLocks/>
+          </p:cNvCxnSpPr>
+          <p:nvPr/>
+        </p:nvCxnSpPr>
+        <p:spPr>
+          <a:xfrm flipH="1" flipV="1">
+            <a:off x="4110644" y="2090651"/>
+            <a:ext cx="2340032" cy="369916"/>
+          </a:xfrm>
+          <a:prstGeom prst="straightConnector1">
+            <a:avLst/>
+          </a:prstGeom>
+          <a:ln>
+            <a:solidFill>
+              <a:schemeClr val="tx1"/>
+            </a:solidFill>
+            <a:tailEnd type="triangle"/>
+          </a:ln>
+        </p:spPr>
+        <p:style>
+          <a:lnRef idx="2">
+            <a:schemeClr val="accent1"/>
+          </a:lnRef>
+          <a:fillRef idx="0">
+            <a:schemeClr val="accent1"/>
+          </a:fillRef>
+          <a:effectRef idx="1">
+            <a:schemeClr val="accent1"/>
+          </a:effectRef>
+          <a:fontRef idx="minor">
+            <a:schemeClr val="tx1"/>
+          </a:fontRef>
+        </p:style>
+      </p:cxnSp>
+      <p:cxnSp>
+        <p:nvCxnSpPr>
+          <p:cNvPr id="11" name="Straight Arrow Connector 10">
+            <a:extLst>
+              <a:ext uri="{FF2B5EF4-FFF2-40B4-BE49-F238E27FC236}">
+                <a16:creationId xmlns:a16="http://schemas.microsoft.com/office/drawing/2014/main" id="{9335E553-E3A3-58F5-7AD3-E9EDD97BA8A1}"/>
+              </a:ext>
+            </a:extLst>
+          </p:cNvPr>
+          <p:cNvCxnSpPr>
+            <a:cxnSpLocks/>
+          </p:cNvCxnSpPr>
+          <p:nvPr/>
+        </p:nvCxnSpPr>
+        <p:spPr>
+          <a:xfrm flipH="1" flipV="1">
+            <a:off x="5964383" y="2090651"/>
+            <a:ext cx="673330" cy="1126374"/>
+          </a:xfrm>
+          <a:prstGeom prst="straightConnector1">
+            <a:avLst/>
+          </a:prstGeom>
+          <a:ln>
+            <a:solidFill>
+              <a:schemeClr val="tx1"/>
+            </a:solidFill>
+            <a:tailEnd type="triangle"/>
+          </a:ln>
+        </p:spPr>
+        <p:style>
+          <a:lnRef idx="2">
+            <a:schemeClr val="accent1"/>
+          </a:lnRef>
+          <a:fillRef idx="0">
+            <a:schemeClr val="accent1"/>
+          </a:fillRef>
+          <a:effectRef idx="1">
+            <a:schemeClr val="accent1"/>
+          </a:effectRef>
+          <a:fontRef idx="minor">
+            <a:schemeClr val="tx1"/>
+          </a:fontRef>
+        </p:style>
+      </p:cxnSp>
     </p:spTree>
+    <p:extLst>
+      <p:ext uri="{BB962C8B-B14F-4D97-AF65-F5344CB8AC3E}">
+        <p14:creationId xmlns:p14="http://schemas.microsoft.com/office/powerpoint/2010/main" val="408679869"/>
+      </p:ext>
+    </p:extLst>
+  </p:cSld>
+  <p:clrMapOvr>
+    <a:masterClrMapping/>
+  </p:clrMapOvr>
+</p:sld>
+</file>
+
+<file path=ppt/slides/slide59.xml><?xml version="1.0" encoding="utf-8"?>
+<p:sld xmlns:a="http://schemas.openxmlformats.org/drawingml/2006/main" xmlns:r="http://schemas.openxmlformats.org/officeDocument/2006/relationships" xmlns:p="http://schemas.openxmlformats.org/presentationml/2006/main">
+  <p:cSld>
+    <p:spTree>
+      <p:nvGrpSpPr>
+        <p:cNvPr id="1" name="">
+          <a:extLst>
+            <a:ext uri="{FF2B5EF4-FFF2-40B4-BE49-F238E27FC236}">
+              <a16:creationId xmlns:a16="http://schemas.microsoft.com/office/drawing/2014/main" id="{78B8922B-4C2C-8747-7F4D-830A99A4D222}"/>
+            </a:ext>
+          </a:extLst>
+        </p:cNvPr>
+        <p:cNvGrpSpPr/>
+        <p:nvPr/>
+      </p:nvGrpSpPr>
+      <p:grpSpPr>
+        <a:xfrm>
+          <a:off x="0" y="0"/>
+          <a:ext cx="0" cy="0"/>
+          <a:chOff x="0" y="0"/>
+          <a:chExt cx="0" cy="0"/>
+        </a:xfrm>
+      </p:grpSpPr>
+      <p:sp>
+        <p:nvSpPr>
+          <p:cNvPr id="2" name="Title 1">
+            <a:extLst>
+              <a:ext uri="{FF2B5EF4-FFF2-40B4-BE49-F238E27FC236}">
+                <a16:creationId xmlns:a16="http://schemas.microsoft.com/office/drawing/2014/main" id="{745B9A7A-DF85-8F7E-9824-A05F72721CE7}"/>
+              </a:ext>
+            </a:extLst>
+          </p:cNvPr>
+          <p:cNvSpPr>
+            <a:spLocks noGrp="1"/>
+          </p:cNvSpPr>
+          <p:nvPr>
+            <p:ph type="title"/>
+          </p:nvPr>
+        </p:nvSpPr>
+        <p:spPr/>
+        <p:txBody>
+          <a:bodyPr/>
+          <a:lstStyle/>
+          <a:p>
+            <a:pPr marL="0" lvl="0" indent="0">
+              <a:buNone/>
+            </a:pPr>
+            <a:r>
+              <a:t>Stationarity</a:t>
+            </a:r>
+          </a:p>
+        </p:txBody>
+      </p:sp>
+      <p:sp>
+        <p:nvSpPr>
+          <p:cNvPr id="3" name="Content Placeholder 2">
+            <a:extLst>
+              <a:ext uri="{FF2B5EF4-FFF2-40B4-BE49-F238E27FC236}">
+                <a16:creationId xmlns:a16="http://schemas.microsoft.com/office/drawing/2014/main" id="{74768F59-4FDF-B125-2A8C-8206BA37982F}"/>
+              </a:ext>
+            </a:extLst>
+          </p:cNvPr>
+          <p:cNvSpPr>
+            <a:spLocks noGrp="1"/>
+          </p:cNvSpPr>
+          <p:nvPr>
+            <p:ph idx="1"/>
+          </p:nvPr>
+        </p:nvSpPr>
+        <p:spPr>
+          <a:xfrm>
+            <a:off x="457200" y="1006192"/>
+            <a:ext cx="8229600" cy="508000"/>
+          </a:xfrm>
+        </p:spPr>
+        <p:txBody>
+          <a:bodyPr/>
+          <a:lstStyle/>
+          <a:p>
+            <a:pPr marL="0" lvl="0" indent="0">
+              <a:buNone/>
+            </a:pPr>
+            <a:r>
+              <a:rPr dirty="0"/>
+              <a:t>Example of hypothesis tests on </a:t>
+            </a:r>
+            <a:r>
+              <a:rPr lang="en-US" dirty="0"/>
+              <a:t>5 </a:t>
+            </a:r>
+            <a:r>
+              <a:rPr dirty="0"/>
+              <a:t>example time series</a:t>
+            </a:r>
+          </a:p>
+        </p:txBody>
+      </p:sp>
+      <p:pic>
+        <p:nvPicPr>
+          <p:cNvPr id="4" name="Picture 1" descr="../images/ADF_KPSS_tests.PNG">
+            <a:extLst>
+              <a:ext uri="{FF2B5EF4-FFF2-40B4-BE49-F238E27FC236}">
+                <a16:creationId xmlns:a16="http://schemas.microsoft.com/office/drawing/2014/main" id="{0BA5E420-3FA8-FE3B-CCEC-E28F3AD1592E}"/>
+              </a:ext>
+            </a:extLst>
+          </p:cNvPr>
+          <p:cNvPicPr>
+            <a:picLocks noGrp="1" noChangeAspect="1"/>
+          </p:cNvPicPr>
+          <p:nvPr/>
+        </p:nvPicPr>
+        <p:blipFill>
+          <a:blip r:embed="rId2"/>
+          <a:stretch>
+            <a:fillRect/>
+          </a:stretch>
+        </p:blipFill>
+        <p:spPr bwMode="auto">
+          <a:xfrm>
+            <a:off x="544944" y="1514192"/>
+            <a:ext cx="5461001" cy="2312775"/>
+          </a:xfrm>
+          <a:prstGeom prst="rect">
+            <a:avLst/>
+          </a:prstGeom>
+          <a:noFill/>
+          <a:ln w="9525">
+            <a:noFill/>
+            <a:headEnd/>
+            <a:tailEnd/>
+          </a:ln>
+        </p:spPr>
+      </p:pic>
+      <p:sp>
+        <p:nvSpPr>
+          <p:cNvPr id="5" name="TextBox 3">
+            <a:extLst>
+              <a:ext uri="{FF2B5EF4-FFF2-40B4-BE49-F238E27FC236}">
+                <a16:creationId xmlns:a16="http://schemas.microsoft.com/office/drawing/2014/main" id="{6ADD7F28-D16A-6279-5A6D-BBEE89346BF1}"/>
+              </a:ext>
+            </a:extLst>
+          </p:cNvPr>
+          <p:cNvSpPr txBox="1"/>
+          <p:nvPr/>
+        </p:nvSpPr>
+        <p:spPr>
+          <a:xfrm>
+            <a:off x="544945" y="3883308"/>
+            <a:ext cx="5419438" cy="508000"/>
+          </a:xfrm>
+          <a:prstGeom prst="rect">
+            <a:avLst/>
+          </a:prstGeom>
+          <a:noFill/>
+        </p:spPr>
+        <p:txBody>
+          <a:bodyPr/>
+          <a:lstStyle/>
+          <a:p>
+            <a:pPr marL="0" lvl="0" indent="0" algn="ctr">
+              <a:buNone/>
+            </a:pPr>
+            <a:r>
+              <a:rPr dirty="0"/>
+              <a:t>Example of tests for stationarity</a:t>
+            </a:r>
+          </a:p>
+        </p:txBody>
+      </p:sp>
+      <p:sp>
+        <p:nvSpPr>
+          <p:cNvPr id="6" name="Content Placeholder 2">
+            <a:extLst>
+              <a:ext uri="{FF2B5EF4-FFF2-40B4-BE49-F238E27FC236}">
+                <a16:creationId xmlns:a16="http://schemas.microsoft.com/office/drawing/2014/main" id="{EBF000A5-E1DF-B3EC-33DD-D570BD401EEE}"/>
+              </a:ext>
+            </a:extLst>
+          </p:cNvPr>
+          <p:cNvSpPr txBox="1">
+            <a:spLocks/>
+          </p:cNvSpPr>
+          <p:nvPr/>
+        </p:nvSpPr>
+        <p:spPr>
+          <a:xfrm>
+            <a:off x="6226233" y="1502877"/>
+            <a:ext cx="2857953" cy="3640623"/>
+          </a:xfrm>
+          <a:prstGeom prst="rect">
+            <a:avLst/>
+          </a:prstGeom>
+        </p:spPr>
+        <p:txBody>
+          <a:bodyPr vert="horz" lIns="91440" tIns="45720" rIns="91440" bIns="45720" rtlCol="0">
+            <a:normAutofit/>
+          </a:bodyPr>
+          <a:lstStyle>
+            <a:lvl1pPr marL="342900" indent="-342900" algn="l" defTabSz="342900" rtl="0" eaLnBrk="1" latinLnBrk="0" hangingPunct="1">
+              <a:spcBef>
+                <a:spcPct val="20000"/>
+              </a:spcBef>
+              <a:buFont typeface="Arial"/>
+              <a:buChar char="•"/>
+              <a:defRPr sz="2400" kern="1200">
+                <a:solidFill>
+                  <a:schemeClr val="tx1"/>
+                </a:solidFill>
+                <a:latin typeface="+mn-lt"/>
+                <a:ea typeface="+mn-ea"/>
+                <a:cs typeface="+mn-cs"/>
+              </a:defRPr>
+            </a:lvl1pPr>
+            <a:lvl2pPr marL="685800" indent="-342900" algn="l" defTabSz="342900" rtl="0" eaLnBrk="1" latinLnBrk="0" hangingPunct="1">
+              <a:spcBef>
+                <a:spcPct val="20000"/>
+              </a:spcBef>
+              <a:buFont typeface="Arial"/>
+              <a:buChar char="–"/>
+              <a:defRPr sz="2100" kern="1200">
+                <a:solidFill>
+                  <a:schemeClr val="tx1"/>
+                </a:solidFill>
+                <a:latin typeface="+mn-lt"/>
+                <a:ea typeface="+mn-ea"/>
+                <a:cs typeface="+mn-cs"/>
+              </a:defRPr>
+            </a:lvl2pPr>
+            <a:lvl3pPr marL="1028700" indent="-342900" algn="l" defTabSz="342900" rtl="0" eaLnBrk="1" latinLnBrk="0" hangingPunct="1">
+              <a:spcBef>
+                <a:spcPct val="20000"/>
+              </a:spcBef>
+              <a:buFont typeface="Arial"/>
+              <a:buChar char="•"/>
+              <a:defRPr sz="1800" kern="1200">
+                <a:solidFill>
+                  <a:schemeClr val="tx1"/>
+                </a:solidFill>
+                <a:latin typeface="+mn-lt"/>
+                <a:ea typeface="+mn-ea"/>
+                <a:cs typeface="+mn-cs"/>
+              </a:defRPr>
+            </a:lvl3pPr>
+            <a:lvl4pPr marL="1371600" indent="-342900" algn="l" defTabSz="342900" rtl="0" eaLnBrk="1" latinLnBrk="0" hangingPunct="1">
+              <a:spcBef>
+                <a:spcPct val="20000"/>
+              </a:spcBef>
+              <a:buFont typeface="Arial"/>
+              <a:buChar char="–"/>
+              <a:defRPr sz="1500" kern="1200">
+                <a:solidFill>
+                  <a:schemeClr val="tx1"/>
+                </a:solidFill>
+                <a:latin typeface="+mn-lt"/>
+                <a:ea typeface="+mn-ea"/>
+                <a:cs typeface="+mn-cs"/>
+              </a:defRPr>
+            </a:lvl4pPr>
+            <a:lvl5pPr marL="1714500" indent="-342900" algn="l" defTabSz="342900" rtl="0" eaLnBrk="1" latinLnBrk="0" hangingPunct="1">
+              <a:spcBef>
+                <a:spcPct val="20000"/>
+              </a:spcBef>
+              <a:buFont typeface="Arial"/>
+              <a:buChar char="»"/>
+              <a:defRPr sz="1500" kern="1200">
+                <a:solidFill>
+                  <a:schemeClr val="tx1"/>
+                </a:solidFill>
+                <a:latin typeface="+mn-lt"/>
+                <a:ea typeface="+mn-ea"/>
+                <a:cs typeface="+mn-cs"/>
+              </a:defRPr>
+            </a:lvl5pPr>
+            <a:lvl6pPr marL="2057400" indent="-342900" algn="l" defTabSz="342900" rtl="0" eaLnBrk="1" latinLnBrk="0" hangingPunct="1">
+              <a:spcBef>
+                <a:spcPct val="20000"/>
+              </a:spcBef>
+              <a:buFont typeface="Arial"/>
+              <a:buChar char="•"/>
+              <a:defRPr sz="1500" kern="1200">
+                <a:solidFill>
+                  <a:schemeClr val="tx1"/>
+                </a:solidFill>
+                <a:latin typeface="+mn-lt"/>
+                <a:ea typeface="+mn-ea"/>
+                <a:cs typeface="+mn-cs"/>
+              </a:defRPr>
+            </a:lvl6pPr>
+            <a:lvl7pPr marL="2400300" indent="-342900" algn="l" defTabSz="342900" rtl="0" eaLnBrk="1" latinLnBrk="0" hangingPunct="1">
+              <a:spcBef>
+                <a:spcPct val="20000"/>
+              </a:spcBef>
+              <a:buFont typeface="Arial"/>
+              <a:buChar char="•"/>
+              <a:defRPr sz="1500" kern="1200">
+                <a:solidFill>
+                  <a:schemeClr val="tx1"/>
+                </a:solidFill>
+                <a:latin typeface="+mn-lt"/>
+                <a:ea typeface="+mn-ea"/>
+                <a:cs typeface="+mn-cs"/>
+              </a:defRPr>
+            </a:lvl7pPr>
+            <a:lvl8pPr marL="2743200" indent="-342900" algn="l" defTabSz="342900" rtl="0" eaLnBrk="1" latinLnBrk="0" hangingPunct="1">
+              <a:spcBef>
+                <a:spcPct val="20000"/>
+              </a:spcBef>
+              <a:buFont typeface="Arial"/>
+              <a:buChar char="•"/>
+              <a:defRPr sz="1500" kern="1200">
+                <a:solidFill>
+                  <a:schemeClr val="tx1"/>
+                </a:solidFill>
+                <a:latin typeface="+mn-lt"/>
+                <a:ea typeface="+mn-ea"/>
+                <a:cs typeface="+mn-cs"/>
+              </a:defRPr>
+            </a:lvl8pPr>
+            <a:lvl9pPr marL="3086100" indent="-342900" algn="l" defTabSz="342900" rtl="0" eaLnBrk="1" latinLnBrk="0" hangingPunct="1">
+              <a:spcBef>
+                <a:spcPct val="20000"/>
+              </a:spcBef>
+              <a:buFont typeface="Arial"/>
+              <a:buChar char="•"/>
+              <a:defRPr sz="1500" kern="1200">
+                <a:solidFill>
+                  <a:schemeClr val="tx1"/>
+                </a:solidFill>
+                <a:latin typeface="+mn-lt"/>
+                <a:ea typeface="+mn-ea"/>
+                <a:cs typeface="+mn-cs"/>
+              </a:defRPr>
+            </a:lvl9pPr>
+          </a:lstStyle>
+          <a:p>
+            <a:pPr marL="0" indent="0">
+              <a:buNone/>
+            </a:pPr>
+            <a:r>
+              <a:rPr lang="en-US" sz="2000" dirty="0"/>
+              <a:t>White noise series</a:t>
+            </a:r>
+          </a:p>
+          <a:p>
+            <a:r>
+              <a:rPr lang="en-US" sz="2000" dirty="0"/>
+              <a:t>ADF; reject hypothesis of non-trend-stationary </a:t>
+            </a:r>
+          </a:p>
+          <a:p>
+            <a:r>
+              <a:rPr lang="en-US" sz="2000" dirty="0"/>
+              <a:t>KPSS test cannot reject null hypothesis of trend-stationary </a:t>
+            </a:r>
+          </a:p>
+        </p:txBody>
+      </p:sp>
+      <p:cxnSp>
+        <p:nvCxnSpPr>
+          <p:cNvPr id="7" name="Straight Arrow Connector 6">
+            <a:extLst>
+              <a:ext uri="{FF2B5EF4-FFF2-40B4-BE49-F238E27FC236}">
+                <a16:creationId xmlns:a16="http://schemas.microsoft.com/office/drawing/2014/main" id="{5EEF6AAE-43DB-AA43-C844-4EA6FF8FF160}"/>
+              </a:ext>
+            </a:extLst>
+          </p:cNvPr>
+          <p:cNvCxnSpPr>
+            <a:cxnSpLocks/>
+          </p:cNvCxnSpPr>
+          <p:nvPr/>
+        </p:nvCxnSpPr>
+        <p:spPr>
+          <a:xfrm flipH="1">
+            <a:off x="4110644" y="2460567"/>
+            <a:ext cx="2340032" cy="648393"/>
+          </a:xfrm>
+          <a:prstGeom prst="straightConnector1">
+            <a:avLst/>
+          </a:prstGeom>
+          <a:ln>
+            <a:solidFill>
+              <a:schemeClr val="tx1"/>
+            </a:solidFill>
+            <a:tailEnd type="triangle"/>
+          </a:ln>
+        </p:spPr>
+        <p:style>
+          <a:lnRef idx="2">
+            <a:schemeClr val="accent1"/>
+          </a:lnRef>
+          <a:fillRef idx="0">
+            <a:schemeClr val="accent1"/>
+          </a:fillRef>
+          <a:effectRef idx="1">
+            <a:schemeClr val="accent1"/>
+          </a:effectRef>
+          <a:fontRef idx="minor">
+            <a:schemeClr val="tx1"/>
+          </a:fontRef>
+        </p:style>
+      </p:cxnSp>
+      <p:cxnSp>
+        <p:nvCxnSpPr>
+          <p:cNvPr id="11" name="Straight Arrow Connector 10">
+            <a:extLst>
+              <a:ext uri="{FF2B5EF4-FFF2-40B4-BE49-F238E27FC236}">
+                <a16:creationId xmlns:a16="http://schemas.microsoft.com/office/drawing/2014/main" id="{2DA2F138-A98A-CE6D-3E01-71DF44819BE3}"/>
+              </a:ext>
+            </a:extLst>
+          </p:cNvPr>
+          <p:cNvCxnSpPr>
+            <a:cxnSpLocks/>
+          </p:cNvCxnSpPr>
+          <p:nvPr/>
+        </p:nvCxnSpPr>
+        <p:spPr>
+          <a:xfrm flipH="1" flipV="1">
+            <a:off x="6005945" y="3108960"/>
+            <a:ext cx="631768" cy="108065"/>
+          </a:xfrm>
+          <a:prstGeom prst="straightConnector1">
+            <a:avLst/>
+          </a:prstGeom>
+          <a:ln>
+            <a:solidFill>
+              <a:schemeClr val="tx1"/>
+            </a:solidFill>
+            <a:tailEnd type="triangle"/>
+          </a:ln>
+        </p:spPr>
+        <p:style>
+          <a:lnRef idx="2">
+            <a:schemeClr val="accent1"/>
+          </a:lnRef>
+          <a:fillRef idx="0">
+            <a:schemeClr val="accent1"/>
+          </a:fillRef>
+          <a:effectRef idx="1">
+            <a:schemeClr val="accent1"/>
+          </a:effectRef>
+          <a:fontRef idx="minor">
+            <a:schemeClr val="tx1"/>
+          </a:fontRef>
+        </p:style>
+      </p:cxnSp>
+    </p:spTree>
+    <p:extLst>
+      <p:ext uri="{BB962C8B-B14F-4D97-AF65-F5344CB8AC3E}">
+        <p14:creationId xmlns:p14="http://schemas.microsoft.com/office/powerpoint/2010/main" val="58794761"/>
+      </p:ext>
+    </p:extLst>
   </p:cSld>
   <p:clrMapOvr>
     <a:masterClrMapping/>
@@ -19190,6 +20992,1099 @@
             <a:r>
               <a:rPr dirty="0"/>
               <a:t>Joseph Fourier</a:t>
+            </a:r>
+          </a:p>
+        </p:txBody>
+      </p:sp>
+    </p:spTree>
+  </p:cSld>
+  <p:clrMapOvr>
+    <a:masterClrMapping/>
+  </p:clrMapOvr>
+</p:sld>
+</file>
+
+<file path=ppt/slides/slide60.xml><?xml version="1.0" encoding="utf-8"?>
+<p:sld xmlns:a="http://schemas.openxmlformats.org/drawingml/2006/main" xmlns:r="http://schemas.openxmlformats.org/officeDocument/2006/relationships" xmlns:p="http://schemas.openxmlformats.org/presentationml/2006/main">
+  <p:cSld>
+    <p:spTree>
+      <p:nvGrpSpPr>
+        <p:cNvPr id="1" name="">
+          <a:extLst>
+            <a:ext uri="{FF2B5EF4-FFF2-40B4-BE49-F238E27FC236}">
+              <a16:creationId xmlns:a16="http://schemas.microsoft.com/office/drawing/2014/main" id="{8424EFD3-4D8D-2A7E-2E48-EA38D811DB2E}"/>
+            </a:ext>
+          </a:extLst>
+        </p:cNvPr>
+        <p:cNvGrpSpPr/>
+        <p:nvPr/>
+      </p:nvGrpSpPr>
+      <p:grpSpPr>
+        <a:xfrm>
+          <a:off x="0" y="0"/>
+          <a:ext cx="0" cy="0"/>
+          <a:chOff x="0" y="0"/>
+          <a:chExt cx="0" cy="0"/>
+        </a:xfrm>
+      </p:grpSpPr>
+      <p:sp>
+        <p:nvSpPr>
+          <p:cNvPr id="2" name="Title 1">
+            <a:extLst>
+              <a:ext uri="{FF2B5EF4-FFF2-40B4-BE49-F238E27FC236}">
+                <a16:creationId xmlns:a16="http://schemas.microsoft.com/office/drawing/2014/main" id="{6ECBD4A3-38A0-7CE2-51A6-61235368DCAA}"/>
+              </a:ext>
+            </a:extLst>
+          </p:cNvPr>
+          <p:cNvSpPr>
+            <a:spLocks noGrp="1"/>
+          </p:cNvSpPr>
+          <p:nvPr>
+            <p:ph type="title"/>
+          </p:nvPr>
+        </p:nvSpPr>
+        <p:spPr/>
+        <p:txBody>
+          <a:bodyPr/>
+          <a:lstStyle/>
+          <a:p>
+            <a:pPr marL="0" lvl="0" indent="0">
+              <a:buNone/>
+            </a:pPr>
+            <a:r>
+              <a:t>Stationarity</a:t>
+            </a:r>
+          </a:p>
+        </p:txBody>
+      </p:sp>
+      <p:sp>
+        <p:nvSpPr>
+          <p:cNvPr id="3" name="Content Placeholder 2">
+            <a:extLst>
+              <a:ext uri="{FF2B5EF4-FFF2-40B4-BE49-F238E27FC236}">
+                <a16:creationId xmlns:a16="http://schemas.microsoft.com/office/drawing/2014/main" id="{1DF8E735-5874-57C7-F6E7-3DD4CC18CFDA}"/>
+              </a:ext>
+            </a:extLst>
+          </p:cNvPr>
+          <p:cNvSpPr>
+            <a:spLocks noGrp="1"/>
+          </p:cNvSpPr>
+          <p:nvPr>
+            <p:ph idx="1"/>
+          </p:nvPr>
+        </p:nvSpPr>
+        <p:spPr>
+          <a:xfrm>
+            <a:off x="457200" y="1006192"/>
+            <a:ext cx="8229600" cy="508000"/>
+          </a:xfrm>
+        </p:spPr>
+        <p:txBody>
+          <a:bodyPr/>
+          <a:lstStyle/>
+          <a:p>
+            <a:pPr marL="0" lvl="0" indent="0">
+              <a:buNone/>
+            </a:pPr>
+            <a:r>
+              <a:rPr dirty="0"/>
+              <a:t>Example of hypothesis tests on </a:t>
+            </a:r>
+            <a:r>
+              <a:rPr lang="en-US" dirty="0"/>
+              <a:t>5 </a:t>
+            </a:r>
+            <a:r>
+              <a:rPr dirty="0"/>
+              <a:t>example time series</a:t>
+            </a:r>
+          </a:p>
+        </p:txBody>
+      </p:sp>
+      <p:pic>
+        <p:nvPicPr>
+          <p:cNvPr id="4" name="Picture 1" descr="../images/ADF_KPSS_tests.PNG">
+            <a:extLst>
+              <a:ext uri="{FF2B5EF4-FFF2-40B4-BE49-F238E27FC236}">
+                <a16:creationId xmlns:a16="http://schemas.microsoft.com/office/drawing/2014/main" id="{83815B47-8A7C-C5B7-0AEE-5C4EF3EC22B0}"/>
+              </a:ext>
+            </a:extLst>
+          </p:cNvPr>
+          <p:cNvPicPr>
+            <a:picLocks noGrp="1" noChangeAspect="1"/>
+          </p:cNvPicPr>
+          <p:nvPr/>
+        </p:nvPicPr>
+        <p:blipFill>
+          <a:blip r:embed="rId2"/>
+          <a:stretch>
+            <a:fillRect/>
+          </a:stretch>
+        </p:blipFill>
+        <p:spPr bwMode="auto">
+          <a:xfrm>
+            <a:off x="544944" y="1514192"/>
+            <a:ext cx="5461001" cy="2312775"/>
+          </a:xfrm>
+          <a:prstGeom prst="rect">
+            <a:avLst/>
+          </a:prstGeom>
+          <a:noFill/>
+          <a:ln w="9525">
+            <a:noFill/>
+            <a:headEnd/>
+            <a:tailEnd/>
+          </a:ln>
+        </p:spPr>
+      </p:pic>
+      <p:sp>
+        <p:nvSpPr>
+          <p:cNvPr id="5" name="TextBox 3">
+            <a:extLst>
+              <a:ext uri="{FF2B5EF4-FFF2-40B4-BE49-F238E27FC236}">
+                <a16:creationId xmlns:a16="http://schemas.microsoft.com/office/drawing/2014/main" id="{57F0B0A6-EE25-1413-DB7A-7F930DE7145E}"/>
+              </a:ext>
+            </a:extLst>
+          </p:cNvPr>
+          <p:cNvSpPr txBox="1"/>
+          <p:nvPr/>
+        </p:nvSpPr>
+        <p:spPr>
+          <a:xfrm>
+            <a:off x="544945" y="3883308"/>
+            <a:ext cx="5419438" cy="508000"/>
+          </a:xfrm>
+          <a:prstGeom prst="rect">
+            <a:avLst/>
+          </a:prstGeom>
+          <a:noFill/>
+        </p:spPr>
+        <p:txBody>
+          <a:bodyPr/>
+          <a:lstStyle/>
+          <a:p>
+            <a:pPr marL="0" lvl="0" indent="0" algn="ctr">
+              <a:buNone/>
+            </a:pPr>
+            <a:r>
+              <a:rPr dirty="0"/>
+              <a:t>Example of tests for stationarity</a:t>
+            </a:r>
+          </a:p>
+        </p:txBody>
+      </p:sp>
+      <p:sp>
+        <p:nvSpPr>
+          <p:cNvPr id="6" name="Content Placeholder 2">
+            <a:extLst>
+              <a:ext uri="{FF2B5EF4-FFF2-40B4-BE49-F238E27FC236}">
+                <a16:creationId xmlns:a16="http://schemas.microsoft.com/office/drawing/2014/main" id="{6E00D4D7-8AC8-F4AB-FD96-5116C237F735}"/>
+              </a:ext>
+            </a:extLst>
+          </p:cNvPr>
+          <p:cNvSpPr txBox="1">
+            <a:spLocks/>
+          </p:cNvSpPr>
+          <p:nvPr/>
+        </p:nvSpPr>
+        <p:spPr>
+          <a:xfrm>
+            <a:off x="6226233" y="1502877"/>
+            <a:ext cx="2857953" cy="3640623"/>
+          </a:xfrm>
+          <a:prstGeom prst="rect">
+            <a:avLst/>
+          </a:prstGeom>
+        </p:spPr>
+        <p:txBody>
+          <a:bodyPr vert="horz" lIns="91440" tIns="45720" rIns="91440" bIns="45720" rtlCol="0">
+            <a:normAutofit/>
+          </a:bodyPr>
+          <a:lstStyle>
+            <a:lvl1pPr marL="342900" indent="-342900" algn="l" defTabSz="342900" rtl="0" eaLnBrk="1" latinLnBrk="0" hangingPunct="1">
+              <a:spcBef>
+                <a:spcPct val="20000"/>
+              </a:spcBef>
+              <a:buFont typeface="Arial"/>
+              <a:buChar char="•"/>
+              <a:defRPr sz="2400" kern="1200">
+                <a:solidFill>
+                  <a:schemeClr val="tx1"/>
+                </a:solidFill>
+                <a:latin typeface="+mn-lt"/>
+                <a:ea typeface="+mn-ea"/>
+                <a:cs typeface="+mn-cs"/>
+              </a:defRPr>
+            </a:lvl1pPr>
+            <a:lvl2pPr marL="685800" indent="-342900" algn="l" defTabSz="342900" rtl="0" eaLnBrk="1" latinLnBrk="0" hangingPunct="1">
+              <a:spcBef>
+                <a:spcPct val="20000"/>
+              </a:spcBef>
+              <a:buFont typeface="Arial"/>
+              <a:buChar char="–"/>
+              <a:defRPr sz="2100" kern="1200">
+                <a:solidFill>
+                  <a:schemeClr val="tx1"/>
+                </a:solidFill>
+                <a:latin typeface="+mn-lt"/>
+                <a:ea typeface="+mn-ea"/>
+                <a:cs typeface="+mn-cs"/>
+              </a:defRPr>
+            </a:lvl2pPr>
+            <a:lvl3pPr marL="1028700" indent="-342900" algn="l" defTabSz="342900" rtl="0" eaLnBrk="1" latinLnBrk="0" hangingPunct="1">
+              <a:spcBef>
+                <a:spcPct val="20000"/>
+              </a:spcBef>
+              <a:buFont typeface="Arial"/>
+              <a:buChar char="•"/>
+              <a:defRPr sz="1800" kern="1200">
+                <a:solidFill>
+                  <a:schemeClr val="tx1"/>
+                </a:solidFill>
+                <a:latin typeface="+mn-lt"/>
+                <a:ea typeface="+mn-ea"/>
+                <a:cs typeface="+mn-cs"/>
+              </a:defRPr>
+            </a:lvl3pPr>
+            <a:lvl4pPr marL="1371600" indent="-342900" algn="l" defTabSz="342900" rtl="0" eaLnBrk="1" latinLnBrk="0" hangingPunct="1">
+              <a:spcBef>
+                <a:spcPct val="20000"/>
+              </a:spcBef>
+              <a:buFont typeface="Arial"/>
+              <a:buChar char="–"/>
+              <a:defRPr sz="1500" kern="1200">
+                <a:solidFill>
+                  <a:schemeClr val="tx1"/>
+                </a:solidFill>
+                <a:latin typeface="+mn-lt"/>
+                <a:ea typeface="+mn-ea"/>
+                <a:cs typeface="+mn-cs"/>
+              </a:defRPr>
+            </a:lvl4pPr>
+            <a:lvl5pPr marL="1714500" indent="-342900" algn="l" defTabSz="342900" rtl="0" eaLnBrk="1" latinLnBrk="0" hangingPunct="1">
+              <a:spcBef>
+                <a:spcPct val="20000"/>
+              </a:spcBef>
+              <a:buFont typeface="Arial"/>
+              <a:buChar char="»"/>
+              <a:defRPr sz="1500" kern="1200">
+                <a:solidFill>
+                  <a:schemeClr val="tx1"/>
+                </a:solidFill>
+                <a:latin typeface="+mn-lt"/>
+                <a:ea typeface="+mn-ea"/>
+                <a:cs typeface="+mn-cs"/>
+              </a:defRPr>
+            </a:lvl5pPr>
+            <a:lvl6pPr marL="2057400" indent="-342900" algn="l" defTabSz="342900" rtl="0" eaLnBrk="1" latinLnBrk="0" hangingPunct="1">
+              <a:spcBef>
+                <a:spcPct val="20000"/>
+              </a:spcBef>
+              <a:buFont typeface="Arial"/>
+              <a:buChar char="•"/>
+              <a:defRPr sz="1500" kern="1200">
+                <a:solidFill>
+                  <a:schemeClr val="tx1"/>
+                </a:solidFill>
+                <a:latin typeface="+mn-lt"/>
+                <a:ea typeface="+mn-ea"/>
+                <a:cs typeface="+mn-cs"/>
+              </a:defRPr>
+            </a:lvl6pPr>
+            <a:lvl7pPr marL="2400300" indent="-342900" algn="l" defTabSz="342900" rtl="0" eaLnBrk="1" latinLnBrk="0" hangingPunct="1">
+              <a:spcBef>
+                <a:spcPct val="20000"/>
+              </a:spcBef>
+              <a:buFont typeface="Arial"/>
+              <a:buChar char="•"/>
+              <a:defRPr sz="1500" kern="1200">
+                <a:solidFill>
+                  <a:schemeClr val="tx1"/>
+                </a:solidFill>
+                <a:latin typeface="+mn-lt"/>
+                <a:ea typeface="+mn-ea"/>
+                <a:cs typeface="+mn-cs"/>
+              </a:defRPr>
+            </a:lvl7pPr>
+            <a:lvl8pPr marL="2743200" indent="-342900" algn="l" defTabSz="342900" rtl="0" eaLnBrk="1" latinLnBrk="0" hangingPunct="1">
+              <a:spcBef>
+                <a:spcPct val="20000"/>
+              </a:spcBef>
+              <a:buFont typeface="Arial"/>
+              <a:buChar char="•"/>
+              <a:defRPr sz="1500" kern="1200">
+                <a:solidFill>
+                  <a:schemeClr val="tx1"/>
+                </a:solidFill>
+                <a:latin typeface="+mn-lt"/>
+                <a:ea typeface="+mn-ea"/>
+                <a:cs typeface="+mn-cs"/>
+              </a:defRPr>
+            </a:lvl8pPr>
+            <a:lvl9pPr marL="3086100" indent="-342900" algn="l" defTabSz="342900" rtl="0" eaLnBrk="1" latinLnBrk="0" hangingPunct="1">
+              <a:spcBef>
+                <a:spcPct val="20000"/>
+              </a:spcBef>
+              <a:buFont typeface="Arial"/>
+              <a:buChar char="•"/>
+              <a:defRPr sz="1500" kern="1200">
+                <a:solidFill>
+                  <a:schemeClr val="tx1"/>
+                </a:solidFill>
+                <a:latin typeface="+mn-lt"/>
+                <a:ea typeface="+mn-ea"/>
+                <a:cs typeface="+mn-cs"/>
+              </a:defRPr>
+            </a:lvl9pPr>
+          </a:lstStyle>
+          <a:p>
+            <a:pPr marL="0" indent="0">
+              <a:buNone/>
+            </a:pPr>
+            <a:r>
+              <a:rPr lang="en-US" sz="2000" dirty="0"/>
+              <a:t>Trend series</a:t>
+            </a:r>
+          </a:p>
+          <a:p>
+            <a:r>
+              <a:rPr lang="en-US" sz="2000" dirty="0"/>
+              <a:t>ADF; reject hypothesis of non-trend-stationary </a:t>
+            </a:r>
+          </a:p>
+          <a:p>
+            <a:r>
+              <a:rPr lang="en-US" sz="2000" dirty="0"/>
+              <a:t>KPSS test cannot reject null hypothesis of trend-stationary </a:t>
+            </a:r>
+          </a:p>
+        </p:txBody>
+      </p:sp>
+      <p:cxnSp>
+        <p:nvCxnSpPr>
+          <p:cNvPr id="7" name="Straight Arrow Connector 6">
+            <a:extLst>
+              <a:ext uri="{FF2B5EF4-FFF2-40B4-BE49-F238E27FC236}">
+                <a16:creationId xmlns:a16="http://schemas.microsoft.com/office/drawing/2014/main" id="{37A8739B-29B1-6F8B-228B-1650294268B6}"/>
+              </a:ext>
+            </a:extLst>
+          </p:cNvPr>
+          <p:cNvCxnSpPr>
+            <a:cxnSpLocks/>
+          </p:cNvCxnSpPr>
+          <p:nvPr/>
+        </p:nvCxnSpPr>
+        <p:spPr>
+          <a:xfrm flipH="1">
+            <a:off x="4081549" y="2460567"/>
+            <a:ext cx="2369127" cy="1093124"/>
+          </a:xfrm>
+          <a:prstGeom prst="straightConnector1">
+            <a:avLst/>
+          </a:prstGeom>
+          <a:ln>
+            <a:solidFill>
+              <a:schemeClr val="tx1"/>
+            </a:solidFill>
+            <a:tailEnd type="triangle"/>
+          </a:ln>
+        </p:spPr>
+        <p:style>
+          <a:lnRef idx="2">
+            <a:schemeClr val="accent1"/>
+          </a:lnRef>
+          <a:fillRef idx="0">
+            <a:schemeClr val="accent1"/>
+          </a:fillRef>
+          <a:effectRef idx="1">
+            <a:schemeClr val="accent1"/>
+          </a:effectRef>
+          <a:fontRef idx="minor">
+            <a:schemeClr val="tx1"/>
+          </a:fontRef>
+        </p:style>
+      </p:cxnSp>
+      <p:cxnSp>
+        <p:nvCxnSpPr>
+          <p:cNvPr id="11" name="Straight Arrow Connector 10">
+            <a:extLst>
+              <a:ext uri="{FF2B5EF4-FFF2-40B4-BE49-F238E27FC236}">
+                <a16:creationId xmlns:a16="http://schemas.microsoft.com/office/drawing/2014/main" id="{5F366159-6384-7473-84C4-7FD78BEED5D3}"/>
+              </a:ext>
+            </a:extLst>
+          </p:cNvPr>
+          <p:cNvCxnSpPr>
+            <a:cxnSpLocks/>
+          </p:cNvCxnSpPr>
+          <p:nvPr/>
+        </p:nvCxnSpPr>
+        <p:spPr>
+          <a:xfrm flipH="1">
+            <a:off x="6005945" y="3217025"/>
+            <a:ext cx="631768" cy="336666"/>
+          </a:xfrm>
+          <a:prstGeom prst="straightConnector1">
+            <a:avLst/>
+          </a:prstGeom>
+          <a:ln>
+            <a:solidFill>
+              <a:schemeClr val="tx1"/>
+            </a:solidFill>
+            <a:tailEnd type="triangle"/>
+          </a:ln>
+        </p:spPr>
+        <p:style>
+          <a:lnRef idx="2">
+            <a:schemeClr val="accent1"/>
+          </a:lnRef>
+          <a:fillRef idx="0">
+            <a:schemeClr val="accent1"/>
+          </a:fillRef>
+          <a:effectRef idx="1">
+            <a:schemeClr val="accent1"/>
+          </a:effectRef>
+          <a:fontRef idx="minor">
+            <a:schemeClr val="tx1"/>
+          </a:fontRef>
+        </p:style>
+      </p:cxnSp>
+    </p:spTree>
+    <p:extLst>
+      <p:ext uri="{BB962C8B-B14F-4D97-AF65-F5344CB8AC3E}">
+        <p14:creationId xmlns:p14="http://schemas.microsoft.com/office/powerpoint/2010/main" val="822678424"/>
+      </p:ext>
+    </p:extLst>
+  </p:cSld>
+  <p:clrMapOvr>
+    <a:masterClrMapping/>
+  </p:clrMapOvr>
+</p:sld>
+</file>
+
+<file path=ppt/slides/slide61.xml><?xml version="1.0" encoding="utf-8"?>
+<p:sld xmlns:a="http://schemas.openxmlformats.org/drawingml/2006/main" xmlns:r="http://schemas.openxmlformats.org/officeDocument/2006/relationships" xmlns:p="http://schemas.openxmlformats.org/presentationml/2006/main">
+  <p:cSld>
+    <p:spTree>
+      <p:nvGrpSpPr>
+        <p:cNvPr id="1" name="">
+          <a:extLst>
+            <a:ext uri="{FF2B5EF4-FFF2-40B4-BE49-F238E27FC236}">
+              <a16:creationId xmlns:a16="http://schemas.microsoft.com/office/drawing/2014/main" id="{E8726C8E-332A-4F6F-1842-FED9F70B8E2C}"/>
+            </a:ext>
+          </a:extLst>
+        </p:cNvPr>
+        <p:cNvGrpSpPr/>
+        <p:nvPr/>
+      </p:nvGrpSpPr>
+      <p:grpSpPr>
+        <a:xfrm>
+          <a:off x="0" y="0"/>
+          <a:ext cx="0" cy="0"/>
+          <a:chOff x="0" y="0"/>
+          <a:chExt cx="0" cy="0"/>
+        </a:xfrm>
+      </p:grpSpPr>
+      <p:sp>
+        <p:nvSpPr>
+          <p:cNvPr id="2" name="Title 1">
+            <a:extLst>
+              <a:ext uri="{FF2B5EF4-FFF2-40B4-BE49-F238E27FC236}">
+                <a16:creationId xmlns:a16="http://schemas.microsoft.com/office/drawing/2014/main" id="{F673269D-3B6B-BA6A-9FA3-8EE737D75078}"/>
+              </a:ext>
+            </a:extLst>
+          </p:cNvPr>
+          <p:cNvSpPr>
+            <a:spLocks noGrp="1"/>
+          </p:cNvSpPr>
+          <p:nvPr>
+            <p:ph type="title"/>
+          </p:nvPr>
+        </p:nvSpPr>
+        <p:spPr/>
+        <p:txBody>
+          <a:bodyPr/>
+          <a:lstStyle/>
+          <a:p>
+            <a:pPr marL="0" lvl="0" indent="0">
+              <a:buNone/>
+            </a:pPr>
+            <a:r>
+              <a:t>Stationarity</a:t>
+            </a:r>
+          </a:p>
+        </p:txBody>
+      </p:sp>
+      <p:sp>
+        <p:nvSpPr>
+          <p:cNvPr id="3" name="Content Placeholder 2">
+            <a:extLst>
+              <a:ext uri="{FF2B5EF4-FFF2-40B4-BE49-F238E27FC236}">
+                <a16:creationId xmlns:a16="http://schemas.microsoft.com/office/drawing/2014/main" id="{863B1410-A303-CC86-6BFA-760C8BE5D2E1}"/>
+              </a:ext>
+            </a:extLst>
+          </p:cNvPr>
+          <p:cNvSpPr>
+            <a:spLocks noGrp="1"/>
+          </p:cNvSpPr>
+          <p:nvPr>
+            <p:ph idx="1"/>
+          </p:nvPr>
+        </p:nvSpPr>
+        <p:spPr>
+          <a:xfrm>
+            <a:off x="457200" y="1006192"/>
+            <a:ext cx="8229600" cy="508000"/>
+          </a:xfrm>
+        </p:spPr>
+        <p:txBody>
+          <a:bodyPr/>
+          <a:lstStyle/>
+          <a:p>
+            <a:pPr marL="0" lvl="0" indent="0">
+              <a:buNone/>
+            </a:pPr>
+            <a:r>
+              <a:rPr dirty="0"/>
+              <a:t>Example of hypothesis tests on </a:t>
+            </a:r>
+            <a:r>
+              <a:rPr lang="en-US" dirty="0"/>
+              <a:t>5 </a:t>
+            </a:r>
+            <a:r>
+              <a:rPr dirty="0"/>
+              <a:t>example time series</a:t>
+            </a:r>
+          </a:p>
+        </p:txBody>
+      </p:sp>
+      <p:pic>
+        <p:nvPicPr>
+          <p:cNvPr id="4" name="Picture 1" descr="../images/ADF_KPSS_tests.PNG">
+            <a:extLst>
+              <a:ext uri="{FF2B5EF4-FFF2-40B4-BE49-F238E27FC236}">
+                <a16:creationId xmlns:a16="http://schemas.microsoft.com/office/drawing/2014/main" id="{A096BBAF-A48B-1A4A-6675-292BF06B528D}"/>
+              </a:ext>
+            </a:extLst>
+          </p:cNvPr>
+          <p:cNvPicPr>
+            <a:picLocks noGrp="1" noChangeAspect="1"/>
+          </p:cNvPicPr>
+          <p:nvPr/>
+        </p:nvPicPr>
+        <p:blipFill>
+          <a:blip r:embed="rId2"/>
+          <a:stretch>
+            <a:fillRect/>
+          </a:stretch>
+        </p:blipFill>
+        <p:spPr bwMode="auto">
+          <a:xfrm>
+            <a:off x="544944" y="1514192"/>
+            <a:ext cx="5461001" cy="2312775"/>
+          </a:xfrm>
+          <a:prstGeom prst="rect">
+            <a:avLst/>
+          </a:prstGeom>
+          <a:noFill/>
+          <a:ln w="9525">
+            <a:noFill/>
+            <a:headEnd/>
+            <a:tailEnd/>
+          </a:ln>
+        </p:spPr>
+      </p:pic>
+      <p:sp>
+        <p:nvSpPr>
+          <p:cNvPr id="5" name="TextBox 3">
+            <a:extLst>
+              <a:ext uri="{FF2B5EF4-FFF2-40B4-BE49-F238E27FC236}">
+                <a16:creationId xmlns:a16="http://schemas.microsoft.com/office/drawing/2014/main" id="{9881CF10-E490-F0BF-CD31-0F714338BE8E}"/>
+              </a:ext>
+            </a:extLst>
+          </p:cNvPr>
+          <p:cNvSpPr txBox="1"/>
+          <p:nvPr/>
+        </p:nvSpPr>
+        <p:spPr>
+          <a:xfrm>
+            <a:off x="544945" y="3883308"/>
+            <a:ext cx="5419438" cy="508000"/>
+          </a:xfrm>
+          <a:prstGeom prst="rect">
+            <a:avLst/>
+          </a:prstGeom>
+          <a:noFill/>
+        </p:spPr>
+        <p:txBody>
+          <a:bodyPr/>
+          <a:lstStyle/>
+          <a:p>
+            <a:pPr marL="0" lvl="0" indent="0" algn="ctr">
+              <a:buNone/>
+            </a:pPr>
+            <a:r>
+              <a:rPr dirty="0"/>
+              <a:t>Example of tests for stationarity</a:t>
+            </a:r>
+          </a:p>
+        </p:txBody>
+      </p:sp>
+      <p:sp>
+        <p:nvSpPr>
+          <p:cNvPr id="6" name="Content Placeholder 2">
+            <a:extLst>
+              <a:ext uri="{FF2B5EF4-FFF2-40B4-BE49-F238E27FC236}">
+                <a16:creationId xmlns:a16="http://schemas.microsoft.com/office/drawing/2014/main" id="{A8567DBD-E1F9-3F71-E6E1-6E6EA19A1399}"/>
+              </a:ext>
+            </a:extLst>
+          </p:cNvPr>
+          <p:cNvSpPr txBox="1">
+            <a:spLocks/>
+          </p:cNvSpPr>
+          <p:nvPr/>
+        </p:nvSpPr>
+        <p:spPr>
+          <a:xfrm>
+            <a:off x="6226233" y="1502877"/>
+            <a:ext cx="2857953" cy="3640623"/>
+          </a:xfrm>
+          <a:prstGeom prst="rect">
+            <a:avLst/>
+          </a:prstGeom>
+        </p:spPr>
+        <p:txBody>
+          <a:bodyPr vert="horz" lIns="91440" tIns="45720" rIns="91440" bIns="45720" rtlCol="0">
+            <a:normAutofit/>
+          </a:bodyPr>
+          <a:lstStyle>
+            <a:lvl1pPr marL="342900" indent="-342900" algn="l" defTabSz="342900" rtl="0" eaLnBrk="1" latinLnBrk="0" hangingPunct="1">
+              <a:spcBef>
+                <a:spcPct val="20000"/>
+              </a:spcBef>
+              <a:buFont typeface="Arial"/>
+              <a:buChar char="•"/>
+              <a:defRPr sz="2400" kern="1200">
+                <a:solidFill>
+                  <a:schemeClr val="tx1"/>
+                </a:solidFill>
+                <a:latin typeface="+mn-lt"/>
+                <a:ea typeface="+mn-ea"/>
+                <a:cs typeface="+mn-cs"/>
+              </a:defRPr>
+            </a:lvl1pPr>
+            <a:lvl2pPr marL="685800" indent="-342900" algn="l" defTabSz="342900" rtl="0" eaLnBrk="1" latinLnBrk="0" hangingPunct="1">
+              <a:spcBef>
+                <a:spcPct val="20000"/>
+              </a:spcBef>
+              <a:buFont typeface="Arial"/>
+              <a:buChar char="–"/>
+              <a:defRPr sz="2100" kern="1200">
+                <a:solidFill>
+                  <a:schemeClr val="tx1"/>
+                </a:solidFill>
+                <a:latin typeface="+mn-lt"/>
+                <a:ea typeface="+mn-ea"/>
+                <a:cs typeface="+mn-cs"/>
+              </a:defRPr>
+            </a:lvl2pPr>
+            <a:lvl3pPr marL="1028700" indent="-342900" algn="l" defTabSz="342900" rtl="0" eaLnBrk="1" latinLnBrk="0" hangingPunct="1">
+              <a:spcBef>
+                <a:spcPct val="20000"/>
+              </a:spcBef>
+              <a:buFont typeface="Arial"/>
+              <a:buChar char="•"/>
+              <a:defRPr sz="1800" kern="1200">
+                <a:solidFill>
+                  <a:schemeClr val="tx1"/>
+                </a:solidFill>
+                <a:latin typeface="+mn-lt"/>
+                <a:ea typeface="+mn-ea"/>
+                <a:cs typeface="+mn-cs"/>
+              </a:defRPr>
+            </a:lvl3pPr>
+            <a:lvl4pPr marL="1371600" indent="-342900" algn="l" defTabSz="342900" rtl="0" eaLnBrk="1" latinLnBrk="0" hangingPunct="1">
+              <a:spcBef>
+                <a:spcPct val="20000"/>
+              </a:spcBef>
+              <a:buFont typeface="Arial"/>
+              <a:buChar char="–"/>
+              <a:defRPr sz="1500" kern="1200">
+                <a:solidFill>
+                  <a:schemeClr val="tx1"/>
+                </a:solidFill>
+                <a:latin typeface="+mn-lt"/>
+                <a:ea typeface="+mn-ea"/>
+                <a:cs typeface="+mn-cs"/>
+              </a:defRPr>
+            </a:lvl4pPr>
+            <a:lvl5pPr marL="1714500" indent="-342900" algn="l" defTabSz="342900" rtl="0" eaLnBrk="1" latinLnBrk="0" hangingPunct="1">
+              <a:spcBef>
+                <a:spcPct val="20000"/>
+              </a:spcBef>
+              <a:buFont typeface="Arial"/>
+              <a:buChar char="»"/>
+              <a:defRPr sz="1500" kern="1200">
+                <a:solidFill>
+                  <a:schemeClr val="tx1"/>
+                </a:solidFill>
+                <a:latin typeface="+mn-lt"/>
+                <a:ea typeface="+mn-ea"/>
+                <a:cs typeface="+mn-cs"/>
+              </a:defRPr>
+            </a:lvl5pPr>
+            <a:lvl6pPr marL="2057400" indent="-342900" algn="l" defTabSz="342900" rtl="0" eaLnBrk="1" latinLnBrk="0" hangingPunct="1">
+              <a:spcBef>
+                <a:spcPct val="20000"/>
+              </a:spcBef>
+              <a:buFont typeface="Arial"/>
+              <a:buChar char="•"/>
+              <a:defRPr sz="1500" kern="1200">
+                <a:solidFill>
+                  <a:schemeClr val="tx1"/>
+                </a:solidFill>
+                <a:latin typeface="+mn-lt"/>
+                <a:ea typeface="+mn-ea"/>
+                <a:cs typeface="+mn-cs"/>
+              </a:defRPr>
+            </a:lvl6pPr>
+            <a:lvl7pPr marL="2400300" indent="-342900" algn="l" defTabSz="342900" rtl="0" eaLnBrk="1" latinLnBrk="0" hangingPunct="1">
+              <a:spcBef>
+                <a:spcPct val="20000"/>
+              </a:spcBef>
+              <a:buFont typeface="Arial"/>
+              <a:buChar char="•"/>
+              <a:defRPr sz="1500" kern="1200">
+                <a:solidFill>
+                  <a:schemeClr val="tx1"/>
+                </a:solidFill>
+                <a:latin typeface="+mn-lt"/>
+                <a:ea typeface="+mn-ea"/>
+                <a:cs typeface="+mn-cs"/>
+              </a:defRPr>
+            </a:lvl7pPr>
+            <a:lvl8pPr marL="2743200" indent="-342900" algn="l" defTabSz="342900" rtl="0" eaLnBrk="1" latinLnBrk="0" hangingPunct="1">
+              <a:spcBef>
+                <a:spcPct val="20000"/>
+              </a:spcBef>
+              <a:buFont typeface="Arial"/>
+              <a:buChar char="•"/>
+              <a:defRPr sz="1500" kern="1200">
+                <a:solidFill>
+                  <a:schemeClr val="tx1"/>
+                </a:solidFill>
+                <a:latin typeface="+mn-lt"/>
+                <a:ea typeface="+mn-ea"/>
+                <a:cs typeface="+mn-cs"/>
+              </a:defRPr>
+            </a:lvl8pPr>
+            <a:lvl9pPr marL="3086100" indent="-342900" algn="l" defTabSz="342900" rtl="0" eaLnBrk="1" latinLnBrk="0" hangingPunct="1">
+              <a:spcBef>
+                <a:spcPct val="20000"/>
+              </a:spcBef>
+              <a:buFont typeface="Arial"/>
+              <a:buChar char="•"/>
+              <a:defRPr sz="1500" kern="1200">
+                <a:solidFill>
+                  <a:schemeClr val="tx1"/>
+                </a:solidFill>
+                <a:latin typeface="+mn-lt"/>
+                <a:ea typeface="+mn-ea"/>
+                <a:cs typeface="+mn-cs"/>
+              </a:defRPr>
+            </a:lvl9pPr>
+          </a:lstStyle>
+          <a:p>
+            <a:pPr marL="0" indent="0">
+              <a:buNone/>
+            </a:pPr>
+            <a:r>
+              <a:rPr lang="en-US" sz="2000" dirty="0"/>
+              <a:t>Seasonal series</a:t>
+            </a:r>
+          </a:p>
+          <a:p>
+            <a:r>
+              <a:rPr lang="en-US" sz="2000" dirty="0"/>
+              <a:t>ADF; reject hypothesis of non-trend-stationary </a:t>
+            </a:r>
+          </a:p>
+          <a:p>
+            <a:r>
+              <a:rPr lang="en-US" sz="2000" dirty="0"/>
+              <a:t>KPSS test cannot reject null hypothesis of trend-stationary </a:t>
+            </a:r>
+          </a:p>
+          <a:p>
+            <a:r>
+              <a:rPr lang="en-US" sz="2000" dirty="0"/>
+              <a:t>An </a:t>
+            </a:r>
+            <a:r>
+              <a:rPr lang="en-US" sz="2000" b="1" dirty="0"/>
+              <a:t>incorrect inference</a:t>
+            </a:r>
+            <a:r>
+              <a:rPr lang="en-US" sz="2000" dirty="0"/>
+              <a:t>, perhaps result of low power of test!</a:t>
+            </a:r>
+          </a:p>
+        </p:txBody>
+      </p:sp>
+      <p:cxnSp>
+        <p:nvCxnSpPr>
+          <p:cNvPr id="7" name="Straight Arrow Connector 6">
+            <a:extLst>
+              <a:ext uri="{FF2B5EF4-FFF2-40B4-BE49-F238E27FC236}">
+                <a16:creationId xmlns:a16="http://schemas.microsoft.com/office/drawing/2014/main" id="{F3829E3A-85F4-21E5-F548-8DF8EB639A4A}"/>
+              </a:ext>
+            </a:extLst>
+          </p:cNvPr>
+          <p:cNvCxnSpPr>
+            <a:cxnSpLocks/>
+          </p:cNvCxnSpPr>
+          <p:nvPr/>
+        </p:nvCxnSpPr>
+        <p:spPr>
+          <a:xfrm flipH="1">
+            <a:off x="4081549" y="2460567"/>
+            <a:ext cx="2369127" cy="1296786"/>
+          </a:xfrm>
+          <a:prstGeom prst="straightConnector1">
+            <a:avLst/>
+          </a:prstGeom>
+          <a:ln>
+            <a:solidFill>
+              <a:schemeClr val="tx1"/>
+            </a:solidFill>
+            <a:tailEnd type="triangle"/>
+          </a:ln>
+        </p:spPr>
+        <p:style>
+          <a:lnRef idx="2">
+            <a:schemeClr val="accent1"/>
+          </a:lnRef>
+          <a:fillRef idx="0">
+            <a:schemeClr val="accent1"/>
+          </a:fillRef>
+          <a:effectRef idx="1">
+            <a:schemeClr val="accent1"/>
+          </a:effectRef>
+          <a:fontRef idx="minor">
+            <a:schemeClr val="tx1"/>
+          </a:fontRef>
+        </p:style>
+      </p:cxnSp>
+      <p:cxnSp>
+        <p:nvCxnSpPr>
+          <p:cNvPr id="11" name="Straight Arrow Connector 10">
+            <a:extLst>
+              <a:ext uri="{FF2B5EF4-FFF2-40B4-BE49-F238E27FC236}">
+                <a16:creationId xmlns:a16="http://schemas.microsoft.com/office/drawing/2014/main" id="{FBDC12CE-8772-0D18-CB9C-32A8A9D70257}"/>
+              </a:ext>
+            </a:extLst>
+          </p:cNvPr>
+          <p:cNvCxnSpPr>
+            <a:cxnSpLocks/>
+          </p:cNvCxnSpPr>
+          <p:nvPr/>
+        </p:nvCxnSpPr>
+        <p:spPr>
+          <a:xfrm flipH="1">
+            <a:off x="5964383" y="3217025"/>
+            <a:ext cx="673330" cy="540328"/>
+          </a:xfrm>
+          <a:prstGeom prst="straightConnector1">
+            <a:avLst/>
+          </a:prstGeom>
+          <a:ln>
+            <a:solidFill>
+              <a:schemeClr val="tx1"/>
+            </a:solidFill>
+            <a:tailEnd type="triangle"/>
+          </a:ln>
+        </p:spPr>
+        <p:style>
+          <a:lnRef idx="2">
+            <a:schemeClr val="accent1"/>
+          </a:lnRef>
+          <a:fillRef idx="0">
+            <a:schemeClr val="accent1"/>
+          </a:fillRef>
+          <a:effectRef idx="1">
+            <a:schemeClr val="accent1"/>
+          </a:effectRef>
+          <a:fontRef idx="minor">
+            <a:schemeClr val="tx1"/>
+          </a:fontRef>
+        </p:style>
+      </p:cxnSp>
+    </p:spTree>
+    <p:extLst>
+      <p:ext uri="{BB962C8B-B14F-4D97-AF65-F5344CB8AC3E}">
+        <p14:creationId xmlns:p14="http://schemas.microsoft.com/office/powerpoint/2010/main" val="2330853608"/>
+      </p:ext>
+    </p:extLst>
+  </p:cSld>
+  <p:clrMapOvr>
+    <a:masterClrMapping/>
+  </p:clrMapOvr>
+</p:sld>
+</file>
+
+<file path=ppt/slides/slide62.xml><?xml version="1.0" encoding="utf-8"?>
+<p:sld xmlns:a="http://schemas.openxmlformats.org/drawingml/2006/main" xmlns:r="http://schemas.openxmlformats.org/officeDocument/2006/relationships" xmlns:p="http://schemas.openxmlformats.org/presentationml/2006/main">
+  <p:cSld>
+    <p:spTree>
+      <p:nvGrpSpPr>
+        <p:cNvPr id="1" name=""/>
+        <p:cNvGrpSpPr/>
+        <p:nvPr/>
+      </p:nvGrpSpPr>
+      <p:grpSpPr>
+        <a:xfrm>
+          <a:off x="0" y="0"/>
+          <a:ext cx="0" cy="0"/>
+          <a:chOff x="0" y="0"/>
+          <a:chExt cx="0" cy="0"/>
+        </a:xfrm>
+      </p:grpSpPr>
+      <p:sp>
+        <p:nvSpPr>
+          <p:cNvPr id="2" name="Title 1"/>
+          <p:cNvSpPr>
+            <a:spLocks noGrp="1"/>
+          </p:cNvSpPr>
+          <p:nvPr>
+            <p:ph type="title"/>
+          </p:nvPr>
+        </p:nvSpPr>
+        <p:spPr/>
+        <p:txBody>
+          <a:bodyPr/>
+          <a:lstStyle/>
+          <a:p>
+            <a:pPr marL="0" lvl="0" indent="0">
+              <a:buNone/>
+            </a:pPr>
+            <a:r>
+              <a:t>Summary</a:t>
+            </a:r>
+          </a:p>
+        </p:txBody>
+      </p:sp>
+      <p:sp>
+        <p:nvSpPr>
+          <p:cNvPr id="3" name="Content Placeholder 2"/>
+          <p:cNvSpPr>
+            <a:spLocks noGrp="1"/>
+          </p:cNvSpPr>
+          <p:nvPr>
+            <p:ph idx="1"/>
+          </p:nvPr>
+        </p:nvSpPr>
+        <p:spPr>
+          <a:xfrm>
+            <a:off x="457200" y="1200150"/>
+            <a:ext cx="8229600" cy="3558885"/>
+          </a:xfrm>
+        </p:spPr>
+        <p:txBody>
+          <a:bodyPr>
+            <a:normAutofit fontScale="77500" lnSpcReduction="20000"/>
+          </a:bodyPr>
+          <a:lstStyle/>
+          <a:p>
+            <a:pPr marL="0" lvl="0" indent="0">
+              <a:buNone/>
+            </a:pPr>
+            <a:r>
+              <a:rPr dirty="0"/>
+              <a:t>Fundamental elements of time series</a:t>
+            </a:r>
+          </a:p>
+          <a:p>
+            <a:pPr lvl="0"/>
+            <a:r>
+              <a:rPr dirty="0"/>
+              <a:t>Fundamental components which cannot be predicted</a:t>
+            </a:r>
+          </a:p>
+          <a:p>
+            <a:pPr lvl="1"/>
+            <a:r>
+              <a:rPr dirty="0"/>
+              <a:t>White noise</a:t>
+            </a:r>
+          </a:p>
+          <a:p>
+            <a:pPr lvl="1"/>
+            <a:r>
+              <a:rPr dirty="0"/>
+              <a:t>Random walks</a:t>
+            </a:r>
+          </a:p>
+          <a:p>
+            <a:pPr lvl="0"/>
+            <a:r>
+              <a:rPr dirty="0"/>
+              <a:t>Autocorrelation and partial autocorrelation</a:t>
+            </a:r>
+          </a:p>
+          <a:p>
+            <a:pPr lvl="0"/>
+            <a:r>
+              <a:rPr dirty="0"/>
+              <a:t>Trend</a:t>
+            </a:r>
+          </a:p>
+          <a:p>
+            <a:pPr lvl="0"/>
+            <a:r>
+              <a:rPr dirty="0"/>
+              <a:t>Seasonal components</a:t>
+            </a:r>
+          </a:p>
+          <a:p>
+            <a:pPr lvl="0"/>
+            <a:r>
+              <a:rPr dirty="0"/>
+              <a:t>Differencing to transform to stationarity</a:t>
+            </a:r>
+          </a:p>
+          <a:p>
+            <a:pPr lvl="1"/>
+            <a:r>
+              <a:rPr dirty="0"/>
+              <a:t>Seasonal differencing</a:t>
+            </a:r>
+          </a:p>
+          <a:p>
+            <a:pPr lvl="1"/>
+            <a:r>
+              <a:rPr dirty="0"/>
+              <a:t>Non-seasonal differencing</a:t>
+            </a:r>
+          </a:p>
+          <a:p>
+            <a:pPr lvl="0"/>
+            <a:r>
+              <a:rPr dirty="0"/>
+              <a:t>Stationarity properties</a:t>
+            </a:r>
+          </a:p>
+          <a:p>
+            <a:pPr lvl="1"/>
+            <a:r>
+              <a:rPr dirty="0"/>
+              <a:t>augmented Dicky-Fuller test</a:t>
+            </a:r>
+          </a:p>
+          <a:p>
+            <a:pPr lvl="1"/>
+            <a:r>
+              <a:rPr dirty="0"/>
+              <a:t>KPSS test</a:t>
             </a:r>
           </a:p>
         </p:txBody>

</xml_diff>

<commit_message>
Small corrections and added slide on seasonal differencing
</commit_message>
<xml_diff>
--- a/LectureSlides/11_IntroductionToTimeSeries.pptx
+++ b/LectureSlides/11_IntroductionToTimeSeries.pptx
@@ -52,21 +52,22 @@
     <p:sldId id="298" r:id="rId46"/>
     <p:sldId id="299" r:id="rId47"/>
     <p:sldId id="312" r:id="rId48"/>
-    <p:sldId id="300" r:id="rId49"/>
-    <p:sldId id="314" r:id="rId50"/>
-    <p:sldId id="301" r:id="rId51"/>
-    <p:sldId id="302" r:id="rId52"/>
-    <p:sldId id="303" r:id="rId53"/>
-    <p:sldId id="304" r:id="rId54"/>
-    <p:sldId id="305" r:id="rId55"/>
-    <p:sldId id="306" r:id="rId56"/>
-    <p:sldId id="307" r:id="rId57"/>
-    <p:sldId id="315" r:id="rId58"/>
-    <p:sldId id="316" r:id="rId59"/>
-    <p:sldId id="317" r:id="rId60"/>
-    <p:sldId id="318" r:id="rId61"/>
-    <p:sldId id="319" r:id="rId62"/>
-    <p:sldId id="308" r:id="rId63"/>
+    <p:sldId id="320" r:id="rId49"/>
+    <p:sldId id="300" r:id="rId50"/>
+    <p:sldId id="314" r:id="rId51"/>
+    <p:sldId id="301" r:id="rId52"/>
+    <p:sldId id="302" r:id="rId53"/>
+    <p:sldId id="303" r:id="rId54"/>
+    <p:sldId id="304" r:id="rId55"/>
+    <p:sldId id="305" r:id="rId56"/>
+    <p:sldId id="306" r:id="rId57"/>
+    <p:sldId id="307" r:id="rId58"/>
+    <p:sldId id="315" r:id="rId59"/>
+    <p:sldId id="316" r:id="rId60"/>
+    <p:sldId id="317" r:id="rId61"/>
+    <p:sldId id="318" r:id="rId62"/>
+    <p:sldId id="319" r:id="rId63"/>
+    <p:sldId id="308" r:id="rId64"/>
   </p:sldIdLst>
   <p:sldSz cx="9144000" cy="5143500" type="screen16x9"/>
   <p:notesSz cx="6858000" cy="9144000"/>
@@ -363,7 +364,7 @@
           <a:p>
             <a:fld id="{241EB5C9-1307-BA42-ABA2-0BC069CD8E7F}" type="datetimeFigureOut">
               <a:rPr lang="en-US" smtClean="0"/>
-              <a:t>10/28/2024</a:t>
+              <a:t>11/4/2024</a:t>
             </a:fld>
             <a:endParaRPr lang="en-US"/>
           </a:p>
@@ -531,7 +532,7 @@
           <a:p>
             <a:fld id="{241EB5C9-1307-BA42-ABA2-0BC069CD8E7F}" type="datetimeFigureOut">
               <a:rPr lang="en-US" smtClean="0"/>
-              <a:t>10/28/2024</a:t>
+              <a:t>11/4/2024</a:t>
             </a:fld>
             <a:endParaRPr lang="en-US"/>
           </a:p>
@@ -709,7 +710,7 @@
           <a:p>
             <a:fld id="{241EB5C9-1307-BA42-ABA2-0BC069CD8E7F}" type="datetimeFigureOut">
               <a:rPr lang="en-US" smtClean="0"/>
-              <a:t>10/28/2024</a:t>
+              <a:t>11/4/2024</a:t>
             </a:fld>
             <a:endParaRPr lang="en-US"/>
           </a:p>
@@ -877,7 +878,7 @@
           <a:p>
             <a:fld id="{241EB5C9-1307-BA42-ABA2-0BC069CD8E7F}" type="datetimeFigureOut">
               <a:rPr lang="en-US" smtClean="0"/>
-              <a:t>10/28/2024</a:t>
+              <a:t>11/4/2024</a:t>
             </a:fld>
             <a:endParaRPr lang="en-US"/>
           </a:p>
@@ -1122,7 +1123,7 @@
           <a:p>
             <a:fld id="{241EB5C9-1307-BA42-ABA2-0BC069CD8E7F}" type="datetimeFigureOut">
               <a:rPr lang="en-US" smtClean="0"/>
-              <a:t>10/28/2024</a:t>
+              <a:t>11/4/2024</a:t>
             </a:fld>
             <a:endParaRPr lang="en-US"/>
           </a:p>
@@ -1407,7 +1408,7 @@
           <a:p>
             <a:fld id="{241EB5C9-1307-BA42-ABA2-0BC069CD8E7F}" type="datetimeFigureOut">
               <a:rPr lang="en-US" smtClean="0"/>
-              <a:t>10/28/2024</a:t>
+              <a:t>11/4/2024</a:t>
             </a:fld>
             <a:endParaRPr lang="en-US"/>
           </a:p>
@@ -1826,7 +1827,7 @@
           <a:p>
             <a:fld id="{241EB5C9-1307-BA42-ABA2-0BC069CD8E7F}" type="datetimeFigureOut">
               <a:rPr lang="en-US" smtClean="0"/>
-              <a:t>10/28/2024</a:t>
+              <a:t>11/4/2024</a:t>
             </a:fld>
             <a:endParaRPr lang="en-US"/>
           </a:p>
@@ -1943,7 +1944,7 @@
           <a:p>
             <a:fld id="{241EB5C9-1307-BA42-ABA2-0BC069CD8E7F}" type="datetimeFigureOut">
               <a:rPr lang="en-US" smtClean="0"/>
-              <a:t>10/28/2024</a:t>
+              <a:t>11/4/2024</a:t>
             </a:fld>
             <a:endParaRPr lang="en-US"/>
           </a:p>
@@ -2038,7 +2039,7 @@
           <a:p>
             <a:fld id="{241EB5C9-1307-BA42-ABA2-0BC069CD8E7F}" type="datetimeFigureOut">
               <a:rPr lang="en-US" smtClean="0"/>
-              <a:t>10/28/2024</a:t>
+              <a:t>11/4/2024</a:t>
             </a:fld>
             <a:endParaRPr lang="en-US"/>
           </a:p>
@@ -2313,7 +2314,7 @@
           <a:p>
             <a:fld id="{241EB5C9-1307-BA42-ABA2-0BC069CD8E7F}" type="datetimeFigureOut">
               <a:rPr lang="en-US" smtClean="0"/>
-              <a:t>10/28/2024</a:t>
+              <a:t>11/4/2024</a:t>
             </a:fld>
             <a:endParaRPr lang="en-US"/>
           </a:p>
@@ -2565,7 +2566,7 @@
           <a:p>
             <a:fld id="{241EB5C9-1307-BA42-ABA2-0BC069CD8E7F}" type="datetimeFigureOut">
               <a:rPr lang="en-US" smtClean="0"/>
-              <a:t>10/28/2024</a:t>
+              <a:t>11/4/2024</a:t>
             </a:fld>
             <a:endParaRPr lang="en-US"/>
           </a:p>
@@ -2776,7 +2777,7 @@
           <a:p>
             <a:fld id="{241EB5C9-1307-BA42-ABA2-0BC069CD8E7F}" type="datetimeFigureOut">
               <a:rPr lang="en-US" smtClean="0"/>
-              <a:t>10/28/2024</a:t>
+              <a:t>11/4/2024</a:t>
             </a:fld>
             <a:endParaRPr lang="en-US"/>
           </a:p>
@@ -3906,8 +3907,8 @@
           </a:p>
         </p:txBody>
       </p:sp>
-      <mc:AlternateContent xmlns:mc="http://schemas.openxmlformats.org/markup-compatibility/2006" xmlns:a14="http://schemas.microsoft.com/office/drawing/2010/main">
-        <mc:Choice Requires="a14">
+      <mc:AlternateContent xmlns:mc="http://schemas.openxmlformats.org/markup-compatibility/2006">
+        <mc:Choice xmlns:a14="http://schemas.microsoft.com/office/drawing/2010/main" Requires="a14">
           <p:sp>
             <p:nvSpPr>
               <p:cNvPr id="3" name="Content Placeholder 2"/>
@@ -3921,7 +3922,7 @@
             <p:spPr/>
             <p:txBody>
               <a:bodyPr>
-                <a:normAutofit fontScale="92500" lnSpcReduction="20000"/>
+                <a:normAutofit fontScale="85000" lnSpcReduction="20000"/>
               </a:bodyPr>
               <a:lstStyle/>
               <a:p>
@@ -3953,10 +3954,10 @@
                           </m:sSubPr>
                           <m:e>
                             <m:r>
-                              <a:rPr lang="ar-AE">
+                              <a:rPr lang="en-US" b="0" i="1" smtClean="0">
                                 <a:latin typeface="Cambria Math" panose="02040503050406030204" pitchFamily="18" charset="0"/>
                               </a:rPr>
-                              <m:t>𝑥</m:t>
+                              <m:t>𝑦</m:t>
                             </m:r>
                           </m:e>
                           <m:sub>
@@ -3984,10 +3985,10 @@
                           </m:sSubPr>
                           <m:e>
                             <m:r>
-                              <a:rPr lang="ar-AE">
+                              <a:rPr lang="en-US" b="0" i="1" smtClean="0">
                                 <a:latin typeface="Cambria Math" panose="02040503050406030204" pitchFamily="18" charset="0"/>
                               </a:rPr>
-                              <m:t>𝑥</m:t>
+                              <m:t>𝑦</m:t>
                             </m:r>
                           </m:e>
                           <m:sub>
@@ -4015,10 +4016,10 @@
                           </m:sSubPr>
                           <m:e>
                             <m:r>
-                              <a:rPr lang="ar-AE">
+                              <a:rPr lang="en-US" b="0" i="1" smtClean="0">
                                 <a:latin typeface="Cambria Math" panose="02040503050406030204" pitchFamily="18" charset="0"/>
                               </a:rPr>
-                              <m:t>𝑥</m:t>
+                              <m:t>𝑦</m:t>
                             </m:r>
                           </m:e>
                           <m:sub>
@@ -4046,10 +4047,10 @@
                           </m:sSubPr>
                           <m:e>
                             <m:r>
-                              <a:rPr lang="ar-AE">
+                              <a:rPr lang="en-US" b="0" i="1" smtClean="0">
                                 <a:latin typeface="Cambria Math" panose="02040503050406030204" pitchFamily="18" charset="0"/>
                               </a:rPr>
-                              <m:t>𝑥</m:t>
+                              <m:t>𝑦</m:t>
                             </m:r>
                           </m:e>
                           <m:sub>
@@ -4234,7 +4235,7 @@
                 <a:pPr lvl="0"/>
                 <a:r>
                   <a:rPr lang="en-US" dirty="0"/>
-                  <a:t>Or, time measured within an </a:t>
+                  <a:t>Or, time measured within a fixed time </a:t>
                 </a:r>
                 <a:r>
                   <a:rPr lang="en-US" b="1" dirty="0"/>
@@ -4266,7 +4267,7 @@
                 <a:pPr lvl="0"/>
                 <a:r>
                   <a:rPr lang="en-US" dirty="0"/>
-                  <a:t>Even continuous time processes are sampled in practice</a:t>
+                  <a:t>Even continuous time processes are sampled as regular time series in practice</a:t>
                 </a:r>
               </a:p>
               <a:p>
@@ -4294,7 +4295,7 @@
             </p:txBody>
           </p:sp>
         </mc:Choice>
-        <mc:Fallback xmlns="">
+        <mc:Fallback>
           <p:sp>
             <p:nvSpPr>
               <p:cNvPr id="3" name="Content Placeholder 2"/>
@@ -4309,7 +4310,7 @@
               <a:blipFill>
                 <a:blip r:embed="rId2"/>
                 <a:stretch>
-                  <a:fillRect l="-963" t="-3052"/>
+                  <a:fillRect l="-741" t="-2693"/>
                 </a:stretch>
               </a:blipFill>
             </p:spPr>
@@ -4377,8 +4378,8 @@
           </a:p>
         </p:txBody>
       </p:sp>
-      <mc:AlternateContent xmlns:mc="http://schemas.openxmlformats.org/markup-compatibility/2006" xmlns:a14="http://schemas.microsoft.com/office/drawing/2010/main">
-        <mc:Choice Requires="a14">
+      <mc:AlternateContent xmlns:mc="http://schemas.openxmlformats.org/markup-compatibility/2006">
+        <mc:Choice xmlns:a14="http://schemas.microsoft.com/office/drawing/2010/main" Requires="a14">
           <p:sp>
             <p:nvSpPr>
               <p:cNvPr id="3" name="Content Placeholder 2"/>
@@ -4424,11 +4425,7 @@
                 </a:r>
                 <a:r>
                   <a:rPr lang="en-US" b="1" dirty="0"/>
-                  <a:t>)</a:t>
-                </a:r>
-                <a:r>
-                  <a:rPr lang="en-US" dirty="0"/>
-                  <a:t>, Normal</a:t>
+                  <a:t>) Normal</a:t>
                 </a:r>
               </a:p>
               <a:p>
@@ -4593,7 +4590,7 @@
                         <a:rPr lang="en-US" b="0" i="1" smtClean="0">
                           <a:latin typeface="Cambria Math" panose="02040503050406030204" pitchFamily="18" charset="0"/>
                         </a:rPr>
-                        <m:t>𝑋</m:t>
+                        <m:t>𝑌</m:t>
                       </m:r>
                       <m:d>
                         <m:dPr>
@@ -4786,7 +4783,7 @@
                             <a:rPr lang="en-US" b="0" i="1" smtClean="0">
                               <a:latin typeface="Cambria Math" panose="02040503050406030204" pitchFamily="18" charset="0"/>
                             </a:rPr>
-                            <m:t>𝑖</m:t>
+                            <m:t>𝑡</m:t>
                           </m:r>
                         </m:sub>
                       </m:sSub>
@@ -4938,7 +4935,7 @@
             </p:txBody>
           </p:sp>
         </mc:Choice>
-        <mc:Fallback xmlns="">
+        <mc:Fallback>
           <p:sp>
             <p:nvSpPr>
               <p:cNvPr id="3" name="Content Placeholder 2"/>
@@ -5755,7 +5752,7 @@
           <a:p>
             <a:r>
               <a:rPr lang="en-US" dirty="0"/>
-              <a:t>Data are often time-ordered</a:t>
+              <a:t>Time series data are time-ordered</a:t>
             </a:r>
           </a:p>
           <a:p>
@@ -5777,13 +5774,8 @@
             <a:pPr lvl="1"/>
             <a:r>
               <a:rPr lang="en-US" dirty="0"/>
-              <a:t>Ignoring serial correlation results in </a:t>
-            </a:r>
-            <a:r>
-              <a:rPr lang="en-US"/>
-              <a:t>incorrect inferences </a:t>
-            </a:r>
-            <a:endParaRPr lang="en-US" dirty="0"/>
+              <a:t>Ignoring serial correlation results in incorrect inferences </a:t>
+            </a:r>
           </a:p>
           <a:p>
             <a:pPr lvl="0"/>
@@ -8834,8 +8826,8 @@
           </a:p>
         </p:txBody>
       </p:sp>
-      <mc:AlternateContent xmlns:mc="http://schemas.openxmlformats.org/markup-compatibility/2006">
-        <mc:Choice xmlns:a14="http://schemas.microsoft.com/office/drawing/2010/main" Requires="a14">
+      <mc:AlternateContent xmlns:mc="http://schemas.openxmlformats.org/markup-compatibility/2006" xmlns:a14="http://schemas.microsoft.com/office/drawing/2010/main">
+        <mc:Choice Requires="a14">
           <p:sp>
             <p:nvSpPr>
               <p:cNvPr id="4" name="Text Placeholder 3"/>
@@ -9017,7 +9009,7 @@
             </p:txBody>
           </p:sp>
         </mc:Choice>
-        <mc:Fallback>
+        <mc:Fallback xmlns="">
           <p:sp>
             <p:nvSpPr>
               <p:cNvPr id="4" name="Text Placeholder 3"/>
@@ -9598,8 +9590,8 @@
           </a:p>
         </p:txBody>
       </p:sp>
-      <mc:AlternateContent xmlns:mc="http://schemas.openxmlformats.org/markup-compatibility/2006">
-        <mc:Choice xmlns:a14="http://schemas.microsoft.com/office/drawing/2010/main" Requires="a14">
+      <mc:AlternateContent xmlns:mc="http://schemas.openxmlformats.org/markup-compatibility/2006" xmlns:a14="http://schemas.microsoft.com/office/drawing/2010/main">
+        <mc:Choice Requires="a14">
           <p:sp>
             <p:nvSpPr>
               <p:cNvPr id="4" name="Text Placeholder 3"/>
@@ -9916,7 +9908,7 @@
             </p:txBody>
           </p:sp>
         </mc:Choice>
-        <mc:Fallback>
+        <mc:Fallback xmlns="">
           <p:sp>
             <p:nvSpPr>
               <p:cNvPr id="4" name="Text Placeholder 3"/>
@@ -11368,6 +11360,10 @@
               <a:rPr dirty="0" err="1"/>
               <a:t>Statsmodels</a:t>
             </a:r>
+            <a:r>
+              <a:rPr lang="en-US" dirty="0"/>
+              <a:t> and R</a:t>
+            </a:r>
             <a:endParaRPr dirty="0"/>
           </a:p>
         </p:txBody>
@@ -12452,7 +12448,11 @@
             <a:pPr lvl="1"/>
             <a:r>
               <a:rPr dirty="0"/>
-              <a:t>MSTL adds modeling of multiple seasonal components</a:t>
+              <a:t>MSTL adds modeling of </a:t>
+            </a:r>
+            <a:r>
+              <a:rPr b="1" dirty="0"/>
+              <a:t>multiple seasonal components</a:t>
             </a:r>
           </a:p>
           <a:p>
@@ -12975,8 +12975,8 @@
           </a:p>
         </p:txBody>
       </p:sp>
-      <mc:AlternateContent xmlns:mc="http://schemas.openxmlformats.org/markup-compatibility/2006" xmlns:a14="http://schemas.microsoft.com/office/drawing/2010/main">
-        <mc:Choice Requires="a14">
+      <mc:AlternateContent xmlns:mc="http://schemas.openxmlformats.org/markup-compatibility/2006">
+        <mc:Choice xmlns:a14="http://schemas.microsoft.com/office/drawing/2010/main" Requires="a14">
           <p:sp>
             <p:nvSpPr>
               <p:cNvPr id="3" name="Content Placeholder 2"/>
@@ -13165,14 +13165,14 @@
                 </a:r>
                 <a:r>
                   <a:rPr lang="en-US" dirty="0"/>
-                  <a:t> where seasonal effect changes as economic activity grows </a:t>
+                  <a:t> where seasonal effect increases as economic activity grows </a:t>
                 </a:r>
                 <a:endParaRPr dirty="0"/>
               </a:p>
             </p:txBody>
           </p:sp>
         </mc:Choice>
-        <mc:Fallback xmlns="">
+        <mc:Fallback>
           <p:sp>
             <p:nvSpPr>
               <p:cNvPr id="3" name="Content Placeholder 2"/>
@@ -13187,7 +13187,7 @@
               <a:blipFill>
                 <a:blip r:embed="rId2"/>
                 <a:stretch>
-                  <a:fillRect l="-1111" t="-1436" r="-1407"/>
+                  <a:fillRect l="-1111" t="-1436"/>
                 </a:stretch>
               </a:blipFill>
             </p:spPr>
@@ -13277,7 +13277,7 @@
             </p:nvSpPr>
             <p:spPr>
               <a:xfrm>
-                <a:off x="457201" y="931027"/>
+                <a:off x="432262" y="825994"/>
                 <a:ext cx="4686080" cy="4089860"/>
               </a:xfrm>
             </p:spPr>
@@ -13322,7 +13322,7 @@
                 </a:pPr>
                 <a:r>
                   <a:rPr lang="en-US" sz="2000" dirty="0"/>
-                  <a:t>Periodic behavior is constant with time </a:t>
+                  <a:t>Model periodic behavior as constant with time </a:t>
                 </a:r>
               </a:p>
               <a:p>
@@ -13592,13 +13592,13 @@
             </p:nvSpPr>
             <p:spPr>
               <a:xfrm>
-                <a:off x="457201" y="931027"/>
+                <a:off x="432262" y="825994"/>
                 <a:ext cx="4686080" cy="4089860"/>
               </a:xfrm>
               <a:blipFill>
                 <a:blip r:embed="rId2"/>
                 <a:stretch>
-                  <a:fillRect l="-1300" t="-894" b="-298"/>
+                  <a:fillRect l="-1430" t="-745" b="-7899"/>
                 </a:stretch>
               </a:blipFill>
             </p:spPr>
@@ -13662,9 +13662,9 @@
           <p:nvPr/>
         </p:nvCxnSpPr>
         <p:spPr>
-          <a:xfrm flipV="1">
-            <a:off x="4384964" y="2019993"/>
-            <a:ext cx="1055716" cy="78971"/>
+          <a:xfrm>
+            <a:off x="4318462" y="2019993"/>
+            <a:ext cx="1122218" cy="0"/>
           </a:xfrm>
           <a:prstGeom prst="straightConnector1">
             <a:avLst/>
@@ -13707,8 +13707,8 @@
         </p:nvCxnSpPr>
         <p:spPr>
           <a:xfrm>
-            <a:off x="4631119" y="2571750"/>
-            <a:ext cx="589274" cy="221326"/>
+            <a:off x="4663440" y="2464724"/>
+            <a:ext cx="556953" cy="328352"/>
           </a:xfrm>
           <a:prstGeom prst="straightConnector1">
             <a:avLst/>
@@ -13751,8 +13751,8 @@
         </p:nvCxnSpPr>
         <p:spPr>
           <a:xfrm>
-            <a:off x="4717473" y="3265862"/>
-            <a:ext cx="473825" cy="321080"/>
+            <a:off x="4663440" y="3142213"/>
+            <a:ext cx="527858" cy="430140"/>
           </a:xfrm>
           <a:prstGeom prst="straightConnector1">
             <a:avLst/>
@@ -13795,8 +13795,8 @@
         </p:nvCxnSpPr>
         <p:spPr>
           <a:xfrm>
-            <a:off x="4222865" y="3790604"/>
-            <a:ext cx="968433" cy="473825"/>
+            <a:off x="4384964" y="3857105"/>
+            <a:ext cx="806334" cy="407324"/>
           </a:xfrm>
           <a:prstGeom prst="straightConnector1">
             <a:avLst/>
@@ -14186,8 +14186,8 @@
           </a:p>
         </p:txBody>
       </p:sp>
-      <mc:AlternateContent xmlns:mc="http://schemas.openxmlformats.org/markup-compatibility/2006" xmlns:a14="http://schemas.microsoft.com/office/drawing/2010/main">
-        <mc:Choice Requires="a14">
+      <mc:AlternateContent xmlns:mc="http://schemas.openxmlformats.org/markup-compatibility/2006">
+        <mc:Choice xmlns:a14="http://schemas.microsoft.com/office/drawing/2010/main" Requires="a14">
           <p:sp>
             <p:nvSpPr>
               <p:cNvPr id="3" name="Content Placeholder 2"/>
@@ -14437,10 +14437,13 @@
                       <m:t>=</m:t>
                     </m:r>
                     <m:r>
-                      <a:rPr lang="en-US">
+                      <m:rPr>
+                        <m:sty m:val="p"/>
+                      </m:rPr>
+                      <a:rPr lang="en-US" b="0" i="0" smtClean="0">
                         <a:latin typeface="Cambria Math" panose="02040503050406030204" pitchFamily="18" charset="0"/>
                       </a:rPr>
-                      <m:t>𝑝</m:t>
+                      <m:t>S</m:t>
                     </m:r>
                   </m:oMath>
                 </a14:m>
@@ -14451,10 +14454,13 @@
                 <a14:m>
                   <m:oMath xmlns:m="http://schemas.openxmlformats.org/officeDocument/2006/math">
                     <m:r>
-                      <a:rPr lang="en-US">
+                      <m:rPr>
+                        <m:sty m:val="p"/>
+                      </m:rPr>
+                      <a:rPr lang="en-US" b="0" i="0" smtClean="0">
                         <a:latin typeface="Cambria Math" panose="02040503050406030204" pitchFamily="18" charset="0"/>
                       </a:rPr>
-                      <m:t>𝑝</m:t>
+                      <m:t>S</m:t>
                     </m:r>
                     <m:r>
                       <a:rPr lang="en-US">
@@ -14696,7 +14702,7 @@
             </p:txBody>
           </p:sp>
         </mc:Choice>
-        <mc:Fallback xmlns="">
+        <mc:Fallback>
           <p:sp>
             <p:nvSpPr>
               <p:cNvPr id="3" name="Content Placeholder 2"/>
@@ -14791,8 +14797,8 @@
           </a:p>
         </p:txBody>
       </p:sp>
-      <mc:AlternateContent xmlns:mc="http://schemas.openxmlformats.org/markup-compatibility/2006">
-        <mc:Choice xmlns:a14="http://schemas.microsoft.com/office/drawing/2010/main" Requires="a14">
+      <mc:AlternateContent xmlns:mc="http://schemas.openxmlformats.org/markup-compatibility/2006" xmlns:a14="http://schemas.microsoft.com/office/drawing/2010/main">
+        <mc:Choice Requires="a14">
           <p:sp>
             <p:nvSpPr>
               <p:cNvPr id="4" name="Text Placeholder 3"/>
@@ -15204,7 +15210,7 @@
             </p:txBody>
           </p:sp>
         </mc:Choice>
-        <mc:Fallback>
+        <mc:Fallback xmlns="">
           <p:sp>
             <p:nvSpPr>
               <p:cNvPr id="4" name="Text Placeholder 3"/>
@@ -15447,8 +15453,8 @@
           </a:p>
         </p:txBody>
       </p:sp>
-      <mc:AlternateContent xmlns:mc="http://schemas.openxmlformats.org/markup-compatibility/2006">
-        <mc:Choice xmlns:a14="http://schemas.microsoft.com/office/drawing/2010/main" Requires="a14">
+      <mc:AlternateContent xmlns:mc="http://schemas.openxmlformats.org/markup-compatibility/2006" xmlns:a14="http://schemas.microsoft.com/office/drawing/2010/main">
+        <mc:Choice Requires="a14">
           <p:sp>
             <p:nvSpPr>
               <p:cNvPr id="4" name="Text Placeholder 3"/>
@@ -15535,7 +15541,7 @@
             </p:txBody>
           </p:sp>
         </mc:Choice>
-        <mc:Fallback>
+        <mc:Fallback xmlns="">
           <p:sp>
             <p:nvSpPr>
               <p:cNvPr id="4" name="Text Placeholder 3"/>
@@ -15881,6 +15887,941 @@
   <p:cSld>
     <p:spTree>
       <p:nvGrpSpPr>
+        <p:cNvPr id="1" name="">
+          <a:extLst>
+            <a:ext uri="{FF2B5EF4-FFF2-40B4-BE49-F238E27FC236}">
+              <a16:creationId xmlns:a16="http://schemas.microsoft.com/office/drawing/2014/main" id="{1699B22C-C140-4C59-FADF-58A4127D885D}"/>
+            </a:ext>
+          </a:extLst>
+        </p:cNvPr>
+        <p:cNvGrpSpPr/>
+        <p:nvPr/>
+      </p:nvGrpSpPr>
+      <p:grpSpPr>
+        <a:xfrm>
+          <a:off x="0" y="0"/>
+          <a:ext cx="0" cy="0"/>
+          <a:chOff x="0" y="0"/>
+          <a:chExt cx="0" cy="0"/>
+        </a:xfrm>
+      </p:grpSpPr>
+      <p:sp>
+        <p:nvSpPr>
+          <p:cNvPr id="2" name="Title 1">
+            <a:extLst>
+              <a:ext uri="{FF2B5EF4-FFF2-40B4-BE49-F238E27FC236}">
+                <a16:creationId xmlns:a16="http://schemas.microsoft.com/office/drawing/2014/main" id="{58D7A43D-DB19-7F36-F6BD-DAC48769AEFB}"/>
+              </a:ext>
+            </a:extLst>
+          </p:cNvPr>
+          <p:cNvSpPr>
+            <a:spLocks noGrp="1"/>
+          </p:cNvSpPr>
+          <p:nvPr>
+            <p:ph type="title"/>
+          </p:nvPr>
+        </p:nvSpPr>
+        <p:spPr/>
+        <p:txBody>
+          <a:bodyPr/>
+          <a:lstStyle/>
+          <a:p>
+            <a:pPr marL="0" lvl="0" indent="0">
+              <a:buNone/>
+            </a:pPr>
+            <a:r>
+              <a:t>Time Series Difference Operators</a:t>
+            </a:r>
+          </a:p>
+        </p:txBody>
+      </p:sp>
+      <mc:AlternateContent xmlns:mc="http://schemas.openxmlformats.org/markup-compatibility/2006">
+        <mc:Choice xmlns:a14="http://schemas.microsoft.com/office/drawing/2010/main" Requires="a14">
+          <p:sp>
+            <p:nvSpPr>
+              <p:cNvPr id="3" name="Content Placeholder 2">
+                <a:extLst>
+                  <a:ext uri="{FF2B5EF4-FFF2-40B4-BE49-F238E27FC236}">
+                    <a16:creationId xmlns:a16="http://schemas.microsoft.com/office/drawing/2014/main" id="{67664E1C-3840-9974-2B26-5C5EB0BED1F3}"/>
+                  </a:ext>
+                </a:extLst>
+              </p:cNvPr>
+              <p:cNvSpPr>
+                <a:spLocks noGrp="1"/>
+              </p:cNvSpPr>
+              <p:nvPr>
+                <p:ph idx="1"/>
+              </p:nvPr>
+            </p:nvSpPr>
+            <p:spPr>
+              <a:xfrm>
+                <a:off x="457200" y="1200151"/>
+                <a:ext cx="8229600" cy="3858144"/>
+              </a:xfrm>
+            </p:spPr>
+            <p:txBody>
+              <a:bodyPr>
+                <a:normAutofit/>
+              </a:bodyPr>
+              <a:lstStyle/>
+              <a:p>
+                <a:pPr marL="0" lvl="0" indent="0">
+                  <a:buNone/>
+                </a:pPr>
+                <a:r>
+                  <a:rPr lang="en-US" dirty="0"/>
+                  <a:t>Seasonal difference operator removes seasonal component from time series </a:t>
+                </a:r>
+              </a:p>
+              <a:p>
+                <a:pPr marL="0" lvl="0" indent="0">
+                  <a:buNone/>
+                </a:pPr>
+                <a14:m>
+                  <m:oMathPara xmlns:m="http://schemas.openxmlformats.org/officeDocument/2006/math">
+                    <m:oMathParaPr>
+                      <m:jc m:val="center"/>
+                    </m:oMathParaPr>
+                    <m:oMath xmlns:m="http://schemas.openxmlformats.org/officeDocument/2006/math">
+                      <m:sSub>
+                        <m:sSubPr>
+                          <m:ctrlPr>
+                            <a:rPr lang="ar-AE" i="1">
+                              <a:latin typeface="Cambria Math" panose="02040503050406030204" pitchFamily="18" charset="0"/>
+                            </a:rPr>
+                          </m:ctrlPr>
+                        </m:sSubPr>
+                        <m:e>
+                          <m:r>
+                            <a:rPr lang="en-US" b="0" i="1" smtClean="0">
+                              <a:latin typeface="Cambria Math" panose="02040503050406030204" pitchFamily="18" charset="0"/>
+                            </a:rPr>
+                            <m:t>𝑤</m:t>
+                          </m:r>
+                        </m:e>
+                        <m:sub>
+                          <m:r>
+                            <a:rPr lang="ar-AE">
+                              <a:latin typeface="Cambria Math" panose="02040503050406030204" pitchFamily="18" charset="0"/>
+                            </a:rPr>
+                            <m:t>𝑡</m:t>
+                          </m:r>
+                        </m:sub>
+                      </m:sSub>
+                      <m:r>
+                        <a:rPr lang="ar-AE">
+                          <a:latin typeface="Cambria Math" panose="02040503050406030204" pitchFamily="18" charset="0"/>
+                        </a:rPr>
+                        <m:t>=</m:t>
+                      </m:r>
+                      <m:sSub>
+                        <m:sSubPr>
+                          <m:ctrlPr>
+                            <a:rPr lang="ar-AE" i="1">
+                              <a:latin typeface="Cambria Math" panose="02040503050406030204" pitchFamily="18" charset="0"/>
+                            </a:rPr>
+                          </m:ctrlPr>
+                        </m:sSubPr>
+                        <m:e>
+                          <m:r>
+                            <a:rPr lang="ar-AE">
+                              <a:latin typeface="Cambria Math" panose="02040503050406030204" pitchFamily="18" charset="0"/>
+                            </a:rPr>
+                            <m:t>𝑦</m:t>
+                          </m:r>
+                        </m:e>
+                        <m:sub>
+                          <m:r>
+                            <a:rPr lang="ar-AE">
+                              <a:latin typeface="Cambria Math" panose="02040503050406030204" pitchFamily="18" charset="0"/>
+                            </a:rPr>
+                            <m:t>𝑡</m:t>
+                          </m:r>
+                        </m:sub>
+                      </m:sSub>
+                      <m:r>
+                        <a:rPr lang="ar-AE">
+                          <a:latin typeface="Cambria Math" panose="02040503050406030204" pitchFamily="18" charset="0"/>
+                        </a:rPr>
+                        <m:t>−</m:t>
+                      </m:r>
+                      <m:sSub>
+                        <m:sSubPr>
+                          <m:ctrlPr>
+                            <a:rPr lang="ar-AE" i="1">
+                              <a:latin typeface="Cambria Math" panose="02040503050406030204" pitchFamily="18" charset="0"/>
+                            </a:rPr>
+                          </m:ctrlPr>
+                        </m:sSubPr>
+                        <m:e>
+                          <m:r>
+                            <a:rPr lang="ar-AE">
+                              <a:latin typeface="Cambria Math" panose="02040503050406030204" pitchFamily="18" charset="0"/>
+                            </a:rPr>
+                            <m:t>𝑦</m:t>
+                          </m:r>
+                        </m:e>
+                        <m:sub>
+                          <m:r>
+                            <a:rPr lang="ar-AE">
+                              <a:latin typeface="Cambria Math" panose="02040503050406030204" pitchFamily="18" charset="0"/>
+                            </a:rPr>
+                            <m:t>𝑡</m:t>
+                          </m:r>
+                          <m:r>
+                            <a:rPr lang="ar-AE">
+                              <a:latin typeface="Cambria Math" panose="02040503050406030204" pitchFamily="18" charset="0"/>
+                            </a:rPr>
+                            <m:t>−</m:t>
+                          </m:r>
+                          <m:r>
+                            <a:rPr lang="en-US" i="1" smtClean="0">
+                              <a:latin typeface="Cambria Math" panose="02040503050406030204" pitchFamily="18" charset="0"/>
+                            </a:rPr>
+                            <m:t>𝑆</m:t>
+                          </m:r>
+                        </m:sub>
+                      </m:sSub>
+                    </m:oMath>
+                  </m:oMathPara>
+                </a14:m>
+                <a:endParaRPr lang="en-US" dirty="0"/>
+              </a:p>
+              <a:p>
+                <a:pPr marL="685800" lvl="2" indent="0">
+                  <a:buNone/>
+                </a:pPr>
+                <a:r>
+                  <a:rPr lang="en-US" dirty="0"/>
+                  <a:t>Where </a:t>
+                </a:r>
+                <a14:m>
+                  <m:oMath xmlns:m="http://schemas.openxmlformats.org/officeDocument/2006/math">
+                    <m:r>
+                      <a:rPr lang="en-US" i="1" smtClean="0">
+                        <a:latin typeface="Cambria Math" panose="02040503050406030204" pitchFamily="18" charset="0"/>
+                      </a:rPr>
+                      <m:t>𝑆</m:t>
+                    </m:r>
+                  </m:oMath>
+                </a14:m>
+                <a:r>
+                  <a:rPr lang="en-US" dirty="0"/>
+                  <a:t> is the seasonal period  </a:t>
+                </a:r>
+                <a:endParaRPr lang="ar-AE" dirty="0"/>
+              </a:p>
+              <a:p>
+                <a:r>
+                  <a:rPr lang="en-US" dirty="0"/>
+                  <a:t>Can combine seasonal and non-seasonal differencing </a:t>
+                </a:r>
+              </a:p>
+              <a:p>
+                <a:pPr lvl="1"/>
+                <a:r>
+                  <a:rPr lang="en-US" dirty="0"/>
+                  <a:t>Example; first order non-seasonal differencing, </a:t>
+                </a:r>
+                <a14:m>
+                  <m:oMath xmlns:m="http://schemas.openxmlformats.org/officeDocument/2006/math">
+                    <m:sSub>
+                      <m:sSubPr>
+                        <m:ctrlPr>
+                          <a:rPr lang="en-US" i="1" smtClean="0">
+                            <a:latin typeface="Cambria Math" panose="02040503050406030204" pitchFamily="18" charset="0"/>
+                          </a:rPr>
+                        </m:ctrlPr>
+                      </m:sSubPr>
+                      <m:e>
+                        <m:r>
+                          <m:rPr>
+                            <m:sty m:val="p"/>
+                          </m:rPr>
+                          <a:rPr lang="en-US" i="1" smtClean="0">
+                            <a:latin typeface="Cambria Math" panose="02040503050406030204" pitchFamily="18" charset="0"/>
+                            <a:ea typeface="Cambria Math" panose="02040503050406030204" pitchFamily="18" charset="0"/>
+                          </a:rPr>
+                          <m:t>∇</m:t>
+                        </m:r>
+                      </m:e>
+                      <m:sub>
+                        <m:r>
+                          <a:rPr lang="en-US" b="0" i="1" smtClean="0">
+                            <a:latin typeface="Cambria Math" panose="02040503050406030204" pitchFamily="18" charset="0"/>
+                          </a:rPr>
+                          <m:t>1</m:t>
+                        </m:r>
+                      </m:sub>
+                    </m:sSub>
+                  </m:oMath>
+                </a14:m>
+                <a:r>
+                  <a:rPr lang="en-US" dirty="0"/>
+                  <a:t>, and seasonal differencing, </a:t>
+                </a:r>
+                <a14:m>
+                  <m:oMath xmlns:m="http://schemas.openxmlformats.org/officeDocument/2006/math">
+                    <m:sSub>
+                      <m:sSubPr>
+                        <m:ctrlPr>
+                          <a:rPr lang="en-US" i="1">
+                            <a:latin typeface="Cambria Math" panose="02040503050406030204" pitchFamily="18" charset="0"/>
+                          </a:rPr>
+                        </m:ctrlPr>
+                      </m:sSubPr>
+                      <m:e>
+                        <m:r>
+                          <m:rPr>
+                            <m:sty m:val="p"/>
+                          </m:rPr>
+                          <a:rPr lang="en-US" i="1">
+                            <a:latin typeface="Cambria Math" panose="02040503050406030204" pitchFamily="18" charset="0"/>
+                            <a:ea typeface="Cambria Math" panose="02040503050406030204" pitchFamily="18" charset="0"/>
+                          </a:rPr>
+                          <m:t>∇</m:t>
+                        </m:r>
+                      </m:e>
+                      <m:sub>
+                        <m:r>
+                          <a:rPr lang="en-US" i="1" smtClean="0">
+                            <a:latin typeface="Cambria Math" panose="02040503050406030204" pitchFamily="18" charset="0"/>
+                          </a:rPr>
+                          <m:t>𝑆</m:t>
+                        </m:r>
+                      </m:sub>
+                    </m:sSub>
+                  </m:oMath>
+                </a14:m>
+                <a:r>
+                  <a:rPr lang="en-US" dirty="0"/>
+                  <a:t>,  given by product</a:t>
+                </a:r>
+                <a14:m>
+                  <m:oMath xmlns:m="http://schemas.openxmlformats.org/officeDocument/2006/math">
+                    <m:sSub>
+                      <m:sSubPr>
+                        <m:ctrlPr>
+                          <a:rPr lang="en-US" i="1">
+                            <a:latin typeface="Cambria Math" panose="02040503050406030204" pitchFamily="18" charset="0"/>
+                          </a:rPr>
+                        </m:ctrlPr>
+                      </m:sSubPr>
+                      <m:e>
+                        <m:r>
+                          <m:rPr>
+                            <m:sty m:val="p"/>
+                          </m:rPr>
+                          <a:rPr lang="en-US" i="1">
+                            <a:latin typeface="Cambria Math" panose="02040503050406030204" pitchFamily="18" charset="0"/>
+                            <a:ea typeface="Cambria Math" panose="02040503050406030204" pitchFamily="18" charset="0"/>
+                          </a:rPr>
+                          <m:t>∇</m:t>
+                        </m:r>
+                      </m:e>
+                      <m:sub>
+                        <m:r>
+                          <a:rPr lang="en-US" i="1">
+                            <a:latin typeface="Cambria Math" panose="02040503050406030204" pitchFamily="18" charset="0"/>
+                          </a:rPr>
+                          <m:t>1</m:t>
+                        </m:r>
+                      </m:sub>
+                    </m:sSub>
+                  </m:oMath>
+                </a14:m>
+                <a:r>
+                  <a:rPr lang="en-US" dirty="0"/>
+                  <a:t> </a:t>
+                </a:r>
+                <a14:m>
+                  <m:oMath xmlns:m="http://schemas.openxmlformats.org/officeDocument/2006/math">
+                    <m:sSub>
+                      <m:sSubPr>
+                        <m:ctrlPr>
+                          <a:rPr lang="en-US" i="1">
+                            <a:latin typeface="Cambria Math" panose="02040503050406030204" pitchFamily="18" charset="0"/>
+                          </a:rPr>
+                        </m:ctrlPr>
+                      </m:sSubPr>
+                      <m:e>
+                        <m:r>
+                          <m:rPr>
+                            <m:sty m:val="p"/>
+                          </m:rPr>
+                          <a:rPr lang="en-US" i="1">
+                            <a:latin typeface="Cambria Math" panose="02040503050406030204" pitchFamily="18" charset="0"/>
+                            <a:ea typeface="Cambria Math" panose="02040503050406030204" pitchFamily="18" charset="0"/>
+                          </a:rPr>
+                          <m:t>∇</m:t>
+                        </m:r>
+                      </m:e>
+                      <m:sub>
+                        <m:r>
+                          <a:rPr lang="en-US" i="1">
+                            <a:latin typeface="Cambria Math" panose="02040503050406030204" pitchFamily="18" charset="0"/>
+                            <a:ea typeface="Cambria Math" panose="02040503050406030204" pitchFamily="18" charset="0"/>
+                          </a:rPr>
+                          <m:t>𝑆</m:t>
+                        </m:r>
+                      </m:sub>
+                    </m:sSub>
+                  </m:oMath>
+                </a14:m>
+                <a:endParaRPr lang="en-US" dirty="0"/>
+              </a:p>
+              <a:p>
+                <a:pPr marL="342900" lvl="1" indent="0">
+                  <a:buNone/>
+                </a:pPr>
+                <a14:m>
+                  <m:oMathPara xmlns:m="http://schemas.openxmlformats.org/officeDocument/2006/math">
+                    <m:oMathParaPr>
+                      <m:jc m:val="centerGroup"/>
+                    </m:oMathParaPr>
+                    <m:oMath xmlns:m="http://schemas.openxmlformats.org/officeDocument/2006/math">
+                      <m:sSub>
+                        <m:sSubPr>
+                          <m:ctrlPr>
+                            <a:rPr lang="en-US" i="1" smtClean="0">
+                              <a:latin typeface="Cambria Math" panose="02040503050406030204" pitchFamily="18" charset="0"/>
+                            </a:rPr>
+                          </m:ctrlPr>
+                        </m:sSubPr>
+                        <m:e>
+                          <m:r>
+                            <a:rPr lang="en-US" b="0" i="1" smtClean="0">
+                              <a:latin typeface="Cambria Math" panose="02040503050406030204" pitchFamily="18" charset="0"/>
+                            </a:rPr>
+                            <m:t>𝑤</m:t>
+                          </m:r>
+                        </m:e>
+                        <m:sub>
+                          <m:r>
+                            <a:rPr lang="en-US" b="0" i="1" smtClean="0">
+                              <a:latin typeface="Cambria Math" panose="02040503050406030204" pitchFamily="18" charset="0"/>
+                            </a:rPr>
+                            <m:t>𝑡</m:t>
+                          </m:r>
+                        </m:sub>
+                      </m:sSub>
+                      <m:r>
+                        <a:rPr lang="en-US" b="0" i="1" smtClean="0">
+                          <a:latin typeface="Cambria Math" panose="02040503050406030204" pitchFamily="18" charset="0"/>
+                        </a:rPr>
+                        <m:t>=</m:t>
+                      </m:r>
+                      <m:sSub>
+                        <m:sSubPr>
+                          <m:ctrlPr>
+                            <a:rPr lang="en-US" i="1">
+                              <a:latin typeface="Cambria Math" panose="02040503050406030204" pitchFamily="18" charset="0"/>
+                            </a:rPr>
+                          </m:ctrlPr>
+                        </m:sSubPr>
+                        <m:e>
+                          <m:sSub>
+                            <m:sSubPr>
+                              <m:ctrlPr>
+                                <a:rPr lang="en-US" i="1">
+                                  <a:latin typeface="Cambria Math" panose="02040503050406030204" pitchFamily="18" charset="0"/>
+                                </a:rPr>
+                              </m:ctrlPr>
+                            </m:sSubPr>
+                            <m:e>
+                              <m:r>
+                                <m:rPr>
+                                  <m:sty m:val="p"/>
+                                </m:rPr>
+                                <a:rPr lang="en-US" i="1">
+                                  <a:latin typeface="Cambria Math" panose="02040503050406030204" pitchFamily="18" charset="0"/>
+                                  <a:ea typeface="Cambria Math" panose="02040503050406030204" pitchFamily="18" charset="0"/>
+                                </a:rPr>
+                                <m:t>∇</m:t>
+                              </m:r>
+                            </m:e>
+                            <m:sub>
+                              <m:r>
+                                <a:rPr lang="en-US" i="1">
+                                  <a:latin typeface="Cambria Math" panose="02040503050406030204" pitchFamily="18" charset="0"/>
+                                </a:rPr>
+                                <m:t>1</m:t>
+                              </m:r>
+                            </m:sub>
+                          </m:sSub>
+                          <m:r>
+                            <m:rPr>
+                              <m:nor/>
+                            </m:rPr>
+                            <a:rPr lang="en-US" dirty="0"/>
+                            <m:t> </m:t>
+                          </m:r>
+                          <m:sSub>
+                            <m:sSubPr>
+                              <m:ctrlPr>
+                                <a:rPr lang="en-US" i="1">
+                                  <a:latin typeface="Cambria Math" panose="02040503050406030204" pitchFamily="18" charset="0"/>
+                                </a:rPr>
+                              </m:ctrlPr>
+                            </m:sSubPr>
+                            <m:e>
+                              <m:r>
+                                <m:rPr>
+                                  <m:sty m:val="p"/>
+                                </m:rPr>
+                                <a:rPr lang="en-US" i="1">
+                                  <a:latin typeface="Cambria Math" panose="02040503050406030204" pitchFamily="18" charset="0"/>
+                                  <a:ea typeface="Cambria Math" panose="02040503050406030204" pitchFamily="18" charset="0"/>
+                                </a:rPr>
+                                <m:t>∇</m:t>
+                              </m:r>
+                            </m:e>
+                            <m:sub>
+                              <m:r>
+                                <a:rPr lang="en-US" i="1">
+                                  <a:latin typeface="Cambria Math" panose="02040503050406030204" pitchFamily="18" charset="0"/>
+                                  <a:ea typeface="Cambria Math" panose="02040503050406030204" pitchFamily="18" charset="0"/>
+                                </a:rPr>
+                                <m:t>𝑆</m:t>
+                              </m:r>
+                            </m:sub>
+                          </m:sSub>
+                          <m:r>
+                            <a:rPr lang="en-US" i="1">
+                              <a:latin typeface="Cambria Math" panose="02040503050406030204" pitchFamily="18" charset="0"/>
+                            </a:rPr>
+                            <m:t>𝑦</m:t>
+                          </m:r>
+                        </m:e>
+                        <m:sub>
+                          <m:r>
+                            <a:rPr lang="en-US" i="1">
+                              <a:latin typeface="Cambria Math" panose="02040503050406030204" pitchFamily="18" charset="0"/>
+                            </a:rPr>
+                            <m:t>𝑡</m:t>
+                          </m:r>
+                        </m:sub>
+                      </m:sSub>
+                      <m:r>
+                        <a:rPr lang="en-US" b="0" i="1" smtClean="0">
+                          <a:latin typeface="Cambria Math" panose="02040503050406030204" pitchFamily="18" charset="0"/>
+                        </a:rPr>
+                        <m:t>=</m:t>
+                      </m:r>
+                      <m:sSub>
+                        <m:sSubPr>
+                          <m:ctrlPr>
+                            <a:rPr lang="en-US" b="0" i="1" smtClean="0">
+                              <a:latin typeface="Cambria Math" panose="02040503050406030204" pitchFamily="18" charset="0"/>
+                            </a:rPr>
+                          </m:ctrlPr>
+                        </m:sSubPr>
+                        <m:e>
+                          <m:r>
+                            <m:rPr>
+                              <m:nor/>
+                            </m:rPr>
+                            <a:rPr lang="en-US" dirty="0"/>
+                            <m:t> </m:t>
+                          </m:r>
+                          <m:sSub>
+                            <m:sSubPr>
+                              <m:ctrlPr>
+                                <a:rPr lang="en-US" i="1">
+                                  <a:latin typeface="Cambria Math" panose="02040503050406030204" pitchFamily="18" charset="0"/>
+                                </a:rPr>
+                              </m:ctrlPr>
+                            </m:sSubPr>
+                            <m:e>
+                              <m:r>
+                                <m:rPr>
+                                  <m:sty m:val="p"/>
+                                </m:rPr>
+                                <a:rPr lang="en-US" i="1">
+                                  <a:latin typeface="Cambria Math" panose="02040503050406030204" pitchFamily="18" charset="0"/>
+                                  <a:ea typeface="Cambria Math" panose="02040503050406030204" pitchFamily="18" charset="0"/>
+                                </a:rPr>
+                                <m:t>∇</m:t>
+                              </m:r>
+                            </m:e>
+                            <m:sub>
+                              <m:r>
+                                <a:rPr lang="en-US" i="1">
+                                  <a:latin typeface="Cambria Math" panose="02040503050406030204" pitchFamily="18" charset="0"/>
+                                  <a:ea typeface="Cambria Math" panose="02040503050406030204" pitchFamily="18" charset="0"/>
+                                </a:rPr>
+                                <m:t>𝑆</m:t>
+                              </m:r>
+                            </m:sub>
+                          </m:sSub>
+                          <m:r>
+                            <a:rPr lang="en-US" b="0" i="1" smtClean="0">
+                              <a:latin typeface="Cambria Math" panose="02040503050406030204" pitchFamily="18" charset="0"/>
+                            </a:rPr>
+                            <m:t>𝑦</m:t>
+                          </m:r>
+                        </m:e>
+                        <m:sub>
+                          <m:r>
+                            <a:rPr lang="en-US" b="0" i="1" smtClean="0">
+                              <a:latin typeface="Cambria Math" panose="02040503050406030204" pitchFamily="18" charset="0"/>
+                            </a:rPr>
+                            <m:t>𝑡</m:t>
+                          </m:r>
+                        </m:sub>
+                      </m:sSub>
+                      <m:r>
+                        <a:rPr lang="en-US" b="0" i="1" smtClean="0">
+                          <a:latin typeface="Cambria Math" panose="02040503050406030204" pitchFamily="18" charset="0"/>
+                        </a:rPr>
+                        <m:t>−</m:t>
+                      </m:r>
+                      <m:sSub>
+                        <m:sSubPr>
+                          <m:ctrlPr>
+                            <a:rPr lang="en-US" b="0" i="1" smtClean="0">
+                              <a:latin typeface="Cambria Math" panose="02040503050406030204" pitchFamily="18" charset="0"/>
+                            </a:rPr>
+                          </m:ctrlPr>
+                        </m:sSubPr>
+                        <m:e>
+                          <m:sSub>
+                            <m:sSubPr>
+                              <m:ctrlPr>
+                                <a:rPr lang="en-US" i="1">
+                                  <a:latin typeface="Cambria Math" panose="02040503050406030204" pitchFamily="18" charset="0"/>
+                                </a:rPr>
+                              </m:ctrlPr>
+                            </m:sSubPr>
+                            <m:e>
+                              <m:r>
+                                <m:rPr>
+                                  <m:sty m:val="p"/>
+                                </m:rPr>
+                                <a:rPr lang="en-US" i="1">
+                                  <a:latin typeface="Cambria Math" panose="02040503050406030204" pitchFamily="18" charset="0"/>
+                                  <a:ea typeface="Cambria Math" panose="02040503050406030204" pitchFamily="18" charset="0"/>
+                                </a:rPr>
+                                <m:t>∇</m:t>
+                              </m:r>
+                            </m:e>
+                            <m:sub>
+                              <m:r>
+                                <a:rPr lang="en-US" i="1">
+                                  <a:latin typeface="Cambria Math" panose="02040503050406030204" pitchFamily="18" charset="0"/>
+                                  <a:ea typeface="Cambria Math" panose="02040503050406030204" pitchFamily="18" charset="0"/>
+                                </a:rPr>
+                                <m:t>𝑆</m:t>
+                              </m:r>
+                            </m:sub>
+                          </m:sSub>
+                          <m:r>
+                            <a:rPr lang="en-US" b="0" i="1" smtClean="0">
+                              <a:latin typeface="Cambria Math" panose="02040503050406030204" pitchFamily="18" charset="0"/>
+                            </a:rPr>
+                            <m:t>𝑦</m:t>
+                          </m:r>
+                        </m:e>
+                        <m:sub>
+                          <m:r>
+                            <a:rPr lang="en-US" b="0" i="1" smtClean="0">
+                              <a:latin typeface="Cambria Math" panose="02040503050406030204" pitchFamily="18" charset="0"/>
+                            </a:rPr>
+                            <m:t>𝑡</m:t>
+                          </m:r>
+                          <m:r>
+                            <a:rPr lang="en-US" b="0" i="1" smtClean="0">
+                              <a:latin typeface="Cambria Math" panose="02040503050406030204" pitchFamily="18" charset="0"/>
+                            </a:rPr>
+                            <m:t>−</m:t>
+                          </m:r>
+                          <m:r>
+                            <a:rPr lang="en-US" b="0" i="1" smtClean="0">
+                              <a:latin typeface="Cambria Math" panose="02040503050406030204" pitchFamily="18" charset="0"/>
+                            </a:rPr>
+                            <m:t>1</m:t>
+                          </m:r>
+                        </m:sub>
+                      </m:sSub>
+                    </m:oMath>
+                  </m:oMathPara>
+                </a14:m>
+                <a:endParaRPr lang="en-US" dirty="0"/>
+              </a:p>
+              <a:p>
+                <a:pPr marL="342900" lvl="1" indent="0">
+                  <a:buNone/>
+                </a:pPr>
+                <a14:m>
+                  <m:oMathPara xmlns:m="http://schemas.openxmlformats.org/officeDocument/2006/math">
+                    <m:oMathParaPr>
+                      <m:jc m:val="centerGroup"/>
+                    </m:oMathParaPr>
+                    <m:oMath xmlns:m="http://schemas.openxmlformats.org/officeDocument/2006/math">
+                      <m:r>
+                        <a:rPr lang="en-US" b="0" i="1" smtClean="0">
+                          <a:latin typeface="Cambria Math" panose="02040503050406030204" pitchFamily="18" charset="0"/>
+                        </a:rPr>
+                        <m:t>=</m:t>
+                      </m:r>
+                      <m:d>
+                        <m:dPr>
+                          <m:ctrlPr>
+                            <a:rPr lang="en-US" b="0" i="1" smtClean="0">
+                              <a:latin typeface="Cambria Math" panose="02040503050406030204" pitchFamily="18" charset="0"/>
+                            </a:rPr>
+                          </m:ctrlPr>
+                        </m:dPr>
+                        <m:e>
+                          <m:sSub>
+                            <m:sSubPr>
+                              <m:ctrlPr>
+                                <a:rPr lang="en-US" b="0" i="1" smtClean="0">
+                                  <a:latin typeface="Cambria Math" panose="02040503050406030204" pitchFamily="18" charset="0"/>
+                                </a:rPr>
+                              </m:ctrlPr>
+                            </m:sSubPr>
+                            <m:e>
+                              <m:r>
+                                <a:rPr lang="en-US" b="0" i="1" smtClean="0">
+                                  <a:latin typeface="Cambria Math" panose="02040503050406030204" pitchFamily="18" charset="0"/>
+                                </a:rPr>
+                                <m:t>𝑦</m:t>
+                              </m:r>
+                            </m:e>
+                            <m:sub>
+                              <m:r>
+                                <a:rPr lang="en-US" b="0" i="1" smtClean="0">
+                                  <a:latin typeface="Cambria Math" panose="02040503050406030204" pitchFamily="18" charset="0"/>
+                                </a:rPr>
+                                <m:t>𝑡</m:t>
+                              </m:r>
+                            </m:sub>
+                          </m:sSub>
+                          <m:r>
+                            <a:rPr lang="en-US" b="0" i="1" smtClean="0">
+                              <a:latin typeface="Cambria Math" panose="02040503050406030204" pitchFamily="18" charset="0"/>
+                            </a:rPr>
+                            <m:t>−</m:t>
+                          </m:r>
+                          <m:sSub>
+                            <m:sSubPr>
+                              <m:ctrlPr>
+                                <a:rPr lang="en-US" b="0" i="1" smtClean="0">
+                                  <a:latin typeface="Cambria Math" panose="02040503050406030204" pitchFamily="18" charset="0"/>
+                                </a:rPr>
+                              </m:ctrlPr>
+                            </m:sSubPr>
+                            <m:e>
+                              <m:r>
+                                <a:rPr lang="en-US" b="0" i="1" smtClean="0">
+                                  <a:latin typeface="Cambria Math" panose="02040503050406030204" pitchFamily="18" charset="0"/>
+                                </a:rPr>
+                                <m:t>𝑦</m:t>
+                              </m:r>
+                            </m:e>
+                            <m:sub>
+                              <m:r>
+                                <a:rPr lang="en-US" b="0" i="1" smtClean="0">
+                                  <a:latin typeface="Cambria Math" panose="02040503050406030204" pitchFamily="18" charset="0"/>
+                                </a:rPr>
+                                <m:t>𝑡</m:t>
+                              </m:r>
+                              <m:r>
+                                <a:rPr lang="en-US" b="0" i="1" smtClean="0">
+                                  <a:latin typeface="Cambria Math" panose="02040503050406030204" pitchFamily="18" charset="0"/>
+                                </a:rPr>
+                                <m:t>−</m:t>
+                              </m:r>
+                              <m:r>
+                                <a:rPr lang="en-US" b="0" i="1" smtClean="0">
+                                  <a:latin typeface="Cambria Math" panose="02040503050406030204" pitchFamily="18" charset="0"/>
+                                </a:rPr>
+                                <m:t>𝑆</m:t>
+                              </m:r>
+                            </m:sub>
+                          </m:sSub>
+                        </m:e>
+                      </m:d>
+                      <m:r>
+                        <a:rPr lang="en-US" b="0" i="1" smtClean="0">
+                          <a:latin typeface="Cambria Math" panose="02040503050406030204" pitchFamily="18" charset="0"/>
+                        </a:rPr>
+                        <m:t>−</m:t>
+                      </m:r>
+                      <m:d>
+                        <m:dPr>
+                          <m:ctrlPr>
+                            <a:rPr lang="en-US" b="0" i="1" smtClean="0">
+                              <a:latin typeface="Cambria Math" panose="02040503050406030204" pitchFamily="18" charset="0"/>
+                            </a:rPr>
+                          </m:ctrlPr>
+                        </m:dPr>
+                        <m:e>
+                          <m:sSub>
+                            <m:sSubPr>
+                              <m:ctrlPr>
+                                <a:rPr lang="en-US" i="1">
+                                  <a:latin typeface="Cambria Math" panose="02040503050406030204" pitchFamily="18" charset="0"/>
+                                </a:rPr>
+                              </m:ctrlPr>
+                            </m:sSubPr>
+                            <m:e>
+                              <m:r>
+                                <a:rPr lang="en-US" i="1">
+                                  <a:latin typeface="Cambria Math" panose="02040503050406030204" pitchFamily="18" charset="0"/>
+                                </a:rPr>
+                                <m:t>𝑦</m:t>
+                              </m:r>
+                            </m:e>
+                            <m:sub>
+                              <m:r>
+                                <a:rPr lang="en-US" i="1">
+                                  <a:latin typeface="Cambria Math" panose="02040503050406030204" pitchFamily="18" charset="0"/>
+                                </a:rPr>
+                                <m:t>𝑡</m:t>
+                              </m:r>
+                              <m:r>
+                                <a:rPr lang="en-US" b="0" i="1" smtClean="0">
+                                  <a:latin typeface="Cambria Math" panose="02040503050406030204" pitchFamily="18" charset="0"/>
+                                </a:rPr>
+                                <m:t>−</m:t>
+                              </m:r>
+                              <m:r>
+                                <a:rPr lang="en-US" b="0" i="1" smtClean="0">
+                                  <a:latin typeface="Cambria Math" panose="02040503050406030204" pitchFamily="18" charset="0"/>
+                                </a:rPr>
+                                <m:t>1</m:t>
+                              </m:r>
+                            </m:sub>
+                          </m:sSub>
+                          <m:r>
+                            <a:rPr lang="en-US" i="1">
+                              <a:latin typeface="Cambria Math" panose="02040503050406030204" pitchFamily="18" charset="0"/>
+                            </a:rPr>
+                            <m:t>−</m:t>
+                          </m:r>
+                          <m:sSub>
+                            <m:sSubPr>
+                              <m:ctrlPr>
+                                <a:rPr lang="en-US" i="1">
+                                  <a:latin typeface="Cambria Math" panose="02040503050406030204" pitchFamily="18" charset="0"/>
+                                </a:rPr>
+                              </m:ctrlPr>
+                            </m:sSubPr>
+                            <m:e>
+                              <m:r>
+                                <a:rPr lang="en-US" i="1">
+                                  <a:latin typeface="Cambria Math" panose="02040503050406030204" pitchFamily="18" charset="0"/>
+                                </a:rPr>
+                                <m:t>𝑦</m:t>
+                              </m:r>
+                            </m:e>
+                            <m:sub>
+                              <m:r>
+                                <a:rPr lang="en-US" i="1">
+                                  <a:latin typeface="Cambria Math" panose="02040503050406030204" pitchFamily="18" charset="0"/>
+                                </a:rPr>
+                                <m:t>𝑡</m:t>
+                              </m:r>
+                              <m:r>
+                                <a:rPr lang="en-US" i="1">
+                                  <a:latin typeface="Cambria Math" panose="02040503050406030204" pitchFamily="18" charset="0"/>
+                                </a:rPr>
+                                <m:t>−</m:t>
+                              </m:r>
+                              <m:r>
+                                <a:rPr lang="en-US" i="1">
+                                  <a:latin typeface="Cambria Math" panose="02040503050406030204" pitchFamily="18" charset="0"/>
+                                </a:rPr>
+                                <m:t>𝑆</m:t>
+                              </m:r>
+                              <m:r>
+                                <a:rPr lang="en-US" b="0" i="1" smtClean="0">
+                                  <a:latin typeface="Cambria Math" panose="02040503050406030204" pitchFamily="18" charset="0"/>
+                                </a:rPr>
+                                <m:t>−</m:t>
+                              </m:r>
+                              <m:r>
+                                <a:rPr lang="en-US" b="0" i="1" smtClean="0">
+                                  <a:latin typeface="Cambria Math" panose="02040503050406030204" pitchFamily="18" charset="0"/>
+                                </a:rPr>
+                                <m:t>1</m:t>
+                              </m:r>
+                            </m:sub>
+                          </m:sSub>
+                        </m:e>
+                      </m:d>
+                    </m:oMath>
+                  </m:oMathPara>
+                </a14:m>
+                <a:endParaRPr lang="en-US" dirty="0"/>
+              </a:p>
+            </p:txBody>
+          </p:sp>
+        </mc:Choice>
+        <mc:Fallback>
+          <p:sp>
+            <p:nvSpPr>
+              <p:cNvPr id="3" name="Content Placeholder 2">
+                <a:extLst>
+                  <a:ext uri="{FF2B5EF4-FFF2-40B4-BE49-F238E27FC236}">
+                    <a16:creationId xmlns:a16="http://schemas.microsoft.com/office/drawing/2014/main" id="{67664E1C-3840-9974-2B26-5C5EB0BED1F3}"/>
+                  </a:ext>
+                </a:extLst>
+              </p:cNvPr>
+              <p:cNvSpPr>
+                <a:spLocks noGrp="1" noRot="1" noChangeAspect="1" noMove="1" noResize="1" noEditPoints="1" noAdjustHandles="1" noChangeArrowheads="1" noChangeShapeType="1" noTextEdit="1"/>
+              </p:cNvSpPr>
+              <p:nvPr>
+                <p:ph idx="1"/>
+              </p:nvPr>
+            </p:nvSpPr>
+            <p:spPr>
+              <a:xfrm>
+                <a:off x="457200" y="1200151"/>
+                <a:ext cx="8229600" cy="3858144"/>
+              </a:xfrm>
+              <a:blipFill>
+                <a:blip r:embed="rId2"/>
+                <a:stretch>
+                  <a:fillRect l="-1111" t="-1264" r="-1333"/>
+                </a:stretch>
+              </a:blipFill>
+            </p:spPr>
+            <p:txBody>
+              <a:bodyPr/>
+              <a:lstStyle/>
+              <a:p>
+                <a:r>
+                  <a:rPr lang="en-US">
+                    <a:noFill/>
+                  </a:rPr>
+                  <a:t> </a:t>
+                </a:r>
+              </a:p>
+            </p:txBody>
+          </p:sp>
+        </mc:Fallback>
+      </mc:AlternateContent>
+    </p:spTree>
+    <p:extLst>
+      <p:ext uri="{BB962C8B-B14F-4D97-AF65-F5344CB8AC3E}">
+        <p14:creationId xmlns:p14="http://schemas.microsoft.com/office/powerpoint/2010/main" val="1981981084"/>
+      </p:ext>
+    </p:extLst>
+  </p:cSld>
+  <p:clrMapOvr>
+    <a:masterClrMapping/>
+  </p:clrMapOvr>
+</p:sld>
+</file>
+
+<file path=ppt/slides/slide49.xml><?xml version="1.0" encoding="utf-8"?>
+<p:sld xmlns:a="http://schemas.openxmlformats.org/drawingml/2006/main" xmlns:r="http://schemas.openxmlformats.org/officeDocument/2006/relationships" xmlns:p="http://schemas.openxmlformats.org/presentationml/2006/main">
+  <p:cSld>
+    <p:spTree>
+      <p:nvGrpSpPr>
         <p:cNvPr id="1" name=""/>
         <p:cNvGrpSpPr/>
         <p:nvPr/>
@@ -15988,7 +16929,119 @@
 </p:sld>
 </file>
 
-<file path=ppt/slides/slide49.xml><?xml version="1.0" encoding="utf-8"?>
+<file path=ppt/slides/slide5.xml><?xml version="1.0" encoding="utf-8"?>
+<p:sld xmlns:a="http://schemas.openxmlformats.org/drawingml/2006/main" xmlns:r="http://schemas.openxmlformats.org/officeDocument/2006/relationships" xmlns:p="http://schemas.openxmlformats.org/presentationml/2006/main">
+  <p:cSld>
+    <p:spTree>
+      <p:nvGrpSpPr>
+        <p:cNvPr id="1" name=""/>
+        <p:cNvGrpSpPr/>
+        <p:nvPr/>
+      </p:nvGrpSpPr>
+      <p:grpSpPr>
+        <a:xfrm>
+          <a:off x="0" y="0"/>
+          <a:ext cx="0" cy="0"/>
+          <a:chOff x="0" y="0"/>
+          <a:chExt cx="0" cy="0"/>
+        </a:xfrm>
+      </p:grpSpPr>
+      <p:sp>
+        <p:nvSpPr>
+          <p:cNvPr id="2" name="Title 1"/>
+          <p:cNvSpPr>
+            <a:spLocks noGrp="1"/>
+          </p:cNvSpPr>
+          <p:nvPr>
+            <p:ph type="title"/>
+          </p:nvPr>
+        </p:nvSpPr>
+        <p:spPr/>
+        <p:txBody>
+          <a:bodyPr/>
+          <a:lstStyle/>
+          <a:p>
+            <a:pPr marL="0" lvl="0" indent="0">
+              <a:buNone/>
+            </a:pPr>
+            <a:r>
+              <a:t>Why Are Time Series Data Different</a:t>
+            </a:r>
+          </a:p>
+        </p:txBody>
+      </p:sp>
+      <p:sp>
+        <p:nvSpPr>
+          <p:cNvPr id="3" name="Content Placeholder 2"/>
+          <p:cNvSpPr>
+            <a:spLocks noGrp="1"/>
+          </p:cNvSpPr>
+          <p:nvPr>
+            <p:ph idx="1"/>
+          </p:nvPr>
+        </p:nvSpPr>
+        <p:spPr/>
+        <p:txBody>
+          <a:bodyPr>
+            <a:normAutofit lnSpcReduction="10000"/>
+          </a:bodyPr>
+          <a:lstStyle/>
+          <a:p>
+            <a:pPr marL="0" lvl="0" indent="0">
+              <a:buNone/>
+            </a:pPr>
+            <a:r>
+              <a:rPr dirty="0"/>
+              <a:t>Examples of seri</a:t>
+            </a:r>
+            <a:r>
+              <a:rPr lang="en-US" dirty="0"/>
+              <a:t>al</a:t>
+            </a:r>
+            <a:r>
+              <a:rPr dirty="0"/>
+              <a:t> correlation:</a:t>
+            </a:r>
+          </a:p>
+          <a:p>
+            <a:pPr lvl="0"/>
+            <a:r>
+              <a:rPr dirty="0"/>
+              <a:t>Temperature forecasts, where the future values are correlated with the current values</a:t>
+            </a:r>
+          </a:p>
+          <a:p>
+            <a:pPr lvl="0"/>
+            <a:r>
+              <a:rPr dirty="0"/>
+              <a:t>The opening price of a stock is correlated with the price at the previous close</a:t>
+            </a:r>
+          </a:p>
+          <a:p>
+            <a:pPr lvl="0"/>
+            <a:r>
+              <a:rPr dirty="0"/>
+              <a:t>The daily sales volume of a product is correlated with the previous sales volume</a:t>
+            </a:r>
+          </a:p>
+          <a:p>
+            <a:pPr lvl="0"/>
+            <a:r>
+              <a:rPr dirty="0"/>
+              <a:t>A medical patient’s blood pressure reading is correlated with the previous observations</a:t>
+            </a:r>
+          </a:p>
+        </p:txBody>
+      </p:sp>
+    </p:spTree>
+  </p:cSld>
+  <p:clrMapOvr>
+    <a:masterClrMapping/>
+  </p:clrMapOvr>
+</p:sld>
+</file>
+
+<file path=ppt/slides/slide50.xml><?xml version="1.0" encoding="utf-8"?>
 <p:sld xmlns:a="http://schemas.openxmlformats.org/drawingml/2006/main" xmlns:r="http://schemas.openxmlformats.org/officeDocument/2006/relationships" xmlns:p="http://schemas.openxmlformats.org/presentationml/2006/main">
   <p:cSld>
     <p:spTree>
@@ -16177,119 +17230,7 @@
 </p:sld>
 </file>
 
-<file path=ppt/slides/slide5.xml><?xml version="1.0" encoding="utf-8"?>
-<p:sld xmlns:a="http://schemas.openxmlformats.org/drawingml/2006/main" xmlns:r="http://schemas.openxmlformats.org/officeDocument/2006/relationships" xmlns:p="http://schemas.openxmlformats.org/presentationml/2006/main">
-  <p:cSld>
-    <p:spTree>
-      <p:nvGrpSpPr>
-        <p:cNvPr id="1" name=""/>
-        <p:cNvGrpSpPr/>
-        <p:nvPr/>
-      </p:nvGrpSpPr>
-      <p:grpSpPr>
-        <a:xfrm>
-          <a:off x="0" y="0"/>
-          <a:ext cx="0" cy="0"/>
-          <a:chOff x="0" y="0"/>
-          <a:chExt cx="0" cy="0"/>
-        </a:xfrm>
-      </p:grpSpPr>
-      <p:sp>
-        <p:nvSpPr>
-          <p:cNvPr id="2" name="Title 1"/>
-          <p:cNvSpPr>
-            <a:spLocks noGrp="1"/>
-          </p:cNvSpPr>
-          <p:nvPr>
-            <p:ph type="title"/>
-          </p:nvPr>
-        </p:nvSpPr>
-        <p:spPr/>
-        <p:txBody>
-          <a:bodyPr/>
-          <a:lstStyle/>
-          <a:p>
-            <a:pPr marL="0" lvl="0" indent="0">
-              <a:buNone/>
-            </a:pPr>
-            <a:r>
-              <a:t>Why Are Time Series Data Different</a:t>
-            </a:r>
-          </a:p>
-        </p:txBody>
-      </p:sp>
-      <p:sp>
-        <p:nvSpPr>
-          <p:cNvPr id="3" name="Content Placeholder 2"/>
-          <p:cNvSpPr>
-            <a:spLocks noGrp="1"/>
-          </p:cNvSpPr>
-          <p:nvPr>
-            <p:ph idx="1"/>
-          </p:nvPr>
-        </p:nvSpPr>
-        <p:spPr/>
-        <p:txBody>
-          <a:bodyPr>
-            <a:normAutofit lnSpcReduction="10000"/>
-          </a:bodyPr>
-          <a:lstStyle/>
-          <a:p>
-            <a:pPr marL="0" lvl="0" indent="0">
-              <a:buNone/>
-            </a:pPr>
-            <a:r>
-              <a:rPr dirty="0"/>
-              <a:t>Examples of seri</a:t>
-            </a:r>
-            <a:r>
-              <a:rPr lang="en-US" dirty="0"/>
-              <a:t>al</a:t>
-            </a:r>
-            <a:r>
-              <a:rPr dirty="0"/>
-              <a:t> correlation:</a:t>
-            </a:r>
-          </a:p>
-          <a:p>
-            <a:pPr lvl="0"/>
-            <a:r>
-              <a:rPr dirty="0"/>
-              <a:t>Temperature forecasts, where the future values are correlated with the current values</a:t>
-            </a:r>
-          </a:p>
-          <a:p>
-            <a:pPr lvl="0"/>
-            <a:r>
-              <a:rPr dirty="0"/>
-              <a:t>The opening price of a stock is correlated with the price at the previous close</a:t>
-            </a:r>
-          </a:p>
-          <a:p>
-            <a:pPr lvl="0"/>
-            <a:r>
-              <a:rPr dirty="0"/>
-              <a:t>The daily sales volume of a product is correlated with the previous sales volume</a:t>
-            </a:r>
-          </a:p>
-          <a:p>
-            <a:pPr lvl="0"/>
-            <a:r>
-              <a:rPr dirty="0"/>
-              <a:t>A medical patient’s blood pressure reading is correlated with the previous observations</a:t>
-            </a:r>
-          </a:p>
-        </p:txBody>
-      </p:sp>
-    </p:spTree>
-  </p:cSld>
-  <p:clrMapOvr>
-    <a:masterClrMapping/>
-  </p:clrMapOvr>
-</p:sld>
-</file>
-
-<file path=ppt/slides/slide50.xml><?xml version="1.0" encoding="utf-8"?>
+<file path=ppt/slides/slide51.xml><?xml version="1.0" encoding="utf-8"?>
 <p:sld xmlns:a="http://schemas.openxmlformats.org/drawingml/2006/main" xmlns:r="http://schemas.openxmlformats.org/officeDocument/2006/relationships" xmlns:p="http://schemas.openxmlformats.org/presentationml/2006/main">
   <p:cSld>
     <p:spTree>
@@ -16812,10 +17753,14 @@
                     </m:oMathParaPr>
                     <m:oMath xmlns:m="http://schemas.openxmlformats.org/officeDocument/2006/math">
                       <m:r>
-                        <a:rPr lang="en-US">
+                        <m:rPr>
+                          <m:sty m:val="p"/>
+                        </m:rPr>
+                        <a:rPr lang="ar-AE" i="1" smtClean="0">
                           <a:latin typeface="Cambria Math" panose="02040503050406030204" pitchFamily="18" charset="0"/>
+                          <a:ea typeface="Cambria Math" panose="02040503050406030204" pitchFamily="18" charset="0"/>
                         </a:rPr>
-                        <m:t>𝛥</m:t>
+                        <m:t>∇</m:t>
                       </m:r>
                       <m:sSub>
                         <m:sSubPr>
@@ -16995,7 +17940,7 @@
 </p:sld>
 </file>
 
-<file path=ppt/slides/slide51.xml><?xml version="1.0" encoding="utf-8"?>
+<file path=ppt/slides/slide52.xml><?xml version="1.0" encoding="utf-8"?>
 <p:sld xmlns:a="http://schemas.openxmlformats.org/drawingml/2006/main" xmlns:r="http://schemas.openxmlformats.org/officeDocument/2006/relationships" xmlns:p="http://schemas.openxmlformats.org/presentationml/2006/main">
   <p:cSld>
     <p:spTree>
@@ -17120,10 +18065,21 @@
                     </m:oMathParaPr>
                     <m:oMath xmlns:m="http://schemas.openxmlformats.org/officeDocument/2006/math">
                       <m:r>
-                        <a:rPr lang="en-US">
+                        <m:rPr>
+                          <m:sty m:val="p"/>
+                        </m:rPr>
+                        <a:rPr lang="ar-AE" i="1">
                           <a:latin typeface="Cambria Math" panose="02040503050406030204" pitchFamily="18" charset="0"/>
+                          <a:ea typeface="Cambria Math" panose="02040503050406030204" pitchFamily="18" charset="0"/>
                         </a:rPr>
-                        <m:t>𝛥</m:t>
+                        <m:t>∇</m:t>
+                      </m:r>
+                      <m:r>
+                        <a:rPr lang="ar-AE" i="1">
+                          <a:latin typeface="Cambria Math" panose="02040503050406030204" pitchFamily="18" charset="0"/>
+                          <a:ea typeface="Cambria Math" panose="02040503050406030204" pitchFamily="18" charset="0"/>
+                        </a:rPr>
+                        <m:t> </m:t>
                       </m:r>
                       <m:sSub>
                         <m:sSubPr>
@@ -17594,7 +18550,7 @@
 </p:sld>
 </file>
 
-<file path=ppt/slides/slide52.xml><?xml version="1.0" encoding="utf-8"?>
+<file path=ppt/slides/slide53.xml><?xml version="1.0" encoding="utf-8"?>
 <p:sld xmlns:a="http://schemas.openxmlformats.org/drawingml/2006/main" xmlns:r="http://schemas.openxmlformats.org/officeDocument/2006/relationships" xmlns:p="http://schemas.openxmlformats.org/presentationml/2006/main">
   <p:cSld>
     <p:spTree>
@@ -17635,8 +18591,8 @@
           </a:p>
         </p:txBody>
       </p:sp>
-      <mc:AlternateContent xmlns:mc="http://schemas.openxmlformats.org/markup-compatibility/2006">
-        <mc:Choice xmlns:a14="http://schemas.microsoft.com/office/drawing/2010/main" Requires="a14">
+      <mc:AlternateContent xmlns:mc="http://schemas.openxmlformats.org/markup-compatibility/2006" xmlns:a14="http://schemas.microsoft.com/office/drawing/2010/main">
+        <mc:Choice Requires="a14">
           <p:sp>
             <p:nvSpPr>
               <p:cNvPr id="3" name="Content Placeholder 2"/>
@@ -17794,7 +18750,7 @@
             </p:txBody>
           </p:sp>
         </mc:Choice>
-        <mc:Fallback>
+        <mc:Fallback xmlns="">
           <p:sp>
             <p:nvSpPr>
               <p:cNvPr id="3" name="Content Placeholder 2"/>
@@ -17836,7 +18792,7 @@
 </p:sld>
 </file>
 
-<file path=ppt/slides/slide53.xml><?xml version="1.0" encoding="utf-8"?>
+<file path=ppt/slides/slide54.xml><?xml version="1.0" encoding="utf-8"?>
 <p:sld xmlns:a="http://schemas.openxmlformats.org/drawingml/2006/main" xmlns:r="http://schemas.openxmlformats.org/officeDocument/2006/relationships" xmlns:p="http://schemas.openxmlformats.org/presentationml/2006/main">
   <p:cSld>
     <p:spTree>
@@ -17932,10 +18888,21 @@
                     </m:oMathParaPr>
                     <m:oMath xmlns:m="http://schemas.openxmlformats.org/officeDocument/2006/math">
                       <m:r>
-                        <a:rPr lang="en-US">
+                        <m:rPr>
+                          <m:sty m:val="p"/>
+                        </m:rPr>
+                        <a:rPr lang="ar-AE" i="1">
                           <a:latin typeface="Cambria Math" panose="02040503050406030204" pitchFamily="18" charset="0"/>
+                          <a:ea typeface="Cambria Math" panose="02040503050406030204" pitchFamily="18" charset="0"/>
                         </a:rPr>
-                        <m:t>𝛥</m:t>
+                        <m:t>∇</m:t>
+                      </m:r>
+                      <m:r>
+                        <a:rPr lang="ar-AE" i="1">
+                          <a:latin typeface="Cambria Math" panose="02040503050406030204" pitchFamily="18" charset="0"/>
+                          <a:ea typeface="Cambria Math" panose="02040503050406030204" pitchFamily="18" charset="0"/>
+                        </a:rPr>
+                        <m:t> </m:t>
                       </m:r>
                       <m:sSub>
                         <m:sSubPr>
@@ -18575,196 +19542,6 @@
 </p:sld>
 </file>
 
-<file path=ppt/slides/slide54.xml><?xml version="1.0" encoding="utf-8"?>
-<p:sld xmlns:a="http://schemas.openxmlformats.org/drawingml/2006/main" xmlns:r="http://schemas.openxmlformats.org/officeDocument/2006/relationships" xmlns:p="http://schemas.openxmlformats.org/presentationml/2006/main">
-  <p:cSld>
-    <p:spTree>
-      <p:nvGrpSpPr>
-        <p:cNvPr id="1" name=""/>
-        <p:cNvGrpSpPr/>
-        <p:nvPr/>
-      </p:nvGrpSpPr>
-      <p:grpSpPr>
-        <a:xfrm>
-          <a:off x="0" y="0"/>
-          <a:ext cx="0" cy="0"/>
-          <a:chOff x="0" y="0"/>
-          <a:chExt cx="0" cy="0"/>
-        </a:xfrm>
-      </p:grpSpPr>
-      <p:sp>
-        <p:nvSpPr>
-          <p:cNvPr id="2" name="Title 1"/>
-          <p:cNvSpPr>
-            <a:spLocks noGrp="1"/>
-          </p:cNvSpPr>
-          <p:nvPr>
-            <p:ph type="title"/>
-          </p:nvPr>
-        </p:nvSpPr>
-        <p:spPr/>
-        <p:txBody>
-          <a:bodyPr/>
-          <a:lstStyle/>
-          <a:p>
-            <a:pPr marL="0" lvl="0" indent="0">
-              <a:buNone/>
-            </a:pPr>
-            <a:r>
-              <a:t>Stationarity</a:t>
-            </a:r>
-          </a:p>
-        </p:txBody>
-      </p:sp>
-      <p:sp>
-        <p:nvSpPr>
-          <p:cNvPr id="3" name="Content Placeholder 2"/>
-          <p:cNvSpPr>
-            <a:spLocks noGrp="1"/>
-          </p:cNvSpPr>
-          <p:nvPr>
-            <p:ph idx="1"/>
-          </p:nvPr>
-        </p:nvSpPr>
-        <p:spPr/>
-        <p:txBody>
-          <a:bodyPr>
-            <a:normAutofit fontScale="92500" lnSpcReduction="20000"/>
-          </a:bodyPr>
-          <a:lstStyle/>
-          <a:p>
-            <a:pPr marL="0" lvl="0" indent="0">
-              <a:buNone/>
-            </a:pPr>
-            <a:r>
-              <a:rPr dirty="0"/>
-              <a:t>There are a number of ways to determine if a time series is stationary</a:t>
-            </a:r>
-          </a:p>
-          <a:p>
-            <a:pPr marL="0" lvl="0" indent="0">
-              <a:buNone/>
-            </a:pPr>
-            <a:r>
-              <a:rPr dirty="0"/>
-              <a:t>We will work with two of the many possible tests here:</a:t>
-            </a:r>
-          </a:p>
-          <a:p>
-            <a:pPr marL="342900" lvl="0" indent="-342900">
-              <a:buAutoNum type="arabicPeriod"/>
-            </a:pPr>
-            <a:r>
-              <a:rPr b="1" dirty="0">
-                <a:hlinkClick r:id="rId2"/>
-              </a:rPr>
-              <a:t>Augmented Dicky-Fuller test</a:t>
-            </a:r>
-            <a:r>
-              <a:rPr dirty="0"/>
-              <a:t> or </a:t>
-            </a:r>
-            <a:r>
-              <a:rPr b="1" dirty="0"/>
-              <a:t>ADF</a:t>
-            </a:r>
-            <a:r>
-              <a:rPr dirty="0"/>
-              <a:t> test</a:t>
-            </a:r>
-          </a:p>
-          <a:p>
-            <a:pPr lvl="1"/>
-            <a:r>
-              <a:rPr dirty="0"/>
-              <a:t>ADF tests are unit root tests of the significance a linear time series model</a:t>
-            </a:r>
-          </a:p>
-          <a:p>
-            <a:pPr lvl="1"/>
-            <a:r>
-              <a:rPr dirty="0"/>
-              <a:t>Coefficients represent components of the time series, e.g. </a:t>
-            </a:r>
-            <a:r>
-              <a:rPr lang="en-US" dirty="0" err="1"/>
-              <a:t>constsant</a:t>
-            </a:r>
-            <a:r>
-              <a:rPr lang="en-US" dirty="0"/>
-              <a:t>, </a:t>
-            </a:r>
-            <a:r>
-              <a:rPr dirty="0"/>
-              <a:t>trend and lagged differences</a:t>
-            </a:r>
-          </a:p>
-          <a:p>
-            <a:pPr lvl="1"/>
-            <a:r>
-              <a:rPr dirty="0"/>
-              <a:t>Null distribution is that the </a:t>
-            </a:r>
-            <a:r>
-              <a:rPr b="1" dirty="0"/>
-              <a:t>series is non-stationary</a:t>
-            </a:r>
-          </a:p>
-          <a:p>
-            <a:pPr marL="342900" lvl="0" indent="-342900">
-              <a:buAutoNum type="arabicPeriod"/>
-            </a:pPr>
-            <a:r>
-              <a:rPr b="1" dirty="0">
-                <a:hlinkClick r:id="rId3"/>
-              </a:rPr>
-              <a:t>Kwiatkowski–Phillips–Schmidt–Shin (KPSS) test</a:t>
-            </a:r>
-            <a:r>
-              <a:rPr dirty="0"/>
-              <a:t> is a unit root test for stationarity about a trend of time series</a:t>
-            </a:r>
-          </a:p>
-          <a:p>
-            <a:pPr lvl="1"/>
-            <a:r>
-              <a:rPr dirty="0"/>
-              <a:t>Null hypothesis is that the </a:t>
-            </a:r>
-            <a:r>
-              <a:rPr b="1" dirty="0"/>
-              <a:t>time series is trend stationary</a:t>
-            </a:r>
-            <a:endParaRPr lang="en-US" b="1" dirty="0"/>
-          </a:p>
-          <a:p>
-            <a:pPr marL="0" indent="0">
-              <a:buNone/>
-            </a:pPr>
-            <a:r>
-              <a:rPr lang="en-US" dirty="0">
-                <a:solidFill>
-                  <a:srgbClr val="C00000"/>
-                </a:solidFill>
-              </a:rPr>
-              <a:t>Don’t me confused by the different null hypotheses for these tests!</a:t>
-            </a:r>
-            <a:endParaRPr dirty="0">
-              <a:solidFill>
-                <a:srgbClr val="C00000"/>
-              </a:solidFill>
-            </a:endParaRPr>
-          </a:p>
-        </p:txBody>
-      </p:sp>
-    </p:spTree>
-  </p:cSld>
-  <p:clrMapOvr>
-    <a:masterClrMapping/>
-  </p:clrMapOvr>
-</p:sld>
-</file>
-
 <file path=ppt/slides/slide55.xml><?xml version="1.0" encoding="utf-8"?>
 <p:sld xmlns:a="http://schemas.openxmlformats.org/drawingml/2006/main" xmlns:r="http://schemas.openxmlformats.org/officeDocument/2006/relationships" xmlns:p="http://schemas.openxmlformats.org/presentationml/2006/main">
   <p:cSld>
@@ -18819,7 +19596,7 @@
         <p:spPr/>
         <p:txBody>
           <a:bodyPr>
-            <a:normAutofit lnSpcReduction="10000"/>
+            <a:normAutofit fontScale="92500" lnSpcReduction="20000"/>
           </a:bodyPr>
           <a:lstStyle/>
           <a:p>
@@ -18828,82 +19605,122 @@
             </a:pPr>
             <a:r>
               <a:rPr dirty="0"/>
-              <a:t>There is often a small difference between a time series </a:t>
+              <a:t>There are a number of ways to determine if a time series is stationary</a:t>
+            </a:r>
+          </a:p>
+          <a:p>
+            <a:pPr marL="0" lvl="0" indent="0">
+              <a:buNone/>
+            </a:pPr>
+            <a:r>
+              <a:rPr dirty="0"/>
+              <a:t>We will work with two of the many possible tests here:</a:t>
+            </a:r>
+          </a:p>
+          <a:p>
+            <a:pPr marL="342900" lvl="0" indent="-342900">
+              <a:buAutoNum type="arabicPeriod"/>
+            </a:pPr>
+            <a:r>
+              <a:rPr b="1" dirty="0">
+                <a:hlinkClick r:id="rId2"/>
+              </a:rPr>
+              <a:t>Augmented Dicky-Fuller test</a:t>
+            </a:r>
+            <a:r>
+              <a:rPr dirty="0"/>
+              <a:t> or </a:t>
+            </a:r>
+            <a:r>
+              <a:rPr b="1" dirty="0"/>
+              <a:t>ADF</a:t>
+            </a:r>
+            <a:r>
+              <a:rPr dirty="0"/>
+              <a:t> test</a:t>
+            </a:r>
+          </a:p>
+          <a:p>
+            <a:pPr lvl="1"/>
+            <a:r>
+              <a:rPr dirty="0"/>
+              <a:t>ADF tests are unit root tests of the significance a linear time series model</a:t>
+            </a:r>
+          </a:p>
+          <a:p>
+            <a:pPr lvl="1"/>
+            <a:r>
+              <a:rPr dirty="0"/>
+              <a:t>Coefficients represent components of the time series, e.g. </a:t>
+            </a:r>
+            <a:r>
+              <a:rPr lang="en-US" dirty="0" err="1"/>
+              <a:t>constsant</a:t>
             </a:r>
             <a:r>
               <a:rPr lang="en-US" dirty="0"/>
-              <a:t>nonstationary time series with a </a:t>
+              <a:t>, </a:t>
             </a:r>
             <a:r>
               <a:rPr dirty="0"/>
-              <a:t>unit root</a:t>
-            </a:r>
-            <a:r>
-              <a:rPr lang="en-US" dirty="0"/>
-              <a:t> </a:t>
-            </a:r>
+              <a:t>trend and lagged differences</a:t>
+            </a:r>
+          </a:p>
+          <a:p>
+            <a:pPr lvl="1"/>
             <a:r>
               <a:rPr dirty="0"/>
-              <a:t>and a time series with a root close to unit</a:t>
-            </a:r>
-          </a:p>
-          <a:p>
-            <a:pPr lvl="0"/>
+              <a:t>Null distribution is that the </a:t>
+            </a:r>
+            <a:r>
+              <a:rPr b="1" dirty="0"/>
+              <a:t>series is non-stationary</a:t>
+            </a:r>
+          </a:p>
+          <a:p>
+            <a:pPr marL="342900" lvl="0" indent="-342900">
+              <a:buAutoNum type="arabicPeriod"/>
+            </a:pPr>
+            <a:r>
+              <a:rPr b="1" dirty="0">
+                <a:hlinkClick r:id="rId3"/>
+              </a:rPr>
+              <a:t>Kwiatkowski–Phillips–Schmidt–Shin (KPSS) test</a:t>
+            </a:r>
             <a:r>
               <a:rPr dirty="0"/>
-              <a:t>Therefore, unit root tests are said to </a:t>
+              <a:t> is a unit root test for stationarity about a trend of time series</a:t>
+            </a:r>
+          </a:p>
+          <a:p>
+            <a:pPr lvl="1"/>
+            <a:r>
+              <a:rPr dirty="0"/>
+              <a:t>Null hypothesis is that the </a:t>
             </a:r>
             <a:r>
               <a:rPr b="1" dirty="0"/>
-              <a:t>lack power</a:t>
-            </a:r>
-            <a:endParaRPr dirty="0"/>
-          </a:p>
-          <a:p>
-            <a:pPr lvl="0"/>
-            <a:r>
-              <a:rPr dirty="0"/>
-              <a:t>Lack of power means a hypothesis test may not be able to reject a hypothesis of </a:t>
-            </a:r>
-            <a:r>
-              <a:rPr dirty="0" err="1"/>
-              <a:t>nonstationar</a:t>
-            </a:r>
-            <a:r>
-              <a:rPr lang="en-US" dirty="0" err="1"/>
-              <a:t>ity</a:t>
-            </a:r>
-            <a:endParaRPr dirty="0"/>
-          </a:p>
-          <a:p>
-            <a:pPr lvl="0"/>
-            <a:r>
-              <a:rPr dirty="0"/>
-              <a:t>In other cases, the opposite might be true</a:t>
-            </a:r>
-          </a:p>
-          <a:p>
-            <a:pPr lvl="0"/>
-            <a:r>
-              <a:rPr dirty="0"/>
-              <a:t>It is best </a:t>
-            </a:r>
-            <a:r>
-              <a:rPr lang="en-US" dirty="0"/>
-              <a:t>to </a:t>
-            </a:r>
-            <a:r>
-              <a:rPr lang="en-US" dirty="0" err="1"/>
-              <a:t>linclude</a:t>
-            </a:r>
-            <a:r>
-              <a:rPr lang="en-US" dirty="0"/>
-              <a:t> </a:t>
-            </a:r>
-            <a:r>
-              <a:rPr dirty="0"/>
-              <a:t>a visual inspection of the properties of the time series as well</a:t>
-            </a:r>
+              <a:t>time series is trend stationary</a:t>
+            </a:r>
+            <a:endParaRPr lang="en-US" b="1" dirty="0"/>
+          </a:p>
+          <a:p>
+            <a:pPr marL="0" indent="0">
+              <a:buNone/>
+            </a:pPr>
+            <a:r>
+              <a:rPr lang="en-US" dirty="0">
+                <a:solidFill>
+                  <a:srgbClr val="C00000"/>
+                </a:solidFill>
+              </a:rPr>
+              <a:t>Don’t me confused by the different null hypotheses for these tests!</a:t>
+            </a:r>
+            <a:endParaRPr dirty="0">
+              <a:solidFill>
+                <a:srgbClr val="C00000"/>
+              </a:solidFill>
+            </a:endParaRPr>
           </a:p>
         </p:txBody>
       </p:sp>
@@ -18916,6 +19733,152 @@
 </file>
 
 <file path=ppt/slides/slide56.xml><?xml version="1.0" encoding="utf-8"?>
+<p:sld xmlns:a="http://schemas.openxmlformats.org/drawingml/2006/main" xmlns:r="http://schemas.openxmlformats.org/officeDocument/2006/relationships" xmlns:p="http://schemas.openxmlformats.org/presentationml/2006/main">
+  <p:cSld>
+    <p:spTree>
+      <p:nvGrpSpPr>
+        <p:cNvPr id="1" name=""/>
+        <p:cNvGrpSpPr/>
+        <p:nvPr/>
+      </p:nvGrpSpPr>
+      <p:grpSpPr>
+        <a:xfrm>
+          <a:off x="0" y="0"/>
+          <a:ext cx="0" cy="0"/>
+          <a:chOff x="0" y="0"/>
+          <a:chExt cx="0" cy="0"/>
+        </a:xfrm>
+      </p:grpSpPr>
+      <p:sp>
+        <p:nvSpPr>
+          <p:cNvPr id="2" name="Title 1"/>
+          <p:cNvSpPr>
+            <a:spLocks noGrp="1"/>
+          </p:cNvSpPr>
+          <p:nvPr>
+            <p:ph type="title"/>
+          </p:nvPr>
+        </p:nvSpPr>
+        <p:spPr/>
+        <p:txBody>
+          <a:bodyPr/>
+          <a:lstStyle/>
+          <a:p>
+            <a:pPr marL="0" lvl="0" indent="0">
+              <a:buNone/>
+            </a:pPr>
+            <a:r>
+              <a:t>Stationarity</a:t>
+            </a:r>
+          </a:p>
+        </p:txBody>
+      </p:sp>
+      <p:sp>
+        <p:nvSpPr>
+          <p:cNvPr id="3" name="Content Placeholder 2"/>
+          <p:cNvSpPr>
+            <a:spLocks noGrp="1"/>
+          </p:cNvSpPr>
+          <p:nvPr>
+            <p:ph idx="1"/>
+          </p:nvPr>
+        </p:nvSpPr>
+        <p:spPr/>
+        <p:txBody>
+          <a:bodyPr>
+            <a:normAutofit lnSpcReduction="10000"/>
+          </a:bodyPr>
+          <a:lstStyle/>
+          <a:p>
+            <a:pPr marL="0" lvl="0" indent="0">
+              <a:buNone/>
+            </a:pPr>
+            <a:r>
+              <a:rPr dirty="0"/>
+              <a:t>There is often a small difference between a time series </a:t>
+            </a:r>
+            <a:r>
+              <a:rPr lang="en-US" dirty="0"/>
+              <a:t>nonstationary time series with a </a:t>
+            </a:r>
+            <a:r>
+              <a:rPr dirty="0"/>
+              <a:t>unit root</a:t>
+            </a:r>
+            <a:r>
+              <a:rPr lang="en-US" dirty="0"/>
+              <a:t> </a:t>
+            </a:r>
+            <a:r>
+              <a:rPr dirty="0"/>
+              <a:t>and a time series with a root close to unit</a:t>
+            </a:r>
+          </a:p>
+          <a:p>
+            <a:pPr lvl="0"/>
+            <a:r>
+              <a:rPr dirty="0"/>
+              <a:t>Therefore, unit root tests are said to </a:t>
+            </a:r>
+            <a:r>
+              <a:rPr b="1" dirty="0"/>
+              <a:t>lack power</a:t>
+            </a:r>
+            <a:endParaRPr dirty="0"/>
+          </a:p>
+          <a:p>
+            <a:pPr lvl="0"/>
+            <a:r>
+              <a:rPr dirty="0"/>
+              <a:t>Lack of power means a hypothesis test may not be able to reject a hypothesis of non</a:t>
+            </a:r>
+            <a:r>
+              <a:rPr lang="en-US" dirty="0"/>
+              <a:t>-</a:t>
+            </a:r>
+            <a:r>
+              <a:rPr dirty="0"/>
+              <a:t>stationar</a:t>
+            </a:r>
+            <a:r>
+              <a:rPr lang="en-US" dirty="0"/>
+              <a:t>ity</a:t>
+            </a:r>
+            <a:endParaRPr dirty="0"/>
+          </a:p>
+          <a:p>
+            <a:pPr lvl="0"/>
+            <a:r>
+              <a:rPr dirty="0"/>
+              <a:t>In other cases, the opposite might be true</a:t>
+            </a:r>
+          </a:p>
+          <a:p>
+            <a:pPr lvl="0"/>
+            <a:r>
+              <a:rPr dirty="0"/>
+              <a:t>It is best </a:t>
+            </a:r>
+            <a:r>
+              <a:rPr lang="en-US" dirty="0"/>
+              <a:t>to include </a:t>
+            </a:r>
+            <a:r>
+              <a:rPr dirty="0"/>
+              <a:t>a visual inspection of the properties of the time series as well</a:t>
+            </a:r>
+          </a:p>
+        </p:txBody>
+      </p:sp>
+    </p:spTree>
+  </p:cSld>
+  <p:clrMapOvr>
+    <a:masterClrMapping/>
+  </p:clrMapOvr>
+</p:sld>
+</file>
+
+<file path=ppt/slides/slide57.xml><?xml version="1.0" encoding="utf-8"?>
 <p:sld xmlns:a="http://schemas.openxmlformats.org/drawingml/2006/main" xmlns:r="http://schemas.openxmlformats.org/officeDocument/2006/relationships" xmlns:p="http://schemas.openxmlformats.org/presentationml/2006/main">
   <p:cSld>
     <p:spTree>
@@ -19462,7 +20425,7 @@
 </p:sld>
 </file>
 
-<file path=ppt/slides/slide57.xml><?xml version="1.0" encoding="utf-8"?>
+<file path=ppt/slides/slide58.xml><?xml version="1.0" encoding="utf-8"?>
 <p:sld xmlns:a="http://schemas.openxmlformats.org/drawingml/2006/main" xmlns:r="http://schemas.openxmlformats.org/officeDocument/2006/relationships" xmlns:p="http://schemas.openxmlformats.org/presentationml/2006/main">
   <p:cSld>
     <p:spTree>
@@ -19919,7 +20882,7 @@
 </p:sld>
 </file>
 
-<file path=ppt/slides/slide58.xml><?xml version="1.0" encoding="utf-8"?>
+<file path=ppt/slides/slide59.xml><?xml version="1.0" encoding="utf-8"?>
 <p:sld xmlns:a="http://schemas.openxmlformats.org/drawingml/2006/main" xmlns:r="http://schemas.openxmlformats.org/officeDocument/2006/relationships" xmlns:p="http://schemas.openxmlformats.org/presentationml/2006/main">
   <p:cSld>
     <p:spTree>
@@ -20264,7 +21227,7 @@
           <a:p>
             <a:r>
               <a:rPr lang="en-US" sz="2000" dirty="0"/>
-              <a:t>ADF; cannot reject hypothesis of nonstationary </a:t>
+              <a:t>ADF; reject hypothesis of stationary </a:t>
             </a:r>
           </a:p>
           <a:p>
@@ -20276,7 +21239,7 @@
           <a:p>
             <a:r>
               <a:rPr lang="en-US" sz="2000" dirty="0"/>
-              <a:t>Ambiguous result, so assume nonstationary</a:t>
+              <a:t>Ambiguous result from low-power, so assume nonstationary</a:t>
             </a:r>
           </a:p>
         </p:txBody>
@@ -20342,7 +21305,7 @@
         <p:spPr>
           <a:xfrm flipH="1" flipV="1">
             <a:off x="5964383" y="2090651"/>
-            <a:ext cx="673330" cy="1126374"/>
+            <a:ext cx="357446" cy="552796"/>
           </a:xfrm>
           <a:prstGeom prst="straightConnector1">
             <a:avLst/>
@@ -20382,7 +21345,172 @@
 </p:sld>
 </file>
 
-<file path=ppt/slides/slide59.xml><?xml version="1.0" encoding="utf-8"?>
+<file path=ppt/slides/slide6.xml><?xml version="1.0" encoding="utf-8"?>
+<p:sld xmlns:a="http://schemas.openxmlformats.org/drawingml/2006/main" xmlns:r="http://schemas.openxmlformats.org/officeDocument/2006/relationships" xmlns:p="http://schemas.openxmlformats.org/presentationml/2006/main">
+  <p:cSld>
+    <p:spTree>
+      <p:nvGrpSpPr>
+        <p:cNvPr id="1" name=""/>
+        <p:cNvGrpSpPr/>
+        <p:nvPr/>
+      </p:nvGrpSpPr>
+      <p:grpSpPr>
+        <a:xfrm>
+          <a:off x="0" y="0"/>
+          <a:ext cx="0" cy="0"/>
+          <a:chOff x="0" y="0"/>
+          <a:chExt cx="0" cy="0"/>
+        </a:xfrm>
+      </p:grpSpPr>
+      <p:sp>
+        <p:nvSpPr>
+          <p:cNvPr id="2" name="Title 1"/>
+          <p:cNvSpPr>
+            <a:spLocks noGrp="1"/>
+          </p:cNvSpPr>
+          <p:nvPr>
+            <p:ph type="title"/>
+          </p:nvPr>
+        </p:nvSpPr>
+        <p:spPr/>
+        <p:txBody>
+          <a:bodyPr/>
+          <a:lstStyle/>
+          <a:p>
+            <a:pPr marL="0" lvl="0" indent="0">
+              <a:buNone/>
+            </a:pPr>
+            <a:r>
+              <a:rPr lang="en-US" dirty="0"/>
+              <a:t>Short </a:t>
+            </a:r>
+            <a:r>
+              <a:rPr dirty="0"/>
+              <a:t>History of Time Series Analysis</a:t>
+            </a:r>
+          </a:p>
+        </p:txBody>
+      </p:sp>
+      <p:sp>
+        <p:nvSpPr>
+          <p:cNvPr id="3" name="Content Placeholder 2"/>
+          <p:cNvSpPr>
+            <a:spLocks noGrp="1"/>
+          </p:cNvSpPr>
+          <p:nvPr>
+            <p:ph idx="1"/>
+          </p:nvPr>
+        </p:nvSpPr>
+        <p:spPr>
+          <a:xfrm>
+            <a:off x="457200" y="1200151"/>
+            <a:ext cx="5270269" cy="3394472"/>
+          </a:xfrm>
+        </p:spPr>
+        <p:txBody>
+          <a:bodyPr/>
+          <a:lstStyle/>
+          <a:p>
+            <a:pPr marL="0" indent="0">
+              <a:buNone/>
+            </a:pPr>
+            <a:r>
+              <a:rPr dirty="0"/>
+              <a:t>Time series analysis have a long history</a:t>
+            </a:r>
+            <a:endParaRPr lang="en-US" dirty="0"/>
+          </a:p>
+          <a:p>
+            <a:r>
+              <a:rPr lang="en-US" dirty="0"/>
+              <a:t>T</a:t>
+            </a:r>
+            <a:r>
+              <a:rPr dirty="0"/>
+              <a:t>he serial dependency in time series data </a:t>
+            </a:r>
+            <a:r>
+              <a:rPr lang="en-US" dirty="0"/>
+              <a:t>was recognized long ago</a:t>
+            </a:r>
+          </a:p>
+          <a:p>
+            <a:r>
+              <a:rPr dirty="0"/>
+              <a:t>Joseph Fourier and Simeon Poisson worked on time series problems in the early 19th Century</a:t>
+            </a:r>
+          </a:p>
+        </p:txBody>
+      </p:sp>
+      <p:pic>
+        <p:nvPicPr>
+          <p:cNvPr id="4" name="Picture 1" descr="../images/Fourier.jpg"/>
+          <p:cNvPicPr>
+            <a:picLocks noGrp="1" noChangeAspect="1"/>
+          </p:cNvPicPr>
+          <p:nvPr/>
+        </p:nvPicPr>
+        <p:blipFill>
+          <a:blip r:embed="rId2"/>
+          <a:stretch>
+            <a:fillRect/>
+          </a:stretch>
+        </p:blipFill>
+        <p:spPr bwMode="auto">
+          <a:xfrm>
+            <a:off x="6151418" y="953192"/>
+            <a:ext cx="2743894" cy="3348731"/>
+          </a:xfrm>
+          <a:prstGeom prst="rect">
+            <a:avLst/>
+          </a:prstGeom>
+          <a:noFill/>
+          <a:ln w="9525">
+            <a:noFill/>
+            <a:headEnd/>
+            <a:tailEnd/>
+          </a:ln>
+        </p:spPr>
+      </p:pic>
+      <p:sp>
+        <p:nvSpPr>
+          <p:cNvPr id="5" name="TextBox 3"/>
+          <p:cNvSpPr txBox="1"/>
+          <p:nvPr/>
+        </p:nvSpPr>
+        <p:spPr>
+          <a:xfrm>
+            <a:off x="6255674" y="4186383"/>
+            <a:ext cx="2535382" cy="508000"/>
+          </a:xfrm>
+          <a:prstGeom prst="rect">
+            <a:avLst/>
+          </a:prstGeom>
+          <a:noFill/>
+        </p:spPr>
+        <p:txBody>
+          <a:bodyPr/>
+          <a:lstStyle/>
+          <a:p>
+            <a:pPr marL="0" lvl="0" indent="0" algn="ctr">
+              <a:buNone/>
+            </a:pPr>
+            <a:r>
+              <a:rPr dirty="0"/>
+              <a:t>Joseph Fourier</a:t>
+            </a:r>
+          </a:p>
+        </p:txBody>
+      </p:sp>
+    </p:spTree>
+  </p:cSld>
+  <p:clrMapOvr>
+    <a:masterClrMapping/>
+  </p:clrMapOvr>
+</p:sld>
+</file>
+
+<file path=ppt/slides/slide60.xml><?xml version="1.0" encoding="utf-8"?>
 <p:sld xmlns:a="http://schemas.openxmlformats.org/drawingml/2006/main" xmlns:r="http://schemas.openxmlformats.org/officeDocument/2006/relationships" xmlns:p="http://schemas.openxmlformats.org/presentationml/2006/main">
   <p:cSld>
     <p:spTree>
@@ -20721,19 +21849,19 @@
             </a:pPr>
             <a:r>
               <a:rPr lang="en-US" sz="2000" dirty="0"/>
-              <a:t>White noise series</a:t>
+              <a:t>Random walk series</a:t>
             </a:r>
           </a:p>
           <a:p>
             <a:r>
               <a:rPr lang="en-US" sz="2000" dirty="0"/>
-              <a:t>ADF; reject hypothesis of non-trend-stationary </a:t>
+              <a:t>ADF; cannot reject hypothesis of nonstationary </a:t>
             </a:r>
           </a:p>
           <a:p>
             <a:r>
               <a:rPr lang="en-US" sz="2000" dirty="0"/>
-              <a:t>KPSS test cannot reject null hypothesis of trend-stationary </a:t>
+              <a:t>KPSS reject null hypothesis of stationary </a:t>
             </a:r>
           </a:p>
         </p:txBody>
@@ -20754,8 +21882,8 @@
         </p:nvCxnSpPr>
         <p:spPr>
           <a:xfrm flipH="1">
-            <a:off x="4110644" y="2460567"/>
-            <a:ext cx="2340032" cy="648393"/>
+            <a:off x="4110644" y="2034540"/>
+            <a:ext cx="2157152" cy="176645"/>
           </a:xfrm>
           <a:prstGeom prst="straightConnector1">
             <a:avLst/>
@@ -20798,8 +21926,8 @@
         </p:nvCxnSpPr>
         <p:spPr>
           <a:xfrm flipH="1" flipV="1">
-            <a:off x="6005945" y="3108960"/>
-            <a:ext cx="631768" cy="108065"/>
+            <a:off x="5964383" y="2256905"/>
+            <a:ext cx="419792" cy="714895"/>
           </a:xfrm>
           <a:prstGeom prst="straightConnector1">
             <a:avLst/>
@@ -20839,172 +21967,7 @@
 </p:sld>
 </file>
 
-<file path=ppt/slides/slide6.xml><?xml version="1.0" encoding="utf-8"?>
-<p:sld xmlns:a="http://schemas.openxmlformats.org/drawingml/2006/main" xmlns:r="http://schemas.openxmlformats.org/officeDocument/2006/relationships" xmlns:p="http://schemas.openxmlformats.org/presentationml/2006/main">
-  <p:cSld>
-    <p:spTree>
-      <p:nvGrpSpPr>
-        <p:cNvPr id="1" name=""/>
-        <p:cNvGrpSpPr/>
-        <p:nvPr/>
-      </p:nvGrpSpPr>
-      <p:grpSpPr>
-        <a:xfrm>
-          <a:off x="0" y="0"/>
-          <a:ext cx="0" cy="0"/>
-          <a:chOff x="0" y="0"/>
-          <a:chExt cx="0" cy="0"/>
-        </a:xfrm>
-      </p:grpSpPr>
-      <p:sp>
-        <p:nvSpPr>
-          <p:cNvPr id="2" name="Title 1"/>
-          <p:cNvSpPr>
-            <a:spLocks noGrp="1"/>
-          </p:cNvSpPr>
-          <p:nvPr>
-            <p:ph type="title"/>
-          </p:nvPr>
-        </p:nvSpPr>
-        <p:spPr/>
-        <p:txBody>
-          <a:bodyPr/>
-          <a:lstStyle/>
-          <a:p>
-            <a:pPr marL="0" lvl="0" indent="0">
-              <a:buNone/>
-            </a:pPr>
-            <a:r>
-              <a:rPr lang="en-US" dirty="0"/>
-              <a:t>Short </a:t>
-            </a:r>
-            <a:r>
-              <a:rPr dirty="0"/>
-              <a:t>History of Time Series Analysis</a:t>
-            </a:r>
-          </a:p>
-        </p:txBody>
-      </p:sp>
-      <p:sp>
-        <p:nvSpPr>
-          <p:cNvPr id="3" name="Content Placeholder 2"/>
-          <p:cNvSpPr>
-            <a:spLocks noGrp="1"/>
-          </p:cNvSpPr>
-          <p:nvPr>
-            <p:ph idx="1"/>
-          </p:nvPr>
-        </p:nvSpPr>
-        <p:spPr>
-          <a:xfrm>
-            <a:off x="457200" y="1200151"/>
-            <a:ext cx="5270269" cy="3394472"/>
-          </a:xfrm>
-        </p:spPr>
-        <p:txBody>
-          <a:bodyPr/>
-          <a:lstStyle/>
-          <a:p>
-            <a:pPr marL="0" indent="0">
-              <a:buNone/>
-            </a:pPr>
-            <a:r>
-              <a:rPr dirty="0"/>
-              <a:t>Time series analysis have a long history</a:t>
-            </a:r>
-            <a:endParaRPr lang="en-US" dirty="0"/>
-          </a:p>
-          <a:p>
-            <a:r>
-              <a:rPr lang="en-US" dirty="0"/>
-              <a:t>T</a:t>
-            </a:r>
-            <a:r>
-              <a:rPr dirty="0"/>
-              <a:t>he serial dependency in time series data </a:t>
-            </a:r>
-            <a:r>
-              <a:rPr lang="en-US" dirty="0"/>
-              <a:t>was recognized long ago</a:t>
-            </a:r>
-          </a:p>
-          <a:p>
-            <a:r>
-              <a:rPr dirty="0"/>
-              <a:t>Joseph Fourier and Simeon Poisson worked on time series problems in the early 19th Century</a:t>
-            </a:r>
-          </a:p>
-        </p:txBody>
-      </p:sp>
-      <p:pic>
-        <p:nvPicPr>
-          <p:cNvPr id="4" name="Picture 1" descr="../images/Fourier.jpg"/>
-          <p:cNvPicPr>
-            <a:picLocks noGrp="1" noChangeAspect="1"/>
-          </p:cNvPicPr>
-          <p:nvPr/>
-        </p:nvPicPr>
-        <p:blipFill>
-          <a:blip r:embed="rId2"/>
-          <a:stretch>
-            <a:fillRect/>
-          </a:stretch>
-        </p:blipFill>
-        <p:spPr bwMode="auto">
-          <a:xfrm>
-            <a:off x="6151418" y="953192"/>
-            <a:ext cx="2743894" cy="3348731"/>
-          </a:xfrm>
-          <a:prstGeom prst="rect">
-            <a:avLst/>
-          </a:prstGeom>
-          <a:noFill/>
-          <a:ln w="9525">
-            <a:noFill/>
-            <a:headEnd/>
-            <a:tailEnd/>
-          </a:ln>
-        </p:spPr>
-      </p:pic>
-      <p:sp>
-        <p:nvSpPr>
-          <p:cNvPr id="5" name="TextBox 3"/>
-          <p:cNvSpPr txBox="1"/>
-          <p:nvPr/>
-        </p:nvSpPr>
-        <p:spPr>
-          <a:xfrm>
-            <a:off x="6255674" y="4186383"/>
-            <a:ext cx="2535382" cy="508000"/>
-          </a:xfrm>
-          <a:prstGeom prst="rect">
-            <a:avLst/>
-          </a:prstGeom>
-          <a:noFill/>
-        </p:spPr>
-        <p:txBody>
-          <a:bodyPr/>
-          <a:lstStyle/>
-          <a:p>
-            <a:pPr marL="0" lvl="0" indent="0" algn="ctr">
-              <a:buNone/>
-            </a:pPr>
-            <a:r>
-              <a:rPr dirty="0"/>
-              <a:t>Joseph Fourier</a:t>
-            </a:r>
-          </a:p>
-        </p:txBody>
-      </p:sp>
-    </p:spTree>
-  </p:cSld>
-  <p:clrMapOvr>
-    <a:masterClrMapping/>
-  </p:clrMapOvr>
-</p:sld>
-</file>
-
-<file path=ppt/slides/slide60.xml><?xml version="1.0" encoding="utf-8"?>
+<file path=ppt/slides/slide61.xml><?xml version="1.0" encoding="utf-8"?>
 <p:sld xmlns:a="http://schemas.openxmlformats.org/drawingml/2006/main" xmlns:r="http://schemas.openxmlformats.org/officeDocument/2006/relationships" xmlns:p="http://schemas.openxmlformats.org/presentationml/2006/main">
   <p:cSld>
     <p:spTree>
@@ -21349,7 +22312,7 @@
           <a:p>
             <a:r>
               <a:rPr lang="en-US" sz="2000" dirty="0"/>
-              <a:t>ADF; reject hypothesis of non-trend-stationary </a:t>
+              <a:t>ADF; reject hypothesis of trend-nonstationary </a:t>
             </a:r>
           </a:p>
           <a:p>
@@ -21461,7 +22424,7 @@
 </p:sld>
 </file>
 
-<file path=ppt/slides/slide61.xml><?xml version="1.0" encoding="utf-8"?>
+<file path=ppt/slides/slide62.xml><?xml version="1.0" encoding="utf-8"?>
 <p:sld xmlns:a="http://schemas.openxmlformats.org/drawingml/2006/main" xmlns:r="http://schemas.openxmlformats.org/officeDocument/2006/relationships" xmlns:p="http://schemas.openxmlformats.org/presentationml/2006/main">
   <p:cSld>
     <p:spTree>
@@ -21806,7 +22769,7 @@
           <a:p>
             <a:r>
               <a:rPr lang="en-US" sz="2000" dirty="0"/>
-              <a:t>ADF; reject hypothesis of non-trend-stationary </a:t>
+              <a:t>ADF; reject hypothesis of trend-nonstationary </a:t>
             </a:r>
           </a:p>
           <a:p>
@@ -21826,7 +22789,7 @@
             </a:r>
             <a:r>
               <a:rPr lang="en-US" sz="2000" dirty="0"/>
-              <a:t>, perhaps result of low power of test!</a:t>
+              <a:t>, perhaps result of noise and low power of test!</a:t>
             </a:r>
           </a:p>
         </p:txBody>
@@ -21932,7 +22895,7 @@
 </p:sld>
 </file>
 
-<file path=ppt/slides/slide62.xml><?xml version="1.0" encoding="utf-8"?>
+<file path=ppt/slides/slide63.xml><?xml version="1.0" encoding="utf-8"?>
 <p:sld xmlns:a="http://schemas.openxmlformats.org/drawingml/2006/main" xmlns:r="http://schemas.openxmlformats.org/officeDocument/2006/relationships" xmlns:p="http://schemas.openxmlformats.org/presentationml/2006/main">
   <p:cSld>
     <p:spTree>

</xml_diff>

<commit_message>
Small updates and correction slides
</commit_message>
<xml_diff>
--- a/LectureSlides/11_IntroductionToTimeSeries.pptx
+++ b/LectureSlides/11_IntroductionToTimeSeries.pptx
@@ -364,7 +364,7 @@
           <a:p>
             <a:fld id="{241EB5C9-1307-BA42-ABA2-0BC069CD8E7F}" type="datetimeFigureOut">
               <a:rPr lang="en-US" smtClean="0"/>
-              <a:t>11/4/2024</a:t>
+              <a:t>11/5/2024</a:t>
             </a:fld>
             <a:endParaRPr lang="en-US"/>
           </a:p>
@@ -532,7 +532,7 @@
           <a:p>
             <a:fld id="{241EB5C9-1307-BA42-ABA2-0BC069CD8E7F}" type="datetimeFigureOut">
               <a:rPr lang="en-US" smtClean="0"/>
-              <a:t>11/4/2024</a:t>
+              <a:t>11/5/2024</a:t>
             </a:fld>
             <a:endParaRPr lang="en-US"/>
           </a:p>
@@ -710,7 +710,7 @@
           <a:p>
             <a:fld id="{241EB5C9-1307-BA42-ABA2-0BC069CD8E7F}" type="datetimeFigureOut">
               <a:rPr lang="en-US" smtClean="0"/>
-              <a:t>11/4/2024</a:t>
+              <a:t>11/5/2024</a:t>
             </a:fld>
             <a:endParaRPr lang="en-US"/>
           </a:p>
@@ -878,7 +878,7 @@
           <a:p>
             <a:fld id="{241EB5C9-1307-BA42-ABA2-0BC069CD8E7F}" type="datetimeFigureOut">
               <a:rPr lang="en-US" smtClean="0"/>
-              <a:t>11/4/2024</a:t>
+              <a:t>11/5/2024</a:t>
             </a:fld>
             <a:endParaRPr lang="en-US"/>
           </a:p>
@@ -1123,7 +1123,7 @@
           <a:p>
             <a:fld id="{241EB5C9-1307-BA42-ABA2-0BC069CD8E7F}" type="datetimeFigureOut">
               <a:rPr lang="en-US" smtClean="0"/>
-              <a:t>11/4/2024</a:t>
+              <a:t>11/5/2024</a:t>
             </a:fld>
             <a:endParaRPr lang="en-US"/>
           </a:p>
@@ -1408,7 +1408,7 @@
           <a:p>
             <a:fld id="{241EB5C9-1307-BA42-ABA2-0BC069CD8E7F}" type="datetimeFigureOut">
               <a:rPr lang="en-US" smtClean="0"/>
-              <a:t>11/4/2024</a:t>
+              <a:t>11/5/2024</a:t>
             </a:fld>
             <a:endParaRPr lang="en-US"/>
           </a:p>
@@ -1827,7 +1827,7 @@
           <a:p>
             <a:fld id="{241EB5C9-1307-BA42-ABA2-0BC069CD8E7F}" type="datetimeFigureOut">
               <a:rPr lang="en-US" smtClean="0"/>
-              <a:t>11/4/2024</a:t>
+              <a:t>11/5/2024</a:t>
             </a:fld>
             <a:endParaRPr lang="en-US"/>
           </a:p>
@@ -1944,7 +1944,7 @@
           <a:p>
             <a:fld id="{241EB5C9-1307-BA42-ABA2-0BC069CD8E7F}" type="datetimeFigureOut">
               <a:rPr lang="en-US" smtClean="0"/>
-              <a:t>11/4/2024</a:t>
+              <a:t>11/5/2024</a:t>
             </a:fld>
             <a:endParaRPr lang="en-US"/>
           </a:p>
@@ -2039,7 +2039,7 @@
           <a:p>
             <a:fld id="{241EB5C9-1307-BA42-ABA2-0BC069CD8E7F}" type="datetimeFigureOut">
               <a:rPr lang="en-US" smtClean="0"/>
-              <a:t>11/4/2024</a:t>
+              <a:t>11/5/2024</a:t>
             </a:fld>
             <a:endParaRPr lang="en-US"/>
           </a:p>
@@ -2314,7 +2314,7 @@
           <a:p>
             <a:fld id="{241EB5C9-1307-BA42-ABA2-0BC069CD8E7F}" type="datetimeFigureOut">
               <a:rPr lang="en-US" smtClean="0"/>
-              <a:t>11/4/2024</a:t>
+              <a:t>11/5/2024</a:t>
             </a:fld>
             <a:endParaRPr lang="en-US"/>
           </a:p>
@@ -2566,7 +2566,7 @@
           <a:p>
             <a:fld id="{241EB5C9-1307-BA42-ABA2-0BC069CD8E7F}" type="datetimeFigureOut">
               <a:rPr lang="en-US" smtClean="0"/>
-              <a:t>11/4/2024</a:t>
+              <a:t>11/5/2024</a:t>
             </a:fld>
             <a:endParaRPr lang="en-US"/>
           </a:p>
@@ -2777,7 +2777,7 @@
           <a:p>
             <a:fld id="{241EB5C9-1307-BA42-ABA2-0BC069CD8E7F}" type="datetimeFigureOut">
               <a:rPr lang="en-US" smtClean="0"/>
-              <a:t>11/4/2024</a:t>
+              <a:t>11/5/2024</a:t>
             </a:fld>
             <a:endParaRPr lang="en-US"/>
           </a:p>
@@ -3585,7 +3585,7 @@
         </p:spPr>
         <p:txBody>
           <a:bodyPr>
-            <a:normAutofit fontScale="92500" lnSpcReduction="20000"/>
+            <a:normAutofit fontScale="85000" lnSpcReduction="20000"/>
           </a:bodyPr>
           <a:lstStyle/>
           <a:p>
@@ -3595,6 +3595,17 @@
             <a:r>
               <a:rPr dirty="0"/>
               <a:t>Most statistical packages have considerable time series modeling capability</a:t>
+            </a:r>
+          </a:p>
+          <a:p>
+            <a:pPr lvl="0"/>
+            <a:r>
+              <a:rPr lang="en-US" dirty="0"/>
+              <a:t>Statistical time series analysis allows </a:t>
+            </a:r>
+            <a:r>
+              <a:rPr lang="en-US" b="1" dirty="0"/>
+              <a:t>inference on models! </a:t>
             </a:r>
           </a:p>
           <a:p>
@@ -3628,7 +3639,15 @@
             <a:pPr lvl="0"/>
             <a:r>
               <a:rPr dirty="0"/>
-              <a:t>Primary Python time series analysis package in </a:t>
+              <a:t>Primary Python time series analysis package i</a:t>
+            </a:r>
+            <a:r>
+              <a:rPr lang="en-US" dirty="0"/>
+              <a:t>s</a:t>
+            </a:r>
+            <a:r>
+              <a:rPr dirty="0"/>
+              <a:t> </a:t>
             </a:r>
             <a:r>
               <a:rPr dirty="0" err="1">
@@ -3691,7 +3710,19 @@
               <a:rPr dirty="0">
                 <a:hlinkClick r:id="rId6"/>
               </a:rPr>
-              <a:t>Meta Kats</a:t>
+              <a:t>Meta</a:t>
+            </a:r>
+            <a:r>
+              <a:rPr lang="en-US" dirty="0">
+                <a:hlinkClick r:id="rId6"/>
+              </a:rPr>
+              <a:t>’s</a:t>
+            </a:r>
+            <a:r>
+              <a:rPr dirty="0">
+                <a:hlinkClick r:id="rId6"/>
+              </a:rPr>
+              <a:t> Kats</a:t>
             </a:r>
             <a:r>
               <a:rPr dirty="0"/>
@@ -3907,8 +3938,8 @@
           </a:p>
         </p:txBody>
       </p:sp>
-      <mc:AlternateContent xmlns:mc="http://schemas.openxmlformats.org/markup-compatibility/2006">
-        <mc:Choice xmlns:a14="http://schemas.microsoft.com/office/drawing/2010/main" Requires="a14">
+      <mc:AlternateContent xmlns:mc="http://schemas.openxmlformats.org/markup-compatibility/2006" xmlns:a14="http://schemas.microsoft.com/office/drawing/2010/main">
+        <mc:Choice Requires="a14">
           <p:sp>
             <p:nvSpPr>
               <p:cNvPr id="3" name="Content Placeholder 2"/>
@@ -4295,7 +4326,7 @@
             </p:txBody>
           </p:sp>
         </mc:Choice>
-        <mc:Fallback>
+        <mc:Fallback xmlns="">
           <p:sp>
             <p:nvSpPr>
               <p:cNvPr id="3" name="Content Placeholder 2"/>
@@ -4378,8 +4409,8 @@
           </a:p>
         </p:txBody>
       </p:sp>
-      <mc:AlternateContent xmlns:mc="http://schemas.openxmlformats.org/markup-compatibility/2006">
-        <mc:Choice xmlns:a14="http://schemas.microsoft.com/office/drawing/2010/main" Requires="a14">
+      <mc:AlternateContent xmlns:mc="http://schemas.openxmlformats.org/markup-compatibility/2006" xmlns:a14="http://schemas.microsoft.com/office/drawing/2010/main">
+        <mc:Choice Requires="a14">
           <p:sp>
             <p:nvSpPr>
               <p:cNvPr id="3" name="Content Placeholder 2"/>
@@ -4935,7 +4966,7 @@
             </p:txBody>
           </p:sp>
         </mc:Choice>
-        <mc:Fallback>
+        <mc:Fallback xmlns="">
           <p:sp>
             <p:nvSpPr>
               <p:cNvPr id="3" name="Content Placeholder 2"/>
@@ -5383,7 +5414,15 @@
             </a:r>
             <a:r>
               <a:rPr dirty="0"/>
-              <a:t> a stationary time series has </a:t>
+              <a:t> a </a:t>
+            </a:r>
+            <a:r>
+              <a:rPr lang="en-US" dirty="0"/>
+              <a:t>second order </a:t>
+            </a:r>
+            <a:r>
+              <a:rPr dirty="0"/>
+              <a:t>stationary time series has </a:t>
             </a:r>
             <a:r>
               <a:rPr b="1" dirty="0"/>
@@ -5404,15 +5443,12 @@
           <a:p>
             <a:pPr lvl="1"/>
             <a:r>
+              <a:rPr lang="en-US" dirty="0"/>
+              <a:t>T</a:t>
+            </a:r>
+            <a:r>
               <a:rPr dirty="0"/>
-              <a:t>Often transform time series to make them stationary</a:t>
-            </a:r>
-          </a:p>
-          <a:p>
-            <a:pPr lvl="1"/>
-            <a:r>
-              <a:rPr dirty="0"/>
-              <a:t>More on this later</a:t>
+              <a:t>ransform time series to make them stationary</a:t>
             </a:r>
           </a:p>
         </p:txBody>
@@ -5743,10 +5779,20 @@
           <a:bodyPr/>
           <a:lstStyle/>
           <a:p>
-            <a:pPr lvl="0"/>
+            <a:pPr marL="0" lvl="0" indent="0">
+              <a:buNone/>
+            </a:pPr>
             <a:r>
               <a:rPr dirty="0"/>
-              <a:t>Estimates 30% of data science problems include time series data</a:t>
+              <a:t>Estimate</a:t>
+            </a:r>
+            <a:r>
+              <a:rPr lang="en-US" dirty="0"/>
+              <a:t>d </a:t>
+            </a:r>
+            <a:r>
+              <a:rPr dirty="0"/>
+              <a:t>30% of data science problems include time series data</a:t>
             </a:r>
           </a:p>
           <a:p>
@@ -7260,8 +7306,8 @@
           </a:p>
         </p:txBody>
       </p:sp>
-      <mc:AlternateContent xmlns:mc="http://schemas.openxmlformats.org/markup-compatibility/2006" xmlns:a14="http://schemas.microsoft.com/office/drawing/2010/main">
-        <mc:Choice Requires="a14">
+      <mc:AlternateContent xmlns:mc="http://schemas.openxmlformats.org/markup-compatibility/2006">
+        <mc:Choice xmlns:a14="http://schemas.microsoft.com/office/drawing/2010/main" Requires="a14">
           <p:sp>
             <p:nvSpPr>
               <p:cNvPr id="3" name="Content Placeholder 2"/>
@@ -7562,14 +7608,14 @@
                 </a:r>
                 <a:r>
                   <a:rPr lang="en-US" dirty="0"/>
-                  <a:t>distributed</a:t>
+                  <a:t>distributed for small samples</a:t>
                 </a:r>
               </a:p>
               <a:p>
                 <a:pPr lvl="0"/>
                 <a:r>
                   <a:rPr lang="en-US" dirty="0"/>
-                  <a:t>Null hypothesis is no serial correlation between</a:t>
+                  <a:t>Null hypothesis is no serial correlation</a:t>
                 </a:r>
               </a:p>
               <a:p>
@@ -7632,7 +7678,7 @@
             </p:txBody>
           </p:sp>
         </mc:Choice>
-        <mc:Fallback xmlns="">
+        <mc:Fallback>
           <p:sp>
             <p:nvSpPr>
               <p:cNvPr id="3" name="Content Placeholder 2"/>
@@ -11417,8 +11463,8 @@
           </a:p>
         </p:txBody>
       </p:sp>
-      <mc:AlternateContent xmlns:mc="http://schemas.openxmlformats.org/markup-compatibility/2006" xmlns:a14="http://schemas.microsoft.com/office/drawing/2010/main">
-        <mc:Choice Requires="a14">
+      <mc:AlternateContent xmlns:mc="http://schemas.openxmlformats.org/markup-compatibility/2006">
+        <mc:Choice xmlns:a14="http://schemas.microsoft.com/office/drawing/2010/main" Requires="a14">
           <p:sp>
             <p:nvSpPr>
               <p:cNvPr id="3" name="Content Placeholder 2"/>
@@ -11478,7 +11524,15 @@
                 <a:pPr lvl="1"/>
                 <a:r>
                   <a:rPr dirty="0"/>
-                  <a:t>Last day of the month</a:t>
+                  <a:t>Last day of </a:t>
+                </a:r>
+                <a:r>
+                  <a:rPr lang="en-US" dirty="0"/>
+                  <a:t>a</a:t>
+                </a:r>
+                <a:r>
+                  <a:rPr dirty="0"/>
+                  <a:t> month</a:t>
                 </a:r>
               </a:p>
               <a:p>
@@ -11501,19 +11555,17 @@
                   <a:rPr dirty="0"/>
                   <a:t>Option expiration date</a:t>
                 </a:r>
+                <a:r>
+                  <a:rPr lang="en-US" dirty="0"/>
+                  <a:t>s</a:t>
+                </a:r>
+                <a:endParaRPr dirty="0"/>
               </a:p>
               <a:p>
                 <a:pPr lvl="1"/>
                 <a:r>
                   <a:rPr dirty="0"/>
                   <a:t>Game day, e.g. Supper Bowl</a:t>
-                </a:r>
-              </a:p>
-              <a:p>
-                <a:pPr lvl="1"/>
-                <a:r>
-                  <a:rPr dirty="0"/>
-                  <a:t>Electrical impulses in a heart - EKG</a:t>
                 </a:r>
               </a:p>
               <a:p>
@@ -11554,7 +11606,7 @@
             </p:txBody>
           </p:sp>
         </mc:Choice>
-        <mc:Fallback xmlns="">
+        <mc:Fallback>
           <p:sp>
             <p:nvSpPr>
               <p:cNvPr id="3" name="Content Placeholder 2"/>
@@ -11573,7 +11625,7 @@
               <a:blipFill>
                 <a:blip r:embed="rId2"/>
                 <a:stretch>
-                  <a:fillRect l="-667" t="-2145" b="-1980"/>
+                  <a:fillRect l="-667" t="-2145"/>
                 </a:stretch>
               </a:blipFill>
             </p:spPr>
@@ -12197,12 +12249,16 @@
               <a:buNone/>
             </a:pPr>
             <a:r>
+              <a:rPr lang="en-US" dirty="0"/>
+              <a:t>Possible m</a:t>
+            </a:r>
+            <a:r>
               <a:rPr dirty="0"/>
-              <a:t>Use regression models </a:t>
+              <a:t>odels </a:t>
             </a:r>
             <a:r>
               <a:rPr lang="en-US" dirty="0"/>
-              <a:t>to find parameters for</a:t>
+              <a:t>for</a:t>
             </a:r>
             <a:r>
               <a:rPr dirty="0"/>
@@ -12213,28 +12269,69 @@
             <a:pPr lvl="0"/>
             <a:r>
               <a:rPr dirty="0"/>
-              <a:t>Simple regression model:</a:t>
-            </a:r>
+              <a:t>Simple regression model</a:t>
+            </a:r>
+            <a:r>
+              <a:rPr lang="en-US" dirty="0"/>
+              <a:t> with c</a:t>
+            </a:r>
+            <a:r>
+              <a:rPr dirty="0"/>
+              <a:t>oefficient for each interval in period; </a:t>
+            </a:r>
+            <a:endParaRPr lang="en-US" dirty="0"/>
           </a:p>
           <a:p>
             <a:pPr lvl="1"/>
             <a:r>
+              <a:rPr lang="en-US" dirty="0"/>
+              <a:t>Example; </a:t>
+            </a:r>
+            <a:r>
               <a:rPr dirty="0"/>
-              <a:t>Coefficient for each interval in period; e.g. 12 coefficients for monthly effects</a:t>
-            </a:r>
-          </a:p>
-          <a:p>
-            <a:pPr lvl="2"/>
+              <a:t>12 coefficients for monthly effects</a:t>
+            </a:r>
+          </a:p>
+          <a:p>
+            <a:pPr lvl="1"/>
             <a:r>
               <a:rPr dirty="0"/>
-              <a:t>But simple approach leads to high variance estimates of coefficients for periodic behavior</a:t>
+              <a:t>But </a:t>
+            </a:r>
+            <a:r>
+              <a:rPr lang="en-US" dirty="0"/>
+              <a:t>OLS </a:t>
+            </a:r>
+            <a:r>
+              <a:rPr dirty="0"/>
+              <a:t>approach </a:t>
+            </a:r>
+            <a:r>
+              <a:rPr lang="en-US" dirty="0"/>
+              <a:t>ignores serial correlation </a:t>
+            </a:r>
+            <a:r>
+              <a:rPr dirty="0"/>
+              <a:t>lead</a:t>
+            </a:r>
+            <a:r>
+              <a:rPr lang="en-US" dirty="0"/>
+              <a:t>ing</a:t>
+            </a:r>
+            <a:r>
+              <a:rPr dirty="0"/>
+              <a:t> to high variance estimates of coefficients</a:t>
             </a:r>
           </a:p>
           <a:p>
             <a:pPr lvl="1"/>
             <a:r>
+              <a:rPr lang="en-US" dirty="0"/>
+              <a:t>Example; c</a:t>
+            </a:r>
+            <a:r>
               <a:rPr dirty="0"/>
-              <a:t>Coefficient for specific effect - e.g. date of holiday</a:t>
+              <a:t>oefficient for specific effect - e.g. date of holiday</a:t>
             </a:r>
           </a:p>
           <a:p>
@@ -12278,17 +12375,18 @@
           <a:p>
             <a:pPr lvl="0"/>
             <a:r>
+              <a:rPr lang="en-US" b="1" dirty="0"/>
+              <a:t>S</a:t>
+            </a:r>
+            <a:r>
+              <a:rPr b="1" dirty="0"/>
+              <a:t>easonal difference</a:t>
+            </a:r>
+            <a:r>
               <a:rPr lang="en-US" dirty="0"/>
-              <a:t>Alternative, t</a:t>
-            </a:r>
-            <a:r>
-              <a:rPr dirty="0"/>
-              <a:t>ake </a:t>
-            </a:r>
-            <a:r>
-              <a:rPr b="1" dirty="0"/>
-              <a:t>seasonal differences</a:t>
-            </a:r>
+              <a:t> model</a:t>
+            </a:r>
+            <a:endParaRPr b="1" dirty="0"/>
           </a:p>
         </p:txBody>
       </p:sp>
@@ -12359,7 +12457,7 @@
         <p:spPr/>
         <p:txBody>
           <a:bodyPr>
-            <a:normAutofit fontScale="92500" lnSpcReduction="10000"/>
+            <a:normAutofit fontScale="92500"/>
           </a:bodyPr>
           <a:lstStyle/>
           <a:p>
@@ -12399,7 +12497,7 @@
             <a:pPr lvl="1"/>
             <a:r>
               <a:rPr dirty="0"/>
-              <a:t>Uses a nonparametric and nonlinear local regression model, LOESS, to decompose trend component</a:t>
+              <a:t>Uses a nonparametric nonlinear local regression model, LOESS, to decompose trend component</a:t>
             </a:r>
           </a:p>
           <a:p>
@@ -12445,7 +12543,6 @@
             </a:r>
           </a:p>
           <a:p>
-            <a:pPr lvl="1"/>
             <a:r>
               <a:rPr dirty="0"/>
               <a:t>MSTL adds modeling of </a:t>
@@ -12454,14 +12551,6 @@
               <a:rPr b="1" dirty="0"/>
               <a:t>multiple seasonal components</a:t>
             </a:r>
-          </a:p>
-          <a:p>
-            <a:pPr lvl="0"/>
-            <a:r>
-              <a:rPr lang="en-US" dirty="0"/>
-              <a:t>Seasonal differencing model removes seasonal effects </a:t>
-            </a:r>
-            <a:endParaRPr dirty="0"/>
           </a:p>
         </p:txBody>
       </p:sp>
@@ -12527,7 +12616,7 @@
         <p:spPr/>
         <p:txBody>
           <a:bodyPr>
-            <a:normAutofit fontScale="92500" lnSpcReduction="10000"/>
+            <a:normAutofit lnSpcReduction="10000"/>
           </a:bodyPr>
           <a:lstStyle/>
           <a:p>
@@ -12579,21 +12668,6 @@
             <a:r>
               <a:rPr dirty="0"/>
               <a:t>But, this is not the case for time series data</a:t>
-            </a:r>
-          </a:p>
-          <a:p>
-            <a:pPr lvl="0"/>
-            <a:r>
-              <a:rPr dirty="0"/>
-              <a:t>Time series values </a:t>
-            </a:r>
-            <a:r>
-              <a:rPr lang="en-US" dirty="0"/>
-              <a:t>exhibit are </a:t>
-            </a:r>
-            <a:r>
-              <a:rPr dirty="0"/>
-              <a:t>correlated in time</a:t>
             </a:r>
           </a:p>
           <a:p>
@@ -13147,7 +13221,15 @@
                 <a:pPr lvl="0"/>
                 <a:r>
                   <a:rPr dirty="0"/>
-                  <a:t>The multiplicative form is can be hard to work with, so log transform to additive model</a:t>
+                  <a:t>The multiplicative form is can be hard to work with, so log</a:t>
+                </a:r>
+                <a:r>
+                  <a:rPr lang="en-US" dirty="0"/>
+                  <a:t>-</a:t>
+                </a:r>
+                <a:r>
+                  <a:rPr dirty="0"/>
+                  <a:t>transform to additive model</a:t>
                 </a:r>
               </a:p>
               <a:p>
@@ -13302,7 +13384,7 @@
                 </a:pPr>
                 <a:r>
                   <a:rPr lang="en-US" sz="2000" dirty="0"/>
-                  <a:t>The original nonstationary series</a:t>
+                  <a:t>Original nonstationary series</a:t>
                 </a:r>
               </a:p>
               <a:p>
@@ -13663,8 +13745,8 @@
         </p:nvCxnSpPr>
         <p:spPr>
           <a:xfrm>
-            <a:off x="4318462" y="2019993"/>
-            <a:ext cx="1122218" cy="0"/>
+            <a:off x="3928230" y="2019993"/>
+            <a:ext cx="1512450" cy="0"/>
           </a:xfrm>
           <a:prstGeom prst="straightConnector1">
             <a:avLst/>
@@ -14040,7 +14122,7 @@
                             <m:t>−</m:t>
                           </m:r>
                           <m:r>
-                            <a:rPr lang="ar-AE">
+                            <a:rPr lang="ar-AE" smtClean="0">
                               <a:latin typeface="Cambria Math" panose="02040503050406030204" pitchFamily="18" charset="0"/>
                             </a:rPr>
                             <m:t>𝛿</m:t>
@@ -14072,7 +14154,7 @@
                 <a14:m>
                   <m:oMath xmlns:m="http://schemas.openxmlformats.org/officeDocument/2006/math">
                     <m:r>
-                      <a:rPr lang="en-US">
+                      <a:rPr lang="en-US" smtClean="0">
                         <a:latin typeface="Cambria Math" panose="02040503050406030204" pitchFamily="18" charset="0"/>
                       </a:rPr>
                       <m:t>𝛿</m:t>
@@ -14186,8 +14268,8 @@
           </a:p>
         </p:txBody>
       </p:sp>
-      <mc:AlternateContent xmlns:mc="http://schemas.openxmlformats.org/markup-compatibility/2006">
-        <mc:Choice xmlns:a14="http://schemas.microsoft.com/office/drawing/2010/main" Requires="a14">
+      <mc:AlternateContent xmlns:mc="http://schemas.openxmlformats.org/markup-compatibility/2006" xmlns:a14="http://schemas.microsoft.com/office/drawing/2010/main">
+        <mc:Choice Requires="a14">
           <p:sp>
             <p:nvSpPr>
               <p:cNvPr id="3" name="Content Placeholder 2"/>
@@ -14329,7 +14411,7 @@
                             <m:t>−</m:t>
                           </m:r>
                           <m:r>
-                            <a:rPr lang="ar-AE">
+                            <a:rPr lang="ar-AE" smtClean="0">
                               <a:latin typeface="Cambria Math" panose="02040503050406030204" pitchFamily="18" charset="0"/>
                             </a:rPr>
                             <m:t>𝛿</m:t>
@@ -14377,7 +14459,7 @@
                 <a14:m>
                   <m:oMath xmlns:m="http://schemas.openxmlformats.org/officeDocument/2006/math">
                     <m:r>
-                      <a:rPr lang="en-US">
+                      <a:rPr lang="en-US" smtClean="0">
                         <a:latin typeface="Cambria Math" panose="02040503050406030204" pitchFamily="18" charset="0"/>
                       </a:rPr>
                       <m:t>𝛿</m:t>
@@ -14416,7 +14498,7 @@
                 <a14:m>
                   <m:oMath xmlns:m="http://schemas.openxmlformats.org/officeDocument/2006/math">
                     <m:r>
-                      <a:rPr lang="en-US">
+                      <a:rPr lang="en-US" smtClean="0">
                         <a:latin typeface="Cambria Math" panose="02040503050406030204" pitchFamily="18" charset="0"/>
                       </a:rPr>
                       <m:t>𝛿</m:t>
@@ -14702,7 +14784,7 @@
             </p:txBody>
           </p:sp>
         </mc:Choice>
-        <mc:Fallback>
+        <mc:Fallback xmlns="">
           <p:sp>
             <p:nvSpPr>
               <p:cNvPr id="3" name="Content Placeholder 2"/>
@@ -15935,8 +16017,8 @@
           </a:p>
         </p:txBody>
       </p:sp>
-      <mc:AlternateContent xmlns:mc="http://schemas.openxmlformats.org/markup-compatibility/2006">
-        <mc:Choice xmlns:a14="http://schemas.microsoft.com/office/drawing/2010/main" Requires="a14">
+      <mc:AlternateContent xmlns:mc="http://schemas.openxmlformats.org/markup-compatibility/2006" xmlns:a14="http://schemas.microsoft.com/office/drawing/2010/main">
+        <mc:Choice Requires="a14">
           <p:sp>
             <p:nvSpPr>
               <p:cNvPr id="3" name="Content Placeholder 2">
@@ -16760,7 +16842,7 @@
             </p:txBody>
           </p:sp>
         </mc:Choice>
-        <mc:Fallback>
+        <mc:Fallback xmlns="">
           <p:sp>
             <p:nvSpPr>
               <p:cNvPr id="3" name="Content Placeholder 2">
@@ -17118,7 +17200,7 @@
         </p:spPr>
         <p:txBody>
           <a:bodyPr>
-            <a:normAutofit fontScale="92500"/>
+            <a:normAutofit fontScale="92500" lnSpcReduction="10000"/>
           </a:bodyPr>
           <a:lstStyle/>
           <a:p>
@@ -17195,10 +17277,13 @@
               <a:t>Note</a:t>
             </a:r>
             <a:r>
-              <a:rPr dirty="0"/>
+              <a:rPr b="1" dirty="0"/>
               <a:t>, a stationary series does not preclude the presence of serial correlations</a:t>
             </a:r>
-            <a:endParaRPr lang="en-US" dirty="0"/>
+            <a:r>
+              <a:rPr lang="en-US" b="1" dirty="0"/>
+              <a:t>!</a:t>
+            </a:r>
           </a:p>
           <a:p>
             <a:pPr lvl="1"/>
@@ -17212,7 +17297,15 @@
             <a:pPr lvl="1"/>
             <a:r>
               <a:rPr dirty="0"/>
-              <a:t>Many time series models for serial correlation properties require stationarity</a:t>
+              <a:t>Many time series models for serial correlation properties </a:t>
+            </a:r>
+            <a:r>
+              <a:rPr lang="en-US" dirty="0"/>
+              <a:t>assume</a:t>
+            </a:r>
+            <a:r>
+              <a:rPr dirty="0"/>
+              <a:t> stationarity</a:t>
             </a:r>
           </a:p>
         </p:txBody>
@@ -17271,8 +17364,8 @@
           </a:p>
         </p:txBody>
       </p:sp>
-      <mc:AlternateContent xmlns:mc="http://schemas.openxmlformats.org/markup-compatibility/2006">
-        <mc:Choice xmlns:a14="http://schemas.microsoft.com/office/drawing/2010/main" Requires="a14">
+      <mc:AlternateContent xmlns:mc="http://schemas.openxmlformats.org/markup-compatibility/2006" xmlns:a14="http://schemas.microsoft.com/office/drawing/2010/main">
+        <mc:Choice Requires="a14">
           <p:sp>
             <p:nvSpPr>
               <p:cNvPr id="3" name="Content Placeholder 2"/>
@@ -17898,7 +17991,7 @@
             </p:txBody>
           </p:sp>
         </mc:Choice>
-        <mc:Fallback>
+        <mc:Fallback xmlns="">
           <p:sp>
             <p:nvSpPr>
               <p:cNvPr id="3" name="Content Placeholder 2"/>
@@ -17982,8 +18075,8 @@
           </a:p>
         </p:txBody>
       </p:sp>
-      <mc:AlternateContent xmlns:mc="http://schemas.openxmlformats.org/markup-compatibility/2006">
-        <mc:Choice xmlns:a14="http://schemas.microsoft.com/office/drawing/2010/main" Requires="a14">
+      <mc:AlternateContent xmlns:mc="http://schemas.openxmlformats.org/markup-compatibility/2006" xmlns:a14="http://schemas.microsoft.com/office/drawing/2010/main">
+        <mc:Choice Requires="a14">
           <p:sp>
             <p:nvSpPr>
               <p:cNvPr id="3" name="Content Placeholder 2"/>
@@ -18378,7 +18471,7 @@
                 <a:pPr lvl="0"/>
                 <a:r>
                   <a:rPr lang="en-US" dirty="0"/>
-                  <a:t>Gives rise to a random walk, which is stochastic and </a:t>
+                  <a:t>Gives rise to a random walk, which is completely stochastic and </a:t>
                 </a:r>
                 <a:r>
                   <a:rPr lang="en-US" b="1" dirty="0"/>
@@ -18504,7 +18597,7 @@
             </p:txBody>
           </p:sp>
         </mc:Choice>
-        <mc:Fallback>
+        <mc:Fallback xmlns="">
           <p:sp>
             <p:nvSpPr>
               <p:cNvPr id="3" name="Content Placeholder 2"/>
@@ -18613,7 +18706,15 @@
                 </a:pPr>
                 <a:r>
                   <a:rPr dirty="0"/>
-                  <a:t>A random walk is stochastic and </a:t>
+                  <a:t>A random walk</a:t>
+                </a:r>
+                <a:r>
+                  <a:rPr lang="en-US" dirty="0"/>
+                  <a:t> at the unit root</a:t>
+                </a:r>
+                <a:r>
+                  <a:rPr dirty="0"/>
+                  <a:t> is stochastic and </a:t>
                 </a:r>
                 <a:r>
                   <a:rPr b="1" dirty="0"/>
@@ -18833,8 +18934,8 @@
           </a:p>
         </p:txBody>
       </p:sp>
-      <mc:AlternateContent xmlns:mc="http://schemas.openxmlformats.org/markup-compatibility/2006">
-        <mc:Choice xmlns:a14="http://schemas.microsoft.com/office/drawing/2010/main" Requires="a14">
+      <mc:AlternateContent xmlns:mc="http://schemas.openxmlformats.org/markup-compatibility/2006" xmlns:a14="http://schemas.microsoft.com/office/drawing/2010/main">
+        <mc:Choice Requires="a14">
           <p:sp>
             <p:nvSpPr>
               <p:cNvPr id="3" name="Content Placeholder 2"/>
@@ -19054,7 +19155,7 @@
                 <a:pPr lvl="1"/>
                 <a:r>
                   <a:rPr lang="en-US" dirty="0"/>
-                  <a:t>Often constant is initial value, </a:t>
+                  <a:t>Constant is initial value, </a:t>
                 </a:r>
                 <a14:m>
                   <m:oMath xmlns:m="http://schemas.openxmlformats.org/officeDocument/2006/math">
@@ -19500,7 +19601,7 @@
             </p:txBody>
           </p:sp>
         </mc:Choice>
-        <mc:Fallback>
+        <mc:Fallback xmlns="">
           <p:sp>
             <p:nvSpPr>
               <p:cNvPr id="3" name="Content Placeholder 2"/>
@@ -19654,12 +19755,8 @@
               <a:t>Coefficients represent components of the time series, e.g. </a:t>
             </a:r>
             <a:r>
-              <a:rPr lang="en-US" dirty="0" err="1"/>
-              <a:t>constsant</a:t>
-            </a:r>
-            <a:r>
               <a:rPr lang="en-US" dirty="0"/>
-              <a:t>, </a:t>
+              <a:t>constant, </a:t>
             </a:r>
             <a:r>
               <a:rPr dirty="0"/>
@@ -19689,8 +19786,13 @@
             </a:r>
             <a:r>
               <a:rPr dirty="0"/>
-              <a:t> is a unit root test for stationarity about a trend of time series</a:t>
-            </a:r>
+              <a:t> is a unit root test for stationarity</a:t>
+            </a:r>
+            <a:r>
+              <a:rPr lang="en-US" dirty="0"/>
+              <a:t> on a time series</a:t>
+            </a:r>
+            <a:endParaRPr dirty="0"/>
           </a:p>
           <a:p>
             <a:pPr lvl="1"/>
@@ -19700,7 +19802,7 @@
             </a:r>
             <a:r>
               <a:rPr b="1" dirty="0"/>
-              <a:t>time series is trend stationary</a:t>
+              <a:t>time series is stationary</a:t>
             </a:r>
             <a:endParaRPr lang="en-US" b="1" dirty="0"/>
           </a:p>
@@ -19714,7 +19816,7 @@
                   <a:srgbClr val="C00000"/>
                 </a:solidFill>
               </a:rPr>
-              <a:t>Don’t me confused by the different null hypotheses for these tests!</a:t>
+              <a:t>Don’t be confused by the different null hypotheses for these tests!</a:t>
             </a:r>
             <a:endParaRPr dirty="0">
               <a:solidFill>
@@ -19786,7 +19888,7 @@
         <p:spPr/>
         <p:txBody>
           <a:bodyPr>
-            <a:normAutofit lnSpcReduction="10000"/>
+            <a:normAutofit/>
           </a:bodyPr>
           <a:lstStyle/>
           <a:p>
@@ -19795,7 +19897,15 @@
             </a:pPr>
             <a:r>
               <a:rPr dirty="0"/>
-              <a:t>There is often a small difference between a time series </a:t>
+              <a:t>There is often a small difference between </a:t>
+            </a:r>
+            <a:r>
+              <a:rPr lang="en-US" dirty="0"/>
+              <a:t>a</a:t>
+            </a:r>
+            <a:r>
+              <a:rPr dirty="0"/>
+              <a:t> </a:t>
             </a:r>
             <a:r>
               <a:rPr lang="en-US" dirty="0"/>
@@ -19811,7 +19921,11 @@
             </a:r>
             <a:r>
               <a:rPr dirty="0"/>
-              <a:t>and a time series with a root close to unit</a:t>
+              <a:t>and a time series with a </a:t>
+            </a:r>
+            <a:r>
+              <a:rPr b="1" dirty="0"/>
+              <a:t>root close to unit</a:t>
             </a:r>
           </a:p>
           <a:p>
@@ -20798,7 +20912,7 @@
         <p:spPr>
           <a:xfrm flipH="1" flipV="1">
             <a:off x="4110644" y="1949335"/>
-            <a:ext cx="2340032" cy="511232"/>
+            <a:ext cx="2302457" cy="338715"/>
           </a:xfrm>
           <a:prstGeom prst="straightConnector1">
             <a:avLst/>
@@ -20842,7 +20956,7 @@
         <p:spPr>
           <a:xfrm flipH="1" flipV="1">
             <a:off x="5964383" y="1949335"/>
-            <a:ext cx="565264" cy="1201189"/>
+            <a:ext cx="486293" cy="733599"/>
           </a:xfrm>
           <a:prstGeom prst="straightConnector1">
             <a:avLst/>
@@ -21261,7 +21375,7 @@
         <p:spPr>
           <a:xfrm flipH="1" flipV="1">
             <a:off x="4110644" y="2090651"/>
-            <a:ext cx="2340032" cy="369916"/>
+            <a:ext cx="2227811" cy="249382"/>
           </a:xfrm>
           <a:prstGeom prst="straightConnector1">
             <a:avLst/>
@@ -21304,8 +21418,8 @@
         </p:nvCxnSpPr>
         <p:spPr>
           <a:xfrm flipH="1" flipV="1">
-            <a:off x="5964383" y="2090651"/>
-            <a:ext cx="357446" cy="552796"/>
+            <a:off x="5964383" y="2177935"/>
+            <a:ext cx="448886" cy="939338"/>
           </a:xfrm>
           <a:prstGeom prst="straightConnector1">
             <a:avLst/>
@@ -22312,13 +22426,19 @@
           <a:p>
             <a:r>
               <a:rPr lang="en-US" sz="2000" dirty="0"/>
+              <a:t>Compare results to non-trend models</a:t>
+            </a:r>
+          </a:p>
+          <a:p>
+            <a:r>
+              <a:rPr lang="en-US" sz="2000" dirty="0"/>
               <a:t>ADF; reject hypothesis of trend-nonstationary </a:t>
             </a:r>
           </a:p>
           <a:p>
             <a:r>
               <a:rPr lang="en-US" sz="2000" dirty="0"/>
-              <a:t>KPSS test cannot reject null hypothesis of trend-stationary </a:t>
+              <a:t>KPSS cannot reject null hypothesis of trend-stationary </a:t>
             </a:r>
           </a:p>
         </p:txBody>
@@ -22339,8 +22459,8 @@
         </p:nvCxnSpPr>
         <p:spPr>
           <a:xfrm flipH="1">
-            <a:off x="4081549" y="2460567"/>
-            <a:ext cx="2369127" cy="1093124"/>
+            <a:off x="4081549" y="2897258"/>
+            <a:ext cx="2231787" cy="656433"/>
           </a:xfrm>
           <a:prstGeom prst="straightConnector1">
             <a:avLst/>
@@ -22382,9 +22502,97 @@
           <p:nvPr/>
         </p:nvCxnSpPr>
         <p:spPr>
+          <a:xfrm flipH="1" flipV="1">
+            <a:off x="6005945" y="3553691"/>
+            <a:ext cx="307391" cy="183422"/>
+          </a:xfrm>
+          <a:prstGeom prst="straightConnector1">
+            <a:avLst/>
+          </a:prstGeom>
+          <a:ln>
+            <a:solidFill>
+              <a:schemeClr val="tx1"/>
+            </a:solidFill>
+            <a:tailEnd type="triangle"/>
+          </a:ln>
+        </p:spPr>
+        <p:style>
+          <a:lnRef idx="2">
+            <a:schemeClr val="accent1"/>
+          </a:lnRef>
+          <a:fillRef idx="0">
+            <a:schemeClr val="accent1"/>
+          </a:fillRef>
+          <a:effectRef idx="1">
+            <a:schemeClr val="accent1"/>
+          </a:effectRef>
+          <a:fontRef idx="minor">
+            <a:schemeClr val="tx1"/>
+          </a:fontRef>
+        </p:style>
+      </p:cxnSp>
+      <p:cxnSp>
+        <p:nvCxnSpPr>
+          <p:cNvPr id="10" name="Straight Arrow Connector 9">
+            <a:extLst>
+              <a:ext uri="{FF2B5EF4-FFF2-40B4-BE49-F238E27FC236}">
+                <a16:creationId xmlns:a16="http://schemas.microsoft.com/office/drawing/2014/main" id="{586645AF-BAAD-CB06-24D5-ECDE3416F898}"/>
+              </a:ext>
+            </a:extLst>
+          </p:cNvPr>
+          <p:cNvCxnSpPr>
+            <a:cxnSpLocks/>
+          </p:cNvCxnSpPr>
+          <p:nvPr/>
+        </p:nvCxnSpPr>
+        <p:spPr>
           <a:xfrm flipH="1">
-            <a:off x="6005945" y="3217025"/>
-            <a:ext cx="631768" cy="336666"/>
+            <a:off x="4081549" y="2067339"/>
+            <a:ext cx="2144684" cy="178904"/>
+          </a:xfrm>
+          <a:prstGeom prst="straightConnector1">
+            <a:avLst/>
+          </a:prstGeom>
+          <a:ln>
+            <a:solidFill>
+              <a:schemeClr val="tx1"/>
+            </a:solidFill>
+            <a:tailEnd type="triangle"/>
+          </a:ln>
+        </p:spPr>
+        <p:style>
+          <a:lnRef idx="2">
+            <a:schemeClr val="accent1"/>
+          </a:lnRef>
+          <a:fillRef idx="0">
+            <a:schemeClr val="accent1"/>
+          </a:fillRef>
+          <a:effectRef idx="1">
+            <a:schemeClr val="accent1"/>
+          </a:effectRef>
+          <a:fontRef idx="minor">
+            <a:schemeClr val="tx1"/>
+          </a:fontRef>
+        </p:style>
+      </p:cxnSp>
+      <p:cxnSp>
+        <p:nvCxnSpPr>
+          <p:cNvPr id="14" name="Straight Arrow Connector 13">
+            <a:extLst>
+              <a:ext uri="{FF2B5EF4-FFF2-40B4-BE49-F238E27FC236}">
+                <a16:creationId xmlns:a16="http://schemas.microsoft.com/office/drawing/2014/main" id="{EA647B32-D8C2-1DAA-AA27-97BAAE144B93}"/>
+              </a:ext>
+            </a:extLst>
+          </p:cNvPr>
+          <p:cNvCxnSpPr>
+            <a:cxnSpLocks/>
+          </p:cNvCxnSpPr>
+          <p:nvPr/>
+        </p:nvCxnSpPr>
+        <p:spPr>
+          <a:xfrm flipH="1">
+            <a:off x="5964383" y="2047195"/>
+            <a:ext cx="303412" cy="178904"/>
           </a:xfrm>
           <a:prstGeom prst="straightConnector1">
             <a:avLst/>
@@ -22472,6 +22680,7 @@
               <a:buNone/>
             </a:pPr>
             <a:r>
+              <a:rPr dirty="0"/>
               <a:t>Stationarity</a:t>
             </a:r>
           </a:p>
@@ -22769,13 +22978,13 @@
           <a:p>
             <a:r>
               <a:rPr lang="en-US" sz="2000" dirty="0"/>
-              <a:t>ADF; reject hypothesis of trend-nonstationary </a:t>
+              <a:t>ADF; cannot reject hypothesis of trend-nonstationary </a:t>
             </a:r>
           </a:p>
           <a:p>
             <a:r>
               <a:rPr lang="en-US" sz="2000" dirty="0"/>
-              <a:t>KPSS test cannot reject null hypothesis of trend-stationary </a:t>
+              <a:t>KPSS; cannot reject null hypothesis of trend-stationary </a:t>
             </a:r>
           </a:p>
           <a:p>
@@ -22810,8 +23019,8 @@
         </p:nvCxnSpPr>
         <p:spPr>
           <a:xfrm flipH="1">
-            <a:off x="4081549" y="2460567"/>
-            <a:ext cx="2369127" cy="1296786"/>
+            <a:off x="4081549" y="2397318"/>
+            <a:ext cx="2369127" cy="1360035"/>
           </a:xfrm>
           <a:prstGeom prst="straightConnector1">
             <a:avLst/>
@@ -22948,13 +23157,13 @@
         </p:nvSpPr>
         <p:spPr>
           <a:xfrm>
-            <a:off x="457200" y="1200150"/>
-            <a:ext cx="8229600" cy="3558885"/>
+            <a:off x="457200" y="970060"/>
+            <a:ext cx="8229600" cy="4007458"/>
           </a:xfrm>
         </p:spPr>
         <p:txBody>
           <a:bodyPr>
-            <a:normAutofit fontScale="77500" lnSpcReduction="20000"/>
+            <a:normAutofit fontScale="70000" lnSpcReduction="20000"/>
           </a:bodyPr>
           <a:lstStyle/>
           <a:p>
@@ -22990,23 +23199,53 @@
           <a:p>
             <a:pPr lvl="0"/>
             <a:r>
-              <a:rPr dirty="0"/>
-              <a:t>Autocorrelation and partial autocorrelation</a:t>
-            </a:r>
-          </a:p>
-          <a:p>
-            <a:pPr lvl="0"/>
+              <a:rPr lang="en-US" dirty="0"/>
+              <a:t>Predictable nonstationary components</a:t>
+            </a:r>
+          </a:p>
+          <a:p>
+            <a:pPr lvl="1"/>
             <a:r>
               <a:rPr dirty="0"/>
               <a:t>Trend</a:t>
             </a:r>
           </a:p>
           <a:p>
-            <a:pPr lvl="0"/>
+            <a:pPr lvl="1"/>
             <a:r>
               <a:rPr dirty="0"/>
-              <a:t>Seasonal components</a:t>
-            </a:r>
+              <a:t>S</a:t>
+            </a:r>
+            <a:r>
+              <a:rPr lang="en-US" dirty="0"/>
+              <a:t>ea</a:t>
+            </a:r>
+            <a:r>
+              <a:rPr dirty="0"/>
+              <a:t>sonal components</a:t>
+            </a:r>
+            <a:endParaRPr lang="en-US" dirty="0"/>
+          </a:p>
+          <a:p>
+            <a:r>
+              <a:rPr lang="en-US" dirty="0"/>
+              <a:t>Autocorrelation and partial autocorrelation</a:t>
+            </a:r>
+          </a:p>
+          <a:p>
+            <a:pPr lvl="1"/>
+            <a:r>
+              <a:rPr lang="en-US" dirty="0"/>
+              <a:t>Measures of serial correlation</a:t>
+            </a:r>
+          </a:p>
+          <a:p>
+            <a:pPr lvl="1"/>
+            <a:r>
+              <a:rPr lang="en-US" dirty="0"/>
+              <a:t>Independent of stationarity</a:t>
+            </a:r>
+            <a:endParaRPr dirty="0"/>
           </a:p>
           <a:p>
             <a:pPr lvl="0"/>
@@ -23522,7 +23761,15 @@
             <a:pPr lvl="0"/>
             <a:r>
               <a:rPr dirty="0"/>
-              <a:t>Included the </a:t>
+              <a:t>Included </a:t>
+            </a:r>
+            <a:r>
+              <a:rPr lang="en-US" dirty="0"/>
+              <a:t>a</a:t>
+            </a:r>
+            <a:r>
+              <a:rPr dirty="0"/>
+              <a:t> </a:t>
             </a:r>
             <a:r>
               <a:rPr b="1" dirty="0"/>

</xml_diff>